<commit_message>
Reconfigure folders, add Shasta data, and update Powerpoint
</commit_message>
<xml_diff>
--- a/Building daily CalLite model from scratch – daily.pptx
+++ b/Building daily CalLite model from scratch – daily.pptx
@@ -6,8 +6,15 @@
   </p:sldMasterIdLst>
   <p:sldIdLst>
     <p:sldId id="256" r:id="rId2"/>
-    <p:sldId id="257" r:id="rId3"/>
-    <p:sldId id="258" r:id="rId4"/>
+    <p:sldId id="265" r:id="rId3"/>
+    <p:sldId id="260" r:id="rId4"/>
+    <p:sldId id="263" r:id="rId5"/>
+    <p:sldId id="257" r:id="rId6"/>
+    <p:sldId id="259" r:id="rId7"/>
+    <p:sldId id="261" r:id="rId8"/>
+    <p:sldId id="262" r:id="rId9"/>
+    <p:sldId id="258" r:id="rId10"/>
+    <p:sldId id="264" r:id="rId11"/>
   </p:sldIdLst>
   <p:sldSz cx="12192000" cy="6858000"/>
   <p:notesSz cx="6858000" cy="9144000"/>
@@ -106,6 +113,11 @@
       </a:defRPr>
     </a:lvl9pPr>
   </p:defaultTextStyle>
+  <p:extLst>
+    <p:ext uri="{EFAFB233-063F-42B5-8137-9DF3F51BA10A}">
+      <p15:sldGuideLst xmlns:p15="http://schemas.microsoft.com/office/powerpoint/2012/main"/>
+    </p:ext>
+  </p:extLst>
 </p:presentation>
 </file>
 
@@ -256,7 +268,7 @@
           <a:p>
             <a:fld id="{DABA3B07-39EE-405B-8EBB-3517E9BED2D2}" type="datetimeFigureOut">
               <a:rPr lang="en-US" smtClean="0"/>
-              <a:t>9/1/2020</a:t>
+              <a:t>10/2/2020</a:t>
             </a:fld>
             <a:endParaRPr lang="en-US"/>
           </a:p>
@@ -454,7 +466,7 @@
           <a:p>
             <a:fld id="{DABA3B07-39EE-405B-8EBB-3517E9BED2D2}" type="datetimeFigureOut">
               <a:rPr lang="en-US" smtClean="0"/>
-              <a:t>9/1/2020</a:t>
+              <a:t>10/2/2020</a:t>
             </a:fld>
             <a:endParaRPr lang="en-US"/>
           </a:p>
@@ -662,7 +674,7 @@
           <a:p>
             <a:fld id="{DABA3B07-39EE-405B-8EBB-3517E9BED2D2}" type="datetimeFigureOut">
               <a:rPr lang="en-US" smtClean="0"/>
-              <a:t>9/1/2020</a:t>
+              <a:t>10/2/2020</a:t>
             </a:fld>
             <a:endParaRPr lang="en-US"/>
           </a:p>
@@ -860,7 +872,7 @@
           <a:p>
             <a:fld id="{DABA3B07-39EE-405B-8EBB-3517E9BED2D2}" type="datetimeFigureOut">
               <a:rPr lang="en-US" smtClean="0"/>
-              <a:t>9/1/2020</a:t>
+              <a:t>10/2/2020</a:t>
             </a:fld>
             <a:endParaRPr lang="en-US"/>
           </a:p>
@@ -1135,7 +1147,7 @@
           <a:p>
             <a:fld id="{DABA3B07-39EE-405B-8EBB-3517E9BED2D2}" type="datetimeFigureOut">
               <a:rPr lang="en-US" smtClean="0"/>
-              <a:t>9/1/2020</a:t>
+              <a:t>10/2/2020</a:t>
             </a:fld>
             <a:endParaRPr lang="en-US"/>
           </a:p>
@@ -1400,7 +1412,7 @@
           <a:p>
             <a:fld id="{DABA3B07-39EE-405B-8EBB-3517E9BED2D2}" type="datetimeFigureOut">
               <a:rPr lang="en-US" smtClean="0"/>
-              <a:t>9/1/2020</a:t>
+              <a:t>10/2/2020</a:t>
             </a:fld>
             <a:endParaRPr lang="en-US"/>
           </a:p>
@@ -1812,7 +1824,7 @@
           <a:p>
             <a:fld id="{DABA3B07-39EE-405B-8EBB-3517E9BED2D2}" type="datetimeFigureOut">
               <a:rPr lang="en-US" smtClean="0"/>
-              <a:t>9/1/2020</a:t>
+              <a:t>10/2/2020</a:t>
             </a:fld>
             <a:endParaRPr lang="en-US"/>
           </a:p>
@@ -1953,7 +1965,7 @@
           <a:p>
             <a:fld id="{DABA3B07-39EE-405B-8EBB-3517E9BED2D2}" type="datetimeFigureOut">
               <a:rPr lang="en-US" smtClean="0"/>
-              <a:t>9/1/2020</a:t>
+              <a:t>10/2/2020</a:t>
             </a:fld>
             <a:endParaRPr lang="en-US"/>
           </a:p>
@@ -2066,7 +2078,7 @@
           <a:p>
             <a:fld id="{DABA3B07-39EE-405B-8EBB-3517E9BED2D2}" type="datetimeFigureOut">
               <a:rPr lang="en-US" smtClean="0"/>
-              <a:t>9/1/2020</a:t>
+              <a:t>10/2/2020</a:t>
             </a:fld>
             <a:endParaRPr lang="en-US"/>
           </a:p>
@@ -2377,7 +2389,7 @@
           <a:p>
             <a:fld id="{DABA3B07-39EE-405B-8EBB-3517E9BED2D2}" type="datetimeFigureOut">
               <a:rPr lang="en-US" smtClean="0"/>
-              <a:t>9/1/2020</a:t>
+              <a:t>10/2/2020</a:t>
             </a:fld>
             <a:endParaRPr lang="en-US"/>
           </a:p>
@@ -2665,7 +2677,7 @@
           <a:p>
             <a:fld id="{DABA3B07-39EE-405B-8EBB-3517E9BED2D2}" type="datetimeFigureOut">
               <a:rPr lang="en-US" smtClean="0"/>
-              <a:t>9/1/2020</a:t>
+              <a:t>10/2/2020</a:t>
             </a:fld>
             <a:endParaRPr lang="en-US"/>
           </a:p>
@@ -2906,7 +2918,7 @@
           <a:p>
             <a:fld id="{DABA3B07-39EE-405B-8EBB-3517E9BED2D2}" type="datetimeFigureOut">
               <a:rPr lang="en-US" smtClean="0"/>
-              <a:t>9/1/2020</a:t>
+              <a:t>10/2/2020</a:t>
             </a:fld>
             <a:endParaRPr lang="en-US"/>
           </a:p>
@@ -3389,7 +3401,7 @@
 </p:sld>
 </file>
 
-<file path=ppt/slides/slide2.xml><?xml version="1.0" encoding="utf-8"?>
+<file path=ppt/slides/slide10.xml><?xml version="1.0" encoding="utf-8"?>
 <p:sld xmlns:a="http://schemas.openxmlformats.org/drawingml/2006/main" xmlns:r="http://schemas.openxmlformats.org/officeDocument/2006/relationships" xmlns:p="http://schemas.openxmlformats.org/presentationml/2006/main">
   <p:cSld>
     <p:bg>
@@ -3443,10 +3455,9 @@
           <a:lstStyle/>
           <a:p>
             <a:r>
-              <a:rPr lang="en-US"/>
-              <a:t>Phase 1</a:t>
-            </a:r>
-            <a:endParaRPr lang="en-US" dirty="0"/>
+              <a:rPr lang="en-US" sz="3700"/>
+              <a:t>Phase 2.1 – Shasta dam and outflow only</a:t>
+            </a:r>
           </a:p>
         </p:txBody>
       </p:sp>
@@ -3468,8 +3479,8 @@
         </p:nvSpPr>
         <p:spPr>
           <a:xfrm>
-            <a:off x="648931" y="1847462"/>
-            <a:ext cx="3505494" cy="4376358"/>
+            <a:off x="648931" y="2438400"/>
+            <a:ext cx="3505494" cy="3785419"/>
           </a:xfrm>
         </p:spPr>
         <p:txBody>
@@ -3487,54 +3498,41 @@
             <a:pPr lvl="1"/>
             <a:r>
               <a:rPr lang="en-US" sz="2000" dirty="0"/>
-              <a:t>Inflow to Oroville reservoir</a:t>
+              <a:t>Inflow to Shasta reservoir</a:t>
             </a:r>
           </a:p>
           <a:p>
             <a:pPr lvl="1"/>
             <a:r>
               <a:rPr lang="en-US" sz="2000" dirty="0"/>
-              <a:t>Oroville reservoir storage</a:t>
+              <a:t>Shasta reservoir storage</a:t>
             </a:r>
           </a:p>
           <a:p>
             <a:pPr lvl="1"/>
             <a:r>
               <a:rPr lang="en-US" sz="2000" dirty="0"/>
-              <a:t>Release from Oroville storage </a:t>
-            </a:r>
-          </a:p>
-          <a:p>
-            <a:r>
-              <a:rPr lang="en-US" dirty="0"/>
-              <a:t>Time period</a:t>
+              <a:t>Release from Shasta storage </a:t>
+            </a:r>
+          </a:p>
+          <a:p>
+            <a:r>
+              <a:rPr lang="en-US" sz="2000" dirty="0"/>
+              <a:t>Output</a:t>
             </a:r>
           </a:p>
           <a:p>
             <a:pPr lvl="1"/>
             <a:r>
               <a:rPr lang="en-US" sz="2000" dirty="0"/>
-              <a:t>October 2018-September 2019 (WY 2019)</a:t>
-            </a:r>
-          </a:p>
-          <a:p>
-            <a:r>
-              <a:rPr lang="en-US" sz="2400" dirty="0"/>
-              <a:t>Output</a:t>
-            </a:r>
-          </a:p>
-          <a:p>
-            <a:pPr lvl="1"/>
-            <a:r>
-              <a:rPr lang="en-US" sz="2000" dirty="0"/>
-              <a:t>Daily Oroville releases</a:t>
-            </a:r>
-          </a:p>
-        </p:txBody>
-      </p:sp>
-      <p:sp>
-        <p:nvSpPr>
-          <p:cNvPr id="18" name="Rectangle 11">
+              <a:t>Daily Shasta releases</a:t>
+            </a:r>
+          </a:p>
+        </p:txBody>
+      </p:sp>
+      <p:sp>
+        <p:nvSpPr>
+          <p:cNvPr id="24" name="Rectangle 23">
             <a:extLst>
               <a:ext uri="{FF2B5EF4-FFF2-40B4-BE49-F238E27FC236}">
                 <a16:creationId xmlns:a16="http://schemas.microsoft.com/office/drawing/2014/main" id="{5E39A796-BE83-48B1-B33F-35C4A32AAB57}"/>
@@ -3597,7 +3595,7 @@
       </p:sp>
       <p:sp>
         <p:nvSpPr>
-          <p:cNvPr id="19" name="Rounded Rectangle 9">
+          <p:cNvPr id="26" name="Rounded Rectangle 9">
             <a:extLst>
               <a:ext uri="{FF2B5EF4-FFF2-40B4-BE49-F238E27FC236}">
                 <a16:creationId xmlns:a16="http://schemas.microsoft.com/office/drawing/2014/main" id="{72F84B47-E267-4194-8194-831DB7B5547F}"/>
@@ -3671,6 +3669,1185 @@
       </p:sp>
       <p:pic>
         <p:nvPicPr>
+          <p:cNvPr id="5" name="Picture 4">
+            <a:extLst>
+              <a:ext uri="{FF2B5EF4-FFF2-40B4-BE49-F238E27FC236}">
+                <a16:creationId xmlns:a16="http://schemas.microsoft.com/office/drawing/2014/main" id="{D1F0508B-2B14-460F-9E52-EDD3BAA9511B}"/>
+              </a:ext>
+            </a:extLst>
+          </p:cNvPr>
+          <p:cNvPicPr>
+            <a:picLocks noChangeAspect="1"/>
+          </p:cNvPicPr>
+          <p:nvPr/>
+        </p:nvPicPr>
+        <p:blipFill>
+          <a:blip r:embed="rId2"/>
+          <a:stretch>
+            <a:fillRect/>
+          </a:stretch>
+        </p:blipFill>
+        <p:spPr>
+          <a:xfrm>
+            <a:off x="5920183" y="807593"/>
+            <a:ext cx="4990688" cy="5239568"/>
+          </a:xfrm>
+          <a:prstGeom prst="rect">
+            <a:avLst/>
+          </a:prstGeom>
+          <a:effectLst/>
+        </p:spPr>
+      </p:pic>
+    </p:spTree>
+    <p:extLst>
+      <p:ext uri="{BB962C8B-B14F-4D97-AF65-F5344CB8AC3E}">
+        <p14:creationId xmlns:p14="http://schemas.microsoft.com/office/powerpoint/2010/main" val="3935373024"/>
+      </p:ext>
+    </p:extLst>
+  </p:cSld>
+  <p:clrMapOvr>
+    <a:masterClrMapping/>
+  </p:clrMapOvr>
+</p:sld>
+</file>
+
+<file path=ppt/slides/slide2.xml><?xml version="1.0" encoding="utf-8"?>
+<p:sld xmlns:a="http://schemas.openxmlformats.org/drawingml/2006/main" xmlns:r="http://schemas.openxmlformats.org/officeDocument/2006/relationships" xmlns:p="http://schemas.openxmlformats.org/presentationml/2006/main">
+  <p:cSld>
+    <p:spTree>
+      <p:nvGrpSpPr>
+        <p:cNvPr id="1" name=""/>
+        <p:cNvGrpSpPr/>
+        <p:nvPr/>
+      </p:nvGrpSpPr>
+      <p:grpSpPr>
+        <a:xfrm>
+          <a:off x="0" y="0"/>
+          <a:ext cx="0" cy="0"/>
+          <a:chOff x="0" y="0"/>
+          <a:chExt cx="0" cy="0"/>
+        </a:xfrm>
+      </p:grpSpPr>
+      <p:sp>
+        <p:nvSpPr>
+          <p:cNvPr id="2" name="Title 1">
+            <a:extLst>
+              <a:ext uri="{FF2B5EF4-FFF2-40B4-BE49-F238E27FC236}">
+                <a16:creationId xmlns:a16="http://schemas.microsoft.com/office/drawing/2014/main" id="{6E12429E-5042-4B90-A91B-BD65B7F451EE}"/>
+              </a:ext>
+            </a:extLst>
+          </p:cNvPr>
+          <p:cNvSpPr>
+            <a:spLocks noGrp="1"/>
+          </p:cNvSpPr>
+          <p:nvPr>
+            <p:ph type="title"/>
+          </p:nvPr>
+        </p:nvSpPr>
+        <p:spPr/>
+        <p:txBody>
+          <a:bodyPr/>
+          <a:lstStyle/>
+          <a:p>
+            <a:r>
+              <a:rPr lang="en-US" dirty="0"/>
+              <a:t>Goals</a:t>
+            </a:r>
+          </a:p>
+        </p:txBody>
+      </p:sp>
+      <p:sp>
+        <p:nvSpPr>
+          <p:cNvPr id="3" name="Content Placeholder 2">
+            <a:extLst>
+              <a:ext uri="{FF2B5EF4-FFF2-40B4-BE49-F238E27FC236}">
+                <a16:creationId xmlns:a16="http://schemas.microsoft.com/office/drawing/2014/main" id="{BCEF2D39-819B-4BA9-9BD8-AB60DE2F028D}"/>
+              </a:ext>
+            </a:extLst>
+          </p:cNvPr>
+          <p:cNvSpPr>
+            <a:spLocks noGrp="1"/>
+          </p:cNvSpPr>
+          <p:nvPr>
+            <p:ph idx="1"/>
+          </p:nvPr>
+        </p:nvSpPr>
+        <p:spPr/>
+        <p:txBody>
+          <a:bodyPr/>
+          <a:lstStyle/>
+          <a:p>
+            <a:r>
+              <a:rPr lang="en-US" dirty="0"/>
+              <a:t>Learn how to rebuild CalLite schematic North of Delta model from scratch using daily data</a:t>
+            </a:r>
+          </a:p>
+          <a:p>
+            <a:pPr lvl="1"/>
+            <a:r>
+              <a:rPr lang="en-US" dirty="0"/>
+              <a:t>Including Delta operations and requirements will be saved for later</a:t>
+            </a:r>
+          </a:p>
+          <a:p>
+            <a:r>
+              <a:rPr lang="en-US" dirty="0"/>
+              <a:t>Review how WRESL routes water without actual channel routing like Muskingum method</a:t>
+            </a:r>
+          </a:p>
+          <a:p>
+            <a:r>
+              <a:rPr lang="en-US" dirty="0"/>
+              <a:t>Determine the validity and corroborate the results</a:t>
+            </a:r>
+          </a:p>
+        </p:txBody>
+      </p:sp>
+    </p:spTree>
+    <p:extLst>
+      <p:ext uri="{BB962C8B-B14F-4D97-AF65-F5344CB8AC3E}">
+        <p14:creationId xmlns:p14="http://schemas.microsoft.com/office/powerpoint/2010/main" val="1827690023"/>
+      </p:ext>
+    </p:extLst>
+  </p:cSld>
+  <p:clrMapOvr>
+    <a:masterClrMapping/>
+  </p:clrMapOvr>
+</p:sld>
+</file>
+
+<file path=ppt/slides/slide3.xml><?xml version="1.0" encoding="utf-8"?>
+<p:sld xmlns:a="http://schemas.openxmlformats.org/drawingml/2006/main" xmlns:r="http://schemas.openxmlformats.org/officeDocument/2006/relationships" xmlns:p="http://schemas.openxmlformats.org/presentationml/2006/main">
+  <p:cSld>
+    <p:spTree>
+      <p:nvGrpSpPr>
+        <p:cNvPr id="1" name=""/>
+        <p:cNvGrpSpPr/>
+        <p:nvPr/>
+      </p:nvGrpSpPr>
+      <p:grpSpPr>
+        <a:xfrm>
+          <a:off x="0" y="0"/>
+          <a:ext cx="0" cy="0"/>
+          <a:chOff x="0" y="0"/>
+          <a:chExt cx="0" cy="0"/>
+        </a:xfrm>
+      </p:grpSpPr>
+      <p:sp>
+        <p:nvSpPr>
+          <p:cNvPr id="2" name="Title 1">
+            <a:extLst>
+              <a:ext uri="{FF2B5EF4-FFF2-40B4-BE49-F238E27FC236}">
+                <a16:creationId xmlns:a16="http://schemas.microsoft.com/office/drawing/2014/main" id="{5F418B98-7822-4743-AA79-451454610E33}"/>
+              </a:ext>
+            </a:extLst>
+          </p:cNvPr>
+          <p:cNvSpPr>
+            <a:spLocks noGrp="1"/>
+          </p:cNvSpPr>
+          <p:nvPr>
+            <p:ph type="title"/>
+          </p:nvPr>
+        </p:nvSpPr>
+        <p:spPr/>
+        <p:txBody>
+          <a:bodyPr/>
+          <a:lstStyle/>
+          <a:p>
+            <a:r>
+              <a:rPr lang="en-US" dirty="0"/>
+              <a:t>North of Delta Daily 1-year model</a:t>
+            </a:r>
+          </a:p>
+        </p:txBody>
+      </p:sp>
+      <p:sp>
+        <p:nvSpPr>
+          <p:cNvPr id="3" name="Content Placeholder 2">
+            <a:extLst>
+              <a:ext uri="{FF2B5EF4-FFF2-40B4-BE49-F238E27FC236}">
+                <a16:creationId xmlns:a16="http://schemas.microsoft.com/office/drawing/2014/main" id="{D19EBD02-6EBD-4E0B-802C-1DACC0DDEA5A}"/>
+              </a:ext>
+            </a:extLst>
+          </p:cNvPr>
+          <p:cNvSpPr>
+            <a:spLocks noGrp="1"/>
+          </p:cNvSpPr>
+          <p:nvPr>
+            <p:ph idx="1"/>
+          </p:nvPr>
+        </p:nvSpPr>
+        <p:spPr/>
+        <p:txBody>
+          <a:bodyPr/>
+          <a:lstStyle/>
+          <a:p>
+            <a:r>
+              <a:rPr lang="en-US" dirty="0"/>
+              <a:t>Time period</a:t>
+            </a:r>
+          </a:p>
+          <a:p>
+            <a:pPr lvl="1"/>
+            <a:r>
+              <a:rPr lang="en-US" sz="2000" dirty="0"/>
+              <a:t>August 2019-August 2020 (mostly water year 2020)</a:t>
+            </a:r>
+          </a:p>
+          <a:p>
+            <a:r>
+              <a:rPr lang="en-US" sz="2400" dirty="0"/>
+              <a:t>Progresses as phases and sub-phases which can be done on parallel paths</a:t>
+            </a:r>
+          </a:p>
+          <a:p>
+            <a:pPr marL="914400" lvl="1" indent="-457200">
+              <a:buFont typeface="+mj-lt"/>
+              <a:buAutoNum type="arabicPeriod"/>
+            </a:pPr>
+            <a:r>
+              <a:rPr lang="en-US" sz="2000" dirty="0"/>
+              <a:t>Feather River to Confluence</a:t>
+            </a:r>
+          </a:p>
+          <a:p>
+            <a:pPr marL="914400" lvl="1" indent="-457200">
+              <a:buFont typeface="+mj-lt"/>
+              <a:buAutoNum type="arabicPeriod"/>
+            </a:pPr>
+            <a:r>
+              <a:rPr lang="en-US" sz="2000" dirty="0"/>
+              <a:t>Yuba River to Confluence</a:t>
+            </a:r>
+          </a:p>
+          <a:p>
+            <a:pPr marL="914400" lvl="1" indent="-457200">
+              <a:buFont typeface="+mj-lt"/>
+              <a:buAutoNum type="arabicPeriod"/>
+            </a:pPr>
+            <a:r>
+              <a:rPr lang="en-US" sz="2000" dirty="0"/>
+              <a:t>Feather-Yuba to </a:t>
+            </a:r>
+            <a:r>
+              <a:rPr lang="en-US" sz="2000" dirty="0" err="1"/>
+              <a:t>SacFeather</a:t>
+            </a:r>
+            <a:r>
+              <a:rPr lang="en-US" sz="2000" dirty="0"/>
+              <a:t> confluence</a:t>
+            </a:r>
+          </a:p>
+          <a:p>
+            <a:pPr marL="914400" lvl="1" indent="-457200">
+              <a:buFont typeface="+mj-lt"/>
+              <a:buAutoNum type="arabicPeriod"/>
+            </a:pPr>
+            <a:r>
+              <a:rPr lang="en-US" sz="2000" dirty="0"/>
+              <a:t>Shasta to Red Bluff</a:t>
+            </a:r>
+          </a:p>
+          <a:p>
+            <a:pPr marL="914400" lvl="1" indent="-457200">
+              <a:buFont typeface="+mj-lt"/>
+              <a:buAutoNum type="arabicPeriod"/>
+            </a:pPr>
+            <a:r>
+              <a:rPr lang="en-US" sz="2000" dirty="0"/>
+              <a:t>Trinity to Red Bluff</a:t>
+            </a:r>
+          </a:p>
+          <a:p>
+            <a:pPr marL="914400" lvl="1" indent="-457200">
+              <a:buFont typeface="+mj-lt"/>
+              <a:buAutoNum type="arabicPeriod"/>
+            </a:pPr>
+            <a:r>
+              <a:rPr lang="en-US" sz="2000" dirty="0"/>
+              <a:t>Shasta-Trinity to </a:t>
+            </a:r>
+            <a:r>
+              <a:rPr lang="en-US" sz="2000" dirty="0" err="1"/>
+              <a:t>SacFeather</a:t>
+            </a:r>
+            <a:r>
+              <a:rPr lang="en-US" sz="2000" dirty="0"/>
+              <a:t> confluence</a:t>
+            </a:r>
+          </a:p>
+          <a:p>
+            <a:pPr marL="914400" lvl="1" indent="-457200">
+              <a:buFont typeface="+mj-lt"/>
+              <a:buAutoNum type="arabicPeriod"/>
+            </a:pPr>
+            <a:endParaRPr lang="en-US" sz="2000" dirty="0"/>
+          </a:p>
+          <a:p>
+            <a:endParaRPr lang="en-US" dirty="0"/>
+          </a:p>
+        </p:txBody>
+      </p:sp>
+    </p:spTree>
+    <p:extLst>
+      <p:ext uri="{BB962C8B-B14F-4D97-AF65-F5344CB8AC3E}">
+        <p14:creationId xmlns:p14="http://schemas.microsoft.com/office/powerpoint/2010/main" val="2761532089"/>
+      </p:ext>
+    </p:extLst>
+  </p:cSld>
+  <p:clrMapOvr>
+    <a:masterClrMapping/>
+  </p:clrMapOvr>
+</p:sld>
+</file>
+
+<file path=ppt/slides/slide4.xml><?xml version="1.0" encoding="utf-8"?>
+<p:sld xmlns:a="http://schemas.openxmlformats.org/drawingml/2006/main" xmlns:r="http://schemas.openxmlformats.org/officeDocument/2006/relationships" xmlns:p="http://schemas.openxmlformats.org/presentationml/2006/main">
+  <p:cSld>
+    <p:bg>
+      <p:bgPr>
+        <a:solidFill>
+          <a:schemeClr val="bg1"/>
+        </a:solidFill>
+        <a:effectLst/>
+      </p:bgPr>
+    </p:bg>
+    <p:spTree>
+      <p:nvGrpSpPr>
+        <p:cNvPr id="1" name=""/>
+        <p:cNvGrpSpPr/>
+        <p:nvPr/>
+      </p:nvGrpSpPr>
+      <p:grpSpPr>
+        <a:xfrm>
+          <a:off x="0" y="0"/>
+          <a:ext cx="0" cy="0"/>
+          <a:chOff x="0" y="0"/>
+          <a:chExt cx="0" cy="0"/>
+        </a:xfrm>
+      </p:grpSpPr>
+      <p:sp useBgFill="1">
+        <p:nvSpPr>
+          <p:cNvPr id="19" name="Rectangle 12">
+            <a:extLst>
+              <a:ext uri="{FF2B5EF4-FFF2-40B4-BE49-F238E27FC236}">
+                <a16:creationId xmlns:a16="http://schemas.microsoft.com/office/drawing/2014/main" id="{CEF6118E-44FB-4509-B4D9-129052E4C6EE}"/>
+              </a:ext>
+              <a:ext uri="{C183D7F6-B498-43B3-948B-1728B52AA6E4}">
+                <adec:decorative xmlns:adec="http://schemas.microsoft.com/office/drawing/2017/decorative" val="1"/>
+              </a:ext>
+            </a:extLst>
+          </p:cNvPr>
+          <p:cNvSpPr>
+            <a:spLocks noGrp="1" noRot="1" noChangeAspect="1" noMove="1" noResize="1" noEditPoints="1" noAdjustHandles="1" noChangeArrowheads="1" noChangeShapeType="1" noTextEdit="1"/>
+          </p:cNvSpPr>
+          <p:nvPr>
+            <p:extLst>
+              <p:ext uri="{386F3935-93C4-4BCD-93E2-E3B085C9AB24}">
+                <p16:designElem xmlns:p16="http://schemas.microsoft.com/office/powerpoint/2015/main" val="1"/>
+              </p:ext>
+            </p:extLst>
+          </p:nvPr>
+        </p:nvSpPr>
+        <p:spPr>
+          <a:xfrm>
+            <a:off x="-1" y="0"/>
+            <a:ext cx="12188952" cy="6858000"/>
+          </a:xfrm>
+          <a:prstGeom prst="rect">
+            <a:avLst/>
+          </a:prstGeom>
+          <a:ln>
+            <a:noFill/>
+          </a:ln>
+        </p:spPr>
+        <p:style>
+          <a:lnRef idx="2">
+            <a:schemeClr val="accent1">
+              <a:shade val="50000"/>
+            </a:schemeClr>
+          </a:lnRef>
+          <a:fillRef idx="1">
+            <a:schemeClr val="accent1"/>
+          </a:fillRef>
+          <a:effectRef idx="0">
+            <a:schemeClr val="accent1"/>
+          </a:effectRef>
+          <a:fontRef idx="minor">
+            <a:schemeClr val="lt1"/>
+          </a:fontRef>
+        </p:style>
+        <p:txBody>
+          <a:bodyPr rtlCol="0" anchor="ctr"/>
+          <a:lstStyle/>
+          <a:p>
+            <a:pPr algn="ctr"/>
+            <a:endParaRPr lang="en-US"/>
+          </a:p>
+        </p:txBody>
+      </p:sp>
+      <p:sp>
+        <p:nvSpPr>
+          <p:cNvPr id="2" name="Title 1">
+            <a:extLst>
+              <a:ext uri="{FF2B5EF4-FFF2-40B4-BE49-F238E27FC236}">
+                <a16:creationId xmlns:a16="http://schemas.microsoft.com/office/drawing/2014/main" id="{7AB120BA-79D7-4569-94C2-3D7396CB6E8D}"/>
+              </a:ext>
+            </a:extLst>
+          </p:cNvPr>
+          <p:cNvSpPr>
+            <a:spLocks noGrp="1"/>
+          </p:cNvSpPr>
+          <p:nvPr>
+            <p:ph type="title"/>
+          </p:nvPr>
+        </p:nvSpPr>
+        <p:spPr>
+          <a:xfrm>
+            <a:off x="838200" y="525195"/>
+            <a:ext cx="3986156" cy="2806506"/>
+          </a:xfrm>
+        </p:spPr>
+        <p:txBody>
+          <a:bodyPr anchor="b">
+            <a:normAutofit/>
+          </a:bodyPr>
+          <a:lstStyle/>
+          <a:p>
+            <a:r>
+              <a:rPr lang="en-US" sz="4000"/>
+              <a:t>Schematic</a:t>
+            </a:r>
+          </a:p>
+        </p:txBody>
+      </p:sp>
+      <p:sp>
+        <p:nvSpPr>
+          <p:cNvPr id="10" name="Content Placeholder 9">
+            <a:extLst>
+              <a:ext uri="{FF2B5EF4-FFF2-40B4-BE49-F238E27FC236}">
+                <a16:creationId xmlns:a16="http://schemas.microsoft.com/office/drawing/2014/main" id="{E50A5D6B-43D2-4B4B-8664-98148F307602}"/>
+              </a:ext>
+            </a:extLst>
+          </p:cNvPr>
+          <p:cNvSpPr>
+            <a:spLocks noGrp="1"/>
+          </p:cNvSpPr>
+          <p:nvPr>
+            <p:ph idx="1"/>
+          </p:nvPr>
+        </p:nvSpPr>
+        <p:spPr>
+          <a:xfrm>
+            <a:off x="838200" y="3526300"/>
+            <a:ext cx="3986156" cy="2588458"/>
+          </a:xfrm>
+        </p:spPr>
+        <p:txBody>
+          <a:bodyPr>
+            <a:normAutofit/>
+          </a:bodyPr>
+          <a:lstStyle/>
+          <a:p>
+            <a:endParaRPr lang="en-US" sz="2000"/>
+          </a:p>
+        </p:txBody>
+      </p:sp>
+      <p:pic>
+        <p:nvPicPr>
+          <p:cNvPr id="6" name="Content Placeholder 5">
+            <a:extLst>
+              <a:ext uri="{FF2B5EF4-FFF2-40B4-BE49-F238E27FC236}">
+                <a16:creationId xmlns:a16="http://schemas.microsoft.com/office/drawing/2014/main" id="{71E83ADF-3495-41CA-B89A-AA25B5A8F39E}"/>
+              </a:ext>
+            </a:extLst>
+          </p:cNvPr>
+          <p:cNvPicPr>
+            <a:picLocks noChangeAspect="1"/>
+          </p:cNvPicPr>
+          <p:nvPr/>
+        </p:nvPicPr>
+        <p:blipFill rotWithShape="1">
+          <a:blip r:embed="rId2"/>
+          <a:srcRect l="13023" r="13804" b="-1"/>
+          <a:stretch/>
+        </p:blipFill>
+        <p:spPr>
+          <a:xfrm>
+            <a:off x="5186557" y="162853"/>
+            <a:ext cx="6830817" cy="6137951"/>
+          </a:xfrm>
+          <a:prstGeom prst="rect">
+            <a:avLst/>
+          </a:prstGeom>
+        </p:spPr>
+      </p:pic>
+      <p:sp>
+        <p:nvSpPr>
+          <p:cNvPr id="7" name="Rectangle 6">
+            <a:extLst>
+              <a:ext uri="{FF2B5EF4-FFF2-40B4-BE49-F238E27FC236}">
+                <a16:creationId xmlns:a16="http://schemas.microsoft.com/office/drawing/2014/main" id="{12F6FABE-9B94-40FE-8126-A9556D6A25E9}"/>
+              </a:ext>
+            </a:extLst>
+          </p:cNvPr>
+          <p:cNvSpPr/>
+          <p:nvPr/>
+        </p:nvSpPr>
+        <p:spPr>
+          <a:xfrm rot="2084321">
+            <a:off x="10395839" y="1948924"/>
+            <a:ext cx="325420" cy="2810634"/>
+          </a:xfrm>
+          <a:prstGeom prst="rect">
+            <a:avLst/>
+          </a:prstGeom>
+          <a:noFill/>
+          <a:ln w="9525" cap="flat" cmpd="sng" algn="ctr">
+            <a:solidFill>
+              <a:schemeClr val="accent1"/>
+            </a:solidFill>
+            <a:prstDash val="solid"/>
+            <a:round/>
+            <a:headEnd type="none" w="med" len="med"/>
+            <a:tailEnd type="none" w="med" len="med"/>
+          </a:ln>
+        </p:spPr>
+        <p:style>
+          <a:lnRef idx="0">
+            <a:scrgbClr r="0" g="0" b="0"/>
+          </a:lnRef>
+          <a:fillRef idx="0">
+            <a:scrgbClr r="0" g="0" b="0"/>
+          </a:fillRef>
+          <a:effectRef idx="0">
+            <a:scrgbClr r="0" g="0" b="0"/>
+          </a:effectRef>
+          <a:fontRef idx="minor">
+            <a:schemeClr val="accent1"/>
+          </a:fontRef>
+        </p:style>
+        <p:txBody>
+          <a:bodyPr rtlCol="0" anchor="ctr"/>
+          <a:lstStyle/>
+          <a:p>
+            <a:pPr algn="ctr"/>
+            <a:endParaRPr lang="en-US"/>
+          </a:p>
+        </p:txBody>
+      </p:sp>
+      <p:sp>
+        <p:nvSpPr>
+          <p:cNvPr id="8" name="Rectangle 7">
+            <a:extLst>
+              <a:ext uri="{FF2B5EF4-FFF2-40B4-BE49-F238E27FC236}">
+                <a16:creationId xmlns:a16="http://schemas.microsoft.com/office/drawing/2014/main" id="{E98BC1A6-5607-45C5-9BFC-F5F6CE95827E}"/>
+              </a:ext>
+            </a:extLst>
+          </p:cNvPr>
+          <p:cNvSpPr/>
+          <p:nvPr/>
+        </p:nvSpPr>
+        <p:spPr>
+          <a:xfrm>
+            <a:off x="8117146" y="884919"/>
+            <a:ext cx="325420" cy="2810634"/>
+          </a:xfrm>
+          <a:prstGeom prst="rect">
+            <a:avLst/>
+          </a:prstGeom>
+          <a:noFill/>
+          <a:ln w="9525" cap="flat" cmpd="sng" algn="ctr">
+            <a:solidFill>
+              <a:schemeClr val="accent1"/>
+            </a:solidFill>
+            <a:prstDash val="solid"/>
+            <a:round/>
+            <a:headEnd type="none" w="med" len="med"/>
+            <a:tailEnd type="none" w="med" len="med"/>
+          </a:ln>
+        </p:spPr>
+        <p:style>
+          <a:lnRef idx="0">
+            <a:scrgbClr r="0" g="0" b="0"/>
+          </a:lnRef>
+          <a:fillRef idx="0">
+            <a:scrgbClr r="0" g="0" b="0"/>
+          </a:fillRef>
+          <a:effectRef idx="0">
+            <a:scrgbClr r="0" g="0" b="0"/>
+          </a:effectRef>
+          <a:fontRef idx="minor">
+            <a:schemeClr val="accent1"/>
+          </a:fontRef>
+        </p:style>
+        <p:txBody>
+          <a:bodyPr rtlCol="0" anchor="ctr"/>
+          <a:lstStyle/>
+          <a:p>
+            <a:pPr algn="ctr"/>
+            <a:endParaRPr lang="en-US"/>
+          </a:p>
+        </p:txBody>
+      </p:sp>
+      <p:sp>
+        <p:nvSpPr>
+          <p:cNvPr id="9" name="Rectangle 8">
+            <a:extLst>
+              <a:ext uri="{FF2B5EF4-FFF2-40B4-BE49-F238E27FC236}">
+                <a16:creationId xmlns:a16="http://schemas.microsoft.com/office/drawing/2014/main" id="{10351221-1223-4F23-BE6E-2953933C381A}"/>
+              </a:ext>
+            </a:extLst>
+          </p:cNvPr>
+          <p:cNvSpPr/>
+          <p:nvPr/>
+        </p:nvSpPr>
+        <p:spPr>
+          <a:xfrm rot="18836733">
+            <a:off x="7004043" y="1422658"/>
+            <a:ext cx="325420" cy="2968111"/>
+          </a:xfrm>
+          <a:prstGeom prst="rect">
+            <a:avLst/>
+          </a:prstGeom>
+          <a:noFill/>
+          <a:ln w="9525" cap="flat" cmpd="sng" algn="ctr">
+            <a:solidFill>
+              <a:schemeClr val="accent1"/>
+            </a:solidFill>
+            <a:prstDash val="solid"/>
+            <a:round/>
+            <a:headEnd type="none" w="med" len="med"/>
+            <a:tailEnd type="none" w="med" len="med"/>
+          </a:ln>
+        </p:spPr>
+        <p:style>
+          <a:lnRef idx="0">
+            <a:scrgbClr r="0" g="0" b="0"/>
+          </a:lnRef>
+          <a:fillRef idx="0">
+            <a:scrgbClr r="0" g="0" b="0"/>
+          </a:fillRef>
+          <a:effectRef idx="0">
+            <a:scrgbClr r="0" g="0" b="0"/>
+          </a:effectRef>
+          <a:fontRef idx="minor">
+            <a:schemeClr val="accent1"/>
+          </a:fontRef>
+        </p:style>
+        <p:txBody>
+          <a:bodyPr rtlCol="0" anchor="ctr"/>
+          <a:lstStyle/>
+          <a:p>
+            <a:pPr algn="ctr"/>
+            <a:endParaRPr lang="en-US"/>
+          </a:p>
+        </p:txBody>
+      </p:sp>
+      <p:sp>
+        <p:nvSpPr>
+          <p:cNvPr id="27" name="Rectangle 26">
+            <a:extLst>
+              <a:ext uri="{FF2B5EF4-FFF2-40B4-BE49-F238E27FC236}">
+                <a16:creationId xmlns:a16="http://schemas.microsoft.com/office/drawing/2014/main" id="{1C92E966-8BB2-4184-B921-01ECF13D23A7}"/>
+              </a:ext>
+            </a:extLst>
+          </p:cNvPr>
+          <p:cNvSpPr/>
+          <p:nvPr/>
+        </p:nvSpPr>
+        <p:spPr>
+          <a:xfrm>
+            <a:off x="8121608" y="3695553"/>
+            <a:ext cx="325420" cy="2706358"/>
+          </a:xfrm>
+          <a:prstGeom prst="rect">
+            <a:avLst/>
+          </a:prstGeom>
+          <a:noFill/>
+          <a:ln w="28575" cap="flat" cmpd="sng" algn="ctr">
+            <a:solidFill>
+              <a:schemeClr val="accent6"/>
+            </a:solidFill>
+            <a:prstDash val="solid"/>
+            <a:round/>
+            <a:headEnd type="none" w="med" len="med"/>
+            <a:tailEnd type="none" w="med" len="med"/>
+          </a:ln>
+        </p:spPr>
+        <p:style>
+          <a:lnRef idx="0">
+            <a:scrgbClr r="0" g="0" b="0"/>
+          </a:lnRef>
+          <a:fillRef idx="0">
+            <a:scrgbClr r="0" g="0" b="0"/>
+          </a:fillRef>
+          <a:effectRef idx="0">
+            <a:scrgbClr r="0" g="0" b="0"/>
+          </a:effectRef>
+          <a:fontRef idx="minor">
+            <a:schemeClr val="accent6"/>
+          </a:fontRef>
+        </p:style>
+        <p:txBody>
+          <a:bodyPr rtlCol="0" anchor="ctr"/>
+          <a:lstStyle/>
+          <a:p>
+            <a:pPr algn="ctr"/>
+            <a:endParaRPr lang="en-US"/>
+          </a:p>
+        </p:txBody>
+      </p:sp>
+      <p:sp>
+        <p:nvSpPr>
+          <p:cNvPr id="29" name="Rectangle 28">
+            <a:extLst>
+              <a:ext uri="{FF2B5EF4-FFF2-40B4-BE49-F238E27FC236}">
+                <a16:creationId xmlns:a16="http://schemas.microsoft.com/office/drawing/2014/main" id="{B81CE89A-2FA6-447C-8731-B6F1730AFD07}"/>
+              </a:ext>
+            </a:extLst>
+          </p:cNvPr>
+          <p:cNvSpPr/>
+          <p:nvPr/>
+        </p:nvSpPr>
+        <p:spPr>
+          <a:xfrm rot="5400000">
+            <a:off x="10750291" y="3527518"/>
+            <a:ext cx="325420" cy="2380323"/>
+          </a:xfrm>
+          <a:prstGeom prst="rect">
+            <a:avLst/>
+          </a:prstGeom>
+          <a:noFill/>
+          <a:ln w="9525" cap="flat" cmpd="sng" algn="ctr">
+            <a:solidFill>
+              <a:schemeClr val="accent1"/>
+            </a:solidFill>
+            <a:prstDash val="solid"/>
+            <a:round/>
+            <a:headEnd type="none" w="med" len="med"/>
+            <a:tailEnd type="none" w="med" len="med"/>
+          </a:ln>
+        </p:spPr>
+        <p:style>
+          <a:lnRef idx="0">
+            <a:scrgbClr r="0" g="0" b="0"/>
+          </a:lnRef>
+          <a:fillRef idx="0">
+            <a:scrgbClr r="0" g="0" b="0"/>
+          </a:fillRef>
+          <a:effectRef idx="0">
+            <a:scrgbClr r="0" g="0" b="0"/>
+          </a:effectRef>
+          <a:fontRef idx="minor">
+            <a:schemeClr val="accent1"/>
+          </a:fontRef>
+        </p:style>
+        <p:txBody>
+          <a:bodyPr rtlCol="0" anchor="ctr"/>
+          <a:lstStyle/>
+          <a:p>
+            <a:pPr algn="ctr"/>
+            <a:endParaRPr lang="en-US"/>
+          </a:p>
+        </p:txBody>
+      </p:sp>
+      <p:sp>
+        <p:nvSpPr>
+          <p:cNvPr id="31" name="Rectangle 30">
+            <a:extLst>
+              <a:ext uri="{FF2B5EF4-FFF2-40B4-BE49-F238E27FC236}">
+                <a16:creationId xmlns:a16="http://schemas.microsoft.com/office/drawing/2014/main" id="{B39628DD-3116-4324-8377-94BA5658EECF}"/>
+              </a:ext>
+            </a:extLst>
+          </p:cNvPr>
+          <p:cNvSpPr/>
+          <p:nvPr/>
+        </p:nvSpPr>
+        <p:spPr>
+          <a:xfrm rot="2408832">
+            <a:off x="8823426" y="4151901"/>
+            <a:ext cx="325420" cy="2374246"/>
+          </a:xfrm>
+          <a:prstGeom prst="rect">
+            <a:avLst/>
+          </a:prstGeom>
+          <a:noFill/>
+          <a:ln w="19050" cap="flat" cmpd="sng" algn="ctr">
+            <a:solidFill>
+              <a:schemeClr val="accent6"/>
+            </a:solidFill>
+            <a:prstDash val="solid"/>
+            <a:round/>
+            <a:headEnd type="none" w="med" len="med"/>
+            <a:tailEnd type="none" w="med" len="med"/>
+          </a:ln>
+        </p:spPr>
+        <p:style>
+          <a:lnRef idx="0">
+            <a:scrgbClr r="0" g="0" b="0"/>
+          </a:lnRef>
+          <a:fillRef idx="0">
+            <a:scrgbClr r="0" g="0" b="0"/>
+          </a:fillRef>
+          <a:effectRef idx="0">
+            <a:scrgbClr r="0" g="0" b="0"/>
+          </a:effectRef>
+          <a:fontRef idx="minor">
+            <a:schemeClr val="accent6"/>
+          </a:fontRef>
+        </p:style>
+        <p:txBody>
+          <a:bodyPr rtlCol="0" anchor="ctr"/>
+          <a:lstStyle/>
+          <a:p>
+            <a:pPr algn="ctr"/>
+            <a:endParaRPr lang="en-US" dirty="0"/>
+          </a:p>
+        </p:txBody>
+      </p:sp>
+      <p:sp>
+        <p:nvSpPr>
+          <p:cNvPr id="33" name="Rectangle 32">
+            <a:extLst>
+              <a:ext uri="{FF2B5EF4-FFF2-40B4-BE49-F238E27FC236}">
+                <a16:creationId xmlns:a16="http://schemas.microsoft.com/office/drawing/2014/main" id="{CD69AF78-E17D-49CC-BD26-F74A612E2F55}"/>
+              </a:ext>
+            </a:extLst>
+          </p:cNvPr>
+          <p:cNvSpPr/>
+          <p:nvPr/>
+        </p:nvSpPr>
+        <p:spPr>
+          <a:xfrm rot="5400000">
+            <a:off x="7163906" y="814202"/>
+            <a:ext cx="241461" cy="2380323"/>
+          </a:xfrm>
+          <a:prstGeom prst="rect">
+            <a:avLst/>
+          </a:prstGeom>
+          <a:noFill/>
+          <a:ln w="19050" cap="flat" cmpd="sng" algn="ctr">
+            <a:solidFill>
+              <a:schemeClr val="accent6"/>
+            </a:solidFill>
+            <a:prstDash val="solid"/>
+            <a:round/>
+            <a:headEnd type="none" w="med" len="med"/>
+            <a:tailEnd type="none" w="med" len="med"/>
+          </a:ln>
+        </p:spPr>
+        <p:style>
+          <a:lnRef idx="0">
+            <a:scrgbClr r="0" g="0" b="0"/>
+          </a:lnRef>
+          <a:fillRef idx="0">
+            <a:scrgbClr r="0" g="0" b="0"/>
+          </a:fillRef>
+          <a:effectRef idx="0">
+            <a:scrgbClr r="0" g="0" b="0"/>
+          </a:effectRef>
+          <a:fontRef idx="minor">
+            <a:schemeClr val="accent6"/>
+          </a:fontRef>
+        </p:style>
+        <p:txBody>
+          <a:bodyPr rtlCol="0" anchor="ctr"/>
+          <a:lstStyle/>
+          <a:p>
+            <a:pPr algn="ctr"/>
+            <a:endParaRPr lang="en-US"/>
+          </a:p>
+        </p:txBody>
+      </p:sp>
+    </p:spTree>
+    <p:extLst>
+      <p:ext uri="{BB962C8B-B14F-4D97-AF65-F5344CB8AC3E}">
+        <p14:creationId xmlns:p14="http://schemas.microsoft.com/office/powerpoint/2010/main" val="4136336566"/>
+      </p:ext>
+    </p:extLst>
+  </p:cSld>
+  <p:clrMapOvr>
+    <a:masterClrMapping/>
+  </p:clrMapOvr>
+</p:sld>
+</file>
+
+<file path=ppt/slides/slide5.xml><?xml version="1.0" encoding="utf-8"?>
+<p:sld xmlns:a="http://schemas.openxmlformats.org/drawingml/2006/main" xmlns:r="http://schemas.openxmlformats.org/officeDocument/2006/relationships" xmlns:p="http://schemas.openxmlformats.org/presentationml/2006/main">
+  <p:cSld>
+    <p:bg>
+      <p:bgPr>
+        <a:solidFill>
+          <a:schemeClr val="bg1"/>
+        </a:solidFill>
+        <a:effectLst/>
+      </p:bgPr>
+    </p:bg>
+    <p:spTree>
+      <p:nvGrpSpPr>
+        <p:cNvPr id="1" name=""/>
+        <p:cNvGrpSpPr/>
+        <p:nvPr/>
+      </p:nvGrpSpPr>
+      <p:grpSpPr>
+        <a:xfrm>
+          <a:off x="0" y="0"/>
+          <a:ext cx="0" cy="0"/>
+          <a:chOff x="0" y="0"/>
+          <a:chExt cx="0" cy="0"/>
+        </a:xfrm>
+      </p:grpSpPr>
+      <p:sp>
+        <p:nvSpPr>
+          <p:cNvPr id="2" name="Title 1">
+            <a:extLst>
+              <a:ext uri="{FF2B5EF4-FFF2-40B4-BE49-F238E27FC236}">
+                <a16:creationId xmlns:a16="http://schemas.microsoft.com/office/drawing/2014/main" id="{4F87C7D5-4E35-46C7-A5AB-3569E12C88CF}"/>
+              </a:ext>
+            </a:extLst>
+          </p:cNvPr>
+          <p:cNvSpPr>
+            <a:spLocks noGrp="1"/>
+          </p:cNvSpPr>
+          <p:nvPr>
+            <p:ph type="title"/>
+          </p:nvPr>
+        </p:nvSpPr>
+        <p:spPr>
+          <a:xfrm>
+            <a:off x="648929" y="629266"/>
+            <a:ext cx="3663012" cy="989809"/>
+          </a:xfrm>
+        </p:spPr>
+        <p:txBody>
+          <a:bodyPr>
+            <a:normAutofit fontScale="90000"/>
+          </a:bodyPr>
+          <a:lstStyle/>
+          <a:p>
+            <a:r>
+              <a:rPr lang="en-US" dirty="0"/>
+              <a:t>Phase 1.1 – Oroville dam and outflow only</a:t>
+            </a:r>
+          </a:p>
+        </p:txBody>
+      </p:sp>
+      <p:sp>
+        <p:nvSpPr>
+          <p:cNvPr id="3" name="Content Placeholder 2">
+            <a:extLst>
+              <a:ext uri="{FF2B5EF4-FFF2-40B4-BE49-F238E27FC236}">
+                <a16:creationId xmlns:a16="http://schemas.microsoft.com/office/drawing/2014/main" id="{319E246B-3D2E-438E-BEED-6A615B92177C}"/>
+              </a:ext>
+            </a:extLst>
+          </p:cNvPr>
+          <p:cNvSpPr>
+            <a:spLocks noGrp="1"/>
+          </p:cNvSpPr>
+          <p:nvPr>
+            <p:ph idx="1"/>
+          </p:nvPr>
+        </p:nvSpPr>
+        <p:spPr>
+          <a:xfrm>
+            <a:off x="648931" y="1847462"/>
+            <a:ext cx="3505494" cy="4376358"/>
+          </a:xfrm>
+        </p:spPr>
+        <p:txBody>
+          <a:bodyPr>
+            <a:normAutofit/>
+          </a:bodyPr>
+          <a:lstStyle/>
+          <a:p>
+            <a:r>
+              <a:rPr lang="en-US" sz="2000" dirty="0"/>
+              <a:t>Develop very simple model</a:t>
+            </a:r>
+          </a:p>
+          <a:p>
+            <a:pPr lvl="1"/>
+            <a:r>
+              <a:rPr lang="en-US" sz="2000" dirty="0"/>
+              <a:t>Inflow to Oroville reservoir</a:t>
+            </a:r>
+          </a:p>
+          <a:p>
+            <a:pPr lvl="1"/>
+            <a:r>
+              <a:rPr lang="en-US" sz="2000" dirty="0"/>
+              <a:t>Oroville reservoir storage</a:t>
+            </a:r>
+          </a:p>
+          <a:p>
+            <a:pPr lvl="1"/>
+            <a:r>
+              <a:rPr lang="en-US" sz="2000" dirty="0"/>
+              <a:t>Release from Oroville storage </a:t>
+            </a:r>
+          </a:p>
+          <a:p>
+            <a:pPr lvl="1"/>
+            <a:r>
+              <a:rPr lang="en-US" sz="2000" dirty="0"/>
+              <a:t>No deliveries/demands yet</a:t>
+            </a:r>
+          </a:p>
+          <a:p>
+            <a:r>
+              <a:rPr lang="en-US" sz="2400" dirty="0"/>
+              <a:t>Output</a:t>
+            </a:r>
+          </a:p>
+          <a:p>
+            <a:pPr lvl="1"/>
+            <a:r>
+              <a:rPr lang="en-US" sz="2000" dirty="0"/>
+              <a:t>Daily Oroville releases</a:t>
+            </a:r>
+          </a:p>
+        </p:txBody>
+      </p:sp>
+      <p:sp>
+        <p:nvSpPr>
+          <p:cNvPr id="18" name="Rectangle 11">
+            <a:extLst>
+              <a:ext uri="{FF2B5EF4-FFF2-40B4-BE49-F238E27FC236}">
+                <a16:creationId xmlns:a16="http://schemas.microsoft.com/office/drawing/2014/main" id="{5E39A796-BE83-48B1-B33F-35C4A32AAB57}"/>
+              </a:ext>
+              <a:ext uri="{C183D7F6-B498-43B3-948B-1728B52AA6E4}">
+                <adec:decorative xmlns:adec="http://schemas.microsoft.com/office/drawing/2017/decorative" val="1"/>
+              </a:ext>
+            </a:extLst>
+          </p:cNvPr>
+          <p:cNvSpPr>
+            <a:spLocks noGrp="1" noRot="1" noChangeAspect="1" noMove="1" noResize="1" noEditPoints="1" noAdjustHandles="1" noChangeArrowheads="1" noChangeShapeType="1" noTextEdit="1"/>
+          </p:cNvSpPr>
+          <p:nvPr>
+            <p:extLst>
+              <p:ext uri="{386F3935-93C4-4BCD-93E2-E3B085C9AB24}">
+                <p16:designElem xmlns:p16="http://schemas.microsoft.com/office/powerpoint/2015/main" val="1"/>
+              </p:ext>
+            </p:extLst>
+          </p:nvPr>
+        </p:nvSpPr>
+        <p:spPr>
+          <a:xfrm>
+            <a:off x="4639056" y="0"/>
+            <a:ext cx="7552944" cy="6858000"/>
+          </a:xfrm>
+          <a:prstGeom prst="rect">
+            <a:avLst/>
+          </a:prstGeom>
+          <a:solidFill>
+            <a:srgbClr val="C8CACA"/>
+          </a:solidFill>
+          <a:ln>
+            <a:noFill/>
+          </a:ln>
+        </p:spPr>
+        <p:style>
+          <a:lnRef idx="2">
+            <a:schemeClr val="accent1">
+              <a:shade val="50000"/>
+            </a:schemeClr>
+          </a:lnRef>
+          <a:fillRef idx="1">
+            <a:schemeClr val="accent1"/>
+          </a:fillRef>
+          <a:effectRef idx="0">
+            <a:schemeClr val="accent1"/>
+          </a:effectRef>
+          <a:fontRef idx="minor">
+            <a:schemeClr val="lt1"/>
+          </a:fontRef>
+        </p:style>
+        <p:txBody>
+          <a:bodyPr rtlCol="0" anchor="ctr"/>
+          <a:lstStyle/>
+          <a:p>
+            <a:pPr algn="ctr"/>
+            <a:endParaRPr lang="en-US"/>
+          </a:p>
+        </p:txBody>
+      </p:sp>
+      <p:sp>
+        <p:nvSpPr>
+          <p:cNvPr id="19" name="Rounded Rectangle 9">
+            <a:extLst>
+              <a:ext uri="{FF2B5EF4-FFF2-40B4-BE49-F238E27FC236}">
+                <a16:creationId xmlns:a16="http://schemas.microsoft.com/office/drawing/2014/main" id="{72F84B47-E267-4194-8194-831DB7B5547F}"/>
+              </a:ext>
+              <a:ext uri="{C183D7F6-B498-43B3-948B-1728B52AA6E4}">
+                <adec:decorative xmlns:adec="http://schemas.microsoft.com/office/drawing/2017/decorative" val="1"/>
+              </a:ext>
+            </a:extLst>
+          </p:cNvPr>
+          <p:cNvSpPr>
+            <a:spLocks noGrp="1" noRot="1" noChangeAspect="1" noMove="1" noResize="1" noEditPoints="1" noAdjustHandles="1" noChangeArrowheads="1" noChangeShapeType="1" noTextEdit="1"/>
+          </p:cNvSpPr>
+          <p:nvPr>
+            <p:extLst>
+              <p:ext uri="{386F3935-93C4-4BCD-93E2-E3B085C9AB24}">
+                <p16:designElem xmlns:p16="http://schemas.microsoft.com/office/powerpoint/2015/main" val="1"/>
+              </p:ext>
+            </p:extLst>
+          </p:nvPr>
+        </p:nvSpPr>
+        <p:spPr>
+          <a:xfrm>
+            <a:off x="5123688" y="557784"/>
+            <a:ext cx="6584098" cy="5739187"/>
+          </a:xfrm>
+          <a:prstGeom prst="roundRect">
+            <a:avLst>
+              <a:gd name="adj" fmla="val 0"/>
+            </a:avLst>
+          </a:prstGeom>
+          <a:solidFill>
+            <a:srgbClr val="FFFFFF"/>
+          </a:solidFill>
+          <a:ln w="9525">
+            <a:solidFill>
+              <a:srgbClr val="C8CACA"/>
+            </a:solidFill>
+          </a:ln>
+          <a:effectLst>
+            <a:outerShdw blurRad="57150" dist="19050" dir="5400000" algn="t" rotWithShape="0">
+              <a:prstClr val="black">
+                <a:alpha val="63000"/>
+              </a:prstClr>
+            </a:outerShdw>
+          </a:effectLst>
+        </p:spPr>
+        <p:style>
+          <a:lnRef idx="2">
+            <a:schemeClr val="accent1">
+              <a:shade val="50000"/>
+            </a:schemeClr>
+          </a:lnRef>
+          <a:fillRef idx="1">
+            <a:schemeClr val="accent1"/>
+          </a:fillRef>
+          <a:effectRef idx="0">
+            <a:schemeClr val="accent1"/>
+          </a:effectRef>
+          <a:fontRef idx="minor">
+            <a:schemeClr val="lt1"/>
+          </a:fontRef>
+        </p:style>
+        <p:txBody>
+          <a:bodyPr rtlCol="0" anchor="ctr"/>
+          <a:lstStyle/>
+          <a:p>
+            <a:pPr algn="ctr"/>
+            <a:endParaRPr lang="en-US"/>
+          </a:p>
+        </p:txBody>
+      </p:sp>
+      <p:pic>
+        <p:nvPicPr>
           <p:cNvPr id="7" name="Picture 6">
             <a:extLst>
               <a:ext uri="{FF2B5EF4-FFF2-40B4-BE49-F238E27FC236}">
@@ -3712,7 +4889,1009 @@
 </p:sld>
 </file>
 
-<file path=ppt/slides/slide3.xml><?xml version="1.0" encoding="utf-8"?>
+<file path=ppt/slides/slide6.xml><?xml version="1.0" encoding="utf-8"?>
+<p:sld xmlns:a="http://schemas.openxmlformats.org/drawingml/2006/main" xmlns:r="http://schemas.openxmlformats.org/officeDocument/2006/relationships" xmlns:p="http://schemas.openxmlformats.org/presentationml/2006/main">
+  <p:cSld>
+    <p:bg>
+      <p:bgPr>
+        <a:solidFill>
+          <a:schemeClr val="bg1"/>
+        </a:solidFill>
+        <a:effectLst/>
+      </p:bgPr>
+    </p:bg>
+    <p:spTree>
+      <p:nvGrpSpPr>
+        <p:cNvPr id="1" name=""/>
+        <p:cNvGrpSpPr/>
+        <p:nvPr/>
+      </p:nvGrpSpPr>
+      <p:grpSpPr>
+        <a:xfrm>
+          <a:off x="0" y="0"/>
+          <a:ext cx="0" cy="0"/>
+          <a:chOff x="0" y="0"/>
+          <a:chExt cx="0" cy="0"/>
+        </a:xfrm>
+      </p:grpSpPr>
+      <p:sp>
+        <p:nvSpPr>
+          <p:cNvPr id="2" name="Title 1">
+            <a:extLst>
+              <a:ext uri="{FF2B5EF4-FFF2-40B4-BE49-F238E27FC236}">
+                <a16:creationId xmlns:a16="http://schemas.microsoft.com/office/drawing/2014/main" id="{4F87C7D5-4E35-46C7-A5AB-3569E12C88CF}"/>
+              </a:ext>
+            </a:extLst>
+          </p:cNvPr>
+          <p:cNvSpPr>
+            <a:spLocks noGrp="1"/>
+          </p:cNvSpPr>
+          <p:nvPr>
+            <p:ph type="title"/>
+          </p:nvPr>
+        </p:nvSpPr>
+        <p:spPr>
+          <a:xfrm>
+            <a:off x="648929" y="629266"/>
+            <a:ext cx="3505495" cy="1622321"/>
+          </a:xfrm>
+        </p:spPr>
+        <p:txBody>
+          <a:bodyPr>
+            <a:normAutofit/>
+          </a:bodyPr>
+          <a:lstStyle/>
+          <a:p>
+            <a:r>
+              <a:rPr lang="en-US" sz="3400" dirty="0"/>
+              <a:t>Phase 1.2 – Include Oroville deliveries</a:t>
+            </a:r>
+          </a:p>
+        </p:txBody>
+      </p:sp>
+      <p:sp>
+        <p:nvSpPr>
+          <p:cNvPr id="3" name="Content Placeholder 2">
+            <a:extLst>
+              <a:ext uri="{FF2B5EF4-FFF2-40B4-BE49-F238E27FC236}">
+                <a16:creationId xmlns:a16="http://schemas.microsoft.com/office/drawing/2014/main" id="{319E246B-3D2E-438E-BEED-6A615B92177C}"/>
+              </a:ext>
+            </a:extLst>
+          </p:cNvPr>
+          <p:cNvSpPr>
+            <a:spLocks noGrp="1"/>
+          </p:cNvSpPr>
+          <p:nvPr>
+            <p:ph idx="1"/>
+          </p:nvPr>
+        </p:nvSpPr>
+        <p:spPr>
+          <a:xfrm>
+            <a:off x="648931" y="2438400"/>
+            <a:ext cx="3505494" cy="3785419"/>
+          </a:xfrm>
+        </p:spPr>
+        <p:txBody>
+          <a:bodyPr>
+            <a:normAutofit/>
+          </a:bodyPr>
+          <a:lstStyle/>
+          <a:p>
+            <a:r>
+              <a:rPr lang="en-US" sz="2000" dirty="0"/>
+              <a:t>Include D_OROVL missing from previous step</a:t>
+            </a:r>
+          </a:p>
+          <a:p>
+            <a:r>
+              <a:rPr lang="en-US" sz="2000" dirty="0"/>
+              <a:t>Output</a:t>
+            </a:r>
+          </a:p>
+          <a:p>
+            <a:pPr lvl="1"/>
+            <a:r>
+              <a:rPr lang="en-US" sz="2000" dirty="0"/>
+              <a:t>Oroville releases, storage, deliveries</a:t>
+            </a:r>
+          </a:p>
+        </p:txBody>
+      </p:sp>
+      <p:sp>
+        <p:nvSpPr>
+          <p:cNvPr id="31" name="Rectangle 30">
+            <a:extLst>
+              <a:ext uri="{FF2B5EF4-FFF2-40B4-BE49-F238E27FC236}">
+                <a16:creationId xmlns:a16="http://schemas.microsoft.com/office/drawing/2014/main" id="{5E39A796-BE83-48B1-B33F-35C4A32AAB57}"/>
+              </a:ext>
+              <a:ext uri="{C183D7F6-B498-43B3-948B-1728B52AA6E4}">
+                <adec:decorative xmlns:adec="http://schemas.microsoft.com/office/drawing/2017/decorative" val="1"/>
+              </a:ext>
+            </a:extLst>
+          </p:cNvPr>
+          <p:cNvSpPr>
+            <a:spLocks noGrp="1" noRot="1" noChangeAspect="1" noMove="1" noResize="1" noEditPoints="1" noAdjustHandles="1" noChangeArrowheads="1" noChangeShapeType="1" noTextEdit="1"/>
+          </p:cNvSpPr>
+          <p:nvPr>
+            <p:extLst>
+              <p:ext uri="{386F3935-93C4-4BCD-93E2-E3B085C9AB24}">
+                <p16:designElem xmlns:p16="http://schemas.microsoft.com/office/powerpoint/2015/main" val="1"/>
+              </p:ext>
+            </p:extLst>
+          </p:nvPr>
+        </p:nvSpPr>
+        <p:spPr>
+          <a:xfrm>
+            <a:off x="4639056" y="0"/>
+            <a:ext cx="7552944" cy="6858000"/>
+          </a:xfrm>
+          <a:prstGeom prst="rect">
+            <a:avLst/>
+          </a:prstGeom>
+          <a:solidFill>
+            <a:srgbClr val="C8CACA"/>
+          </a:solidFill>
+          <a:ln>
+            <a:noFill/>
+          </a:ln>
+        </p:spPr>
+        <p:style>
+          <a:lnRef idx="2">
+            <a:schemeClr val="accent1">
+              <a:shade val="50000"/>
+            </a:schemeClr>
+          </a:lnRef>
+          <a:fillRef idx="1">
+            <a:schemeClr val="accent1"/>
+          </a:fillRef>
+          <a:effectRef idx="0">
+            <a:schemeClr val="accent1"/>
+          </a:effectRef>
+          <a:fontRef idx="minor">
+            <a:schemeClr val="lt1"/>
+          </a:fontRef>
+        </p:style>
+        <p:txBody>
+          <a:bodyPr rtlCol="0" anchor="ctr"/>
+          <a:lstStyle/>
+          <a:p>
+            <a:pPr algn="ctr"/>
+            <a:endParaRPr lang="en-US"/>
+          </a:p>
+        </p:txBody>
+      </p:sp>
+      <p:sp>
+        <p:nvSpPr>
+          <p:cNvPr id="33" name="Rounded Rectangle 9">
+            <a:extLst>
+              <a:ext uri="{FF2B5EF4-FFF2-40B4-BE49-F238E27FC236}">
+                <a16:creationId xmlns:a16="http://schemas.microsoft.com/office/drawing/2014/main" id="{72F84B47-E267-4194-8194-831DB7B5547F}"/>
+              </a:ext>
+              <a:ext uri="{C183D7F6-B498-43B3-948B-1728B52AA6E4}">
+                <adec:decorative xmlns:adec="http://schemas.microsoft.com/office/drawing/2017/decorative" val="1"/>
+              </a:ext>
+            </a:extLst>
+          </p:cNvPr>
+          <p:cNvSpPr>
+            <a:spLocks noGrp="1" noRot="1" noChangeAspect="1" noMove="1" noResize="1" noEditPoints="1" noAdjustHandles="1" noChangeArrowheads="1" noChangeShapeType="1" noTextEdit="1"/>
+          </p:cNvSpPr>
+          <p:nvPr>
+            <p:extLst>
+              <p:ext uri="{386F3935-93C4-4BCD-93E2-E3B085C9AB24}">
+                <p16:designElem xmlns:p16="http://schemas.microsoft.com/office/powerpoint/2015/main" val="1"/>
+              </p:ext>
+            </p:extLst>
+          </p:nvPr>
+        </p:nvSpPr>
+        <p:spPr>
+          <a:xfrm>
+            <a:off x="5123688" y="557784"/>
+            <a:ext cx="6584098" cy="5739187"/>
+          </a:xfrm>
+          <a:prstGeom prst="roundRect">
+            <a:avLst>
+              <a:gd name="adj" fmla="val 0"/>
+            </a:avLst>
+          </a:prstGeom>
+          <a:solidFill>
+            <a:srgbClr val="FFFFFF"/>
+          </a:solidFill>
+          <a:ln w="9525">
+            <a:solidFill>
+              <a:srgbClr val="C8CACA"/>
+            </a:solidFill>
+          </a:ln>
+          <a:effectLst>
+            <a:outerShdw blurRad="57150" dist="19050" dir="5400000" algn="t" rotWithShape="0">
+              <a:prstClr val="black">
+                <a:alpha val="63000"/>
+              </a:prstClr>
+            </a:outerShdw>
+          </a:effectLst>
+        </p:spPr>
+        <p:style>
+          <a:lnRef idx="2">
+            <a:schemeClr val="accent1">
+              <a:shade val="50000"/>
+            </a:schemeClr>
+          </a:lnRef>
+          <a:fillRef idx="1">
+            <a:schemeClr val="accent1"/>
+          </a:fillRef>
+          <a:effectRef idx="0">
+            <a:schemeClr val="accent1"/>
+          </a:effectRef>
+          <a:fontRef idx="minor">
+            <a:schemeClr val="lt1"/>
+          </a:fontRef>
+        </p:style>
+        <p:txBody>
+          <a:bodyPr rtlCol="0" anchor="ctr"/>
+          <a:lstStyle/>
+          <a:p>
+            <a:pPr algn="ctr"/>
+            <a:endParaRPr lang="en-US"/>
+          </a:p>
+        </p:txBody>
+      </p:sp>
+      <p:pic>
+        <p:nvPicPr>
+          <p:cNvPr id="8" name="Picture 7">
+            <a:extLst>
+              <a:ext uri="{FF2B5EF4-FFF2-40B4-BE49-F238E27FC236}">
+                <a16:creationId xmlns:a16="http://schemas.microsoft.com/office/drawing/2014/main" id="{D2870AF7-B942-4FB7-895B-E7FA99F0BE2E}"/>
+              </a:ext>
+            </a:extLst>
+          </p:cNvPr>
+          <p:cNvPicPr>
+            <a:picLocks noChangeAspect="1"/>
+          </p:cNvPicPr>
+          <p:nvPr/>
+        </p:nvPicPr>
+        <p:blipFill>
+          <a:blip r:embed="rId2"/>
+          <a:stretch>
+            <a:fillRect/>
+          </a:stretch>
+        </p:blipFill>
+        <p:spPr>
+          <a:xfrm>
+            <a:off x="5567936" y="807593"/>
+            <a:ext cx="5695183" cy="5239568"/>
+          </a:xfrm>
+          <a:prstGeom prst="rect">
+            <a:avLst/>
+          </a:prstGeom>
+          <a:effectLst/>
+        </p:spPr>
+      </p:pic>
+    </p:spTree>
+    <p:extLst>
+      <p:ext uri="{BB962C8B-B14F-4D97-AF65-F5344CB8AC3E}">
+        <p14:creationId xmlns:p14="http://schemas.microsoft.com/office/powerpoint/2010/main" val="1067204752"/>
+      </p:ext>
+    </p:extLst>
+  </p:cSld>
+  <p:clrMapOvr>
+    <a:masterClrMapping/>
+  </p:clrMapOvr>
+</p:sld>
+</file>
+
+<file path=ppt/slides/slide7.xml><?xml version="1.0" encoding="utf-8"?>
+<p:sld xmlns:a="http://schemas.openxmlformats.org/drawingml/2006/main" xmlns:r="http://schemas.openxmlformats.org/officeDocument/2006/relationships" xmlns:p="http://schemas.openxmlformats.org/presentationml/2006/main">
+  <p:cSld>
+    <p:bg>
+      <p:bgPr>
+        <a:solidFill>
+          <a:schemeClr val="bg1"/>
+        </a:solidFill>
+        <a:effectLst/>
+      </p:bgPr>
+    </p:bg>
+    <p:spTree>
+      <p:nvGrpSpPr>
+        <p:cNvPr id="1" name=""/>
+        <p:cNvGrpSpPr/>
+        <p:nvPr/>
+      </p:nvGrpSpPr>
+      <p:grpSpPr>
+        <a:xfrm>
+          <a:off x="0" y="0"/>
+          <a:ext cx="0" cy="0"/>
+          <a:chOff x="0" y="0"/>
+          <a:chExt cx="0" cy="0"/>
+        </a:xfrm>
+      </p:grpSpPr>
+      <p:sp>
+        <p:nvSpPr>
+          <p:cNvPr id="2" name="Title 1">
+            <a:extLst>
+              <a:ext uri="{FF2B5EF4-FFF2-40B4-BE49-F238E27FC236}">
+                <a16:creationId xmlns:a16="http://schemas.microsoft.com/office/drawing/2014/main" id="{4F87C7D5-4E35-46C7-A5AB-3569E12C88CF}"/>
+              </a:ext>
+            </a:extLst>
+          </p:cNvPr>
+          <p:cNvSpPr>
+            <a:spLocks noGrp="1"/>
+          </p:cNvSpPr>
+          <p:nvPr>
+            <p:ph type="title"/>
+          </p:nvPr>
+        </p:nvSpPr>
+        <p:spPr>
+          <a:xfrm>
+            <a:off x="648929" y="629266"/>
+            <a:ext cx="3505495" cy="1622321"/>
+          </a:xfrm>
+        </p:spPr>
+        <p:txBody>
+          <a:bodyPr>
+            <a:normAutofit/>
+          </a:bodyPr>
+          <a:lstStyle/>
+          <a:p>
+            <a:r>
+              <a:rPr lang="en-US" sz="3700"/>
+              <a:t>Phase 1.3 – Include Thermalito node</a:t>
+            </a:r>
+          </a:p>
+        </p:txBody>
+      </p:sp>
+      <p:sp>
+        <p:nvSpPr>
+          <p:cNvPr id="3" name="Content Placeholder 2">
+            <a:extLst>
+              <a:ext uri="{FF2B5EF4-FFF2-40B4-BE49-F238E27FC236}">
+                <a16:creationId xmlns:a16="http://schemas.microsoft.com/office/drawing/2014/main" id="{319E246B-3D2E-438E-BEED-6A615B92177C}"/>
+              </a:ext>
+            </a:extLst>
+          </p:cNvPr>
+          <p:cNvSpPr>
+            <a:spLocks noGrp="1"/>
+          </p:cNvSpPr>
+          <p:nvPr>
+            <p:ph idx="1"/>
+          </p:nvPr>
+        </p:nvSpPr>
+        <p:spPr>
+          <a:xfrm>
+            <a:off x="648931" y="2438400"/>
+            <a:ext cx="3505494" cy="3785419"/>
+          </a:xfrm>
+        </p:spPr>
+        <p:txBody>
+          <a:bodyPr>
+            <a:normAutofit/>
+          </a:bodyPr>
+          <a:lstStyle/>
+          <a:p>
+            <a:r>
+              <a:rPr lang="en-US" sz="2000" dirty="0"/>
+              <a:t>No deliveries yet</a:t>
+            </a:r>
+          </a:p>
+          <a:p>
+            <a:r>
+              <a:rPr lang="en-US" sz="2000" dirty="0"/>
+              <a:t>Just the passing of water from C_OROVL to C_THERM</a:t>
+            </a:r>
+          </a:p>
+          <a:p>
+            <a:r>
+              <a:rPr lang="en-US" sz="2000" dirty="0"/>
+              <a:t>Need to review the purpose of Accretion-Depletion (AD) terms and how to calculate</a:t>
+            </a:r>
+          </a:p>
+          <a:p>
+            <a:r>
+              <a:rPr lang="en-US" sz="2000" dirty="0"/>
+              <a:t>Output</a:t>
+            </a:r>
+          </a:p>
+          <a:p>
+            <a:pPr lvl="1"/>
+            <a:r>
+              <a:rPr lang="en-US" sz="2000" dirty="0"/>
+              <a:t>Flow from Thermalito (C_THERM)</a:t>
+            </a:r>
+          </a:p>
+        </p:txBody>
+      </p:sp>
+      <p:sp>
+        <p:nvSpPr>
+          <p:cNvPr id="38" name="Rectangle 37">
+            <a:extLst>
+              <a:ext uri="{FF2B5EF4-FFF2-40B4-BE49-F238E27FC236}">
+                <a16:creationId xmlns:a16="http://schemas.microsoft.com/office/drawing/2014/main" id="{5E39A796-BE83-48B1-B33F-35C4A32AAB57}"/>
+              </a:ext>
+              <a:ext uri="{C183D7F6-B498-43B3-948B-1728B52AA6E4}">
+                <adec:decorative xmlns:adec="http://schemas.microsoft.com/office/drawing/2017/decorative" val="1"/>
+              </a:ext>
+            </a:extLst>
+          </p:cNvPr>
+          <p:cNvSpPr>
+            <a:spLocks noGrp="1" noRot="1" noChangeAspect="1" noMove="1" noResize="1" noEditPoints="1" noAdjustHandles="1" noChangeArrowheads="1" noChangeShapeType="1" noTextEdit="1"/>
+          </p:cNvSpPr>
+          <p:nvPr>
+            <p:extLst>
+              <p:ext uri="{386F3935-93C4-4BCD-93E2-E3B085C9AB24}">
+                <p16:designElem xmlns:p16="http://schemas.microsoft.com/office/powerpoint/2015/main" val="1"/>
+              </p:ext>
+            </p:extLst>
+          </p:nvPr>
+        </p:nvSpPr>
+        <p:spPr>
+          <a:xfrm>
+            <a:off x="4639056" y="0"/>
+            <a:ext cx="7552944" cy="6858000"/>
+          </a:xfrm>
+          <a:prstGeom prst="rect">
+            <a:avLst/>
+          </a:prstGeom>
+          <a:solidFill>
+            <a:srgbClr val="C8CACA"/>
+          </a:solidFill>
+          <a:ln>
+            <a:noFill/>
+          </a:ln>
+        </p:spPr>
+        <p:style>
+          <a:lnRef idx="2">
+            <a:schemeClr val="accent1">
+              <a:shade val="50000"/>
+            </a:schemeClr>
+          </a:lnRef>
+          <a:fillRef idx="1">
+            <a:schemeClr val="accent1"/>
+          </a:fillRef>
+          <a:effectRef idx="0">
+            <a:schemeClr val="accent1"/>
+          </a:effectRef>
+          <a:fontRef idx="minor">
+            <a:schemeClr val="lt1"/>
+          </a:fontRef>
+        </p:style>
+        <p:txBody>
+          <a:bodyPr rtlCol="0" anchor="ctr"/>
+          <a:lstStyle/>
+          <a:p>
+            <a:pPr algn="ctr"/>
+            <a:endParaRPr lang="en-US"/>
+          </a:p>
+        </p:txBody>
+      </p:sp>
+      <p:sp>
+        <p:nvSpPr>
+          <p:cNvPr id="40" name="Rounded Rectangle 9">
+            <a:extLst>
+              <a:ext uri="{FF2B5EF4-FFF2-40B4-BE49-F238E27FC236}">
+                <a16:creationId xmlns:a16="http://schemas.microsoft.com/office/drawing/2014/main" id="{72F84B47-E267-4194-8194-831DB7B5547F}"/>
+              </a:ext>
+              <a:ext uri="{C183D7F6-B498-43B3-948B-1728B52AA6E4}">
+                <adec:decorative xmlns:adec="http://schemas.microsoft.com/office/drawing/2017/decorative" val="1"/>
+              </a:ext>
+            </a:extLst>
+          </p:cNvPr>
+          <p:cNvSpPr>
+            <a:spLocks noGrp="1" noRot="1" noChangeAspect="1" noMove="1" noResize="1" noEditPoints="1" noAdjustHandles="1" noChangeArrowheads="1" noChangeShapeType="1" noTextEdit="1"/>
+          </p:cNvSpPr>
+          <p:nvPr>
+            <p:extLst>
+              <p:ext uri="{386F3935-93C4-4BCD-93E2-E3B085C9AB24}">
+                <p16:designElem xmlns:p16="http://schemas.microsoft.com/office/powerpoint/2015/main" val="1"/>
+              </p:ext>
+            </p:extLst>
+          </p:nvPr>
+        </p:nvSpPr>
+        <p:spPr>
+          <a:xfrm>
+            <a:off x="5123688" y="557784"/>
+            <a:ext cx="6584098" cy="5739187"/>
+          </a:xfrm>
+          <a:prstGeom prst="roundRect">
+            <a:avLst>
+              <a:gd name="adj" fmla="val 0"/>
+            </a:avLst>
+          </a:prstGeom>
+          <a:solidFill>
+            <a:srgbClr val="FFFFFF"/>
+          </a:solidFill>
+          <a:ln w="9525">
+            <a:solidFill>
+              <a:srgbClr val="C8CACA"/>
+            </a:solidFill>
+          </a:ln>
+          <a:effectLst>
+            <a:outerShdw blurRad="57150" dist="19050" dir="5400000" algn="t" rotWithShape="0">
+              <a:prstClr val="black">
+                <a:alpha val="63000"/>
+              </a:prstClr>
+            </a:outerShdw>
+          </a:effectLst>
+        </p:spPr>
+        <p:style>
+          <a:lnRef idx="2">
+            <a:schemeClr val="accent1">
+              <a:shade val="50000"/>
+            </a:schemeClr>
+          </a:lnRef>
+          <a:fillRef idx="1">
+            <a:schemeClr val="accent1"/>
+          </a:fillRef>
+          <a:effectRef idx="0">
+            <a:schemeClr val="accent1"/>
+          </a:effectRef>
+          <a:fontRef idx="minor">
+            <a:schemeClr val="lt1"/>
+          </a:fontRef>
+        </p:style>
+        <p:txBody>
+          <a:bodyPr rtlCol="0" anchor="ctr"/>
+          <a:lstStyle/>
+          <a:p>
+            <a:pPr algn="ctr"/>
+            <a:endParaRPr lang="en-US"/>
+          </a:p>
+        </p:txBody>
+      </p:sp>
+      <p:pic>
+        <p:nvPicPr>
+          <p:cNvPr id="5" name="Picture 4">
+            <a:extLst>
+              <a:ext uri="{FF2B5EF4-FFF2-40B4-BE49-F238E27FC236}">
+                <a16:creationId xmlns:a16="http://schemas.microsoft.com/office/drawing/2014/main" id="{9E188F83-D5C3-4028-B774-C3E26D8C896D}"/>
+              </a:ext>
+            </a:extLst>
+          </p:cNvPr>
+          <p:cNvPicPr>
+            <a:picLocks noChangeAspect="1"/>
+          </p:cNvPicPr>
+          <p:nvPr/>
+        </p:nvPicPr>
+        <p:blipFill>
+          <a:blip r:embed="rId2"/>
+          <a:stretch>
+            <a:fillRect/>
+          </a:stretch>
+        </p:blipFill>
+        <p:spPr>
+          <a:xfrm>
+            <a:off x="5567936" y="807593"/>
+            <a:ext cx="5695183" cy="5239568"/>
+          </a:xfrm>
+          <a:prstGeom prst="rect">
+            <a:avLst/>
+          </a:prstGeom>
+          <a:effectLst/>
+        </p:spPr>
+      </p:pic>
+      <p:pic>
+        <p:nvPicPr>
+          <p:cNvPr id="7" name="Graphic 6" descr="Close">
+            <a:extLst>
+              <a:ext uri="{FF2B5EF4-FFF2-40B4-BE49-F238E27FC236}">
+                <a16:creationId xmlns:a16="http://schemas.microsoft.com/office/drawing/2014/main" id="{7F3418E1-10F5-451D-A07D-EA67C0BDDC9C}"/>
+              </a:ext>
+            </a:extLst>
+          </p:cNvPr>
+          <p:cNvPicPr>
+            <a:picLocks noChangeAspect="1"/>
+          </p:cNvPicPr>
+          <p:nvPr/>
+        </p:nvPicPr>
+        <p:blipFill>
+          <a:blip r:embed="rId3">
+            <a:extLst>
+              <a:ext uri="{28A0092B-C50C-407E-A947-70E740481C1C}">
+                <a14:useLocalDpi xmlns:a14="http://schemas.microsoft.com/office/drawing/2010/main" val="0"/>
+              </a:ext>
+              <a:ext uri="{96DAC541-7B7A-43D3-8B79-37D633B846F1}">
+                <asvg:svgBlip xmlns:asvg="http://schemas.microsoft.com/office/drawing/2016/SVG/main" r:embed="rId4"/>
+              </a:ext>
+            </a:extLst>
+          </a:blip>
+          <a:stretch>
+            <a:fillRect/>
+          </a:stretch>
+        </p:blipFill>
+        <p:spPr>
+          <a:xfrm>
+            <a:off x="5862649" y="4240763"/>
+            <a:ext cx="914400" cy="914400"/>
+          </a:xfrm>
+          <a:prstGeom prst="rect">
+            <a:avLst/>
+          </a:prstGeom>
+        </p:spPr>
+      </p:pic>
+      <p:pic>
+        <p:nvPicPr>
+          <p:cNvPr id="9" name="Graphic 8" descr="Close">
+            <a:extLst>
+              <a:ext uri="{FF2B5EF4-FFF2-40B4-BE49-F238E27FC236}">
+                <a16:creationId xmlns:a16="http://schemas.microsoft.com/office/drawing/2014/main" id="{B0745657-67C7-4DC6-B129-D920567331AF}"/>
+              </a:ext>
+            </a:extLst>
+          </p:cNvPr>
+          <p:cNvPicPr>
+            <a:picLocks noChangeAspect="1"/>
+          </p:cNvPicPr>
+          <p:nvPr/>
+        </p:nvPicPr>
+        <p:blipFill>
+          <a:blip r:embed="rId3">
+            <a:extLst>
+              <a:ext uri="{28A0092B-C50C-407E-A947-70E740481C1C}">
+                <a14:useLocalDpi xmlns:a14="http://schemas.microsoft.com/office/drawing/2010/main" val="0"/>
+              </a:ext>
+              <a:ext uri="{96DAC541-7B7A-43D3-8B79-37D633B846F1}">
+                <asvg:svgBlip xmlns:asvg="http://schemas.microsoft.com/office/drawing/2016/SVG/main" r:embed="rId4"/>
+              </a:ext>
+            </a:extLst>
+          </a:blip>
+          <a:stretch>
+            <a:fillRect/>
+          </a:stretch>
+        </p:blipFill>
+        <p:spPr>
+          <a:xfrm>
+            <a:off x="6777049" y="5246926"/>
+            <a:ext cx="914400" cy="914400"/>
+          </a:xfrm>
+          <a:prstGeom prst="rect">
+            <a:avLst/>
+          </a:prstGeom>
+        </p:spPr>
+      </p:pic>
+    </p:spTree>
+    <p:extLst>
+      <p:ext uri="{BB962C8B-B14F-4D97-AF65-F5344CB8AC3E}">
+        <p14:creationId xmlns:p14="http://schemas.microsoft.com/office/powerpoint/2010/main" val="1408431886"/>
+      </p:ext>
+    </p:extLst>
+  </p:cSld>
+  <p:clrMapOvr>
+    <a:masterClrMapping/>
+  </p:clrMapOvr>
+</p:sld>
+</file>
+
+<file path=ppt/slides/slide8.xml><?xml version="1.0" encoding="utf-8"?>
+<p:sld xmlns:a="http://schemas.openxmlformats.org/drawingml/2006/main" xmlns:r="http://schemas.openxmlformats.org/officeDocument/2006/relationships" xmlns:p="http://schemas.openxmlformats.org/presentationml/2006/main">
+  <p:cSld>
+    <p:bg>
+      <p:bgPr>
+        <a:solidFill>
+          <a:schemeClr val="bg1"/>
+        </a:solidFill>
+        <a:effectLst/>
+      </p:bgPr>
+    </p:bg>
+    <p:spTree>
+      <p:nvGrpSpPr>
+        <p:cNvPr id="1" name=""/>
+        <p:cNvGrpSpPr/>
+        <p:nvPr/>
+      </p:nvGrpSpPr>
+      <p:grpSpPr>
+        <a:xfrm>
+          <a:off x="0" y="0"/>
+          <a:ext cx="0" cy="0"/>
+          <a:chOff x="0" y="0"/>
+          <a:chExt cx="0" cy="0"/>
+        </a:xfrm>
+      </p:grpSpPr>
+      <p:sp>
+        <p:nvSpPr>
+          <p:cNvPr id="2" name="Title 1">
+            <a:extLst>
+              <a:ext uri="{FF2B5EF4-FFF2-40B4-BE49-F238E27FC236}">
+                <a16:creationId xmlns:a16="http://schemas.microsoft.com/office/drawing/2014/main" id="{4F87C7D5-4E35-46C7-A5AB-3569E12C88CF}"/>
+              </a:ext>
+            </a:extLst>
+          </p:cNvPr>
+          <p:cNvSpPr>
+            <a:spLocks noGrp="1"/>
+          </p:cNvSpPr>
+          <p:nvPr>
+            <p:ph type="title"/>
+          </p:nvPr>
+        </p:nvSpPr>
+        <p:spPr>
+          <a:xfrm>
+            <a:off x="648929" y="629266"/>
+            <a:ext cx="3505495" cy="1622321"/>
+          </a:xfrm>
+        </p:spPr>
+        <p:txBody>
+          <a:bodyPr>
+            <a:normAutofit fontScale="90000"/>
+          </a:bodyPr>
+          <a:lstStyle/>
+          <a:p>
+            <a:r>
+              <a:rPr lang="en-US" sz="3700" dirty="0"/>
+              <a:t>Phase 1.4 – Include Thermalito deliveries</a:t>
+            </a:r>
+          </a:p>
+        </p:txBody>
+      </p:sp>
+      <p:sp>
+        <p:nvSpPr>
+          <p:cNvPr id="3" name="Content Placeholder 2">
+            <a:extLst>
+              <a:ext uri="{FF2B5EF4-FFF2-40B4-BE49-F238E27FC236}">
+                <a16:creationId xmlns:a16="http://schemas.microsoft.com/office/drawing/2014/main" id="{319E246B-3D2E-438E-BEED-6A615B92177C}"/>
+              </a:ext>
+            </a:extLst>
+          </p:cNvPr>
+          <p:cNvSpPr>
+            <a:spLocks noGrp="1"/>
+          </p:cNvSpPr>
+          <p:nvPr>
+            <p:ph idx="1"/>
+          </p:nvPr>
+        </p:nvSpPr>
+        <p:spPr>
+          <a:xfrm>
+            <a:off x="648931" y="2438400"/>
+            <a:ext cx="3505494" cy="3785419"/>
+          </a:xfrm>
+        </p:spPr>
+        <p:txBody>
+          <a:bodyPr>
+            <a:normAutofit/>
+          </a:bodyPr>
+          <a:lstStyle/>
+          <a:p>
+            <a:r>
+              <a:rPr lang="en-US" sz="2000" dirty="0"/>
+              <a:t>Add demands for D_THERM</a:t>
+            </a:r>
+          </a:p>
+          <a:p>
+            <a:r>
+              <a:rPr lang="en-US" sz="2000" dirty="0"/>
+              <a:t>Need to review the purpose of Accretion-Depletion (AD) terms and how to calculate</a:t>
+            </a:r>
+          </a:p>
+          <a:p>
+            <a:r>
+              <a:rPr lang="en-US" sz="2000" dirty="0"/>
+              <a:t>Output</a:t>
+            </a:r>
+          </a:p>
+          <a:p>
+            <a:pPr lvl="1"/>
+            <a:r>
+              <a:rPr lang="en-US" sz="2000" dirty="0"/>
+              <a:t>D_THERM</a:t>
+            </a:r>
+          </a:p>
+        </p:txBody>
+      </p:sp>
+      <p:sp>
+        <p:nvSpPr>
+          <p:cNvPr id="38" name="Rectangle 37">
+            <a:extLst>
+              <a:ext uri="{FF2B5EF4-FFF2-40B4-BE49-F238E27FC236}">
+                <a16:creationId xmlns:a16="http://schemas.microsoft.com/office/drawing/2014/main" id="{5E39A796-BE83-48B1-B33F-35C4A32AAB57}"/>
+              </a:ext>
+              <a:ext uri="{C183D7F6-B498-43B3-948B-1728B52AA6E4}">
+                <adec:decorative xmlns:adec="http://schemas.microsoft.com/office/drawing/2017/decorative" val="1"/>
+              </a:ext>
+            </a:extLst>
+          </p:cNvPr>
+          <p:cNvSpPr>
+            <a:spLocks noGrp="1" noRot="1" noChangeAspect="1" noMove="1" noResize="1" noEditPoints="1" noAdjustHandles="1" noChangeArrowheads="1" noChangeShapeType="1" noTextEdit="1"/>
+          </p:cNvSpPr>
+          <p:nvPr>
+            <p:extLst>
+              <p:ext uri="{386F3935-93C4-4BCD-93E2-E3B085C9AB24}">
+                <p16:designElem xmlns:p16="http://schemas.microsoft.com/office/powerpoint/2015/main" val="1"/>
+              </p:ext>
+            </p:extLst>
+          </p:nvPr>
+        </p:nvSpPr>
+        <p:spPr>
+          <a:xfrm>
+            <a:off x="4639056" y="0"/>
+            <a:ext cx="7552944" cy="6858000"/>
+          </a:xfrm>
+          <a:prstGeom prst="rect">
+            <a:avLst/>
+          </a:prstGeom>
+          <a:solidFill>
+            <a:srgbClr val="C8CACA"/>
+          </a:solidFill>
+          <a:ln>
+            <a:noFill/>
+          </a:ln>
+        </p:spPr>
+        <p:style>
+          <a:lnRef idx="2">
+            <a:schemeClr val="accent1">
+              <a:shade val="50000"/>
+            </a:schemeClr>
+          </a:lnRef>
+          <a:fillRef idx="1">
+            <a:schemeClr val="accent1"/>
+          </a:fillRef>
+          <a:effectRef idx="0">
+            <a:schemeClr val="accent1"/>
+          </a:effectRef>
+          <a:fontRef idx="minor">
+            <a:schemeClr val="lt1"/>
+          </a:fontRef>
+        </p:style>
+        <p:txBody>
+          <a:bodyPr rtlCol="0" anchor="ctr"/>
+          <a:lstStyle/>
+          <a:p>
+            <a:pPr algn="ctr"/>
+            <a:endParaRPr lang="en-US"/>
+          </a:p>
+        </p:txBody>
+      </p:sp>
+      <p:sp>
+        <p:nvSpPr>
+          <p:cNvPr id="40" name="Rounded Rectangle 9">
+            <a:extLst>
+              <a:ext uri="{FF2B5EF4-FFF2-40B4-BE49-F238E27FC236}">
+                <a16:creationId xmlns:a16="http://schemas.microsoft.com/office/drawing/2014/main" id="{72F84B47-E267-4194-8194-831DB7B5547F}"/>
+              </a:ext>
+              <a:ext uri="{C183D7F6-B498-43B3-948B-1728B52AA6E4}">
+                <adec:decorative xmlns:adec="http://schemas.microsoft.com/office/drawing/2017/decorative" val="1"/>
+              </a:ext>
+            </a:extLst>
+          </p:cNvPr>
+          <p:cNvSpPr>
+            <a:spLocks noGrp="1" noRot="1" noChangeAspect="1" noMove="1" noResize="1" noEditPoints="1" noAdjustHandles="1" noChangeArrowheads="1" noChangeShapeType="1" noTextEdit="1"/>
+          </p:cNvSpPr>
+          <p:nvPr>
+            <p:extLst>
+              <p:ext uri="{386F3935-93C4-4BCD-93E2-E3B085C9AB24}">
+                <p16:designElem xmlns:p16="http://schemas.microsoft.com/office/powerpoint/2015/main" val="1"/>
+              </p:ext>
+            </p:extLst>
+          </p:nvPr>
+        </p:nvSpPr>
+        <p:spPr>
+          <a:xfrm>
+            <a:off x="5123688" y="557784"/>
+            <a:ext cx="6584098" cy="5739187"/>
+          </a:xfrm>
+          <a:prstGeom prst="roundRect">
+            <a:avLst>
+              <a:gd name="adj" fmla="val 0"/>
+            </a:avLst>
+          </a:prstGeom>
+          <a:solidFill>
+            <a:srgbClr val="FFFFFF"/>
+          </a:solidFill>
+          <a:ln w="9525">
+            <a:solidFill>
+              <a:srgbClr val="C8CACA"/>
+            </a:solidFill>
+          </a:ln>
+          <a:effectLst>
+            <a:outerShdw blurRad="57150" dist="19050" dir="5400000" algn="t" rotWithShape="0">
+              <a:prstClr val="black">
+                <a:alpha val="63000"/>
+              </a:prstClr>
+            </a:outerShdw>
+          </a:effectLst>
+        </p:spPr>
+        <p:style>
+          <a:lnRef idx="2">
+            <a:schemeClr val="accent1">
+              <a:shade val="50000"/>
+            </a:schemeClr>
+          </a:lnRef>
+          <a:fillRef idx="1">
+            <a:schemeClr val="accent1"/>
+          </a:fillRef>
+          <a:effectRef idx="0">
+            <a:schemeClr val="accent1"/>
+          </a:effectRef>
+          <a:fontRef idx="minor">
+            <a:schemeClr val="lt1"/>
+          </a:fontRef>
+        </p:style>
+        <p:txBody>
+          <a:bodyPr rtlCol="0" anchor="ctr"/>
+          <a:lstStyle/>
+          <a:p>
+            <a:pPr algn="ctr"/>
+            <a:endParaRPr lang="en-US"/>
+          </a:p>
+        </p:txBody>
+      </p:sp>
+      <p:pic>
+        <p:nvPicPr>
+          <p:cNvPr id="5" name="Picture 4">
+            <a:extLst>
+              <a:ext uri="{FF2B5EF4-FFF2-40B4-BE49-F238E27FC236}">
+                <a16:creationId xmlns:a16="http://schemas.microsoft.com/office/drawing/2014/main" id="{9E188F83-D5C3-4028-B774-C3E26D8C896D}"/>
+              </a:ext>
+            </a:extLst>
+          </p:cNvPr>
+          <p:cNvPicPr>
+            <a:picLocks noChangeAspect="1"/>
+          </p:cNvPicPr>
+          <p:nvPr/>
+        </p:nvPicPr>
+        <p:blipFill>
+          <a:blip r:embed="rId2"/>
+          <a:stretch>
+            <a:fillRect/>
+          </a:stretch>
+        </p:blipFill>
+        <p:spPr>
+          <a:xfrm>
+            <a:off x="5567936" y="807593"/>
+            <a:ext cx="5695183" cy="5239568"/>
+          </a:xfrm>
+          <a:prstGeom prst="rect">
+            <a:avLst/>
+          </a:prstGeom>
+          <a:effectLst/>
+        </p:spPr>
+      </p:pic>
+      <p:pic>
+        <p:nvPicPr>
+          <p:cNvPr id="9" name="Graphic 8" descr="Close">
+            <a:extLst>
+              <a:ext uri="{FF2B5EF4-FFF2-40B4-BE49-F238E27FC236}">
+                <a16:creationId xmlns:a16="http://schemas.microsoft.com/office/drawing/2014/main" id="{B0745657-67C7-4DC6-B129-D920567331AF}"/>
+              </a:ext>
+            </a:extLst>
+          </p:cNvPr>
+          <p:cNvPicPr>
+            <a:picLocks noChangeAspect="1"/>
+          </p:cNvPicPr>
+          <p:nvPr/>
+        </p:nvPicPr>
+        <p:blipFill>
+          <a:blip r:embed="rId3">
+            <a:extLst>
+              <a:ext uri="{28A0092B-C50C-407E-A947-70E740481C1C}">
+                <a14:useLocalDpi xmlns:a14="http://schemas.microsoft.com/office/drawing/2010/main" val="0"/>
+              </a:ext>
+              <a:ext uri="{96DAC541-7B7A-43D3-8B79-37D633B846F1}">
+                <asvg:svgBlip xmlns:asvg="http://schemas.microsoft.com/office/drawing/2016/SVG/main" r:embed="rId4"/>
+              </a:ext>
+            </a:extLst>
+          </a:blip>
+          <a:stretch>
+            <a:fillRect/>
+          </a:stretch>
+        </p:blipFill>
+        <p:spPr>
+          <a:xfrm>
+            <a:off x="6777049" y="5246926"/>
+            <a:ext cx="914400" cy="914400"/>
+          </a:xfrm>
+          <a:prstGeom prst="rect">
+            <a:avLst/>
+          </a:prstGeom>
+        </p:spPr>
+      </p:pic>
+    </p:spTree>
+    <p:extLst>
+      <p:ext uri="{BB962C8B-B14F-4D97-AF65-F5344CB8AC3E}">
+        <p14:creationId xmlns:p14="http://schemas.microsoft.com/office/powerpoint/2010/main" val="3305777850"/>
+      </p:ext>
+    </p:extLst>
+  </p:cSld>
+  <p:clrMapOvr>
+    <a:masterClrMapping/>
+  </p:clrMapOvr>
+</p:sld>
+</file>
+
+<file path=ppt/slides/slide9.xml><?xml version="1.0" encoding="utf-8"?>
 <p:sld xmlns:a="http://schemas.openxmlformats.org/drawingml/2006/main" xmlns:r="http://schemas.openxmlformats.org/officeDocument/2006/relationships" xmlns:p="http://schemas.openxmlformats.org/presentationml/2006/main">
   <p:cSld>
     <p:spTree>
@@ -3752,7 +5931,7 @@
           <a:p>
             <a:r>
               <a:rPr lang="en-US" dirty="0"/>
-              <a:t>P1 data requirements</a:t>
+              <a:t>Phase 1 data requirements</a:t>
             </a:r>
           </a:p>
         </p:txBody>
@@ -3780,14 +5959,54 @@
           <a:p>
             <a:r>
               <a:rPr lang="en-US" dirty="0"/>
-              <a:t>Daily Lake Oroville inflow (TAF/day)</a:t>
-            </a:r>
-          </a:p>
-          <a:p>
+              <a:t>Lake Oroville</a:t>
+            </a:r>
+          </a:p>
+          <a:p>
+            <a:pPr lvl="1"/>
             <a:r>
               <a:rPr lang="en-US" dirty="0"/>
-              <a:t>Initial Lake Oroville storage</a:t>
-            </a:r>
+              <a:t>Inflow (TAF/day)</a:t>
+            </a:r>
+          </a:p>
+          <a:p>
+            <a:pPr lvl="1"/>
+            <a:r>
+              <a:rPr lang="en-US" dirty="0"/>
+              <a:t>Initial storage</a:t>
+            </a:r>
+          </a:p>
+          <a:p>
+            <a:pPr lvl="1"/>
+            <a:r>
+              <a:rPr lang="en-US" dirty="0"/>
+              <a:t>Level 5 storage</a:t>
+            </a:r>
+          </a:p>
+          <a:p>
+            <a:pPr lvl="1"/>
+            <a:r>
+              <a:rPr lang="en-US" dirty="0"/>
+              <a:t>Evaporation rate</a:t>
+            </a:r>
+          </a:p>
+          <a:p>
+            <a:r>
+              <a:rPr lang="en-US" dirty="0"/>
+              <a:t>Oroville water rights demands</a:t>
+            </a:r>
+          </a:p>
+          <a:p>
+            <a:r>
+              <a:rPr lang="en-US" dirty="0"/>
+              <a:t>Minimum groundwater pumping</a:t>
+            </a:r>
+          </a:p>
+          <a:p>
+            <a:endParaRPr lang="en-US" dirty="0"/>
+          </a:p>
+          <a:p>
+            <a:endParaRPr lang="en-US" dirty="0"/>
           </a:p>
           <a:p>
             <a:endParaRPr lang="en-US" dirty="0"/>

</xml_diff>

<commit_message>
Implement Shasta node reservoir ops
</commit_message>
<xml_diff>
--- a/Building daily CalLite model from scratch – daily.pptx
+++ b/Building daily CalLite model from scratch – daily.pptx
@@ -9,12 +9,17 @@
     <p:sldId id="265" r:id="rId3"/>
     <p:sldId id="260" r:id="rId4"/>
     <p:sldId id="263" r:id="rId5"/>
-    <p:sldId id="257" r:id="rId6"/>
-    <p:sldId id="259" r:id="rId7"/>
-    <p:sldId id="261" r:id="rId8"/>
-    <p:sldId id="262" r:id="rId9"/>
-    <p:sldId id="258" r:id="rId10"/>
-    <p:sldId id="264" r:id="rId11"/>
+    <p:sldId id="267" r:id="rId6"/>
+    <p:sldId id="268" r:id="rId7"/>
+    <p:sldId id="270" r:id="rId8"/>
+    <p:sldId id="269" r:id="rId9"/>
+    <p:sldId id="257" r:id="rId10"/>
+    <p:sldId id="259" r:id="rId11"/>
+    <p:sldId id="261" r:id="rId12"/>
+    <p:sldId id="262" r:id="rId13"/>
+    <p:sldId id="258" r:id="rId14"/>
+    <p:sldId id="264" r:id="rId15"/>
+    <p:sldId id="266" r:id="rId16"/>
   </p:sldIdLst>
   <p:sldSz cx="12192000" cy="6858000"/>
   <p:notesSz cx="6858000" cy="9144000"/>
@@ -268,7 +273,7 @@
           <a:p>
             <a:fld id="{DABA3B07-39EE-405B-8EBB-3517E9BED2D2}" type="datetimeFigureOut">
               <a:rPr lang="en-US" smtClean="0"/>
-              <a:t>10/2/2020</a:t>
+              <a:t>10/8/2020</a:t>
             </a:fld>
             <a:endParaRPr lang="en-US"/>
           </a:p>
@@ -466,7 +471,7 @@
           <a:p>
             <a:fld id="{DABA3B07-39EE-405B-8EBB-3517E9BED2D2}" type="datetimeFigureOut">
               <a:rPr lang="en-US" smtClean="0"/>
-              <a:t>10/2/2020</a:t>
+              <a:t>10/8/2020</a:t>
             </a:fld>
             <a:endParaRPr lang="en-US"/>
           </a:p>
@@ -674,7 +679,7 @@
           <a:p>
             <a:fld id="{DABA3B07-39EE-405B-8EBB-3517E9BED2D2}" type="datetimeFigureOut">
               <a:rPr lang="en-US" smtClean="0"/>
-              <a:t>10/2/2020</a:t>
+              <a:t>10/8/2020</a:t>
             </a:fld>
             <a:endParaRPr lang="en-US"/>
           </a:p>
@@ -872,7 +877,7 @@
           <a:p>
             <a:fld id="{DABA3B07-39EE-405B-8EBB-3517E9BED2D2}" type="datetimeFigureOut">
               <a:rPr lang="en-US" smtClean="0"/>
-              <a:t>10/2/2020</a:t>
+              <a:t>10/8/2020</a:t>
             </a:fld>
             <a:endParaRPr lang="en-US"/>
           </a:p>
@@ -1147,7 +1152,7 @@
           <a:p>
             <a:fld id="{DABA3B07-39EE-405B-8EBB-3517E9BED2D2}" type="datetimeFigureOut">
               <a:rPr lang="en-US" smtClean="0"/>
-              <a:t>10/2/2020</a:t>
+              <a:t>10/8/2020</a:t>
             </a:fld>
             <a:endParaRPr lang="en-US"/>
           </a:p>
@@ -1412,7 +1417,7 @@
           <a:p>
             <a:fld id="{DABA3B07-39EE-405B-8EBB-3517E9BED2D2}" type="datetimeFigureOut">
               <a:rPr lang="en-US" smtClean="0"/>
-              <a:t>10/2/2020</a:t>
+              <a:t>10/8/2020</a:t>
             </a:fld>
             <a:endParaRPr lang="en-US"/>
           </a:p>
@@ -1824,7 +1829,7 @@
           <a:p>
             <a:fld id="{DABA3B07-39EE-405B-8EBB-3517E9BED2D2}" type="datetimeFigureOut">
               <a:rPr lang="en-US" smtClean="0"/>
-              <a:t>10/2/2020</a:t>
+              <a:t>10/8/2020</a:t>
             </a:fld>
             <a:endParaRPr lang="en-US"/>
           </a:p>
@@ -1965,7 +1970,7 @@
           <a:p>
             <a:fld id="{DABA3B07-39EE-405B-8EBB-3517E9BED2D2}" type="datetimeFigureOut">
               <a:rPr lang="en-US" smtClean="0"/>
-              <a:t>10/2/2020</a:t>
+              <a:t>10/8/2020</a:t>
             </a:fld>
             <a:endParaRPr lang="en-US"/>
           </a:p>
@@ -2078,7 +2083,7 @@
           <a:p>
             <a:fld id="{DABA3B07-39EE-405B-8EBB-3517E9BED2D2}" type="datetimeFigureOut">
               <a:rPr lang="en-US" smtClean="0"/>
-              <a:t>10/2/2020</a:t>
+              <a:t>10/8/2020</a:t>
             </a:fld>
             <a:endParaRPr lang="en-US"/>
           </a:p>
@@ -2389,7 +2394,7 @@
           <a:p>
             <a:fld id="{DABA3B07-39EE-405B-8EBB-3517E9BED2D2}" type="datetimeFigureOut">
               <a:rPr lang="en-US" smtClean="0"/>
-              <a:t>10/2/2020</a:t>
+              <a:t>10/8/2020</a:t>
             </a:fld>
             <a:endParaRPr lang="en-US"/>
           </a:p>
@@ -2677,7 +2682,7 @@
           <a:p>
             <a:fld id="{DABA3B07-39EE-405B-8EBB-3517E9BED2D2}" type="datetimeFigureOut">
               <a:rPr lang="en-US" smtClean="0"/>
-              <a:t>10/2/2020</a:t>
+              <a:t>10/8/2020</a:t>
             </a:fld>
             <a:endParaRPr lang="en-US"/>
           </a:p>
@@ -2918,7 +2923,7 @@
           <a:p>
             <a:fld id="{DABA3B07-39EE-405B-8EBB-3517E9BED2D2}" type="datetimeFigureOut">
               <a:rPr lang="en-US" smtClean="0"/>
-              <a:t>10/2/2020</a:t>
+              <a:t>10/8/2020</a:t>
             </a:fld>
             <a:endParaRPr lang="en-US"/>
           </a:p>
@@ -3402,7 +3407,7 @@
 </file>
 
 <file path=ppt/slides/slide10.xml><?xml version="1.0" encoding="utf-8"?>
-<p:sld xmlns:a="http://schemas.openxmlformats.org/drawingml/2006/main" xmlns:r="http://schemas.openxmlformats.org/officeDocument/2006/relationships" xmlns:p="http://schemas.openxmlformats.org/presentationml/2006/main">
+<p:sld xmlns:a="http://schemas.openxmlformats.org/drawingml/2006/main" xmlns:r="http://schemas.openxmlformats.org/officeDocument/2006/relationships" xmlns:p="http://schemas.openxmlformats.org/presentationml/2006/main" show="0">
   <p:cSld>
     <p:bg>
       <p:bgPr>
@@ -3455,8 +3460,8 @@
           <a:lstStyle/>
           <a:p>
             <a:r>
-              <a:rPr lang="en-US" sz="3700"/>
-              <a:t>Phase 2.1 – Shasta dam and outflow only</a:t>
+              <a:rPr lang="en-US" sz="3400" dirty="0"/>
+              <a:t>Phase 1.2 – Include Oroville deliveries</a:t>
             </a:r>
           </a:p>
         </p:txBody>
@@ -3491,28 +3496,7 @@
           <a:p>
             <a:r>
               <a:rPr lang="en-US" sz="2000" dirty="0"/>
-              <a:t>Develop very simple model</a:t>
-            </a:r>
-          </a:p>
-          <a:p>
-            <a:pPr lvl="1"/>
-            <a:r>
-              <a:rPr lang="en-US" sz="2000" dirty="0"/>
-              <a:t>Inflow to Shasta reservoir</a:t>
-            </a:r>
-          </a:p>
-          <a:p>
-            <a:pPr lvl="1"/>
-            <a:r>
-              <a:rPr lang="en-US" sz="2000" dirty="0"/>
-              <a:t>Shasta reservoir storage</a:t>
-            </a:r>
-          </a:p>
-          <a:p>
-            <a:pPr lvl="1"/>
-            <a:r>
-              <a:rPr lang="en-US" sz="2000" dirty="0"/>
-              <a:t>Release from Shasta storage </a:t>
+              <a:t>Include D_OROVL missing from previous step</a:t>
             </a:r>
           </a:p>
           <a:p>
@@ -3525,14 +3509,14 @@
             <a:pPr lvl="1"/>
             <a:r>
               <a:rPr lang="en-US" sz="2000" dirty="0"/>
-              <a:t>Daily Shasta releases</a:t>
-            </a:r>
-          </a:p>
-        </p:txBody>
-      </p:sp>
-      <p:sp>
-        <p:nvSpPr>
-          <p:cNvPr id="24" name="Rectangle 23">
+              <a:t>Oroville releases, storage, deliveries</a:t>
+            </a:r>
+          </a:p>
+        </p:txBody>
+      </p:sp>
+      <p:sp>
+        <p:nvSpPr>
+          <p:cNvPr id="31" name="Rectangle 30">
             <a:extLst>
               <a:ext uri="{FF2B5EF4-FFF2-40B4-BE49-F238E27FC236}">
                 <a16:creationId xmlns:a16="http://schemas.microsoft.com/office/drawing/2014/main" id="{5E39A796-BE83-48B1-B33F-35C4A32AAB57}"/>
@@ -3595,7 +3579,7 @@
       </p:sp>
       <p:sp>
         <p:nvSpPr>
-          <p:cNvPr id="26" name="Rounded Rectangle 9">
+          <p:cNvPr id="33" name="Rounded Rectangle 9">
             <a:extLst>
               <a:ext uri="{FF2B5EF4-FFF2-40B4-BE49-F238E27FC236}">
                 <a16:creationId xmlns:a16="http://schemas.microsoft.com/office/drawing/2014/main" id="{72F84B47-E267-4194-8194-831DB7B5547F}"/>
@@ -3669,10 +3653,10 @@
       </p:sp>
       <p:pic>
         <p:nvPicPr>
-          <p:cNvPr id="5" name="Picture 4">
-            <a:extLst>
-              <a:ext uri="{FF2B5EF4-FFF2-40B4-BE49-F238E27FC236}">
-                <a16:creationId xmlns:a16="http://schemas.microsoft.com/office/drawing/2014/main" id="{D1F0508B-2B14-460F-9E52-EDD3BAA9511B}"/>
+          <p:cNvPr id="8" name="Picture 7">
+            <a:extLst>
+              <a:ext uri="{FF2B5EF4-FFF2-40B4-BE49-F238E27FC236}">
+                <a16:creationId xmlns:a16="http://schemas.microsoft.com/office/drawing/2014/main" id="{D2870AF7-B942-4FB7-895B-E7FA99F0BE2E}"/>
               </a:ext>
             </a:extLst>
           </p:cNvPr>
@@ -3689,6 +3673,1164 @@
         </p:blipFill>
         <p:spPr>
           <a:xfrm>
+            <a:off x="5567936" y="807593"/>
+            <a:ext cx="5695183" cy="5239568"/>
+          </a:xfrm>
+          <a:prstGeom prst="rect">
+            <a:avLst/>
+          </a:prstGeom>
+          <a:effectLst/>
+        </p:spPr>
+      </p:pic>
+    </p:spTree>
+    <p:extLst>
+      <p:ext uri="{BB962C8B-B14F-4D97-AF65-F5344CB8AC3E}">
+        <p14:creationId xmlns:p14="http://schemas.microsoft.com/office/powerpoint/2010/main" val="1067204752"/>
+      </p:ext>
+    </p:extLst>
+  </p:cSld>
+  <p:clrMapOvr>
+    <a:masterClrMapping/>
+  </p:clrMapOvr>
+</p:sld>
+</file>
+
+<file path=ppt/slides/slide11.xml><?xml version="1.0" encoding="utf-8"?>
+<p:sld xmlns:a="http://schemas.openxmlformats.org/drawingml/2006/main" xmlns:r="http://schemas.openxmlformats.org/officeDocument/2006/relationships" xmlns:p="http://schemas.openxmlformats.org/presentationml/2006/main" show="0">
+  <p:cSld>
+    <p:bg>
+      <p:bgPr>
+        <a:solidFill>
+          <a:schemeClr val="bg1"/>
+        </a:solidFill>
+        <a:effectLst/>
+      </p:bgPr>
+    </p:bg>
+    <p:spTree>
+      <p:nvGrpSpPr>
+        <p:cNvPr id="1" name=""/>
+        <p:cNvGrpSpPr/>
+        <p:nvPr/>
+      </p:nvGrpSpPr>
+      <p:grpSpPr>
+        <a:xfrm>
+          <a:off x="0" y="0"/>
+          <a:ext cx="0" cy="0"/>
+          <a:chOff x="0" y="0"/>
+          <a:chExt cx="0" cy="0"/>
+        </a:xfrm>
+      </p:grpSpPr>
+      <p:sp>
+        <p:nvSpPr>
+          <p:cNvPr id="2" name="Title 1">
+            <a:extLst>
+              <a:ext uri="{FF2B5EF4-FFF2-40B4-BE49-F238E27FC236}">
+                <a16:creationId xmlns:a16="http://schemas.microsoft.com/office/drawing/2014/main" id="{4F87C7D5-4E35-46C7-A5AB-3569E12C88CF}"/>
+              </a:ext>
+            </a:extLst>
+          </p:cNvPr>
+          <p:cNvSpPr>
+            <a:spLocks noGrp="1"/>
+          </p:cNvSpPr>
+          <p:nvPr>
+            <p:ph type="title"/>
+          </p:nvPr>
+        </p:nvSpPr>
+        <p:spPr>
+          <a:xfrm>
+            <a:off x="648929" y="629266"/>
+            <a:ext cx="3505495" cy="1622321"/>
+          </a:xfrm>
+        </p:spPr>
+        <p:txBody>
+          <a:bodyPr>
+            <a:normAutofit/>
+          </a:bodyPr>
+          <a:lstStyle/>
+          <a:p>
+            <a:r>
+              <a:rPr lang="en-US" sz="3700"/>
+              <a:t>Phase 1.3 – Include Thermalito node</a:t>
+            </a:r>
+          </a:p>
+        </p:txBody>
+      </p:sp>
+      <p:sp>
+        <p:nvSpPr>
+          <p:cNvPr id="3" name="Content Placeholder 2">
+            <a:extLst>
+              <a:ext uri="{FF2B5EF4-FFF2-40B4-BE49-F238E27FC236}">
+                <a16:creationId xmlns:a16="http://schemas.microsoft.com/office/drawing/2014/main" id="{319E246B-3D2E-438E-BEED-6A615B92177C}"/>
+              </a:ext>
+            </a:extLst>
+          </p:cNvPr>
+          <p:cNvSpPr>
+            <a:spLocks noGrp="1"/>
+          </p:cNvSpPr>
+          <p:nvPr>
+            <p:ph idx="1"/>
+          </p:nvPr>
+        </p:nvSpPr>
+        <p:spPr>
+          <a:xfrm>
+            <a:off x="648931" y="2438400"/>
+            <a:ext cx="3505494" cy="3785419"/>
+          </a:xfrm>
+        </p:spPr>
+        <p:txBody>
+          <a:bodyPr>
+            <a:normAutofit/>
+          </a:bodyPr>
+          <a:lstStyle/>
+          <a:p>
+            <a:r>
+              <a:rPr lang="en-US" sz="2000" dirty="0"/>
+              <a:t>No deliveries yet</a:t>
+            </a:r>
+          </a:p>
+          <a:p>
+            <a:r>
+              <a:rPr lang="en-US" sz="2000" dirty="0"/>
+              <a:t>Just the passing of water from C_OROVL to C_THERM</a:t>
+            </a:r>
+          </a:p>
+          <a:p>
+            <a:r>
+              <a:rPr lang="en-US" sz="2000" dirty="0"/>
+              <a:t>Need to review the purpose of Accretion-Depletion (AD) terms and how to calculate</a:t>
+            </a:r>
+          </a:p>
+          <a:p>
+            <a:r>
+              <a:rPr lang="en-US" sz="2000" dirty="0"/>
+              <a:t>Output</a:t>
+            </a:r>
+          </a:p>
+          <a:p>
+            <a:pPr lvl="1"/>
+            <a:r>
+              <a:rPr lang="en-US" sz="2000" dirty="0"/>
+              <a:t>Flow from Thermalito (C_THERM)</a:t>
+            </a:r>
+          </a:p>
+        </p:txBody>
+      </p:sp>
+      <p:sp>
+        <p:nvSpPr>
+          <p:cNvPr id="38" name="Rectangle 37">
+            <a:extLst>
+              <a:ext uri="{FF2B5EF4-FFF2-40B4-BE49-F238E27FC236}">
+                <a16:creationId xmlns:a16="http://schemas.microsoft.com/office/drawing/2014/main" id="{5E39A796-BE83-48B1-B33F-35C4A32AAB57}"/>
+              </a:ext>
+              <a:ext uri="{C183D7F6-B498-43B3-948B-1728B52AA6E4}">
+                <adec:decorative xmlns:adec="http://schemas.microsoft.com/office/drawing/2017/decorative" val="1"/>
+              </a:ext>
+            </a:extLst>
+          </p:cNvPr>
+          <p:cNvSpPr>
+            <a:spLocks noGrp="1" noRot="1" noChangeAspect="1" noMove="1" noResize="1" noEditPoints="1" noAdjustHandles="1" noChangeArrowheads="1" noChangeShapeType="1" noTextEdit="1"/>
+          </p:cNvSpPr>
+          <p:nvPr>
+            <p:extLst>
+              <p:ext uri="{386F3935-93C4-4BCD-93E2-E3B085C9AB24}">
+                <p16:designElem xmlns:p16="http://schemas.microsoft.com/office/powerpoint/2015/main" val="1"/>
+              </p:ext>
+            </p:extLst>
+          </p:nvPr>
+        </p:nvSpPr>
+        <p:spPr>
+          <a:xfrm>
+            <a:off x="4639056" y="0"/>
+            <a:ext cx="7552944" cy="6858000"/>
+          </a:xfrm>
+          <a:prstGeom prst="rect">
+            <a:avLst/>
+          </a:prstGeom>
+          <a:solidFill>
+            <a:srgbClr val="C8CACA"/>
+          </a:solidFill>
+          <a:ln>
+            <a:noFill/>
+          </a:ln>
+        </p:spPr>
+        <p:style>
+          <a:lnRef idx="2">
+            <a:schemeClr val="accent1">
+              <a:shade val="50000"/>
+            </a:schemeClr>
+          </a:lnRef>
+          <a:fillRef idx="1">
+            <a:schemeClr val="accent1"/>
+          </a:fillRef>
+          <a:effectRef idx="0">
+            <a:schemeClr val="accent1"/>
+          </a:effectRef>
+          <a:fontRef idx="minor">
+            <a:schemeClr val="lt1"/>
+          </a:fontRef>
+        </p:style>
+        <p:txBody>
+          <a:bodyPr rtlCol="0" anchor="ctr"/>
+          <a:lstStyle/>
+          <a:p>
+            <a:pPr algn="ctr"/>
+            <a:endParaRPr lang="en-US"/>
+          </a:p>
+        </p:txBody>
+      </p:sp>
+      <p:sp>
+        <p:nvSpPr>
+          <p:cNvPr id="40" name="Rounded Rectangle 9">
+            <a:extLst>
+              <a:ext uri="{FF2B5EF4-FFF2-40B4-BE49-F238E27FC236}">
+                <a16:creationId xmlns:a16="http://schemas.microsoft.com/office/drawing/2014/main" id="{72F84B47-E267-4194-8194-831DB7B5547F}"/>
+              </a:ext>
+              <a:ext uri="{C183D7F6-B498-43B3-948B-1728B52AA6E4}">
+                <adec:decorative xmlns:adec="http://schemas.microsoft.com/office/drawing/2017/decorative" val="1"/>
+              </a:ext>
+            </a:extLst>
+          </p:cNvPr>
+          <p:cNvSpPr>
+            <a:spLocks noGrp="1" noRot="1" noChangeAspect="1" noMove="1" noResize="1" noEditPoints="1" noAdjustHandles="1" noChangeArrowheads="1" noChangeShapeType="1" noTextEdit="1"/>
+          </p:cNvSpPr>
+          <p:nvPr>
+            <p:extLst>
+              <p:ext uri="{386F3935-93C4-4BCD-93E2-E3B085C9AB24}">
+                <p16:designElem xmlns:p16="http://schemas.microsoft.com/office/powerpoint/2015/main" val="1"/>
+              </p:ext>
+            </p:extLst>
+          </p:nvPr>
+        </p:nvSpPr>
+        <p:spPr>
+          <a:xfrm>
+            <a:off x="5123688" y="557784"/>
+            <a:ext cx="6584098" cy="5739187"/>
+          </a:xfrm>
+          <a:prstGeom prst="roundRect">
+            <a:avLst>
+              <a:gd name="adj" fmla="val 0"/>
+            </a:avLst>
+          </a:prstGeom>
+          <a:solidFill>
+            <a:srgbClr val="FFFFFF"/>
+          </a:solidFill>
+          <a:ln w="9525">
+            <a:solidFill>
+              <a:srgbClr val="C8CACA"/>
+            </a:solidFill>
+          </a:ln>
+          <a:effectLst>
+            <a:outerShdw blurRad="57150" dist="19050" dir="5400000" algn="t" rotWithShape="0">
+              <a:prstClr val="black">
+                <a:alpha val="63000"/>
+              </a:prstClr>
+            </a:outerShdw>
+          </a:effectLst>
+        </p:spPr>
+        <p:style>
+          <a:lnRef idx="2">
+            <a:schemeClr val="accent1">
+              <a:shade val="50000"/>
+            </a:schemeClr>
+          </a:lnRef>
+          <a:fillRef idx="1">
+            <a:schemeClr val="accent1"/>
+          </a:fillRef>
+          <a:effectRef idx="0">
+            <a:schemeClr val="accent1"/>
+          </a:effectRef>
+          <a:fontRef idx="minor">
+            <a:schemeClr val="lt1"/>
+          </a:fontRef>
+        </p:style>
+        <p:txBody>
+          <a:bodyPr rtlCol="0" anchor="ctr"/>
+          <a:lstStyle/>
+          <a:p>
+            <a:pPr algn="ctr"/>
+            <a:endParaRPr lang="en-US"/>
+          </a:p>
+        </p:txBody>
+      </p:sp>
+      <p:pic>
+        <p:nvPicPr>
+          <p:cNvPr id="5" name="Picture 4">
+            <a:extLst>
+              <a:ext uri="{FF2B5EF4-FFF2-40B4-BE49-F238E27FC236}">
+                <a16:creationId xmlns:a16="http://schemas.microsoft.com/office/drawing/2014/main" id="{9E188F83-D5C3-4028-B774-C3E26D8C896D}"/>
+              </a:ext>
+            </a:extLst>
+          </p:cNvPr>
+          <p:cNvPicPr>
+            <a:picLocks noChangeAspect="1"/>
+          </p:cNvPicPr>
+          <p:nvPr/>
+        </p:nvPicPr>
+        <p:blipFill>
+          <a:blip r:embed="rId2"/>
+          <a:stretch>
+            <a:fillRect/>
+          </a:stretch>
+        </p:blipFill>
+        <p:spPr>
+          <a:xfrm>
+            <a:off x="5567936" y="807593"/>
+            <a:ext cx="5695183" cy="5239568"/>
+          </a:xfrm>
+          <a:prstGeom prst="rect">
+            <a:avLst/>
+          </a:prstGeom>
+          <a:effectLst/>
+        </p:spPr>
+      </p:pic>
+      <p:pic>
+        <p:nvPicPr>
+          <p:cNvPr id="7" name="Graphic 6" descr="Close">
+            <a:extLst>
+              <a:ext uri="{FF2B5EF4-FFF2-40B4-BE49-F238E27FC236}">
+                <a16:creationId xmlns:a16="http://schemas.microsoft.com/office/drawing/2014/main" id="{7F3418E1-10F5-451D-A07D-EA67C0BDDC9C}"/>
+              </a:ext>
+            </a:extLst>
+          </p:cNvPr>
+          <p:cNvPicPr>
+            <a:picLocks noChangeAspect="1"/>
+          </p:cNvPicPr>
+          <p:nvPr/>
+        </p:nvPicPr>
+        <p:blipFill>
+          <a:blip r:embed="rId3">
+            <a:extLst>
+              <a:ext uri="{28A0092B-C50C-407E-A947-70E740481C1C}">
+                <a14:useLocalDpi xmlns:a14="http://schemas.microsoft.com/office/drawing/2010/main" val="0"/>
+              </a:ext>
+              <a:ext uri="{96DAC541-7B7A-43D3-8B79-37D633B846F1}">
+                <asvg:svgBlip xmlns:asvg="http://schemas.microsoft.com/office/drawing/2016/SVG/main" r:embed="rId4"/>
+              </a:ext>
+            </a:extLst>
+          </a:blip>
+          <a:stretch>
+            <a:fillRect/>
+          </a:stretch>
+        </p:blipFill>
+        <p:spPr>
+          <a:xfrm>
+            <a:off x="5862649" y="4240763"/>
+            <a:ext cx="914400" cy="914400"/>
+          </a:xfrm>
+          <a:prstGeom prst="rect">
+            <a:avLst/>
+          </a:prstGeom>
+        </p:spPr>
+      </p:pic>
+      <p:pic>
+        <p:nvPicPr>
+          <p:cNvPr id="9" name="Graphic 8" descr="Close">
+            <a:extLst>
+              <a:ext uri="{FF2B5EF4-FFF2-40B4-BE49-F238E27FC236}">
+                <a16:creationId xmlns:a16="http://schemas.microsoft.com/office/drawing/2014/main" id="{B0745657-67C7-4DC6-B129-D920567331AF}"/>
+              </a:ext>
+            </a:extLst>
+          </p:cNvPr>
+          <p:cNvPicPr>
+            <a:picLocks noChangeAspect="1"/>
+          </p:cNvPicPr>
+          <p:nvPr/>
+        </p:nvPicPr>
+        <p:blipFill>
+          <a:blip r:embed="rId3">
+            <a:extLst>
+              <a:ext uri="{28A0092B-C50C-407E-A947-70E740481C1C}">
+                <a14:useLocalDpi xmlns:a14="http://schemas.microsoft.com/office/drawing/2010/main" val="0"/>
+              </a:ext>
+              <a:ext uri="{96DAC541-7B7A-43D3-8B79-37D633B846F1}">
+                <asvg:svgBlip xmlns:asvg="http://schemas.microsoft.com/office/drawing/2016/SVG/main" r:embed="rId4"/>
+              </a:ext>
+            </a:extLst>
+          </a:blip>
+          <a:stretch>
+            <a:fillRect/>
+          </a:stretch>
+        </p:blipFill>
+        <p:spPr>
+          <a:xfrm>
+            <a:off x="6777049" y="5246926"/>
+            <a:ext cx="914400" cy="914400"/>
+          </a:xfrm>
+          <a:prstGeom prst="rect">
+            <a:avLst/>
+          </a:prstGeom>
+        </p:spPr>
+      </p:pic>
+    </p:spTree>
+    <p:extLst>
+      <p:ext uri="{BB962C8B-B14F-4D97-AF65-F5344CB8AC3E}">
+        <p14:creationId xmlns:p14="http://schemas.microsoft.com/office/powerpoint/2010/main" val="1408431886"/>
+      </p:ext>
+    </p:extLst>
+  </p:cSld>
+  <p:clrMapOvr>
+    <a:masterClrMapping/>
+  </p:clrMapOvr>
+</p:sld>
+</file>
+
+<file path=ppt/slides/slide12.xml><?xml version="1.0" encoding="utf-8"?>
+<p:sld xmlns:a="http://schemas.openxmlformats.org/drawingml/2006/main" xmlns:r="http://schemas.openxmlformats.org/officeDocument/2006/relationships" xmlns:p="http://schemas.openxmlformats.org/presentationml/2006/main" show="0">
+  <p:cSld>
+    <p:bg>
+      <p:bgPr>
+        <a:solidFill>
+          <a:schemeClr val="bg1"/>
+        </a:solidFill>
+        <a:effectLst/>
+      </p:bgPr>
+    </p:bg>
+    <p:spTree>
+      <p:nvGrpSpPr>
+        <p:cNvPr id="1" name=""/>
+        <p:cNvGrpSpPr/>
+        <p:nvPr/>
+      </p:nvGrpSpPr>
+      <p:grpSpPr>
+        <a:xfrm>
+          <a:off x="0" y="0"/>
+          <a:ext cx="0" cy="0"/>
+          <a:chOff x="0" y="0"/>
+          <a:chExt cx="0" cy="0"/>
+        </a:xfrm>
+      </p:grpSpPr>
+      <p:sp>
+        <p:nvSpPr>
+          <p:cNvPr id="2" name="Title 1">
+            <a:extLst>
+              <a:ext uri="{FF2B5EF4-FFF2-40B4-BE49-F238E27FC236}">
+                <a16:creationId xmlns:a16="http://schemas.microsoft.com/office/drawing/2014/main" id="{4F87C7D5-4E35-46C7-A5AB-3569E12C88CF}"/>
+              </a:ext>
+            </a:extLst>
+          </p:cNvPr>
+          <p:cNvSpPr>
+            <a:spLocks noGrp="1"/>
+          </p:cNvSpPr>
+          <p:nvPr>
+            <p:ph type="title"/>
+          </p:nvPr>
+        </p:nvSpPr>
+        <p:spPr>
+          <a:xfrm>
+            <a:off x="648929" y="629266"/>
+            <a:ext cx="3505495" cy="1622321"/>
+          </a:xfrm>
+        </p:spPr>
+        <p:txBody>
+          <a:bodyPr>
+            <a:normAutofit fontScale="90000"/>
+          </a:bodyPr>
+          <a:lstStyle/>
+          <a:p>
+            <a:r>
+              <a:rPr lang="en-US" sz="3700" dirty="0"/>
+              <a:t>Phase 1.4 – Include Thermalito deliveries</a:t>
+            </a:r>
+          </a:p>
+        </p:txBody>
+      </p:sp>
+      <p:sp>
+        <p:nvSpPr>
+          <p:cNvPr id="3" name="Content Placeholder 2">
+            <a:extLst>
+              <a:ext uri="{FF2B5EF4-FFF2-40B4-BE49-F238E27FC236}">
+                <a16:creationId xmlns:a16="http://schemas.microsoft.com/office/drawing/2014/main" id="{319E246B-3D2E-438E-BEED-6A615B92177C}"/>
+              </a:ext>
+            </a:extLst>
+          </p:cNvPr>
+          <p:cNvSpPr>
+            <a:spLocks noGrp="1"/>
+          </p:cNvSpPr>
+          <p:nvPr>
+            <p:ph idx="1"/>
+          </p:nvPr>
+        </p:nvSpPr>
+        <p:spPr>
+          <a:xfrm>
+            <a:off x="648931" y="2438400"/>
+            <a:ext cx="3505494" cy="3785419"/>
+          </a:xfrm>
+        </p:spPr>
+        <p:txBody>
+          <a:bodyPr>
+            <a:normAutofit/>
+          </a:bodyPr>
+          <a:lstStyle/>
+          <a:p>
+            <a:r>
+              <a:rPr lang="en-US" sz="2000" dirty="0"/>
+              <a:t>Add demands for D_THERM</a:t>
+            </a:r>
+          </a:p>
+          <a:p>
+            <a:r>
+              <a:rPr lang="en-US" sz="2000" dirty="0"/>
+              <a:t>Need to review the purpose of Accretion-Depletion (AD) terms and how to calculate</a:t>
+            </a:r>
+          </a:p>
+          <a:p>
+            <a:r>
+              <a:rPr lang="en-US" sz="2000" dirty="0"/>
+              <a:t>Output</a:t>
+            </a:r>
+          </a:p>
+          <a:p>
+            <a:pPr lvl="1"/>
+            <a:r>
+              <a:rPr lang="en-US" sz="2000" dirty="0"/>
+              <a:t>D_THERM</a:t>
+            </a:r>
+          </a:p>
+        </p:txBody>
+      </p:sp>
+      <p:sp>
+        <p:nvSpPr>
+          <p:cNvPr id="38" name="Rectangle 37">
+            <a:extLst>
+              <a:ext uri="{FF2B5EF4-FFF2-40B4-BE49-F238E27FC236}">
+                <a16:creationId xmlns:a16="http://schemas.microsoft.com/office/drawing/2014/main" id="{5E39A796-BE83-48B1-B33F-35C4A32AAB57}"/>
+              </a:ext>
+              <a:ext uri="{C183D7F6-B498-43B3-948B-1728B52AA6E4}">
+                <adec:decorative xmlns:adec="http://schemas.microsoft.com/office/drawing/2017/decorative" val="1"/>
+              </a:ext>
+            </a:extLst>
+          </p:cNvPr>
+          <p:cNvSpPr>
+            <a:spLocks noGrp="1" noRot="1" noChangeAspect="1" noMove="1" noResize="1" noEditPoints="1" noAdjustHandles="1" noChangeArrowheads="1" noChangeShapeType="1" noTextEdit="1"/>
+          </p:cNvSpPr>
+          <p:nvPr>
+            <p:extLst>
+              <p:ext uri="{386F3935-93C4-4BCD-93E2-E3B085C9AB24}">
+                <p16:designElem xmlns:p16="http://schemas.microsoft.com/office/powerpoint/2015/main" val="1"/>
+              </p:ext>
+            </p:extLst>
+          </p:nvPr>
+        </p:nvSpPr>
+        <p:spPr>
+          <a:xfrm>
+            <a:off x="4639056" y="0"/>
+            <a:ext cx="7552944" cy="6858000"/>
+          </a:xfrm>
+          <a:prstGeom prst="rect">
+            <a:avLst/>
+          </a:prstGeom>
+          <a:solidFill>
+            <a:srgbClr val="C8CACA"/>
+          </a:solidFill>
+          <a:ln>
+            <a:noFill/>
+          </a:ln>
+        </p:spPr>
+        <p:style>
+          <a:lnRef idx="2">
+            <a:schemeClr val="accent1">
+              <a:shade val="50000"/>
+            </a:schemeClr>
+          </a:lnRef>
+          <a:fillRef idx="1">
+            <a:schemeClr val="accent1"/>
+          </a:fillRef>
+          <a:effectRef idx="0">
+            <a:schemeClr val="accent1"/>
+          </a:effectRef>
+          <a:fontRef idx="minor">
+            <a:schemeClr val="lt1"/>
+          </a:fontRef>
+        </p:style>
+        <p:txBody>
+          <a:bodyPr rtlCol="0" anchor="ctr"/>
+          <a:lstStyle/>
+          <a:p>
+            <a:pPr algn="ctr"/>
+            <a:endParaRPr lang="en-US"/>
+          </a:p>
+        </p:txBody>
+      </p:sp>
+      <p:sp>
+        <p:nvSpPr>
+          <p:cNvPr id="40" name="Rounded Rectangle 9">
+            <a:extLst>
+              <a:ext uri="{FF2B5EF4-FFF2-40B4-BE49-F238E27FC236}">
+                <a16:creationId xmlns:a16="http://schemas.microsoft.com/office/drawing/2014/main" id="{72F84B47-E267-4194-8194-831DB7B5547F}"/>
+              </a:ext>
+              <a:ext uri="{C183D7F6-B498-43B3-948B-1728B52AA6E4}">
+                <adec:decorative xmlns:adec="http://schemas.microsoft.com/office/drawing/2017/decorative" val="1"/>
+              </a:ext>
+            </a:extLst>
+          </p:cNvPr>
+          <p:cNvSpPr>
+            <a:spLocks noGrp="1" noRot="1" noChangeAspect="1" noMove="1" noResize="1" noEditPoints="1" noAdjustHandles="1" noChangeArrowheads="1" noChangeShapeType="1" noTextEdit="1"/>
+          </p:cNvSpPr>
+          <p:nvPr>
+            <p:extLst>
+              <p:ext uri="{386F3935-93C4-4BCD-93E2-E3B085C9AB24}">
+                <p16:designElem xmlns:p16="http://schemas.microsoft.com/office/powerpoint/2015/main" val="1"/>
+              </p:ext>
+            </p:extLst>
+          </p:nvPr>
+        </p:nvSpPr>
+        <p:spPr>
+          <a:xfrm>
+            <a:off x="5123688" y="557784"/>
+            <a:ext cx="6584098" cy="5739187"/>
+          </a:xfrm>
+          <a:prstGeom prst="roundRect">
+            <a:avLst>
+              <a:gd name="adj" fmla="val 0"/>
+            </a:avLst>
+          </a:prstGeom>
+          <a:solidFill>
+            <a:srgbClr val="FFFFFF"/>
+          </a:solidFill>
+          <a:ln w="9525">
+            <a:solidFill>
+              <a:srgbClr val="C8CACA"/>
+            </a:solidFill>
+          </a:ln>
+          <a:effectLst>
+            <a:outerShdw blurRad="57150" dist="19050" dir="5400000" algn="t" rotWithShape="0">
+              <a:prstClr val="black">
+                <a:alpha val="63000"/>
+              </a:prstClr>
+            </a:outerShdw>
+          </a:effectLst>
+        </p:spPr>
+        <p:style>
+          <a:lnRef idx="2">
+            <a:schemeClr val="accent1">
+              <a:shade val="50000"/>
+            </a:schemeClr>
+          </a:lnRef>
+          <a:fillRef idx="1">
+            <a:schemeClr val="accent1"/>
+          </a:fillRef>
+          <a:effectRef idx="0">
+            <a:schemeClr val="accent1"/>
+          </a:effectRef>
+          <a:fontRef idx="minor">
+            <a:schemeClr val="lt1"/>
+          </a:fontRef>
+        </p:style>
+        <p:txBody>
+          <a:bodyPr rtlCol="0" anchor="ctr"/>
+          <a:lstStyle/>
+          <a:p>
+            <a:pPr algn="ctr"/>
+            <a:endParaRPr lang="en-US"/>
+          </a:p>
+        </p:txBody>
+      </p:sp>
+      <p:pic>
+        <p:nvPicPr>
+          <p:cNvPr id="5" name="Picture 4">
+            <a:extLst>
+              <a:ext uri="{FF2B5EF4-FFF2-40B4-BE49-F238E27FC236}">
+                <a16:creationId xmlns:a16="http://schemas.microsoft.com/office/drawing/2014/main" id="{9E188F83-D5C3-4028-B774-C3E26D8C896D}"/>
+              </a:ext>
+            </a:extLst>
+          </p:cNvPr>
+          <p:cNvPicPr>
+            <a:picLocks noChangeAspect="1"/>
+          </p:cNvPicPr>
+          <p:nvPr/>
+        </p:nvPicPr>
+        <p:blipFill>
+          <a:blip r:embed="rId2"/>
+          <a:stretch>
+            <a:fillRect/>
+          </a:stretch>
+        </p:blipFill>
+        <p:spPr>
+          <a:xfrm>
+            <a:off x="5567936" y="807593"/>
+            <a:ext cx="5695183" cy="5239568"/>
+          </a:xfrm>
+          <a:prstGeom prst="rect">
+            <a:avLst/>
+          </a:prstGeom>
+          <a:effectLst/>
+        </p:spPr>
+      </p:pic>
+      <p:pic>
+        <p:nvPicPr>
+          <p:cNvPr id="9" name="Graphic 8" descr="Close">
+            <a:extLst>
+              <a:ext uri="{FF2B5EF4-FFF2-40B4-BE49-F238E27FC236}">
+                <a16:creationId xmlns:a16="http://schemas.microsoft.com/office/drawing/2014/main" id="{B0745657-67C7-4DC6-B129-D920567331AF}"/>
+              </a:ext>
+            </a:extLst>
+          </p:cNvPr>
+          <p:cNvPicPr>
+            <a:picLocks noChangeAspect="1"/>
+          </p:cNvPicPr>
+          <p:nvPr/>
+        </p:nvPicPr>
+        <p:blipFill>
+          <a:blip r:embed="rId3">
+            <a:extLst>
+              <a:ext uri="{28A0092B-C50C-407E-A947-70E740481C1C}">
+                <a14:useLocalDpi xmlns:a14="http://schemas.microsoft.com/office/drawing/2010/main" val="0"/>
+              </a:ext>
+              <a:ext uri="{96DAC541-7B7A-43D3-8B79-37D633B846F1}">
+                <asvg:svgBlip xmlns:asvg="http://schemas.microsoft.com/office/drawing/2016/SVG/main" r:embed="rId4"/>
+              </a:ext>
+            </a:extLst>
+          </a:blip>
+          <a:stretch>
+            <a:fillRect/>
+          </a:stretch>
+        </p:blipFill>
+        <p:spPr>
+          <a:xfrm>
+            <a:off x="6777049" y="5246926"/>
+            <a:ext cx="914400" cy="914400"/>
+          </a:xfrm>
+          <a:prstGeom prst="rect">
+            <a:avLst/>
+          </a:prstGeom>
+        </p:spPr>
+      </p:pic>
+    </p:spTree>
+    <p:extLst>
+      <p:ext uri="{BB962C8B-B14F-4D97-AF65-F5344CB8AC3E}">
+        <p14:creationId xmlns:p14="http://schemas.microsoft.com/office/powerpoint/2010/main" val="3305777850"/>
+      </p:ext>
+    </p:extLst>
+  </p:cSld>
+  <p:clrMapOvr>
+    <a:masterClrMapping/>
+  </p:clrMapOvr>
+</p:sld>
+</file>
+
+<file path=ppt/slides/slide13.xml><?xml version="1.0" encoding="utf-8"?>
+<p:sld xmlns:a="http://schemas.openxmlformats.org/drawingml/2006/main" xmlns:r="http://schemas.openxmlformats.org/officeDocument/2006/relationships" xmlns:p="http://schemas.openxmlformats.org/presentationml/2006/main">
+  <p:cSld>
+    <p:spTree>
+      <p:nvGrpSpPr>
+        <p:cNvPr id="1" name=""/>
+        <p:cNvGrpSpPr/>
+        <p:nvPr/>
+      </p:nvGrpSpPr>
+      <p:grpSpPr>
+        <a:xfrm>
+          <a:off x="0" y="0"/>
+          <a:ext cx="0" cy="0"/>
+          <a:chOff x="0" y="0"/>
+          <a:chExt cx="0" cy="0"/>
+        </a:xfrm>
+      </p:grpSpPr>
+      <p:sp>
+        <p:nvSpPr>
+          <p:cNvPr id="2" name="Title 1">
+            <a:extLst>
+              <a:ext uri="{FF2B5EF4-FFF2-40B4-BE49-F238E27FC236}">
+                <a16:creationId xmlns:a16="http://schemas.microsoft.com/office/drawing/2014/main" id="{7E602E9E-CB09-48DE-834B-DAFF04BB4499}"/>
+              </a:ext>
+            </a:extLst>
+          </p:cNvPr>
+          <p:cNvSpPr>
+            <a:spLocks noGrp="1"/>
+          </p:cNvSpPr>
+          <p:nvPr>
+            <p:ph type="title"/>
+          </p:nvPr>
+        </p:nvSpPr>
+        <p:spPr/>
+        <p:txBody>
+          <a:bodyPr/>
+          <a:lstStyle/>
+          <a:p>
+            <a:r>
+              <a:rPr lang="en-US" dirty="0"/>
+              <a:t>Phase 1 data requirements</a:t>
+            </a:r>
+          </a:p>
+        </p:txBody>
+      </p:sp>
+      <p:sp>
+        <p:nvSpPr>
+          <p:cNvPr id="3" name="Content Placeholder 2">
+            <a:extLst>
+              <a:ext uri="{FF2B5EF4-FFF2-40B4-BE49-F238E27FC236}">
+                <a16:creationId xmlns:a16="http://schemas.microsoft.com/office/drawing/2014/main" id="{8382E53A-D19C-4A6E-BB07-054AA7B676BF}"/>
+              </a:ext>
+            </a:extLst>
+          </p:cNvPr>
+          <p:cNvSpPr>
+            <a:spLocks noGrp="1"/>
+          </p:cNvSpPr>
+          <p:nvPr>
+            <p:ph idx="1"/>
+          </p:nvPr>
+        </p:nvSpPr>
+        <p:spPr/>
+        <p:txBody>
+          <a:bodyPr/>
+          <a:lstStyle/>
+          <a:p>
+            <a:r>
+              <a:rPr lang="en-US" dirty="0"/>
+              <a:t>Lake Oroville</a:t>
+            </a:r>
+          </a:p>
+          <a:p>
+            <a:pPr lvl="1"/>
+            <a:r>
+              <a:rPr lang="en-US" dirty="0"/>
+              <a:t>Inflow (TAF/day)</a:t>
+            </a:r>
+          </a:p>
+          <a:p>
+            <a:pPr lvl="1"/>
+            <a:r>
+              <a:rPr lang="en-US" dirty="0"/>
+              <a:t>Initial storage</a:t>
+            </a:r>
+          </a:p>
+          <a:p>
+            <a:pPr lvl="1"/>
+            <a:r>
+              <a:rPr lang="en-US" dirty="0"/>
+              <a:t>Level 5 storage</a:t>
+            </a:r>
+          </a:p>
+          <a:p>
+            <a:pPr lvl="1"/>
+            <a:r>
+              <a:rPr lang="en-US" dirty="0"/>
+              <a:t>Evaporation rate</a:t>
+            </a:r>
+          </a:p>
+          <a:p>
+            <a:r>
+              <a:rPr lang="en-US" dirty="0"/>
+              <a:t>Oroville water rights demands</a:t>
+            </a:r>
+          </a:p>
+          <a:p>
+            <a:r>
+              <a:rPr lang="en-US" dirty="0"/>
+              <a:t>Minimum groundwater pumping</a:t>
+            </a:r>
+          </a:p>
+          <a:p>
+            <a:endParaRPr lang="en-US" dirty="0"/>
+          </a:p>
+          <a:p>
+            <a:endParaRPr lang="en-US" dirty="0"/>
+          </a:p>
+          <a:p>
+            <a:endParaRPr lang="en-US" dirty="0"/>
+          </a:p>
+        </p:txBody>
+      </p:sp>
+    </p:spTree>
+    <p:extLst>
+      <p:ext uri="{BB962C8B-B14F-4D97-AF65-F5344CB8AC3E}">
+        <p14:creationId xmlns:p14="http://schemas.microsoft.com/office/powerpoint/2010/main" val="1200171353"/>
+      </p:ext>
+    </p:extLst>
+  </p:cSld>
+  <p:clrMapOvr>
+    <a:masterClrMapping/>
+  </p:clrMapOvr>
+</p:sld>
+</file>
+
+<file path=ppt/slides/slide14.xml><?xml version="1.0" encoding="utf-8"?>
+<p:sld xmlns:a="http://schemas.openxmlformats.org/drawingml/2006/main" xmlns:r="http://schemas.openxmlformats.org/officeDocument/2006/relationships" xmlns:p="http://schemas.openxmlformats.org/presentationml/2006/main" show="0">
+  <p:cSld>
+    <p:bg>
+      <p:bgPr>
+        <a:solidFill>
+          <a:schemeClr val="bg1"/>
+        </a:solidFill>
+        <a:effectLst/>
+      </p:bgPr>
+    </p:bg>
+    <p:spTree>
+      <p:nvGrpSpPr>
+        <p:cNvPr id="1" name=""/>
+        <p:cNvGrpSpPr/>
+        <p:nvPr/>
+      </p:nvGrpSpPr>
+      <p:grpSpPr>
+        <a:xfrm>
+          <a:off x="0" y="0"/>
+          <a:ext cx="0" cy="0"/>
+          <a:chOff x="0" y="0"/>
+          <a:chExt cx="0" cy="0"/>
+        </a:xfrm>
+      </p:grpSpPr>
+      <p:sp>
+        <p:nvSpPr>
+          <p:cNvPr id="2" name="Title 1">
+            <a:extLst>
+              <a:ext uri="{FF2B5EF4-FFF2-40B4-BE49-F238E27FC236}">
+                <a16:creationId xmlns:a16="http://schemas.microsoft.com/office/drawing/2014/main" id="{4F87C7D5-4E35-46C7-A5AB-3569E12C88CF}"/>
+              </a:ext>
+            </a:extLst>
+          </p:cNvPr>
+          <p:cNvSpPr>
+            <a:spLocks noGrp="1"/>
+          </p:cNvSpPr>
+          <p:nvPr>
+            <p:ph type="title"/>
+          </p:nvPr>
+        </p:nvSpPr>
+        <p:spPr>
+          <a:xfrm>
+            <a:off x="648929" y="629266"/>
+            <a:ext cx="3505495" cy="1622321"/>
+          </a:xfrm>
+        </p:spPr>
+        <p:txBody>
+          <a:bodyPr>
+            <a:normAutofit/>
+          </a:bodyPr>
+          <a:lstStyle/>
+          <a:p>
+            <a:r>
+              <a:rPr lang="en-US" sz="3700"/>
+              <a:t>Phase 2.1 – Shasta dam and outflow only</a:t>
+            </a:r>
+          </a:p>
+        </p:txBody>
+      </p:sp>
+      <p:sp>
+        <p:nvSpPr>
+          <p:cNvPr id="3" name="Content Placeholder 2">
+            <a:extLst>
+              <a:ext uri="{FF2B5EF4-FFF2-40B4-BE49-F238E27FC236}">
+                <a16:creationId xmlns:a16="http://schemas.microsoft.com/office/drawing/2014/main" id="{319E246B-3D2E-438E-BEED-6A615B92177C}"/>
+              </a:ext>
+            </a:extLst>
+          </p:cNvPr>
+          <p:cNvSpPr>
+            <a:spLocks noGrp="1"/>
+          </p:cNvSpPr>
+          <p:nvPr>
+            <p:ph idx="1"/>
+          </p:nvPr>
+        </p:nvSpPr>
+        <p:spPr>
+          <a:xfrm>
+            <a:off x="648931" y="2438400"/>
+            <a:ext cx="3505494" cy="3785419"/>
+          </a:xfrm>
+        </p:spPr>
+        <p:txBody>
+          <a:bodyPr>
+            <a:normAutofit/>
+          </a:bodyPr>
+          <a:lstStyle/>
+          <a:p>
+            <a:r>
+              <a:rPr lang="en-US" sz="2000" dirty="0"/>
+              <a:t>Develop very simple model</a:t>
+            </a:r>
+          </a:p>
+          <a:p>
+            <a:pPr lvl="1"/>
+            <a:r>
+              <a:rPr lang="en-US" sz="2000" dirty="0"/>
+              <a:t>Inflow to Shasta reservoir</a:t>
+            </a:r>
+          </a:p>
+          <a:p>
+            <a:pPr lvl="1"/>
+            <a:r>
+              <a:rPr lang="en-US" sz="2000" dirty="0"/>
+              <a:t>Shasta reservoir storage</a:t>
+            </a:r>
+          </a:p>
+          <a:p>
+            <a:pPr lvl="1"/>
+            <a:r>
+              <a:rPr lang="en-US" sz="2000" dirty="0"/>
+              <a:t>Release from Shasta storage </a:t>
+            </a:r>
+          </a:p>
+          <a:p>
+            <a:r>
+              <a:rPr lang="en-US" sz="2000" dirty="0"/>
+              <a:t>Output</a:t>
+            </a:r>
+          </a:p>
+          <a:p>
+            <a:pPr lvl="1"/>
+            <a:r>
+              <a:rPr lang="en-US" sz="2000" dirty="0"/>
+              <a:t>Daily Shasta releases</a:t>
+            </a:r>
+          </a:p>
+        </p:txBody>
+      </p:sp>
+      <p:sp>
+        <p:nvSpPr>
+          <p:cNvPr id="24" name="Rectangle 23">
+            <a:extLst>
+              <a:ext uri="{FF2B5EF4-FFF2-40B4-BE49-F238E27FC236}">
+                <a16:creationId xmlns:a16="http://schemas.microsoft.com/office/drawing/2014/main" id="{5E39A796-BE83-48B1-B33F-35C4A32AAB57}"/>
+              </a:ext>
+              <a:ext uri="{C183D7F6-B498-43B3-948B-1728B52AA6E4}">
+                <adec:decorative xmlns:adec="http://schemas.microsoft.com/office/drawing/2017/decorative" val="1"/>
+              </a:ext>
+            </a:extLst>
+          </p:cNvPr>
+          <p:cNvSpPr>
+            <a:spLocks noGrp="1" noRot="1" noChangeAspect="1" noMove="1" noResize="1" noEditPoints="1" noAdjustHandles="1" noChangeArrowheads="1" noChangeShapeType="1" noTextEdit="1"/>
+          </p:cNvSpPr>
+          <p:nvPr>
+            <p:extLst>
+              <p:ext uri="{386F3935-93C4-4BCD-93E2-E3B085C9AB24}">
+                <p16:designElem xmlns:p16="http://schemas.microsoft.com/office/powerpoint/2015/main" val="1"/>
+              </p:ext>
+            </p:extLst>
+          </p:nvPr>
+        </p:nvSpPr>
+        <p:spPr>
+          <a:xfrm>
+            <a:off x="4639056" y="0"/>
+            <a:ext cx="7552944" cy="6858000"/>
+          </a:xfrm>
+          <a:prstGeom prst="rect">
+            <a:avLst/>
+          </a:prstGeom>
+          <a:solidFill>
+            <a:srgbClr val="C8CACA"/>
+          </a:solidFill>
+          <a:ln>
+            <a:noFill/>
+          </a:ln>
+        </p:spPr>
+        <p:style>
+          <a:lnRef idx="2">
+            <a:schemeClr val="accent1">
+              <a:shade val="50000"/>
+            </a:schemeClr>
+          </a:lnRef>
+          <a:fillRef idx="1">
+            <a:schemeClr val="accent1"/>
+          </a:fillRef>
+          <a:effectRef idx="0">
+            <a:schemeClr val="accent1"/>
+          </a:effectRef>
+          <a:fontRef idx="minor">
+            <a:schemeClr val="lt1"/>
+          </a:fontRef>
+        </p:style>
+        <p:txBody>
+          <a:bodyPr rtlCol="0" anchor="ctr"/>
+          <a:lstStyle/>
+          <a:p>
+            <a:pPr algn="ctr"/>
+            <a:endParaRPr lang="en-US"/>
+          </a:p>
+        </p:txBody>
+      </p:sp>
+      <p:sp>
+        <p:nvSpPr>
+          <p:cNvPr id="26" name="Rounded Rectangle 9">
+            <a:extLst>
+              <a:ext uri="{FF2B5EF4-FFF2-40B4-BE49-F238E27FC236}">
+                <a16:creationId xmlns:a16="http://schemas.microsoft.com/office/drawing/2014/main" id="{72F84B47-E267-4194-8194-831DB7B5547F}"/>
+              </a:ext>
+              <a:ext uri="{C183D7F6-B498-43B3-948B-1728B52AA6E4}">
+                <adec:decorative xmlns:adec="http://schemas.microsoft.com/office/drawing/2017/decorative" val="1"/>
+              </a:ext>
+            </a:extLst>
+          </p:cNvPr>
+          <p:cNvSpPr>
+            <a:spLocks noGrp="1" noRot="1" noChangeAspect="1" noMove="1" noResize="1" noEditPoints="1" noAdjustHandles="1" noChangeArrowheads="1" noChangeShapeType="1" noTextEdit="1"/>
+          </p:cNvSpPr>
+          <p:nvPr>
+            <p:extLst>
+              <p:ext uri="{386F3935-93C4-4BCD-93E2-E3B085C9AB24}">
+                <p16:designElem xmlns:p16="http://schemas.microsoft.com/office/powerpoint/2015/main" val="1"/>
+              </p:ext>
+            </p:extLst>
+          </p:nvPr>
+        </p:nvSpPr>
+        <p:spPr>
+          <a:xfrm>
+            <a:off x="5123688" y="557784"/>
+            <a:ext cx="6584098" cy="5739187"/>
+          </a:xfrm>
+          <a:prstGeom prst="roundRect">
+            <a:avLst>
+              <a:gd name="adj" fmla="val 0"/>
+            </a:avLst>
+          </a:prstGeom>
+          <a:solidFill>
+            <a:srgbClr val="FFFFFF"/>
+          </a:solidFill>
+          <a:ln w="9525">
+            <a:solidFill>
+              <a:srgbClr val="C8CACA"/>
+            </a:solidFill>
+          </a:ln>
+          <a:effectLst>
+            <a:outerShdw blurRad="57150" dist="19050" dir="5400000" algn="t" rotWithShape="0">
+              <a:prstClr val="black">
+                <a:alpha val="63000"/>
+              </a:prstClr>
+            </a:outerShdw>
+          </a:effectLst>
+        </p:spPr>
+        <p:style>
+          <a:lnRef idx="2">
+            <a:schemeClr val="accent1">
+              <a:shade val="50000"/>
+            </a:schemeClr>
+          </a:lnRef>
+          <a:fillRef idx="1">
+            <a:schemeClr val="accent1"/>
+          </a:fillRef>
+          <a:effectRef idx="0">
+            <a:schemeClr val="accent1"/>
+          </a:effectRef>
+          <a:fontRef idx="minor">
+            <a:schemeClr val="lt1"/>
+          </a:fontRef>
+        </p:style>
+        <p:txBody>
+          <a:bodyPr rtlCol="0" anchor="ctr"/>
+          <a:lstStyle/>
+          <a:p>
+            <a:pPr algn="ctr"/>
+            <a:endParaRPr lang="en-US"/>
+          </a:p>
+        </p:txBody>
+      </p:sp>
+      <p:pic>
+        <p:nvPicPr>
+          <p:cNvPr id="5" name="Picture 4">
+            <a:extLst>
+              <a:ext uri="{FF2B5EF4-FFF2-40B4-BE49-F238E27FC236}">
+                <a16:creationId xmlns:a16="http://schemas.microsoft.com/office/drawing/2014/main" id="{D1F0508B-2B14-460F-9E52-EDD3BAA9511B}"/>
+              </a:ext>
+            </a:extLst>
+          </p:cNvPr>
+          <p:cNvPicPr>
+            <a:picLocks noChangeAspect="1"/>
+          </p:cNvPicPr>
+          <p:nvPr/>
+        </p:nvPicPr>
+        <p:blipFill>
+          <a:blip r:embed="rId2"/>
+          <a:stretch>
+            <a:fillRect/>
+          </a:stretch>
+        </p:blipFill>
+        <p:spPr>
+          <a:xfrm>
             <a:off x="5920183" y="807593"/>
             <a:ext cx="4990688" cy="5239568"/>
           </a:xfrm>
@@ -3702,6 +4844,374 @@
     <p:extLst>
       <p:ext uri="{BB962C8B-B14F-4D97-AF65-F5344CB8AC3E}">
         <p14:creationId xmlns:p14="http://schemas.microsoft.com/office/powerpoint/2010/main" val="3935373024"/>
+      </p:ext>
+    </p:extLst>
+  </p:cSld>
+  <p:clrMapOvr>
+    <a:masterClrMapping/>
+  </p:clrMapOvr>
+</p:sld>
+</file>
+
+<file path=ppt/slides/slide15.xml><?xml version="1.0" encoding="utf-8"?>
+<p:sld xmlns:a="http://schemas.openxmlformats.org/drawingml/2006/main" xmlns:r="http://schemas.openxmlformats.org/officeDocument/2006/relationships" xmlns:p="http://schemas.openxmlformats.org/presentationml/2006/main" show="0">
+  <p:cSld>
+    <p:bg>
+      <p:bgPr>
+        <a:solidFill>
+          <a:schemeClr val="bg1"/>
+        </a:solidFill>
+        <a:effectLst/>
+      </p:bgPr>
+    </p:bg>
+    <p:spTree>
+      <p:nvGrpSpPr>
+        <p:cNvPr id="1" name=""/>
+        <p:cNvGrpSpPr/>
+        <p:nvPr/>
+      </p:nvGrpSpPr>
+      <p:grpSpPr>
+        <a:xfrm>
+          <a:off x="0" y="0"/>
+          <a:ext cx="0" cy="0"/>
+          <a:chOff x="0" y="0"/>
+          <a:chExt cx="0" cy="0"/>
+        </a:xfrm>
+      </p:grpSpPr>
+      <p:sp>
+        <p:nvSpPr>
+          <p:cNvPr id="2" name="Title 1">
+            <a:extLst>
+              <a:ext uri="{FF2B5EF4-FFF2-40B4-BE49-F238E27FC236}">
+                <a16:creationId xmlns:a16="http://schemas.microsoft.com/office/drawing/2014/main" id="{4F87C7D5-4E35-46C7-A5AB-3569E12C88CF}"/>
+              </a:ext>
+            </a:extLst>
+          </p:cNvPr>
+          <p:cNvSpPr>
+            <a:spLocks noGrp="1"/>
+          </p:cNvSpPr>
+          <p:nvPr>
+            <p:ph type="title"/>
+          </p:nvPr>
+        </p:nvSpPr>
+        <p:spPr>
+          <a:xfrm>
+            <a:off x="6622293" y="638144"/>
+            <a:ext cx="4953934" cy="1676603"/>
+          </a:xfrm>
+        </p:spPr>
+        <p:txBody>
+          <a:bodyPr>
+            <a:normAutofit/>
+          </a:bodyPr>
+          <a:lstStyle/>
+          <a:p>
+            <a:r>
+              <a:rPr lang="en-US" sz="4000" dirty="0"/>
+              <a:t>Phase 2.1 – Shasta dam and outflow only</a:t>
+            </a:r>
+          </a:p>
+        </p:txBody>
+      </p:sp>
+      <p:sp>
+        <p:nvSpPr>
+          <p:cNvPr id="31" name="Rectangle 30">
+            <a:extLst>
+              <a:ext uri="{FF2B5EF4-FFF2-40B4-BE49-F238E27FC236}">
+                <a16:creationId xmlns:a16="http://schemas.microsoft.com/office/drawing/2014/main" id="{787900AF-3ED0-4C02-A309-3984EBBD202C}"/>
+              </a:ext>
+              <a:ext uri="{C183D7F6-B498-43B3-948B-1728B52AA6E4}">
+                <adec:decorative xmlns:adec="http://schemas.microsoft.com/office/drawing/2017/decorative" val="1"/>
+              </a:ext>
+            </a:extLst>
+          </p:cNvPr>
+          <p:cNvSpPr>
+            <a:spLocks noGrp="1" noRot="1" noChangeAspect="1" noMove="1" noResize="1" noEditPoints="1" noAdjustHandles="1" noChangeArrowheads="1" noChangeShapeType="1" noTextEdit="1"/>
+          </p:cNvSpPr>
+          <p:nvPr>
+            <p:extLst>
+              <p:ext uri="{386F3935-93C4-4BCD-93E2-E3B085C9AB24}">
+                <p16:designElem xmlns:p16="http://schemas.microsoft.com/office/powerpoint/2015/main" val="1"/>
+              </p:ext>
+            </p:extLst>
+          </p:nvPr>
+        </p:nvSpPr>
+        <p:spPr>
+          <a:xfrm>
+            <a:off x="0" y="0"/>
+            <a:ext cx="6096000" cy="6858000"/>
+          </a:xfrm>
+          <a:prstGeom prst="rect">
+            <a:avLst/>
+          </a:prstGeom>
+          <a:solidFill>
+            <a:srgbClr val="C8CACA"/>
+          </a:solidFill>
+          <a:ln>
+            <a:noFill/>
+          </a:ln>
+        </p:spPr>
+        <p:style>
+          <a:lnRef idx="2">
+            <a:schemeClr val="accent1">
+              <a:shade val="50000"/>
+            </a:schemeClr>
+          </a:lnRef>
+          <a:fillRef idx="1">
+            <a:schemeClr val="accent1"/>
+          </a:fillRef>
+          <a:effectRef idx="0">
+            <a:schemeClr val="accent1"/>
+          </a:effectRef>
+          <a:fontRef idx="minor">
+            <a:schemeClr val="lt1"/>
+          </a:fontRef>
+        </p:style>
+        <p:txBody>
+          <a:bodyPr rtlCol="0" anchor="ctr"/>
+          <a:lstStyle/>
+          <a:p>
+            <a:pPr marL="0" marR="0" lvl="0" indent="0" algn="ctr" defTabSz="914400" rtl="0" eaLnBrk="1" fontAlgn="auto" latinLnBrk="0" hangingPunct="1">
+              <a:lnSpc>
+                <a:spcPct val="100000"/>
+              </a:lnSpc>
+              <a:spcBef>
+                <a:spcPts val="0"/>
+              </a:spcBef>
+              <a:spcAft>
+                <a:spcPts val="0"/>
+              </a:spcAft>
+              <a:buClrTx/>
+              <a:buSzTx/>
+              <a:buFontTx/>
+              <a:buNone/>
+              <a:tabLst/>
+              <a:defRPr/>
+            </a:pPr>
+            <a:endParaRPr kumimoji="0" lang="en-US" sz="1800" b="0" i="0" u="none" strike="noStrike" kern="1200" cap="none" spc="0" normalizeH="0" baseline="0" noProof="0">
+              <a:ln>
+                <a:noFill/>
+              </a:ln>
+              <a:solidFill>
+                <a:prstClr val="white"/>
+              </a:solidFill>
+              <a:effectLst/>
+              <a:uLnTx/>
+              <a:uFillTx/>
+              <a:latin typeface="Calibri" panose="020F0502020204030204"/>
+              <a:ea typeface="+mn-ea"/>
+              <a:cs typeface="+mn-cs"/>
+            </a:endParaRPr>
+          </a:p>
+        </p:txBody>
+      </p:sp>
+      <p:sp>
+        <p:nvSpPr>
+          <p:cNvPr id="33" name="Rounded Rectangle 20">
+            <a:extLst>
+              <a:ext uri="{FF2B5EF4-FFF2-40B4-BE49-F238E27FC236}">
+                <a16:creationId xmlns:a16="http://schemas.microsoft.com/office/drawing/2014/main" id="{8DEDEE5C-3126-4336-A7D4-9277AF5A04B4}"/>
+              </a:ext>
+              <a:ext uri="{C183D7F6-B498-43B3-948B-1728B52AA6E4}">
+                <adec:decorative xmlns:adec="http://schemas.microsoft.com/office/drawing/2017/decorative" val="1"/>
+              </a:ext>
+            </a:extLst>
+          </p:cNvPr>
+          <p:cNvSpPr>
+            <a:spLocks noGrp="1" noRot="1" noChangeAspect="1" noMove="1" noResize="1" noEditPoints="1" noAdjustHandles="1" noChangeArrowheads="1" noChangeShapeType="1" noTextEdit="1"/>
+          </p:cNvSpPr>
+          <p:nvPr>
+            <p:extLst>
+              <p:ext uri="{386F3935-93C4-4BCD-93E2-E3B085C9AB24}">
+                <p16:designElem xmlns:p16="http://schemas.microsoft.com/office/powerpoint/2015/main" val="1"/>
+              </p:ext>
+            </p:extLst>
+          </p:nvPr>
+        </p:nvSpPr>
+        <p:spPr>
+          <a:xfrm>
+            <a:off x="493138" y="559407"/>
+            <a:ext cx="5109725" cy="5739187"/>
+          </a:xfrm>
+          <a:prstGeom prst="roundRect">
+            <a:avLst>
+              <a:gd name="adj" fmla="val 0"/>
+            </a:avLst>
+          </a:prstGeom>
+          <a:solidFill>
+            <a:srgbClr val="FFFFFF"/>
+          </a:solidFill>
+          <a:ln w="9525">
+            <a:solidFill>
+              <a:srgbClr val="C8CACA"/>
+            </a:solidFill>
+          </a:ln>
+          <a:effectLst>
+            <a:outerShdw blurRad="57150" dist="19050" dir="5400000" algn="t" rotWithShape="0">
+              <a:prstClr val="black">
+                <a:alpha val="63000"/>
+              </a:prstClr>
+            </a:outerShdw>
+          </a:effectLst>
+        </p:spPr>
+        <p:style>
+          <a:lnRef idx="2">
+            <a:schemeClr val="accent1">
+              <a:shade val="50000"/>
+            </a:schemeClr>
+          </a:lnRef>
+          <a:fillRef idx="1">
+            <a:schemeClr val="accent1"/>
+          </a:fillRef>
+          <a:effectRef idx="0">
+            <a:schemeClr val="accent1"/>
+          </a:effectRef>
+          <a:fontRef idx="minor">
+            <a:schemeClr val="lt1"/>
+          </a:fontRef>
+        </p:style>
+        <p:txBody>
+          <a:bodyPr rtlCol="0" anchor="ctr"/>
+          <a:lstStyle/>
+          <a:p>
+            <a:pPr marL="0" marR="0" lvl="0" indent="0" algn="ctr" defTabSz="914400" rtl="0" eaLnBrk="1" fontAlgn="auto" latinLnBrk="0" hangingPunct="1">
+              <a:lnSpc>
+                <a:spcPct val="100000"/>
+              </a:lnSpc>
+              <a:spcBef>
+                <a:spcPts val="0"/>
+              </a:spcBef>
+              <a:spcAft>
+                <a:spcPts val="0"/>
+              </a:spcAft>
+              <a:buClrTx/>
+              <a:buSzTx/>
+              <a:buFontTx/>
+              <a:buNone/>
+              <a:tabLst/>
+              <a:defRPr/>
+            </a:pPr>
+            <a:endParaRPr kumimoji="0" lang="en-US" sz="1800" b="0" i="0" u="none" strike="noStrike" kern="1200" cap="none" spc="0" normalizeH="0" baseline="0" noProof="0">
+              <a:ln>
+                <a:noFill/>
+              </a:ln>
+              <a:solidFill>
+                <a:prstClr val="white"/>
+              </a:solidFill>
+              <a:effectLst/>
+              <a:uLnTx/>
+              <a:uFillTx/>
+              <a:latin typeface="Calibri" panose="020F0502020204030204"/>
+              <a:ea typeface="+mn-ea"/>
+              <a:cs typeface="+mn-cs"/>
+            </a:endParaRPr>
+          </a:p>
+        </p:txBody>
+      </p:sp>
+      <p:pic>
+        <p:nvPicPr>
+          <p:cNvPr id="6" name="Picture 5">
+            <a:extLst>
+              <a:ext uri="{FF2B5EF4-FFF2-40B4-BE49-F238E27FC236}">
+                <a16:creationId xmlns:a16="http://schemas.microsoft.com/office/drawing/2014/main" id="{189728B2-F285-4A55-8F08-E0166BCCFB48}"/>
+              </a:ext>
+            </a:extLst>
+          </p:cNvPr>
+          <p:cNvPicPr>
+            <a:picLocks noChangeAspect="1"/>
+          </p:cNvPicPr>
+          <p:nvPr/>
+        </p:nvPicPr>
+        <p:blipFill>
+          <a:blip r:embed="rId2"/>
+          <a:stretch>
+            <a:fillRect/>
+          </a:stretch>
+        </p:blipFill>
+        <p:spPr>
+          <a:xfrm>
+            <a:off x="1902837" y="818521"/>
+            <a:ext cx="2290325" cy="5220957"/>
+          </a:xfrm>
+          <a:prstGeom prst="rect">
+            <a:avLst/>
+          </a:prstGeom>
+          <a:effectLst/>
+        </p:spPr>
+      </p:pic>
+      <p:sp>
+        <p:nvSpPr>
+          <p:cNvPr id="3" name="Content Placeholder 2">
+            <a:extLst>
+              <a:ext uri="{FF2B5EF4-FFF2-40B4-BE49-F238E27FC236}">
+                <a16:creationId xmlns:a16="http://schemas.microsoft.com/office/drawing/2014/main" id="{319E246B-3D2E-438E-BEED-6A615B92177C}"/>
+              </a:ext>
+            </a:extLst>
+          </p:cNvPr>
+          <p:cNvSpPr>
+            <a:spLocks noGrp="1"/>
+          </p:cNvSpPr>
+          <p:nvPr>
+            <p:ph idx="1"/>
+          </p:nvPr>
+        </p:nvSpPr>
+        <p:spPr>
+          <a:xfrm>
+            <a:off x="6622295" y="2438401"/>
+            <a:ext cx="4953932" cy="3779520"/>
+          </a:xfrm>
+        </p:spPr>
+        <p:txBody>
+          <a:bodyPr>
+            <a:normAutofit/>
+          </a:bodyPr>
+          <a:lstStyle/>
+          <a:p>
+            <a:r>
+              <a:rPr lang="en-US" sz="2000" dirty="0"/>
+              <a:t>Develop very simple model</a:t>
+            </a:r>
+          </a:p>
+          <a:p>
+            <a:pPr lvl="1"/>
+            <a:r>
+              <a:rPr lang="en-US" sz="2000" dirty="0"/>
+              <a:t>Inflow to Shasta reservoir</a:t>
+            </a:r>
+          </a:p>
+          <a:p>
+            <a:pPr lvl="1"/>
+            <a:r>
+              <a:rPr lang="en-US" sz="2000" dirty="0"/>
+              <a:t>Shasta reservoir storage</a:t>
+            </a:r>
+          </a:p>
+          <a:p>
+            <a:pPr lvl="1"/>
+            <a:r>
+              <a:rPr lang="en-US" sz="2000" dirty="0"/>
+              <a:t>Release from Shasta storage </a:t>
+            </a:r>
+          </a:p>
+          <a:p>
+            <a:r>
+              <a:rPr lang="en-US" sz="2000" dirty="0"/>
+              <a:t>Output</a:t>
+            </a:r>
+          </a:p>
+          <a:p>
+            <a:pPr lvl="1"/>
+            <a:r>
+              <a:rPr lang="en-US" sz="2000" dirty="0"/>
+              <a:t>Daily Shasta releases</a:t>
+            </a:r>
+          </a:p>
+        </p:txBody>
+      </p:sp>
+    </p:spTree>
+    <p:extLst>
+      <p:ext uri="{BB962C8B-B14F-4D97-AF65-F5344CB8AC3E}">
+        <p14:creationId xmlns:p14="http://schemas.microsoft.com/office/powerpoint/2010/main" val="3706107824"/>
       </p:ext>
     </p:extLst>
   </p:cSld>
@@ -3906,7 +5416,11 @@
               <a:buAutoNum type="arabicPeriod"/>
             </a:pPr>
             <a:r>
-              <a:rPr lang="en-US" sz="2000" dirty="0"/>
+              <a:rPr lang="en-US" sz="2000" dirty="0">
+                <a:solidFill>
+                  <a:srgbClr val="00B050"/>
+                </a:solidFill>
+              </a:rPr>
               <a:t>Feather River to Confluence</a:t>
             </a:r>
           </a:p>
@@ -4576,14 +6090,6 @@
 <file path=ppt/slides/slide5.xml><?xml version="1.0" encoding="utf-8"?>
 <p:sld xmlns:a="http://schemas.openxmlformats.org/drawingml/2006/main" xmlns:r="http://schemas.openxmlformats.org/officeDocument/2006/relationships" xmlns:p="http://schemas.openxmlformats.org/presentationml/2006/main">
   <p:cSld>
-    <p:bg>
-      <p:bgPr>
-        <a:solidFill>
-          <a:schemeClr val="bg1"/>
-        </a:solidFill>
-        <a:effectLst/>
-      </p:bgPr>
-    </p:bg>
     <p:spTree>
       <p:nvGrpSpPr>
         <p:cNvPr id="1" name=""/>
@@ -4603,7 +6109,7 @@
           <p:cNvPr id="2" name="Title 1">
             <a:extLst>
               <a:ext uri="{FF2B5EF4-FFF2-40B4-BE49-F238E27FC236}">
-                <a16:creationId xmlns:a16="http://schemas.microsoft.com/office/drawing/2014/main" id="{4F87C7D5-4E35-46C7-A5AB-3569E12C88CF}"/>
+                <a16:creationId xmlns:a16="http://schemas.microsoft.com/office/drawing/2014/main" id="{4A4FF443-CADA-4533-86B8-7A5564729209}"/>
               </a:ext>
             </a:extLst>
           </p:cNvPr>
@@ -4614,272 +6120,70 @@
             <p:ph type="title"/>
           </p:nvPr>
         </p:nvSpPr>
-        <p:spPr>
-          <a:xfrm>
-            <a:off x="648929" y="629266"/>
-            <a:ext cx="3663012" cy="989809"/>
-          </a:xfrm>
-        </p:spPr>
-        <p:txBody>
-          <a:bodyPr>
-            <a:normAutofit fontScale="90000"/>
-          </a:bodyPr>
+        <p:spPr/>
+        <p:txBody>
+          <a:bodyPr/>
+          <a:lstStyle/>
+          <a:p>
+            <a:r>
+              <a:rPr lang="en-US" dirty="0" err="1"/>
+              <a:t>Questons</a:t>
+            </a:r>
+            <a:endParaRPr lang="en-US" dirty="0"/>
+          </a:p>
+        </p:txBody>
+      </p:sp>
+      <p:sp>
+        <p:nvSpPr>
+          <p:cNvPr id="3" name="Content Placeholder 2">
+            <a:extLst>
+              <a:ext uri="{FF2B5EF4-FFF2-40B4-BE49-F238E27FC236}">
+                <a16:creationId xmlns:a16="http://schemas.microsoft.com/office/drawing/2014/main" id="{152D8056-8BFF-45EA-BF06-141C2DF19C67}"/>
+              </a:ext>
+            </a:extLst>
+          </p:cNvPr>
+          <p:cNvSpPr>
+            <a:spLocks noGrp="1"/>
+          </p:cNvSpPr>
+          <p:nvPr>
+            <p:ph idx="1"/>
+          </p:nvPr>
+        </p:nvSpPr>
+        <p:spPr/>
+        <p:txBody>
+          <a:bodyPr/>
           <a:lstStyle/>
           <a:p>
             <a:r>
               <a:rPr lang="en-US" dirty="0"/>
-              <a:t>Phase 1.1 – Oroville dam and outflow only</a:t>
-            </a:r>
-          </a:p>
-        </p:txBody>
-      </p:sp>
-      <p:sp>
-        <p:nvSpPr>
-          <p:cNvPr id="3" name="Content Placeholder 2">
-            <a:extLst>
-              <a:ext uri="{FF2B5EF4-FFF2-40B4-BE49-F238E27FC236}">
-                <a16:creationId xmlns:a16="http://schemas.microsoft.com/office/drawing/2014/main" id="{319E246B-3D2E-438E-BEED-6A615B92177C}"/>
-              </a:ext>
-            </a:extLst>
-          </p:cNvPr>
-          <p:cNvSpPr>
-            <a:spLocks noGrp="1"/>
-          </p:cNvSpPr>
-          <p:nvPr>
-            <p:ph idx="1"/>
-          </p:nvPr>
-        </p:nvSpPr>
-        <p:spPr>
-          <a:xfrm>
-            <a:off x="648931" y="1847462"/>
-            <a:ext cx="3505494" cy="4376358"/>
-          </a:xfrm>
-        </p:spPr>
-        <p:txBody>
-          <a:bodyPr>
-            <a:normAutofit/>
-          </a:bodyPr>
-          <a:lstStyle/>
-          <a:p>
-            <a:r>
-              <a:rPr lang="en-US" sz="2000" dirty="0"/>
-              <a:t>Develop very simple model</a:t>
+              <a:t>What is the philosophy of using Accretion-Depletion (AD) terms?</a:t>
+            </a:r>
+          </a:p>
+          <a:p>
+            <a:r>
+              <a:rPr lang="en-US" dirty="0"/>
+              <a:t>How to estimate daily AD terms from available daily data?</a:t>
             </a:r>
           </a:p>
           <a:p>
             <a:pPr lvl="1"/>
             <a:r>
-              <a:rPr lang="en-US" sz="2000" dirty="0"/>
-              <a:t>Inflow to Oroville reservoir</a:t>
-            </a:r>
-          </a:p>
-          <a:p>
-            <a:pPr lvl="1"/>
-            <a:r>
-              <a:rPr lang="en-US" sz="2000" dirty="0"/>
-              <a:t>Oroville reservoir storage</a:t>
-            </a:r>
-          </a:p>
-          <a:p>
-            <a:pPr lvl="1"/>
-            <a:r>
-              <a:rPr lang="en-US" sz="2000" dirty="0"/>
-              <a:t>Release from Oroville storage </a:t>
-            </a:r>
-          </a:p>
-          <a:p>
-            <a:pPr lvl="1"/>
-            <a:r>
-              <a:rPr lang="en-US" sz="2000" dirty="0"/>
-              <a:t>No deliveries/demands yet</a:t>
-            </a:r>
-          </a:p>
-          <a:p>
-            <a:r>
-              <a:rPr lang="en-US" sz="2400" dirty="0"/>
-              <a:t>Output</a:t>
-            </a:r>
-          </a:p>
-          <a:p>
-            <a:pPr lvl="1"/>
-            <a:r>
-              <a:rPr lang="en-US" sz="2000" dirty="0"/>
-              <a:t>Daily Oroville releases</a:t>
-            </a:r>
-          </a:p>
-        </p:txBody>
-      </p:sp>
-      <p:sp>
-        <p:nvSpPr>
-          <p:cNvPr id="18" name="Rectangle 11">
-            <a:extLst>
-              <a:ext uri="{FF2B5EF4-FFF2-40B4-BE49-F238E27FC236}">
-                <a16:creationId xmlns:a16="http://schemas.microsoft.com/office/drawing/2014/main" id="{5E39A796-BE83-48B1-B33F-35C4A32AAB57}"/>
-              </a:ext>
-              <a:ext uri="{C183D7F6-B498-43B3-948B-1728B52AA6E4}">
-                <adec:decorative xmlns:adec="http://schemas.microsoft.com/office/drawing/2017/decorative" val="1"/>
-              </a:ext>
-            </a:extLst>
-          </p:cNvPr>
-          <p:cNvSpPr>
-            <a:spLocks noGrp="1" noRot="1" noChangeAspect="1" noMove="1" noResize="1" noEditPoints="1" noAdjustHandles="1" noChangeArrowheads="1" noChangeShapeType="1" noTextEdit="1"/>
-          </p:cNvSpPr>
-          <p:nvPr>
-            <p:extLst>
-              <p:ext uri="{386F3935-93C4-4BCD-93E2-E3B085C9AB24}">
-                <p16:designElem xmlns:p16="http://schemas.microsoft.com/office/powerpoint/2015/main" val="1"/>
-              </p:ext>
-            </p:extLst>
-          </p:nvPr>
-        </p:nvSpPr>
-        <p:spPr>
-          <a:xfrm>
-            <a:off x="4639056" y="0"/>
-            <a:ext cx="7552944" cy="6858000"/>
-          </a:xfrm>
-          <a:prstGeom prst="rect">
-            <a:avLst/>
-          </a:prstGeom>
-          <a:solidFill>
-            <a:srgbClr val="C8CACA"/>
-          </a:solidFill>
-          <a:ln>
-            <a:noFill/>
-          </a:ln>
-        </p:spPr>
-        <p:style>
-          <a:lnRef idx="2">
-            <a:schemeClr val="accent1">
-              <a:shade val="50000"/>
-            </a:schemeClr>
-          </a:lnRef>
-          <a:fillRef idx="1">
-            <a:schemeClr val="accent1"/>
-          </a:fillRef>
-          <a:effectRef idx="0">
-            <a:schemeClr val="accent1"/>
-          </a:effectRef>
-          <a:fontRef idx="minor">
-            <a:schemeClr val="lt1"/>
-          </a:fontRef>
-        </p:style>
-        <p:txBody>
-          <a:bodyPr rtlCol="0" anchor="ctr"/>
-          <a:lstStyle/>
-          <a:p>
-            <a:pPr algn="ctr"/>
-            <a:endParaRPr lang="en-US"/>
-          </a:p>
-        </p:txBody>
-      </p:sp>
-      <p:sp>
-        <p:nvSpPr>
-          <p:cNvPr id="19" name="Rounded Rectangle 9">
-            <a:extLst>
-              <a:ext uri="{FF2B5EF4-FFF2-40B4-BE49-F238E27FC236}">
-                <a16:creationId xmlns:a16="http://schemas.microsoft.com/office/drawing/2014/main" id="{72F84B47-E267-4194-8194-831DB7B5547F}"/>
-              </a:ext>
-              <a:ext uri="{C183D7F6-B498-43B3-948B-1728B52AA6E4}">
-                <adec:decorative xmlns:adec="http://schemas.microsoft.com/office/drawing/2017/decorative" val="1"/>
-              </a:ext>
-            </a:extLst>
-          </p:cNvPr>
-          <p:cNvSpPr>
-            <a:spLocks noGrp="1" noRot="1" noChangeAspect="1" noMove="1" noResize="1" noEditPoints="1" noAdjustHandles="1" noChangeArrowheads="1" noChangeShapeType="1" noTextEdit="1"/>
-          </p:cNvSpPr>
-          <p:nvPr>
-            <p:extLst>
-              <p:ext uri="{386F3935-93C4-4BCD-93E2-E3B085C9AB24}">
-                <p16:designElem xmlns:p16="http://schemas.microsoft.com/office/powerpoint/2015/main" val="1"/>
-              </p:ext>
-            </p:extLst>
-          </p:nvPr>
-        </p:nvSpPr>
-        <p:spPr>
-          <a:xfrm>
-            <a:off x="5123688" y="557784"/>
-            <a:ext cx="6584098" cy="5739187"/>
-          </a:xfrm>
-          <a:prstGeom prst="roundRect">
-            <a:avLst>
-              <a:gd name="adj" fmla="val 0"/>
-            </a:avLst>
-          </a:prstGeom>
-          <a:solidFill>
-            <a:srgbClr val="FFFFFF"/>
-          </a:solidFill>
-          <a:ln w="9525">
-            <a:solidFill>
-              <a:srgbClr val="C8CACA"/>
-            </a:solidFill>
-          </a:ln>
-          <a:effectLst>
-            <a:outerShdw blurRad="57150" dist="19050" dir="5400000" algn="t" rotWithShape="0">
-              <a:prstClr val="black">
-                <a:alpha val="63000"/>
-              </a:prstClr>
-            </a:outerShdw>
-          </a:effectLst>
-        </p:spPr>
-        <p:style>
-          <a:lnRef idx="2">
-            <a:schemeClr val="accent1">
-              <a:shade val="50000"/>
-            </a:schemeClr>
-          </a:lnRef>
-          <a:fillRef idx="1">
-            <a:schemeClr val="accent1"/>
-          </a:fillRef>
-          <a:effectRef idx="0">
-            <a:schemeClr val="accent1"/>
-          </a:effectRef>
-          <a:fontRef idx="minor">
-            <a:schemeClr val="lt1"/>
-          </a:fontRef>
-        </p:style>
-        <p:txBody>
-          <a:bodyPr rtlCol="0" anchor="ctr"/>
-          <a:lstStyle/>
-          <a:p>
-            <a:pPr algn="ctr"/>
-            <a:endParaRPr lang="en-US"/>
-          </a:p>
-        </p:txBody>
-      </p:sp>
-      <p:pic>
-        <p:nvPicPr>
-          <p:cNvPr id="7" name="Picture 6">
-            <a:extLst>
-              <a:ext uri="{FF2B5EF4-FFF2-40B4-BE49-F238E27FC236}">
-                <a16:creationId xmlns:a16="http://schemas.microsoft.com/office/drawing/2014/main" id="{191BED70-9C29-4432-8DE4-262377C5023B}"/>
-              </a:ext>
-            </a:extLst>
-          </p:cNvPr>
-          <p:cNvPicPr>
-            <a:picLocks noChangeAspect="1"/>
-          </p:cNvPicPr>
-          <p:nvPr/>
-        </p:nvPicPr>
-        <p:blipFill rotWithShape="1">
-          <a:blip r:embed="rId2"/>
-          <a:srcRect r="24743"/>
-          <a:stretch/>
-        </p:blipFill>
-        <p:spPr>
-          <a:xfrm>
-            <a:off x="6162303" y="807593"/>
-            <a:ext cx="4506448" cy="5239568"/>
-          </a:xfrm>
-          <a:prstGeom prst="rect">
-            <a:avLst/>
-          </a:prstGeom>
-          <a:effectLst/>
-        </p:spPr>
-      </p:pic>
+              <a:rPr lang="en-US" dirty="0"/>
+              <a:t>Is it okay to estimate these terms using CDEC data or will I have to refer to CalSim II data?</a:t>
+            </a:r>
+          </a:p>
+          <a:p>
+            <a:r>
+              <a:rPr lang="en-US" dirty="0"/>
+              <a:t>With the </a:t>
+            </a:r>
+          </a:p>
+        </p:txBody>
+      </p:sp>
     </p:spTree>
     <p:extLst>
       <p:ext uri="{BB962C8B-B14F-4D97-AF65-F5344CB8AC3E}">
-        <p14:creationId xmlns:p14="http://schemas.microsoft.com/office/powerpoint/2010/main" val="1792466740"/>
+        <p14:creationId xmlns:p14="http://schemas.microsoft.com/office/powerpoint/2010/main" val="678678836"/>
       </p:ext>
     </p:extLst>
   </p:cSld>
@@ -4891,6 +6195,984 @@
 
 <file path=ppt/slides/slide6.xml><?xml version="1.0" encoding="utf-8"?>
 <p:sld xmlns:a="http://schemas.openxmlformats.org/drawingml/2006/main" xmlns:r="http://schemas.openxmlformats.org/officeDocument/2006/relationships" xmlns:p="http://schemas.openxmlformats.org/presentationml/2006/main">
+  <p:cSld>
+    <p:spTree>
+      <p:nvGrpSpPr>
+        <p:cNvPr id="1" name=""/>
+        <p:cNvGrpSpPr/>
+        <p:nvPr/>
+      </p:nvGrpSpPr>
+      <p:grpSpPr>
+        <a:xfrm>
+          <a:off x="0" y="0"/>
+          <a:ext cx="0" cy="0"/>
+          <a:chOff x="0" y="0"/>
+          <a:chExt cx="0" cy="0"/>
+        </a:xfrm>
+      </p:grpSpPr>
+      <p:sp>
+        <p:nvSpPr>
+          <p:cNvPr id="6" name="Title 5">
+            <a:extLst>
+              <a:ext uri="{FF2B5EF4-FFF2-40B4-BE49-F238E27FC236}">
+                <a16:creationId xmlns:a16="http://schemas.microsoft.com/office/drawing/2014/main" id="{9558920F-DD57-443A-9416-1A0EB45E69DB}"/>
+              </a:ext>
+            </a:extLst>
+          </p:cNvPr>
+          <p:cNvSpPr>
+            <a:spLocks noGrp="1"/>
+          </p:cNvSpPr>
+          <p:nvPr>
+            <p:ph type="title"/>
+          </p:nvPr>
+        </p:nvSpPr>
+        <p:spPr/>
+        <p:txBody>
+          <a:bodyPr/>
+          <a:lstStyle/>
+          <a:p>
+            <a:r>
+              <a:rPr lang="en-US" dirty="0"/>
+              <a:t>AD_KSWCK</a:t>
+            </a:r>
+          </a:p>
+        </p:txBody>
+      </p:sp>
+      <p:sp>
+        <p:nvSpPr>
+          <p:cNvPr id="7" name="Content Placeholder 6">
+            <a:extLst>
+              <a:ext uri="{FF2B5EF4-FFF2-40B4-BE49-F238E27FC236}">
+                <a16:creationId xmlns:a16="http://schemas.microsoft.com/office/drawing/2014/main" id="{7E74D1FD-1C0B-438F-85A6-EC2867847357}"/>
+              </a:ext>
+            </a:extLst>
+          </p:cNvPr>
+          <p:cNvSpPr>
+            <a:spLocks noGrp="1"/>
+          </p:cNvSpPr>
+          <p:nvPr>
+            <p:ph idx="1"/>
+          </p:nvPr>
+        </p:nvSpPr>
+        <p:spPr>
+          <a:xfrm>
+            <a:off x="838200" y="1825625"/>
+            <a:ext cx="3976396" cy="4351338"/>
+          </a:xfrm>
+        </p:spPr>
+        <p:txBody>
+          <a:bodyPr/>
+          <a:lstStyle/>
+          <a:p>
+            <a:r>
+              <a:rPr lang="en-US" dirty="0"/>
+              <a:t>Three components</a:t>
+            </a:r>
+          </a:p>
+          <a:p>
+            <a:pPr lvl="1"/>
+            <a:r>
+              <a:rPr lang="en-US" dirty="0"/>
+              <a:t>Shasta dam (SHA) release</a:t>
+            </a:r>
+          </a:p>
+          <a:p>
+            <a:pPr lvl="1"/>
+            <a:r>
+              <a:rPr lang="en-US" dirty="0"/>
+              <a:t>Inflow from Spring Creek (SPC)</a:t>
+            </a:r>
+          </a:p>
+          <a:p>
+            <a:pPr lvl="1"/>
+            <a:r>
+              <a:rPr lang="en-US" dirty="0"/>
+              <a:t>Keswick dam release (KES)</a:t>
+            </a:r>
+          </a:p>
+        </p:txBody>
+      </p:sp>
+      <p:pic>
+        <p:nvPicPr>
+          <p:cNvPr id="9" name="Picture 8">
+            <a:extLst>
+              <a:ext uri="{FF2B5EF4-FFF2-40B4-BE49-F238E27FC236}">
+                <a16:creationId xmlns:a16="http://schemas.microsoft.com/office/drawing/2014/main" id="{3AD5F641-5310-48F3-AB82-6D6433A11EEC}"/>
+              </a:ext>
+            </a:extLst>
+          </p:cNvPr>
+          <p:cNvPicPr>
+            <a:picLocks noChangeAspect="1"/>
+          </p:cNvPicPr>
+          <p:nvPr/>
+        </p:nvPicPr>
+        <p:blipFill>
+          <a:blip r:embed="rId2"/>
+          <a:stretch>
+            <a:fillRect/>
+          </a:stretch>
+        </p:blipFill>
+        <p:spPr>
+          <a:xfrm>
+            <a:off x="4814596" y="-30905"/>
+            <a:ext cx="3976396" cy="3578124"/>
+          </a:xfrm>
+          <a:prstGeom prst="rect">
+            <a:avLst/>
+          </a:prstGeom>
+        </p:spPr>
+      </p:pic>
+      <p:pic>
+        <p:nvPicPr>
+          <p:cNvPr id="11" name="Picture 10">
+            <a:extLst>
+              <a:ext uri="{FF2B5EF4-FFF2-40B4-BE49-F238E27FC236}">
+                <a16:creationId xmlns:a16="http://schemas.microsoft.com/office/drawing/2014/main" id="{8A1BBF42-B715-4FCE-AD0F-FCBE39FA49CA}"/>
+              </a:ext>
+            </a:extLst>
+          </p:cNvPr>
+          <p:cNvPicPr>
+            <a:picLocks noChangeAspect="1"/>
+          </p:cNvPicPr>
+          <p:nvPr/>
+        </p:nvPicPr>
+        <p:blipFill>
+          <a:blip r:embed="rId3"/>
+          <a:stretch>
+            <a:fillRect/>
+          </a:stretch>
+        </p:blipFill>
+        <p:spPr>
+          <a:xfrm>
+            <a:off x="8314033" y="-30905"/>
+            <a:ext cx="3877967" cy="3578124"/>
+          </a:xfrm>
+          <a:prstGeom prst="rect">
+            <a:avLst/>
+          </a:prstGeom>
+        </p:spPr>
+      </p:pic>
+      <p:pic>
+        <p:nvPicPr>
+          <p:cNvPr id="13" name="Picture 12">
+            <a:extLst>
+              <a:ext uri="{FF2B5EF4-FFF2-40B4-BE49-F238E27FC236}">
+                <a16:creationId xmlns:a16="http://schemas.microsoft.com/office/drawing/2014/main" id="{9DF600FE-F3D1-4177-8E79-3779937453CC}"/>
+              </a:ext>
+            </a:extLst>
+          </p:cNvPr>
+          <p:cNvPicPr>
+            <a:picLocks noChangeAspect="1"/>
+          </p:cNvPicPr>
+          <p:nvPr/>
+        </p:nvPicPr>
+        <p:blipFill>
+          <a:blip r:embed="rId4"/>
+          <a:stretch>
+            <a:fillRect/>
+          </a:stretch>
+        </p:blipFill>
+        <p:spPr>
+          <a:xfrm>
+            <a:off x="5732690" y="3097164"/>
+            <a:ext cx="3616584" cy="3756171"/>
+          </a:xfrm>
+          <a:prstGeom prst="rect">
+            <a:avLst/>
+          </a:prstGeom>
+        </p:spPr>
+      </p:pic>
+      <p:sp>
+        <p:nvSpPr>
+          <p:cNvPr id="14" name="Rectangle 13">
+            <a:extLst>
+              <a:ext uri="{FF2B5EF4-FFF2-40B4-BE49-F238E27FC236}">
+                <a16:creationId xmlns:a16="http://schemas.microsoft.com/office/drawing/2014/main" id="{6AE452CD-FE14-43D0-BDDF-EA28F62A2C6A}"/>
+              </a:ext>
+            </a:extLst>
+          </p:cNvPr>
+          <p:cNvSpPr/>
+          <p:nvPr/>
+        </p:nvSpPr>
+        <p:spPr>
+          <a:xfrm>
+            <a:off x="5732690" y="2299816"/>
+            <a:ext cx="2211684" cy="219449"/>
+          </a:xfrm>
+          <a:prstGeom prst="rect">
+            <a:avLst/>
+          </a:prstGeom>
+          <a:solidFill>
+            <a:schemeClr val="accent4">
+              <a:alpha val="50000"/>
+            </a:schemeClr>
+          </a:solidFill>
+          <a:ln>
+            <a:noFill/>
+          </a:ln>
+        </p:spPr>
+        <p:style>
+          <a:lnRef idx="0">
+            <a:scrgbClr r="0" g="0" b="0"/>
+          </a:lnRef>
+          <a:fillRef idx="0">
+            <a:scrgbClr r="0" g="0" b="0"/>
+          </a:fillRef>
+          <a:effectRef idx="0">
+            <a:scrgbClr r="0" g="0" b="0"/>
+          </a:effectRef>
+          <a:fontRef idx="minor">
+            <a:schemeClr val="lt1"/>
+          </a:fontRef>
+        </p:style>
+        <p:txBody>
+          <a:bodyPr rtlCol="0" anchor="ctr"/>
+          <a:lstStyle/>
+          <a:p>
+            <a:pPr algn="ctr"/>
+            <a:endParaRPr lang="en-US"/>
+          </a:p>
+        </p:txBody>
+      </p:sp>
+      <p:sp>
+        <p:nvSpPr>
+          <p:cNvPr id="16" name="Rectangle 15">
+            <a:extLst>
+              <a:ext uri="{FF2B5EF4-FFF2-40B4-BE49-F238E27FC236}">
+                <a16:creationId xmlns:a16="http://schemas.microsoft.com/office/drawing/2014/main" id="{D444B4D6-0042-4524-89A6-2AA003E069C8}"/>
+              </a:ext>
+            </a:extLst>
+          </p:cNvPr>
+          <p:cNvSpPr/>
+          <p:nvPr/>
+        </p:nvSpPr>
+        <p:spPr>
+          <a:xfrm>
+            <a:off x="9385654" y="3014572"/>
+            <a:ext cx="2211684" cy="219449"/>
+          </a:xfrm>
+          <a:prstGeom prst="rect">
+            <a:avLst/>
+          </a:prstGeom>
+          <a:solidFill>
+            <a:schemeClr val="accent4">
+              <a:alpha val="50000"/>
+            </a:schemeClr>
+          </a:solidFill>
+          <a:ln>
+            <a:noFill/>
+          </a:ln>
+        </p:spPr>
+        <p:style>
+          <a:lnRef idx="0">
+            <a:scrgbClr r="0" g="0" b="0"/>
+          </a:lnRef>
+          <a:fillRef idx="0">
+            <a:scrgbClr r="0" g="0" b="0"/>
+          </a:fillRef>
+          <a:effectRef idx="0">
+            <a:scrgbClr r="0" g="0" b="0"/>
+          </a:effectRef>
+          <a:fontRef idx="minor">
+            <a:schemeClr val="lt1"/>
+          </a:fontRef>
+        </p:style>
+        <p:txBody>
+          <a:bodyPr rtlCol="0" anchor="ctr"/>
+          <a:lstStyle/>
+          <a:p>
+            <a:pPr algn="ctr"/>
+            <a:endParaRPr lang="en-US"/>
+          </a:p>
+        </p:txBody>
+      </p:sp>
+      <p:sp>
+        <p:nvSpPr>
+          <p:cNvPr id="18" name="Rectangle 17">
+            <a:extLst>
+              <a:ext uri="{FF2B5EF4-FFF2-40B4-BE49-F238E27FC236}">
+                <a16:creationId xmlns:a16="http://schemas.microsoft.com/office/drawing/2014/main" id="{04173248-13B8-4C64-B6F0-383F381BC974}"/>
+              </a:ext>
+            </a:extLst>
+          </p:cNvPr>
+          <p:cNvSpPr/>
+          <p:nvPr/>
+        </p:nvSpPr>
+        <p:spPr>
+          <a:xfrm>
+            <a:off x="6551010" y="5843060"/>
+            <a:ext cx="2211684" cy="219449"/>
+          </a:xfrm>
+          <a:prstGeom prst="rect">
+            <a:avLst/>
+          </a:prstGeom>
+          <a:solidFill>
+            <a:schemeClr val="accent4">
+              <a:alpha val="50000"/>
+            </a:schemeClr>
+          </a:solidFill>
+          <a:ln>
+            <a:noFill/>
+          </a:ln>
+        </p:spPr>
+        <p:style>
+          <a:lnRef idx="0">
+            <a:scrgbClr r="0" g="0" b="0"/>
+          </a:lnRef>
+          <a:fillRef idx="0">
+            <a:scrgbClr r="0" g="0" b="0"/>
+          </a:fillRef>
+          <a:effectRef idx="0">
+            <a:scrgbClr r="0" g="0" b="0"/>
+          </a:effectRef>
+          <a:fontRef idx="minor">
+            <a:schemeClr val="lt1"/>
+          </a:fontRef>
+        </p:style>
+        <p:txBody>
+          <a:bodyPr rtlCol="0" anchor="ctr"/>
+          <a:lstStyle/>
+          <a:p>
+            <a:pPr algn="ctr"/>
+            <a:endParaRPr lang="en-US"/>
+          </a:p>
+        </p:txBody>
+      </p:sp>
+    </p:spTree>
+    <p:extLst>
+      <p:ext uri="{BB962C8B-B14F-4D97-AF65-F5344CB8AC3E}">
+        <p14:creationId xmlns:p14="http://schemas.microsoft.com/office/powerpoint/2010/main" val="1044387095"/>
+      </p:ext>
+    </p:extLst>
+  </p:cSld>
+  <p:clrMapOvr>
+    <a:masterClrMapping/>
+  </p:clrMapOvr>
+</p:sld>
+</file>
+
+<file path=ppt/slides/slide7.xml><?xml version="1.0" encoding="utf-8"?>
+<p:sld xmlns:a="http://schemas.openxmlformats.org/drawingml/2006/main" xmlns:r="http://schemas.openxmlformats.org/officeDocument/2006/relationships" xmlns:p="http://schemas.openxmlformats.org/presentationml/2006/main">
+  <p:cSld>
+    <p:spTree>
+      <p:nvGrpSpPr>
+        <p:cNvPr id="1" name=""/>
+        <p:cNvGrpSpPr/>
+        <p:nvPr/>
+      </p:nvGrpSpPr>
+      <p:grpSpPr>
+        <a:xfrm>
+          <a:off x="0" y="0"/>
+          <a:ext cx="0" cy="0"/>
+          <a:chOff x="0" y="0"/>
+          <a:chExt cx="0" cy="0"/>
+        </a:xfrm>
+      </p:grpSpPr>
+      <p:pic>
+        <p:nvPicPr>
+          <p:cNvPr id="16" name="Picture 15">
+            <a:extLst>
+              <a:ext uri="{FF2B5EF4-FFF2-40B4-BE49-F238E27FC236}">
+                <a16:creationId xmlns:a16="http://schemas.microsoft.com/office/drawing/2014/main" id="{DD43DAD0-26C3-446B-B301-D236B9F45479}"/>
+              </a:ext>
+            </a:extLst>
+          </p:cNvPr>
+          <p:cNvPicPr>
+            <a:picLocks noChangeAspect="1"/>
+          </p:cNvPicPr>
+          <p:nvPr/>
+        </p:nvPicPr>
+        <p:blipFill>
+          <a:blip r:embed="rId2"/>
+          <a:stretch>
+            <a:fillRect/>
+          </a:stretch>
+        </p:blipFill>
+        <p:spPr>
+          <a:xfrm>
+            <a:off x="8334375" y="92081"/>
+            <a:ext cx="3857625" cy="5067300"/>
+          </a:xfrm>
+          <a:prstGeom prst="rect">
+            <a:avLst/>
+          </a:prstGeom>
+        </p:spPr>
+      </p:pic>
+      <p:sp>
+        <p:nvSpPr>
+          <p:cNvPr id="2" name="Title 1">
+            <a:extLst>
+              <a:ext uri="{FF2B5EF4-FFF2-40B4-BE49-F238E27FC236}">
+                <a16:creationId xmlns:a16="http://schemas.microsoft.com/office/drawing/2014/main" id="{E5F551E8-3546-4F14-A7BC-4932BDF30BC9}"/>
+              </a:ext>
+            </a:extLst>
+          </p:cNvPr>
+          <p:cNvSpPr>
+            <a:spLocks noGrp="1"/>
+          </p:cNvSpPr>
+          <p:nvPr>
+            <p:ph type="title"/>
+          </p:nvPr>
+        </p:nvSpPr>
+        <p:spPr/>
+        <p:txBody>
+          <a:bodyPr/>
+          <a:lstStyle/>
+          <a:p>
+            <a:r>
+              <a:rPr lang="en-US" dirty="0"/>
+              <a:t>Connaughton (2014)</a:t>
+            </a:r>
+          </a:p>
+        </p:txBody>
+      </p:sp>
+      <p:sp>
+        <p:nvSpPr>
+          <p:cNvPr id="3" name="Content Placeholder 2">
+            <a:extLst>
+              <a:ext uri="{FF2B5EF4-FFF2-40B4-BE49-F238E27FC236}">
+                <a16:creationId xmlns:a16="http://schemas.microsoft.com/office/drawing/2014/main" id="{4275C737-83A4-4227-A4E3-E918F5CBB3DB}"/>
+              </a:ext>
+            </a:extLst>
+          </p:cNvPr>
+          <p:cNvSpPr>
+            <a:spLocks noGrp="1"/>
+          </p:cNvSpPr>
+          <p:nvPr>
+            <p:ph idx="1"/>
+          </p:nvPr>
+        </p:nvSpPr>
+        <p:spPr>
+          <a:xfrm>
+            <a:off x="838200" y="1825625"/>
+            <a:ext cx="4023049" cy="4351338"/>
+          </a:xfrm>
+        </p:spPr>
+        <p:txBody>
+          <a:bodyPr/>
+          <a:lstStyle/>
+          <a:p>
+            <a:r>
+              <a:rPr lang="en-US" dirty="0"/>
+              <a:t>Sacramento Valley Integrated Reservoir Optimization Model (SVIROM): Flood Control linear program</a:t>
+            </a:r>
+          </a:p>
+          <a:p>
+            <a:r>
+              <a:rPr lang="en-US" dirty="0"/>
+              <a:t>Provided appendix with derived Muskingum routing coefficients</a:t>
+            </a:r>
+          </a:p>
+          <a:p>
+            <a:r>
+              <a:rPr lang="en-US" dirty="0"/>
+              <a:t>Reach 16 would be</a:t>
+            </a:r>
+          </a:p>
+        </p:txBody>
+      </p:sp>
+      <p:sp>
+        <p:nvSpPr>
+          <p:cNvPr id="6" name="Oval 5">
+            <a:extLst>
+              <a:ext uri="{FF2B5EF4-FFF2-40B4-BE49-F238E27FC236}">
+                <a16:creationId xmlns:a16="http://schemas.microsoft.com/office/drawing/2014/main" id="{8263B379-F6D1-4A6B-BEBB-BC9F61839404}"/>
+              </a:ext>
+            </a:extLst>
+          </p:cNvPr>
+          <p:cNvSpPr/>
+          <p:nvPr/>
+        </p:nvSpPr>
+        <p:spPr>
+          <a:xfrm>
+            <a:off x="8852937" y="2883715"/>
+            <a:ext cx="940167" cy="545285"/>
+          </a:xfrm>
+          <a:prstGeom prst="ellipse">
+            <a:avLst/>
+          </a:prstGeom>
+          <a:noFill/>
+          <a:ln w="9525" cap="flat" cmpd="sng" algn="ctr">
+            <a:solidFill>
+              <a:schemeClr val="accent5"/>
+            </a:solidFill>
+            <a:prstDash val="solid"/>
+            <a:round/>
+            <a:headEnd type="none" w="med" len="med"/>
+            <a:tailEnd type="none" w="med" len="med"/>
+          </a:ln>
+        </p:spPr>
+        <p:style>
+          <a:lnRef idx="0">
+            <a:scrgbClr r="0" g="0" b="0"/>
+          </a:lnRef>
+          <a:fillRef idx="0">
+            <a:scrgbClr r="0" g="0" b="0"/>
+          </a:fillRef>
+          <a:effectRef idx="0">
+            <a:scrgbClr r="0" g="0" b="0"/>
+          </a:effectRef>
+          <a:fontRef idx="minor">
+            <a:schemeClr val="accent5"/>
+          </a:fontRef>
+        </p:style>
+        <p:txBody>
+          <a:bodyPr rtlCol="0" anchor="ctr"/>
+          <a:lstStyle/>
+          <a:p>
+            <a:pPr algn="ctr"/>
+            <a:endParaRPr lang="en-US"/>
+          </a:p>
+        </p:txBody>
+      </p:sp>
+      <p:sp>
+        <p:nvSpPr>
+          <p:cNvPr id="12" name="Oval 11">
+            <a:extLst>
+              <a:ext uri="{FF2B5EF4-FFF2-40B4-BE49-F238E27FC236}">
+                <a16:creationId xmlns:a16="http://schemas.microsoft.com/office/drawing/2014/main" id="{3BC83BAB-09A8-45B8-8BE8-0843D7E73E62}"/>
+              </a:ext>
+            </a:extLst>
+          </p:cNvPr>
+          <p:cNvSpPr/>
+          <p:nvPr/>
+        </p:nvSpPr>
+        <p:spPr>
+          <a:xfrm>
+            <a:off x="9323020" y="3456009"/>
+            <a:ext cx="940167" cy="545285"/>
+          </a:xfrm>
+          <a:prstGeom prst="ellipse">
+            <a:avLst/>
+          </a:prstGeom>
+          <a:noFill/>
+          <a:ln w="9525" cap="flat" cmpd="sng" algn="ctr">
+            <a:solidFill>
+              <a:schemeClr val="accent5"/>
+            </a:solidFill>
+            <a:prstDash val="solid"/>
+            <a:round/>
+            <a:headEnd type="none" w="med" len="med"/>
+            <a:tailEnd type="none" w="med" len="med"/>
+          </a:ln>
+        </p:spPr>
+        <p:style>
+          <a:lnRef idx="0">
+            <a:scrgbClr r="0" g="0" b="0"/>
+          </a:lnRef>
+          <a:fillRef idx="0">
+            <a:scrgbClr r="0" g="0" b="0"/>
+          </a:fillRef>
+          <a:effectRef idx="0">
+            <a:scrgbClr r="0" g="0" b="0"/>
+          </a:effectRef>
+          <a:fontRef idx="minor">
+            <a:schemeClr val="accent5"/>
+          </a:fontRef>
+        </p:style>
+        <p:txBody>
+          <a:bodyPr rtlCol="0" anchor="ctr"/>
+          <a:lstStyle/>
+          <a:p>
+            <a:pPr algn="ctr"/>
+            <a:endParaRPr lang="en-US"/>
+          </a:p>
+        </p:txBody>
+      </p:sp>
+      <p:pic>
+        <p:nvPicPr>
+          <p:cNvPr id="14" name="Picture 13">
+            <a:extLst>
+              <a:ext uri="{FF2B5EF4-FFF2-40B4-BE49-F238E27FC236}">
+                <a16:creationId xmlns:a16="http://schemas.microsoft.com/office/drawing/2014/main" id="{87CB35CD-8EE0-4204-86A3-7515F0DF3D80}"/>
+              </a:ext>
+            </a:extLst>
+          </p:cNvPr>
+          <p:cNvPicPr>
+            <a:picLocks noChangeAspect="1"/>
+          </p:cNvPicPr>
+          <p:nvPr/>
+        </p:nvPicPr>
+        <p:blipFill>
+          <a:blip r:embed="rId3"/>
+          <a:stretch>
+            <a:fillRect/>
+          </a:stretch>
+        </p:blipFill>
+        <p:spPr>
+          <a:xfrm>
+            <a:off x="5019016" y="1373696"/>
+            <a:ext cx="3315359" cy="2726651"/>
+          </a:xfrm>
+          <a:prstGeom prst="rect">
+            <a:avLst/>
+          </a:prstGeom>
+        </p:spPr>
+      </p:pic>
+    </p:spTree>
+    <p:extLst>
+      <p:ext uri="{BB962C8B-B14F-4D97-AF65-F5344CB8AC3E}">
+        <p14:creationId xmlns:p14="http://schemas.microsoft.com/office/powerpoint/2010/main" val="2930355119"/>
+      </p:ext>
+    </p:extLst>
+  </p:cSld>
+  <p:clrMapOvr>
+    <a:masterClrMapping/>
+  </p:clrMapOvr>
+</p:sld>
+</file>
+
+<file path=ppt/slides/slide8.xml><?xml version="1.0" encoding="utf-8"?>
+<p:sld xmlns:a="http://schemas.openxmlformats.org/drawingml/2006/main" xmlns:r="http://schemas.openxmlformats.org/officeDocument/2006/relationships" xmlns:p="http://schemas.openxmlformats.org/presentationml/2006/main">
+  <p:cSld>
+    <p:spTree>
+      <p:nvGrpSpPr>
+        <p:cNvPr id="1" name=""/>
+        <p:cNvGrpSpPr/>
+        <p:nvPr/>
+      </p:nvGrpSpPr>
+      <p:grpSpPr>
+        <a:xfrm>
+          <a:off x="0" y="0"/>
+          <a:ext cx="0" cy="0"/>
+          <a:chOff x="0" y="0"/>
+          <a:chExt cx="0" cy="0"/>
+        </a:xfrm>
+      </p:grpSpPr>
+      <p:sp>
+        <p:nvSpPr>
+          <p:cNvPr id="2" name="Title 1">
+            <a:extLst>
+              <a:ext uri="{FF2B5EF4-FFF2-40B4-BE49-F238E27FC236}">
+                <a16:creationId xmlns:a16="http://schemas.microsoft.com/office/drawing/2014/main" id="{E08DB0DA-9A89-4CA0-9238-1BF41EF627C8}"/>
+              </a:ext>
+            </a:extLst>
+          </p:cNvPr>
+          <p:cNvSpPr>
+            <a:spLocks noGrp="1"/>
+          </p:cNvSpPr>
+          <p:nvPr>
+            <p:ph type="title"/>
+          </p:nvPr>
+        </p:nvSpPr>
+        <p:spPr/>
+        <p:txBody>
+          <a:bodyPr/>
+          <a:lstStyle/>
+          <a:p>
+            <a:r>
+              <a:rPr lang="en-US" dirty="0"/>
+              <a:t>CalLite schematic</a:t>
+            </a:r>
+          </a:p>
+        </p:txBody>
+      </p:sp>
+      <mc:AlternateContent xmlns:mc="http://schemas.openxmlformats.org/markup-compatibility/2006">
+        <mc:Choice xmlns:a14="http://schemas.microsoft.com/office/drawing/2010/main" Requires="a14">
+          <p:sp>
+            <p:nvSpPr>
+              <p:cNvPr id="3" name="Content Placeholder 2">
+                <a:extLst>
+                  <a:ext uri="{FF2B5EF4-FFF2-40B4-BE49-F238E27FC236}">
+                    <a16:creationId xmlns:a16="http://schemas.microsoft.com/office/drawing/2014/main" id="{2BF081CE-547C-4BE8-95E4-5E7EAF088456}"/>
+                  </a:ext>
+                </a:extLst>
+              </p:cNvPr>
+              <p:cNvSpPr>
+                <a:spLocks noGrp="1"/>
+              </p:cNvSpPr>
+              <p:nvPr>
+                <p:ph idx="1"/>
+              </p:nvPr>
+            </p:nvSpPr>
+            <p:spPr>
+              <a:xfrm>
+                <a:off x="2768664" y="3869037"/>
+                <a:ext cx="10515600" cy="900288"/>
+              </a:xfrm>
+            </p:spPr>
+            <p:txBody>
+              <a:bodyPr>
+                <a:normAutofit/>
+              </a:bodyPr>
+              <a:lstStyle/>
+              <a:p>
+                <a:pPr marL="0" indent="0">
+                  <a:buNone/>
+                </a:pPr>
+                <a14:m>
+                  <m:oMathPara xmlns:m="http://schemas.openxmlformats.org/officeDocument/2006/math">
+                    <m:oMathParaPr>
+                      <m:jc m:val="centerGroup"/>
+                    </m:oMathParaPr>
+                    <m:oMath xmlns:m="http://schemas.openxmlformats.org/officeDocument/2006/math">
+                      <m:r>
+                        <a:rPr lang="en-US" sz="1800" b="0" i="1" smtClean="0">
+                          <a:latin typeface="Cambria Math" panose="02040503050406030204" pitchFamily="18" charset="0"/>
+                        </a:rPr>
+                        <m:t>𝐶𝑇𝐻𝐸𝑅𝑀</m:t>
+                      </m:r>
+                      <m:r>
+                        <a:rPr lang="en-US" sz="1800" b="0" i="1" smtClean="0">
+                          <a:latin typeface="Cambria Math" panose="02040503050406030204" pitchFamily="18" charset="0"/>
+                        </a:rPr>
+                        <m:t>=</m:t>
+                      </m:r>
+                      <m:sSub>
+                        <m:sSubPr>
+                          <m:ctrlPr>
+                            <a:rPr lang="en-US" sz="1800" b="0" i="1" smtClean="0">
+                              <a:latin typeface="Cambria Math" panose="02040503050406030204" pitchFamily="18" charset="0"/>
+                            </a:rPr>
+                          </m:ctrlPr>
+                        </m:sSubPr>
+                        <m:e>
+                          <m:r>
+                            <a:rPr lang="en-US" sz="1800" b="0" i="1" smtClean="0">
+                              <a:latin typeface="Cambria Math" panose="02040503050406030204" pitchFamily="18" charset="0"/>
+                            </a:rPr>
+                            <m:t>𝐶</m:t>
+                          </m:r>
+                        </m:e>
+                        <m:sub>
+                          <m:r>
+                            <a:rPr lang="en-US" sz="1800" b="0" i="1" smtClean="0">
+                              <a:latin typeface="Cambria Math" panose="02040503050406030204" pitchFamily="18" charset="0"/>
+                            </a:rPr>
+                            <m:t>0</m:t>
+                          </m:r>
+                        </m:sub>
+                      </m:sSub>
+                      <m:r>
+                        <a:rPr lang="en-US" sz="1800" b="0" i="1" smtClean="0">
+                          <a:latin typeface="Cambria Math" panose="02040503050406030204" pitchFamily="18" charset="0"/>
+                        </a:rPr>
+                        <m:t>𝐶𝑂𝑅𝑂𝑉𝐿</m:t>
+                      </m:r>
+                      <m:r>
+                        <a:rPr lang="en-US" sz="1800" b="0" i="1" smtClean="0">
+                          <a:latin typeface="Cambria Math" panose="02040503050406030204" pitchFamily="18" charset="0"/>
+                        </a:rPr>
+                        <m:t>+</m:t>
+                      </m:r>
+                      <m:sSub>
+                        <m:sSubPr>
+                          <m:ctrlPr>
+                            <a:rPr lang="en-US" sz="1800" b="0" i="1" smtClean="0">
+                              <a:latin typeface="Cambria Math" panose="02040503050406030204" pitchFamily="18" charset="0"/>
+                            </a:rPr>
+                          </m:ctrlPr>
+                        </m:sSubPr>
+                        <m:e>
+                          <m:r>
+                            <a:rPr lang="en-US" sz="1800" b="0" i="1" smtClean="0">
+                              <a:latin typeface="Cambria Math" panose="02040503050406030204" pitchFamily="18" charset="0"/>
+                            </a:rPr>
+                            <m:t>𝐶</m:t>
+                          </m:r>
+                        </m:e>
+                        <m:sub>
+                          <m:r>
+                            <a:rPr lang="en-US" sz="1800" b="0" i="1" smtClean="0">
+                              <a:latin typeface="Cambria Math" panose="02040503050406030204" pitchFamily="18" charset="0"/>
+                            </a:rPr>
+                            <m:t>1</m:t>
+                          </m:r>
+                        </m:sub>
+                      </m:sSub>
+                      <m:r>
+                        <a:rPr lang="en-US" sz="1800" b="0" i="1" smtClean="0">
+                          <a:latin typeface="Cambria Math" panose="02040503050406030204" pitchFamily="18" charset="0"/>
+                        </a:rPr>
+                        <m:t>𝐶𝑂𝑅𝑂𝑉𝐿</m:t>
+                      </m:r>
+                      <m:d>
+                        <m:dPr>
+                          <m:ctrlPr>
+                            <a:rPr lang="en-US" sz="1800" b="0" i="1" smtClean="0">
+                              <a:latin typeface="Cambria Math" panose="02040503050406030204" pitchFamily="18" charset="0"/>
+                            </a:rPr>
+                          </m:ctrlPr>
+                        </m:dPr>
+                        <m:e>
+                          <m:r>
+                            <a:rPr lang="en-US" sz="1800" b="0" i="1" smtClean="0">
+                              <a:latin typeface="Cambria Math" panose="02040503050406030204" pitchFamily="18" charset="0"/>
+                            </a:rPr>
+                            <m:t>−1</m:t>
+                          </m:r>
+                        </m:e>
+                      </m:d>
+                      <m:r>
+                        <a:rPr lang="en-US" sz="1800" b="0" i="1" smtClean="0">
+                          <a:latin typeface="Cambria Math" panose="02040503050406030204" pitchFamily="18" charset="0"/>
+                        </a:rPr>
+                        <m:t>+</m:t>
+                      </m:r>
+                      <m:sSub>
+                        <m:sSubPr>
+                          <m:ctrlPr>
+                            <a:rPr lang="en-US" sz="1800" b="0" i="1" smtClean="0">
+                              <a:latin typeface="Cambria Math" panose="02040503050406030204" pitchFamily="18" charset="0"/>
+                            </a:rPr>
+                          </m:ctrlPr>
+                        </m:sSubPr>
+                        <m:e>
+                          <m:r>
+                            <a:rPr lang="en-US" sz="1800" b="0" i="1" smtClean="0">
+                              <a:latin typeface="Cambria Math" panose="02040503050406030204" pitchFamily="18" charset="0"/>
+                            </a:rPr>
+                            <m:t>𝐶</m:t>
+                          </m:r>
+                        </m:e>
+                        <m:sub>
+                          <m:r>
+                            <a:rPr lang="en-US" sz="1800" b="0" i="1" smtClean="0">
+                              <a:latin typeface="Cambria Math" panose="02040503050406030204" pitchFamily="18" charset="0"/>
+                            </a:rPr>
+                            <m:t>2</m:t>
+                          </m:r>
+                        </m:sub>
+                      </m:sSub>
+                      <m:r>
+                        <a:rPr lang="en-US" sz="1800" b="0" i="1" smtClean="0">
+                          <a:latin typeface="Cambria Math" panose="02040503050406030204" pitchFamily="18" charset="0"/>
+                        </a:rPr>
+                        <m:t>𝐶𝑇𝐻𝐸𝑅𝑀</m:t>
+                      </m:r>
+                      <m:r>
+                        <a:rPr lang="en-US" sz="1800" b="0" i="1" smtClean="0">
+                          <a:latin typeface="Cambria Math" panose="02040503050406030204" pitchFamily="18" charset="0"/>
+                        </a:rPr>
+                        <m:t>(−1)</m:t>
+                      </m:r>
+                    </m:oMath>
+                  </m:oMathPara>
+                </a14:m>
+                <a:endParaRPr lang="en-US" sz="1800" dirty="0"/>
+              </a:p>
+            </p:txBody>
+          </p:sp>
+        </mc:Choice>
+        <mc:Fallback>
+          <p:sp>
+            <p:nvSpPr>
+              <p:cNvPr id="3" name="Content Placeholder 2">
+                <a:extLst>
+                  <a:ext uri="{FF2B5EF4-FFF2-40B4-BE49-F238E27FC236}">
+                    <a16:creationId xmlns:a16="http://schemas.microsoft.com/office/drawing/2014/main" id="{2BF081CE-547C-4BE8-95E4-5E7EAF088456}"/>
+                  </a:ext>
+                </a:extLst>
+              </p:cNvPr>
+              <p:cNvSpPr>
+                <a:spLocks noGrp="1" noRot="1" noChangeAspect="1" noMove="1" noResize="1" noEditPoints="1" noAdjustHandles="1" noChangeArrowheads="1" noChangeShapeType="1" noTextEdit="1"/>
+              </p:cNvSpPr>
+              <p:nvPr>
+                <p:ph idx="1"/>
+              </p:nvPr>
+            </p:nvSpPr>
+            <p:spPr>
+              <a:xfrm>
+                <a:off x="2768664" y="3869037"/>
+                <a:ext cx="10515600" cy="900288"/>
+              </a:xfrm>
+              <a:blipFill>
+                <a:blip r:embed="rId2"/>
+                <a:stretch>
+                  <a:fillRect/>
+                </a:stretch>
+              </a:blipFill>
+            </p:spPr>
+            <p:txBody>
+              <a:bodyPr/>
+              <a:lstStyle/>
+              <a:p>
+                <a:r>
+                  <a:rPr lang="en-US">
+                    <a:noFill/>
+                  </a:rPr>
+                  <a:t> </a:t>
+                </a:r>
+              </a:p>
+            </p:txBody>
+          </p:sp>
+        </mc:Fallback>
+      </mc:AlternateContent>
+      <p:pic>
+        <p:nvPicPr>
+          <p:cNvPr id="9" name="Picture 8">
+            <a:extLst>
+              <a:ext uri="{FF2B5EF4-FFF2-40B4-BE49-F238E27FC236}">
+                <a16:creationId xmlns:a16="http://schemas.microsoft.com/office/drawing/2014/main" id="{135F27D2-BCE0-4AD4-A23C-97CC790593AD}"/>
+              </a:ext>
+            </a:extLst>
+          </p:cNvPr>
+          <p:cNvPicPr>
+            <a:picLocks noChangeAspect="1"/>
+          </p:cNvPicPr>
+          <p:nvPr/>
+        </p:nvPicPr>
+        <p:blipFill>
+          <a:blip r:embed="rId3"/>
+          <a:stretch>
+            <a:fillRect/>
+          </a:stretch>
+        </p:blipFill>
+        <p:spPr>
+          <a:xfrm>
+            <a:off x="4833257" y="2024583"/>
+            <a:ext cx="6520543" cy="1204598"/>
+          </a:xfrm>
+          <a:prstGeom prst="rect">
+            <a:avLst/>
+          </a:prstGeom>
+        </p:spPr>
+      </p:pic>
+      <p:pic>
+        <p:nvPicPr>
+          <p:cNvPr id="13" name="Picture 12">
+            <a:extLst>
+              <a:ext uri="{FF2B5EF4-FFF2-40B4-BE49-F238E27FC236}">
+                <a16:creationId xmlns:a16="http://schemas.microsoft.com/office/drawing/2014/main" id="{A9B55F04-8AC8-4670-9DAD-4BCDA67649A4}"/>
+              </a:ext>
+            </a:extLst>
+          </p:cNvPr>
+          <p:cNvPicPr>
+            <a:picLocks noChangeAspect="1"/>
+          </p:cNvPicPr>
+          <p:nvPr/>
+        </p:nvPicPr>
+        <p:blipFill>
+          <a:blip r:embed="rId4"/>
+          <a:stretch>
+            <a:fillRect/>
+          </a:stretch>
+        </p:blipFill>
+        <p:spPr>
+          <a:xfrm>
+            <a:off x="807319" y="1690688"/>
+            <a:ext cx="4025938" cy="3821412"/>
+          </a:xfrm>
+          <a:prstGeom prst="rect">
+            <a:avLst/>
+          </a:prstGeom>
+        </p:spPr>
+      </p:pic>
+    </p:spTree>
+    <p:extLst>
+      <p:ext uri="{BB962C8B-B14F-4D97-AF65-F5344CB8AC3E}">
+        <p14:creationId xmlns:p14="http://schemas.microsoft.com/office/powerpoint/2010/main" val="385123665"/>
+      </p:ext>
+    </p:extLst>
+  </p:cSld>
+  <p:clrMapOvr>
+    <a:masterClrMapping/>
+  </p:clrMapOvr>
+</p:sld>
+</file>
+
+<file path=ppt/slides/slide9.xml><?xml version="1.0" encoding="utf-8"?>
+<p:sld xmlns:a="http://schemas.openxmlformats.org/drawingml/2006/main" xmlns:r="http://schemas.openxmlformats.org/officeDocument/2006/relationships" xmlns:p="http://schemas.openxmlformats.org/presentationml/2006/main" show="0">
   <p:cSld>
     <p:bg>
       <p:bgPr>
@@ -4933,7 +7215,42 @@
         <p:spPr>
           <a:xfrm>
             <a:off x="648929" y="629266"/>
-            <a:ext cx="3505495" cy="1622321"/>
+            <a:ext cx="3663012" cy="989809"/>
+          </a:xfrm>
+        </p:spPr>
+        <p:txBody>
+          <a:bodyPr>
+            <a:normAutofit fontScale="90000"/>
+          </a:bodyPr>
+          <a:lstStyle/>
+          <a:p>
+            <a:r>
+              <a:rPr lang="en-US" dirty="0"/>
+              <a:t>Phase 1.1 – Oroville dam and outflow only</a:t>
+            </a:r>
+          </a:p>
+        </p:txBody>
+      </p:sp>
+      <p:sp>
+        <p:nvSpPr>
+          <p:cNvPr id="3" name="Content Placeholder 2">
+            <a:extLst>
+              <a:ext uri="{FF2B5EF4-FFF2-40B4-BE49-F238E27FC236}">
+                <a16:creationId xmlns:a16="http://schemas.microsoft.com/office/drawing/2014/main" id="{319E246B-3D2E-438E-BEED-6A615B92177C}"/>
+              </a:ext>
+            </a:extLst>
+          </p:cNvPr>
+          <p:cNvSpPr>
+            <a:spLocks noGrp="1"/>
+          </p:cNvSpPr>
+          <p:nvPr>
+            <p:ph idx="1"/>
+          </p:nvPr>
+        </p:nvSpPr>
+        <p:spPr>
+          <a:xfrm>
+            <a:off x="648931" y="1847462"/>
+            <a:ext cx="3505494" cy="4376358"/>
           </a:xfrm>
         </p:spPr>
         <p:txBody>
@@ -4943,48 +7260,41 @@
           <a:lstStyle/>
           <a:p>
             <a:r>
-              <a:rPr lang="en-US" sz="3400" dirty="0"/>
-              <a:t>Phase 1.2 – Include Oroville deliveries</a:t>
-            </a:r>
-          </a:p>
-        </p:txBody>
-      </p:sp>
-      <p:sp>
-        <p:nvSpPr>
-          <p:cNvPr id="3" name="Content Placeholder 2">
-            <a:extLst>
-              <a:ext uri="{FF2B5EF4-FFF2-40B4-BE49-F238E27FC236}">
-                <a16:creationId xmlns:a16="http://schemas.microsoft.com/office/drawing/2014/main" id="{319E246B-3D2E-438E-BEED-6A615B92177C}"/>
-              </a:ext>
-            </a:extLst>
-          </p:cNvPr>
-          <p:cNvSpPr>
-            <a:spLocks noGrp="1"/>
-          </p:cNvSpPr>
-          <p:nvPr>
-            <p:ph idx="1"/>
-          </p:nvPr>
-        </p:nvSpPr>
-        <p:spPr>
-          <a:xfrm>
-            <a:off x="648931" y="2438400"/>
-            <a:ext cx="3505494" cy="3785419"/>
-          </a:xfrm>
-        </p:spPr>
-        <p:txBody>
-          <a:bodyPr>
-            <a:normAutofit/>
-          </a:bodyPr>
-          <a:lstStyle/>
-          <a:p>
-            <a:r>
               <a:rPr lang="en-US" sz="2000" dirty="0"/>
-              <a:t>Include D_OROVL missing from previous step</a:t>
-            </a:r>
-          </a:p>
-          <a:p>
+              <a:t>Develop very simple model</a:t>
+            </a:r>
+          </a:p>
+          <a:p>
+            <a:pPr lvl="1"/>
             <a:r>
               <a:rPr lang="en-US" sz="2000" dirty="0"/>
+              <a:t>Inflow to Oroville reservoir</a:t>
+            </a:r>
+          </a:p>
+          <a:p>
+            <a:pPr lvl="1"/>
+            <a:r>
+              <a:rPr lang="en-US" sz="2000" dirty="0"/>
+              <a:t>Oroville reservoir storage</a:t>
+            </a:r>
+          </a:p>
+          <a:p>
+            <a:pPr lvl="1"/>
+            <a:r>
+              <a:rPr lang="en-US" sz="2000" dirty="0"/>
+              <a:t>Release from Oroville storage </a:t>
+            </a:r>
+          </a:p>
+          <a:p>
+            <a:pPr lvl="1"/>
+            <a:r>
+              <a:rPr lang="en-US" sz="2000" dirty="0"/>
+              <a:t>No deliveries/demands yet</a:t>
+            </a:r>
+          </a:p>
+          <a:p>
+            <a:r>
+              <a:rPr lang="en-US" sz="2400" dirty="0"/>
               <a:t>Output</a:t>
             </a:r>
           </a:p>
@@ -4992,14 +7302,14 @@
             <a:pPr lvl="1"/>
             <a:r>
               <a:rPr lang="en-US" sz="2000" dirty="0"/>
-              <a:t>Oroville releases, storage, deliveries</a:t>
-            </a:r>
-          </a:p>
-        </p:txBody>
-      </p:sp>
-      <p:sp>
-        <p:nvSpPr>
-          <p:cNvPr id="31" name="Rectangle 30">
+              <a:t>Daily Oroville releases</a:t>
+            </a:r>
+          </a:p>
+        </p:txBody>
+      </p:sp>
+      <p:sp>
+        <p:nvSpPr>
+          <p:cNvPr id="18" name="Rectangle 11">
             <a:extLst>
               <a:ext uri="{FF2B5EF4-FFF2-40B4-BE49-F238E27FC236}">
                 <a16:creationId xmlns:a16="http://schemas.microsoft.com/office/drawing/2014/main" id="{5E39A796-BE83-48B1-B33F-35C4A32AAB57}"/>
@@ -5062,7 +7372,7 @@
       </p:sp>
       <p:sp>
         <p:nvSpPr>
-          <p:cNvPr id="33" name="Rounded Rectangle 9">
+          <p:cNvPr id="19" name="Rounded Rectangle 9">
             <a:extLst>
               <a:ext uri="{FF2B5EF4-FFF2-40B4-BE49-F238E27FC236}">
                 <a16:creationId xmlns:a16="http://schemas.microsoft.com/office/drawing/2014/main" id="{72F84B47-E267-4194-8194-831DB7B5547F}"/>
@@ -5136,10 +7446,10 @@
       </p:sp>
       <p:pic>
         <p:nvPicPr>
-          <p:cNvPr id="8" name="Picture 7">
-            <a:extLst>
-              <a:ext uri="{FF2B5EF4-FFF2-40B4-BE49-F238E27FC236}">
-                <a16:creationId xmlns:a16="http://schemas.microsoft.com/office/drawing/2014/main" id="{D2870AF7-B942-4FB7-895B-E7FA99F0BE2E}"/>
+          <p:cNvPr id="7" name="Picture 6">
+            <a:extLst>
+              <a:ext uri="{FF2B5EF4-FFF2-40B4-BE49-F238E27FC236}">
+                <a16:creationId xmlns:a16="http://schemas.microsoft.com/office/drawing/2014/main" id="{191BED70-9C29-4432-8DE4-262377C5023B}"/>
               </a:ext>
             </a:extLst>
           </p:cNvPr>
@@ -5148,16 +7458,15 @@
           </p:cNvPicPr>
           <p:nvPr/>
         </p:nvPicPr>
-        <p:blipFill>
+        <p:blipFill rotWithShape="1">
           <a:blip r:embed="rId2"/>
-          <a:stretch>
-            <a:fillRect/>
-          </a:stretch>
+          <a:srcRect r="24743"/>
+          <a:stretch/>
         </p:blipFill>
         <p:spPr>
           <a:xfrm>
-            <a:off x="5567936" y="807593"/>
-            <a:ext cx="5695183" cy="5239568"/>
+            <a:off x="6162303" y="807593"/>
+            <a:ext cx="4506448" cy="5239568"/>
           </a:xfrm>
           <a:prstGeom prst="rect">
             <a:avLst/>
@@ -5168,855 +7477,7 @@
     </p:spTree>
     <p:extLst>
       <p:ext uri="{BB962C8B-B14F-4D97-AF65-F5344CB8AC3E}">
-        <p14:creationId xmlns:p14="http://schemas.microsoft.com/office/powerpoint/2010/main" val="1067204752"/>
-      </p:ext>
-    </p:extLst>
-  </p:cSld>
-  <p:clrMapOvr>
-    <a:masterClrMapping/>
-  </p:clrMapOvr>
-</p:sld>
-</file>
-
-<file path=ppt/slides/slide7.xml><?xml version="1.0" encoding="utf-8"?>
-<p:sld xmlns:a="http://schemas.openxmlformats.org/drawingml/2006/main" xmlns:r="http://schemas.openxmlformats.org/officeDocument/2006/relationships" xmlns:p="http://schemas.openxmlformats.org/presentationml/2006/main">
-  <p:cSld>
-    <p:bg>
-      <p:bgPr>
-        <a:solidFill>
-          <a:schemeClr val="bg1"/>
-        </a:solidFill>
-        <a:effectLst/>
-      </p:bgPr>
-    </p:bg>
-    <p:spTree>
-      <p:nvGrpSpPr>
-        <p:cNvPr id="1" name=""/>
-        <p:cNvGrpSpPr/>
-        <p:nvPr/>
-      </p:nvGrpSpPr>
-      <p:grpSpPr>
-        <a:xfrm>
-          <a:off x="0" y="0"/>
-          <a:ext cx="0" cy="0"/>
-          <a:chOff x="0" y="0"/>
-          <a:chExt cx="0" cy="0"/>
-        </a:xfrm>
-      </p:grpSpPr>
-      <p:sp>
-        <p:nvSpPr>
-          <p:cNvPr id="2" name="Title 1">
-            <a:extLst>
-              <a:ext uri="{FF2B5EF4-FFF2-40B4-BE49-F238E27FC236}">
-                <a16:creationId xmlns:a16="http://schemas.microsoft.com/office/drawing/2014/main" id="{4F87C7D5-4E35-46C7-A5AB-3569E12C88CF}"/>
-              </a:ext>
-            </a:extLst>
-          </p:cNvPr>
-          <p:cNvSpPr>
-            <a:spLocks noGrp="1"/>
-          </p:cNvSpPr>
-          <p:nvPr>
-            <p:ph type="title"/>
-          </p:nvPr>
-        </p:nvSpPr>
-        <p:spPr>
-          <a:xfrm>
-            <a:off x="648929" y="629266"/>
-            <a:ext cx="3505495" cy="1622321"/>
-          </a:xfrm>
-        </p:spPr>
-        <p:txBody>
-          <a:bodyPr>
-            <a:normAutofit/>
-          </a:bodyPr>
-          <a:lstStyle/>
-          <a:p>
-            <a:r>
-              <a:rPr lang="en-US" sz="3700"/>
-              <a:t>Phase 1.3 – Include Thermalito node</a:t>
-            </a:r>
-          </a:p>
-        </p:txBody>
-      </p:sp>
-      <p:sp>
-        <p:nvSpPr>
-          <p:cNvPr id="3" name="Content Placeholder 2">
-            <a:extLst>
-              <a:ext uri="{FF2B5EF4-FFF2-40B4-BE49-F238E27FC236}">
-                <a16:creationId xmlns:a16="http://schemas.microsoft.com/office/drawing/2014/main" id="{319E246B-3D2E-438E-BEED-6A615B92177C}"/>
-              </a:ext>
-            </a:extLst>
-          </p:cNvPr>
-          <p:cNvSpPr>
-            <a:spLocks noGrp="1"/>
-          </p:cNvSpPr>
-          <p:nvPr>
-            <p:ph idx="1"/>
-          </p:nvPr>
-        </p:nvSpPr>
-        <p:spPr>
-          <a:xfrm>
-            <a:off x="648931" y="2438400"/>
-            <a:ext cx="3505494" cy="3785419"/>
-          </a:xfrm>
-        </p:spPr>
-        <p:txBody>
-          <a:bodyPr>
-            <a:normAutofit/>
-          </a:bodyPr>
-          <a:lstStyle/>
-          <a:p>
-            <a:r>
-              <a:rPr lang="en-US" sz="2000" dirty="0"/>
-              <a:t>No deliveries yet</a:t>
-            </a:r>
-          </a:p>
-          <a:p>
-            <a:r>
-              <a:rPr lang="en-US" sz="2000" dirty="0"/>
-              <a:t>Just the passing of water from C_OROVL to C_THERM</a:t>
-            </a:r>
-          </a:p>
-          <a:p>
-            <a:r>
-              <a:rPr lang="en-US" sz="2000" dirty="0"/>
-              <a:t>Need to review the purpose of Accretion-Depletion (AD) terms and how to calculate</a:t>
-            </a:r>
-          </a:p>
-          <a:p>
-            <a:r>
-              <a:rPr lang="en-US" sz="2000" dirty="0"/>
-              <a:t>Output</a:t>
-            </a:r>
-          </a:p>
-          <a:p>
-            <a:pPr lvl="1"/>
-            <a:r>
-              <a:rPr lang="en-US" sz="2000" dirty="0"/>
-              <a:t>Flow from Thermalito (C_THERM)</a:t>
-            </a:r>
-          </a:p>
-        </p:txBody>
-      </p:sp>
-      <p:sp>
-        <p:nvSpPr>
-          <p:cNvPr id="38" name="Rectangle 37">
-            <a:extLst>
-              <a:ext uri="{FF2B5EF4-FFF2-40B4-BE49-F238E27FC236}">
-                <a16:creationId xmlns:a16="http://schemas.microsoft.com/office/drawing/2014/main" id="{5E39A796-BE83-48B1-B33F-35C4A32AAB57}"/>
-              </a:ext>
-              <a:ext uri="{C183D7F6-B498-43B3-948B-1728B52AA6E4}">
-                <adec:decorative xmlns:adec="http://schemas.microsoft.com/office/drawing/2017/decorative" val="1"/>
-              </a:ext>
-            </a:extLst>
-          </p:cNvPr>
-          <p:cNvSpPr>
-            <a:spLocks noGrp="1" noRot="1" noChangeAspect="1" noMove="1" noResize="1" noEditPoints="1" noAdjustHandles="1" noChangeArrowheads="1" noChangeShapeType="1" noTextEdit="1"/>
-          </p:cNvSpPr>
-          <p:nvPr>
-            <p:extLst>
-              <p:ext uri="{386F3935-93C4-4BCD-93E2-E3B085C9AB24}">
-                <p16:designElem xmlns:p16="http://schemas.microsoft.com/office/powerpoint/2015/main" val="1"/>
-              </p:ext>
-            </p:extLst>
-          </p:nvPr>
-        </p:nvSpPr>
-        <p:spPr>
-          <a:xfrm>
-            <a:off x="4639056" y="0"/>
-            <a:ext cx="7552944" cy="6858000"/>
-          </a:xfrm>
-          <a:prstGeom prst="rect">
-            <a:avLst/>
-          </a:prstGeom>
-          <a:solidFill>
-            <a:srgbClr val="C8CACA"/>
-          </a:solidFill>
-          <a:ln>
-            <a:noFill/>
-          </a:ln>
-        </p:spPr>
-        <p:style>
-          <a:lnRef idx="2">
-            <a:schemeClr val="accent1">
-              <a:shade val="50000"/>
-            </a:schemeClr>
-          </a:lnRef>
-          <a:fillRef idx="1">
-            <a:schemeClr val="accent1"/>
-          </a:fillRef>
-          <a:effectRef idx="0">
-            <a:schemeClr val="accent1"/>
-          </a:effectRef>
-          <a:fontRef idx="minor">
-            <a:schemeClr val="lt1"/>
-          </a:fontRef>
-        </p:style>
-        <p:txBody>
-          <a:bodyPr rtlCol="0" anchor="ctr"/>
-          <a:lstStyle/>
-          <a:p>
-            <a:pPr algn="ctr"/>
-            <a:endParaRPr lang="en-US"/>
-          </a:p>
-        </p:txBody>
-      </p:sp>
-      <p:sp>
-        <p:nvSpPr>
-          <p:cNvPr id="40" name="Rounded Rectangle 9">
-            <a:extLst>
-              <a:ext uri="{FF2B5EF4-FFF2-40B4-BE49-F238E27FC236}">
-                <a16:creationId xmlns:a16="http://schemas.microsoft.com/office/drawing/2014/main" id="{72F84B47-E267-4194-8194-831DB7B5547F}"/>
-              </a:ext>
-              <a:ext uri="{C183D7F6-B498-43B3-948B-1728B52AA6E4}">
-                <adec:decorative xmlns:adec="http://schemas.microsoft.com/office/drawing/2017/decorative" val="1"/>
-              </a:ext>
-            </a:extLst>
-          </p:cNvPr>
-          <p:cNvSpPr>
-            <a:spLocks noGrp="1" noRot="1" noChangeAspect="1" noMove="1" noResize="1" noEditPoints="1" noAdjustHandles="1" noChangeArrowheads="1" noChangeShapeType="1" noTextEdit="1"/>
-          </p:cNvSpPr>
-          <p:nvPr>
-            <p:extLst>
-              <p:ext uri="{386F3935-93C4-4BCD-93E2-E3B085C9AB24}">
-                <p16:designElem xmlns:p16="http://schemas.microsoft.com/office/powerpoint/2015/main" val="1"/>
-              </p:ext>
-            </p:extLst>
-          </p:nvPr>
-        </p:nvSpPr>
-        <p:spPr>
-          <a:xfrm>
-            <a:off x="5123688" y="557784"/>
-            <a:ext cx="6584098" cy="5739187"/>
-          </a:xfrm>
-          <a:prstGeom prst="roundRect">
-            <a:avLst>
-              <a:gd name="adj" fmla="val 0"/>
-            </a:avLst>
-          </a:prstGeom>
-          <a:solidFill>
-            <a:srgbClr val="FFFFFF"/>
-          </a:solidFill>
-          <a:ln w="9525">
-            <a:solidFill>
-              <a:srgbClr val="C8CACA"/>
-            </a:solidFill>
-          </a:ln>
-          <a:effectLst>
-            <a:outerShdw blurRad="57150" dist="19050" dir="5400000" algn="t" rotWithShape="0">
-              <a:prstClr val="black">
-                <a:alpha val="63000"/>
-              </a:prstClr>
-            </a:outerShdw>
-          </a:effectLst>
-        </p:spPr>
-        <p:style>
-          <a:lnRef idx="2">
-            <a:schemeClr val="accent1">
-              <a:shade val="50000"/>
-            </a:schemeClr>
-          </a:lnRef>
-          <a:fillRef idx="1">
-            <a:schemeClr val="accent1"/>
-          </a:fillRef>
-          <a:effectRef idx="0">
-            <a:schemeClr val="accent1"/>
-          </a:effectRef>
-          <a:fontRef idx="minor">
-            <a:schemeClr val="lt1"/>
-          </a:fontRef>
-        </p:style>
-        <p:txBody>
-          <a:bodyPr rtlCol="0" anchor="ctr"/>
-          <a:lstStyle/>
-          <a:p>
-            <a:pPr algn="ctr"/>
-            <a:endParaRPr lang="en-US"/>
-          </a:p>
-        </p:txBody>
-      </p:sp>
-      <p:pic>
-        <p:nvPicPr>
-          <p:cNvPr id="5" name="Picture 4">
-            <a:extLst>
-              <a:ext uri="{FF2B5EF4-FFF2-40B4-BE49-F238E27FC236}">
-                <a16:creationId xmlns:a16="http://schemas.microsoft.com/office/drawing/2014/main" id="{9E188F83-D5C3-4028-B774-C3E26D8C896D}"/>
-              </a:ext>
-            </a:extLst>
-          </p:cNvPr>
-          <p:cNvPicPr>
-            <a:picLocks noChangeAspect="1"/>
-          </p:cNvPicPr>
-          <p:nvPr/>
-        </p:nvPicPr>
-        <p:blipFill>
-          <a:blip r:embed="rId2"/>
-          <a:stretch>
-            <a:fillRect/>
-          </a:stretch>
-        </p:blipFill>
-        <p:spPr>
-          <a:xfrm>
-            <a:off x="5567936" y="807593"/>
-            <a:ext cx="5695183" cy="5239568"/>
-          </a:xfrm>
-          <a:prstGeom prst="rect">
-            <a:avLst/>
-          </a:prstGeom>
-          <a:effectLst/>
-        </p:spPr>
-      </p:pic>
-      <p:pic>
-        <p:nvPicPr>
-          <p:cNvPr id="7" name="Graphic 6" descr="Close">
-            <a:extLst>
-              <a:ext uri="{FF2B5EF4-FFF2-40B4-BE49-F238E27FC236}">
-                <a16:creationId xmlns:a16="http://schemas.microsoft.com/office/drawing/2014/main" id="{7F3418E1-10F5-451D-A07D-EA67C0BDDC9C}"/>
-              </a:ext>
-            </a:extLst>
-          </p:cNvPr>
-          <p:cNvPicPr>
-            <a:picLocks noChangeAspect="1"/>
-          </p:cNvPicPr>
-          <p:nvPr/>
-        </p:nvPicPr>
-        <p:blipFill>
-          <a:blip r:embed="rId3">
-            <a:extLst>
-              <a:ext uri="{28A0092B-C50C-407E-A947-70E740481C1C}">
-                <a14:useLocalDpi xmlns:a14="http://schemas.microsoft.com/office/drawing/2010/main" val="0"/>
-              </a:ext>
-              <a:ext uri="{96DAC541-7B7A-43D3-8B79-37D633B846F1}">
-                <asvg:svgBlip xmlns:asvg="http://schemas.microsoft.com/office/drawing/2016/SVG/main" r:embed="rId4"/>
-              </a:ext>
-            </a:extLst>
-          </a:blip>
-          <a:stretch>
-            <a:fillRect/>
-          </a:stretch>
-        </p:blipFill>
-        <p:spPr>
-          <a:xfrm>
-            <a:off x="5862649" y="4240763"/>
-            <a:ext cx="914400" cy="914400"/>
-          </a:xfrm>
-          <a:prstGeom prst="rect">
-            <a:avLst/>
-          </a:prstGeom>
-        </p:spPr>
-      </p:pic>
-      <p:pic>
-        <p:nvPicPr>
-          <p:cNvPr id="9" name="Graphic 8" descr="Close">
-            <a:extLst>
-              <a:ext uri="{FF2B5EF4-FFF2-40B4-BE49-F238E27FC236}">
-                <a16:creationId xmlns:a16="http://schemas.microsoft.com/office/drawing/2014/main" id="{B0745657-67C7-4DC6-B129-D920567331AF}"/>
-              </a:ext>
-            </a:extLst>
-          </p:cNvPr>
-          <p:cNvPicPr>
-            <a:picLocks noChangeAspect="1"/>
-          </p:cNvPicPr>
-          <p:nvPr/>
-        </p:nvPicPr>
-        <p:blipFill>
-          <a:blip r:embed="rId3">
-            <a:extLst>
-              <a:ext uri="{28A0092B-C50C-407E-A947-70E740481C1C}">
-                <a14:useLocalDpi xmlns:a14="http://schemas.microsoft.com/office/drawing/2010/main" val="0"/>
-              </a:ext>
-              <a:ext uri="{96DAC541-7B7A-43D3-8B79-37D633B846F1}">
-                <asvg:svgBlip xmlns:asvg="http://schemas.microsoft.com/office/drawing/2016/SVG/main" r:embed="rId4"/>
-              </a:ext>
-            </a:extLst>
-          </a:blip>
-          <a:stretch>
-            <a:fillRect/>
-          </a:stretch>
-        </p:blipFill>
-        <p:spPr>
-          <a:xfrm>
-            <a:off x="6777049" y="5246926"/>
-            <a:ext cx="914400" cy="914400"/>
-          </a:xfrm>
-          <a:prstGeom prst="rect">
-            <a:avLst/>
-          </a:prstGeom>
-        </p:spPr>
-      </p:pic>
-    </p:spTree>
-    <p:extLst>
-      <p:ext uri="{BB962C8B-B14F-4D97-AF65-F5344CB8AC3E}">
-        <p14:creationId xmlns:p14="http://schemas.microsoft.com/office/powerpoint/2010/main" val="1408431886"/>
-      </p:ext>
-    </p:extLst>
-  </p:cSld>
-  <p:clrMapOvr>
-    <a:masterClrMapping/>
-  </p:clrMapOvr>
-</p:sld>
-</file>
-
-<file path=ppt/slides/slide8.xml><?xml version="1.0" encoding="utf-8"?>
-<p:sld xmlns:a="http://schemas.openxmlformats.org/drawingml/2006/main" xmlns:r="http://schemas.openxmlformats.org/officeDocument/2006/relationships" xmlns:p="http://schemas.openxmlformats.org/presentationml/2006/main">
-  <p:cSld>
-    <p:bg>
-      <p:bgPr>
-        <a:solidFill>
-          <a:schemeClr val="bg1"/>
-        </a:solidFill>
-        <a:effectLst/>
-      </p:bgPr>
-    </p:bg>
-    <p:spTree>
-      <p:nvGrpSpPr>
-        <p:cNvPr id="1" name=""/>
-        <p:cNvGrpSpPr/>
-        <p:nvPr/>
-      </p:nvGrpSpPr>
-      <p:grpSpPr>
-        <a:xfrm>
-          <a:off x="0" y="0"/>
-          <a:ext cx="0" cy="0"/>
-          <a:chOff x="0" y="0"/>
-          <a:chExt cx="0" cy="0"/>
-        </a:xfrm>
-      </p:grpSpPr>
-      <p:sp>
-        <p:nvSpPr>
-          <p:cNvPr id="2" name="Title 1">
-            <a:extLst>
-              <a:ext uri="{FF2B5EF4-FFF2-40B4-BE49-F238E27FC236}">
-                <a16:creationId xmlns:a16="http://schemas.microsoft.com/office/drawing/2014/main" id="{4F87C7D5-4E35-46C7-A5AB-3569E12C88CF}"/>
-              </a:ext>
-            </a:extLst>
-          </p:cNvPr>
-          <p:cNvSpPr>
-            <a:spLocks noGrp="1"/>
-          </p:cNvSpPr>
-          <p:nvPr>
-            <p:ph type="title"/>
-          </p:nvPr>
-        </p:nvSpPr>
-        <p:spPr>
-          <a:xfrm>
-            <a:off x="648929" y="629266"/>
-            <a:ext cx="3505495" cy="1622321"/>
-          </a:xfrm>
-        </p:spPr>
-        <p:txBody>
-          <a:bodyPr>
-            <a:normAutofit fontScale="90000"/>
-          </a:bodyPr>
-          <a:lstStyle/>
-          <a:p>
-            <a:r>
-              <a:rPr lang="en-US" sz="3700" dirty="0"/>
-              <a:t>Phase 1.4 – Include Thermalito deliveries</a:t>
-            </a:r>
-          </a:p>
-        </p:txBody>
-      </p:sp>
-      <p:sp>
-        <p:nvSpPr>
-          <p:cNvPr id="3" name="Content Placeholder 2">
-            <a:extLst>
-              <a:ext uri="{FF2B5EF4-FFF2-40B4-BE49-F238E27FC236}">
-                <a16:creationId xmlns:a16="http://schemas.microsoft.com/office/drawing/2014/main" id="{319E246B-3D2E-438E-BEED-6A615B92177C}"/>
-              </a:ext>
-            </a:extLst>
-          </p:cNvPr>
-          <p:cNvSpPr>
-            <a:spLocks noGrp="1"/>
-          </p:cNvSpPr>
-          <p:nvPr>
-            <p:ph idx="1"/>
-          </p:nvPr>
-        </p:nvSpPr>
-        <p:spPr>
-          <a:xfrm>
-            <a:off x="648931" y="2438400"/>
-            <a:ext cx="3505494" cy="3785419"/>
-          </a:xfrm>
-        </p:spPr>
-        <p:txBody>
-          <a:bodyPr>
-            <a:normAutofit/>
-          </a:bodyPr>
-          <a:lstStyle/>
-          <a:p>
-            <a:r>
-              <a:rPr lang="en-US" sz="2000" dirty="0"/>
-              <a:t>Add demands for D_THERM</a:t>
-            </a:r>
-          </a:p>
-          <a:p>
-            <a:r>
-              <a:rPr lang="en-US" sz="2000" dirty="0"/>
-              <a:t>Need to review the purpose of Accretion-Depletion (AD) terms and how to calculate</a:t>
-            </a:r>
-          </a:p>
-          <a:p>
-            <a:r>
-              <a:rPr lang="en-US" sz="2000" dirty="0"/>
-              <a:t>Output</a:t>
-            </a:r>
-          </a:p>
-          <a:p>
-            <a:pPr lvl="1"/>
-            <a:r>
-              <a:rPr lang="en-US" sz="2000" dirty="0"/>
-              <a:t>D_THERM</a:t>
-            </a:r>
-          </a:p>
-        </p:txBody>
-      </p:sp>
-      <p:sp>
-        <p:nvSpPr>
-          <p:cNvPr id="38" name="Rectangle 37">
-            <a:extLst>
-              <a:ext uri="{FF2B5EF4-FFF2-40B4-BE49-F238E27FC236}">
-                <a16:creationId xmlns:a16="http://schemas.microsoft.com/office/drawing/2014/main" id="{5E39A796-BE83-48B1-B33F-35C4A32AAB57}"/>
-              </a:ext>
-              <a:ext uri="{C183D7F6-B498-43B3-948B-1728B52AA6E4}">
-                <adec:decorative xmlns:adec="http://schemas.microsoft.com/office/drawing/2017/decorative" val="1"/>
-              </a:ext>
-            </a:extLst>
-          </p:cNvPr>
-          <p:cNvSpPr>
-            <a:spLocks noGrp="1" noRot="1" noChangeAspect="1" noMove="1" noResize="1" noEditPoints="1" noAdjustHandles="1" noChangeArrowheads="1" noChangeShapeType="1" noTextEdit="1"/>
-          </p:cNvSpPr>
-          <p:nvPr>
-            <p:extLst>
-              <p:ext uri="{386F3935-93C4-4BCD-93E2-E3B085C9AB24}">
-                <p16:designElem xmlns:p16="http://schemas.microsoft.com/office/powerpoint/2015/main" val="1"/>
-              </p:ext>
-            </p:extLst>
-          </p:nvPr>
-        </p:nvSpPr>
-        <p:spPr>
-          <a:xfrm>
-            <a:off x="4639056" y="0"/>
-            <a:ext cx="7552944" cy="6858000"/>
-          </a:xfrm>
-          <a:prstGeom prst="rect">
-            <a:avLst/>
-          </a:prstGeom>
-          <a:solidFill>
-            <a:srgbClr val="C8CACA"/>
-          </a:solidFill>
-          <a:ln>
-            <a:noFill/>
-          </a:ln>
-        </p:spPr>
-        <p:style>
-          <a:lnRef idx="2">
-            <a:schemeClr val="accent1">
-              <a:shade val="50000"/>
-            </a:schemeClr>
-          </a:lnRef>
-          <a:fillRef idx="1">
-            <a:schemeClr val="accent1"/>
-          </a:fillRef>
-          <a:effectRef idx="0">
-            <a:schemeClr val="accent1"/>
-          </a:effectRef>
-          <a:fontRef idx="minor">
-            <a:schemeClr val="lt1"/>
-          </a:fontRef>
-        </p:style>
-        <p:txBody>
-          <a:bodyPr rtlCol="0" anchor="ctr"/>
-          <a:lstStyle/>
-          <a:p>
-            <a:pPr algn="ctr"/>
-            <a:endParaRPr lang="en-US"/>
-          </a:p>
-        </p:txBody>
-      </p:sp>
-      <p:sp>
-        <p:nvSpPr>
-          <p:cNvPr id="40" name="Rounded Rectangle 9">
-            <a:extLst>
-              <a:ext uri="{FF2B5EF4-FFF2-40B4-BE49-F238E27FC236}">
-                <a16:creationId xmlns:a16="http://schemas.microsoft.com/office/drawing/2014/main" id="{72F84B47-E267-4194-8194-831DB7B5547F}"/>
-              </a:ext>
-              <a:ext uri="{C183D7F6-B498-43B3-948B-1728B52AA6E4}">
-                <adec:decorative xmlns:adec="http://schemas.microsoft.com/office/drawing/2017/decorative" val="1"/>
-              </a:ext>
-            </a:extLst>
-          </p:cNvPr>
-          <p:cNvSpPr>
-            <a:spLocks noGrp="1" noRot="1" noChangeAspect="1" noMove="1" noResize="1" noEditPoints="1" noAdjustHandles="1" noChangeArrowheads="1" noChangeShapeType="1" noTextEdit="1"/>
-          </p:cNvSpPr>
-          <p:nvPr>
-            <p:extLst>
-              <p:ext uri="{386F3935-93C4-4BCD-93E2-E3B085C9AB24}">
-                <p16:designElem xmlns:p16="http://schemas.microsoft.com/office/powerpoint/2015/main" val="1"/>
-              </p:ext>
-            </p:extLst>
-          </p:nvPr>
-        </p:nvSpPr>
-        <p:spPr>
-          <a:xfrm>
-            <a:off x="5123688" y="557784"/>
-            <a:ext cx="6584098" cy="5739187"/>
-          </a:xfrm>
-          <a:prstGeom prst="roundRect">
-            <a:avLst>
-              <a:gd name="adj" fmla="val 0"/>
-            </a:avLst>
-          </a:prstGeom>
-          <a:solidFill>
-            <a:srgbClr val="FFFFFF"/>
-          </a:solidFill>
-          <a:ln w="9525">
-            <a:solidFill>
-              <a:srgbClr val="C8CACA"/>
-            </a:solidFill>
-          </a:ln>
-          <a:effectLst>
-            <a:outerShdw blurRad="57150" dist="19050" dir="5400000" algn="t" rotWithShape="0">
-              <a:prstClr val="black">
-                <a:alpha val="63000"/>
-              </a:prstClr>
-            </a:outerShdw>
-          </a:effectLst>
-        </p:spPr>
-        <p:style>
-          <a:lnRef idx="2">
-            <a:schemeClr val="accent1">
-              <a:shade val="50000"/>
-            </a:schemeClr>
-          </a:lnRef>
-          <a:fillRef idx="1">
-            <a:schemeClr val="accent1"/>
-          </a:fillRef>
-          <a:effectRef idx="0">
-            <a:schemeClr val="accent1"/>
-          </a:effectRef>
-          <a:fontRef idx="minor">
-            <a:schemeClr val="lt1"/>
-          </a:fontRef>
-        </p:style>
-        <p:txBody>
-          <a:bodyPr rtlCol="0" anchor="ctr"/>
-          <a:lstStyle/>
-          <a:p>
-            <a:pPr algn="ctr"/>
-            <a:endParaRPr lang="en-US"/>
-          </a:p>
-        </p:txBody>
-      </p:sp>
-      <p:pic>
-        <p:nvPicPr>
-          <p:cNvPr id="5" name="Picture 4">
-            <a:extLst>
-              <a:ext uri="{FF2B5EF4-FFF2-40B4-BE49-F238E27FC236}">
-                <a16:creationId xmlns:a16="http://schemas.microsoft.com/office/drawing/2014/main" id="{9E188F83-D5C3-4028-B774-C3E26D8C896D}"/>
-              </a:ext>
-            </a:extLst>
-          </p:cNvPr>
-          <p:cNvPicPr>
-            <a:picLocks noChangeAspect="1"/>
-          </p:cNvPicPr>
-          <p:nvPr/>
-        </p:nvPicPr>
-        <p:blipFill>
-          <a:blip r:embed="rId2"/>
-          <a:stretch>
-            <a:fillRect/>
-          </a:stretch>
-        </p:blipFill>
-        <p:spPr>
-          <a:xfrm>
-            <a:off x="5567936" y="807593"/>
-            <a:ext cx="5695183" cy="5239568"/>
-          </a:xfrm>
-          <a:prstGeom prst="rect">
-            <a:avLst/>
-          </a:prstGeom>
-          <a:effectLst/>
-        </p:spPr>
-      </p:pic>
-      <p:pic>
-        <p:nvPicPr>
-          <p:cNvPr id="9" name="Graphic 8" descr="Close">
-            <a:extLst>
-              <a:ext uri="{FF2B5EF4-FFF2-40B4-BE49-F238E27FC236}">
-                <a16:creationId xmlns:a16="http://schemas.microsoft.com/office/drawing/2014/main" id="{B0745657-67C7-4DC6-B129-D920567331AF}"/>
-              </a:ext>
-            </a:extLst>
-          </p:cNvPr>
-          <p:cNvPicPr>
-            <a:picLocks noChangeAspect="1"/>
-          </p:cNvPicPr>
-          <p:nvPr/>
-        </p:nvPicPr>
-        <p:blipFill>
-          <a:blip r:embed="rId3">
-            <a:extLst>
-              <a:ext uri="{28A0092B-C50C-407E-A947-70E740481C1C}">
-                <a14:useLocalDpi xmlns:a14="http://schemas.microsoft.com/office/drawing/2010/main" val="0"/>
-              </a:ext>
-              <a:ext uri="{96DAC541-7B7A-43D3-8B79-37D633B846F1}">
-                <asvg:svgBlip xmlns:asvg="http://schemas.microsoft.com/office/drawing/2016/SVG/main" r:embed="rId4"/>
-              </a:ext>
-            </a:extLst>
-          </a:blip>
-          <a:stretch>
-            <a:fillRect/>
-          </a:stretch>
-        </p:blipFill>
-        <p:spPr>
-          <a:xfrm>
-            <a:off x="6777049" y="5246926"/>
-            <a:ext cx="914400" cy="914400"/>
-          </a:xfrm>
-          <a:prstGeom prst="rect">
-            <a:avLst/>
-          </a:prstGeom>
-        </p:spPr>
-      </p:pic>
-    </p:spTree>
-    <p:extLst>
-      <p:ext uri="{BB962C8B-B14F-4D97-AF65-F5344CB8AC3E}">
-        <p14:creationId xmlns:p14="http://schemas.microsoft.com/office/powerpoint/2010/main" val="3305777850"/>
-      </p:ext>
-    </p:extLst>
-  </p:cSld>
-  <p:clrMapOvr>
-    <a:masterClrMapping/>
-  </p:clrMapOvr>
-</p:sld>
-</file>
-
-<file path=ppt/slides/slide9.xml><?xml version="1.0" encoding="utf-8"?>
-<p:sld xmlns:a="http://schemas.openxmlformats.org/drawingml/2006/main" xmlns:r="http://schemas.openxmlformats.org/officeDocument/2006/relationships" xmlns:p="http://schemas.openxmlformats.org/presentationml/2006/main">
-  <p:cSld>
-    <p:spTree>
-      <p:nvGrpSpPr>
-        <p:cNvPr id="1" name=""/>
-        <p:cNvGrpSpPr/>
-        <p:nvPr/>
-      </p:nvGrpSpPr>
-      <p:grpSpPr>
-        <a:xfrm>
-          <a:off x="0" y="0"/>
-          <a:ext cx="0" cy="0"/>
-          <a:chOff x="0" y="0"/>
-          <a:chExt cx="0" cy="0"/>
-        </a:xfrm>
-      </p:grpSpPr>
-      <p:sp>
-        <p:nvSpPr>
-          <p:cNvPr id="2" name="Title 1">
-            <a:extLst>
-              <a:ext uri="{FF2B5EF4-FFF2-40B4-BE49-F238E27FC236}">
-                <a16:creationId xmlns:a16="http://schemas.microsoft.com/office/drawing/2014/main" id="{7E602E9E-CB09-48DE-834B-DAFF04BB4499}"/>
-              </a:ext>
-            </a:extLst>
-          </p:cNvPr>
-          <p:cNvSpPr>
-            <a:spLocks noGrp="1"/>
-          </p:cNvSpPr>
-          <p:nvPr>
-            <p:ph type="title"/>
-          </p:nvPr>
-        </p:nvSpPr>
-        <p:spPr/>
-        <p:txBody>
-          <a:bodyPr/>
-          <a:lstStyle/>
-          <a:p>
-            <a:r>
-              <a:rPr lang="en-US" dirty="0"/>
-              <a:t>Phase 1 data requirements</a:t>
-            </a:r>
-          </a:p>
-        </p:txBody>
-      </p:sp>
-      <p:sp>
-        <p:nvSpPr>
-          <p:cNvPr id="3" name="Content Placeholder 2">
-            <a:extLst>
-              <a:ext uri="{FF2B5EF4-FFF2-40B4-BE49-F238E27FC236}">
-                <a16:creationId xmlns:a16="http://schemas.microsoft.com/office/drawing/2014/main" id="{8382E53A-D19C-4A6E-BB07-054AA7B676BF}"/>
-              </a:ext>
-            </a:extLst>
-          </p:cNvPr>
-          <p:cNvSpPr>
-            <a:spLocks noGrp="1"/>
-          </p:cNvSpPr>
-          <p:nvPr>
-            <p:ph idx="1"/>
-          </p:nvPr>
-        </p:nvSpPr>
-        <p:spPr/>
-        <p:txBody>
-          <a:bodyPr/>
-          <a:lstStyle/>
-          <a:p>
-            <a:r>
-              <a:rPr lang="en-US" dirty="0"/>
-              <a:t>Lake Oroville</a:t>
-            </a:r>
-          </a:p>
-          <a:p>
-            <a:pPr lvl="1"/>
-            <a:r>
-              <a:rPr lang="en-US" dirty="0"/>
-              <a:t>Inflow (TAF/day)</a:t>
-            </a:r>
-          </a:p>
-          <a:p>
-            <a:pPr lvl="1"/>
-            <a:r>
-              <a:rPr lang="en-US" dirty="0"/>
-              <a:t>Initial storage</a:t>
-            </a:r>
-          </a:p>
-          <a:p>
-            <a:pPr lvl="1"/>
-            <a:r>
-              <a:rPr lang="en-US" dirty="0"/>
-              <a:t>Level 5 storage</a:t>
-            </a:r>
-          </a:p>
-          <a:p>
-            <a:pPr lvl="1"/>
-            <a:r>
-              <a:rPr lang="en-US" dirty="0"/>
-              <a:t>Evaporation rate</a:t>
-            </a:r>
-          </a:p>
-          <a:p>
-            <a:r>
-              <a:rPr lang="en-US" dirty="0"/>
-              <a:t>Oroville water rights demands</a:t>
-            </a:r>
-          </a:p>
-          <a:p>
-            <a:r>
-              <a:rPr lang="en-US" dirty="0"/>
-              <a:t>Minimum groundwater pumping</a:t>
-            </a:r>
-          </a:p>
-          <a:p>
-            <a:endParaRPr lang="en-US" dirty="0"/>
-          </a:p>
-          <a:p>
-            <a:endParaRPr lang="en-US" dirty="0"/>
-          </a:p>
-          <a:p>
-            <a:endParaRPr lang="en-US" dirty="0"/>
-          </a:p>
-        </p:txBody>
-      </p:sp>
-    </p:spTree>
-    <p:extLst>
-      <p:ext uri="{BB962C8B-B14F-4D97-AF65-F5344CB8AC3E}">
-        <p14:creationId xmlns:p14="http://schemas.microsoft.com/office/powerpoint/2010/main" val="1200171353"/>
+        <p14:creationId xmlns:p14="http://schemas.microsoft.com/office/powerpoint/2010/main" val="1792466740"/>
       </p:ext>
     </p:extLst>
   </p:cSld>

</xml_diff>

<commit_message>
Update powerpoint, SV data related to D_THERM demands
Just created some tables that will help describe exactly what demands I
needed to disaggregate for D_THERM
</commit_message>
<xml_diff>
--- a/Building daily CalLite model from scratch – daily.pptx
+++ b/Building daily CalLite model from scratch – daily.pptx
@@ -13,13 +13,8 @@
     <p:sldId id="268" r:id="rId7"/>
     <p:sldId id="270" r:id="rId8"/>
     <p:sldId id="269" r:id="rId9"/>
-    <p:sldId id="257" r:id="rId10"/>
-    <p:sldId id="259" r:id="rId11"/>
-    <p:sldId id="261" r:id="rId12"/>
-    <p:sldId id="262" r:id="rId13"/>
-    <p:sldId id="258" r:id="rId14"/>
-    <p:sldId id="264" r:id="rId15"/>
-    <p:sldId id="266" r:id="rId16"/>
+    <p:sldId id="258" r:id="rId10"/>
+    <p:sldId id="271" r:id="rId11"/>
   </p:sldIdLst>
   <p:sldSz cx="12192000" cy="6858000"/>
   <p:notesSz cx="6858000" cy="9144000"/>
@@ -273,7 +268,7 @@
           <a:p>
             <a:fld id="{DABA3B07-39EE-405B-8EBB-3517E9BED2D2}" type="datetimeFigureOut">
               <a:rPr lang="en-US" smtClean="0"/>
-              <a:t>10/8/2020</a:t>
+              <a:t>10/20/2020</a:t>
             </a:fld>
             <a:endParaRPr lang="en-US"/>
           </a:p>
@@ -471,7 +466,7 @@
           <a:p>
             <a:fld id="{DABA3B07-39EE-405B-8EBB-3517E9BED2D2}" type="datetimeFigureOut">
               <a:rPr lang="en-US" smtClean="0"/>
-              <a:t>10/8/2020</a:t>
+              <a:t>10/20/2020</a:t>
             </a:fld>
             <a:endParaRPr lang="en-US"/>
           </a:p>
@@ -679,7 +674,7 @@
           <a:p>
             <a:fld id="{DABA3B07-39EE-405B-8EBB-3517E9BED2D2}" type="datetimeFigureOut">
               <a:rPr lang="en-US" smtClean="0"/>
-              <a:t>10/8/2020</a:t>
+              <a:t>10/20/2020</a:t>
             </a:fld>
             <a:endParaRPr lang="en-US"/>
           </a:p>
@@ -877,7 +872,7 @@
           <a:p>
             <a:fld id="{DABA3B07-39EE-405B-8EBB-3517E9BED2D2}" type="datetimeFigureOut">
               <a:rPr lang="en-US" smtClean="0"/>
-              <a:t>10/8/2020</a:t>
+              <a:t>10/20/2020</a:t>
             </a:fld>
             <a:endParaRPr lang="en-US"/>
           </a:p>
@@ -1152,7 +1147,7 @@
           <a:p>
             <a:fld id="{DABA3B07-39EE-405B-8EBB-3517E9BED2D2}" type="datetimeFigureOut">
               <a:rPr lang="en-US" smtClean="0"/>
-              <a:t>10/8/2020</a:t>
+              <a:t>10/20/2020</a:t>
             </a:fld>
             <a:endParaRPr lang="en-US"/>
           </a:p>
@@ -1417,7 +1412,7 @@
           <a:p>
             <a:fld id="{DABA3B07-39EE-405B-8EBB-3517E9BED2D2}" type="datetimeFigureOut">
               <a:rPr lang="en-US" smtClean="0"/>
-              <a:t>10/8/2020</a:t>
+              <a:t>10/20/2020</a:t>
             </a:fld>
             <a:endParaRPr lang="en-US"/>
           </a:p>
@@ -1829,7 +1824,7 @@
           <a:p>
             <a:fld id="{DABA3B07-39EE-405B-8EBB-3517E9BED2D2}" type="datetimeFigureOut">
               <a:rPr lang="en-US" smtClean="0"/>
-              <a:t>10/8/2020</a:t>
+              <a:t>10/20/2020</a:t>
             </a:fld>
             <a:endParaRPr lang="en-US"/>
           </a:p>
@@ -1970,7 +1965,7 @@
           <a:p>
             <a:fld id="{DABA3B07-39EE-405B-8EBB-3517E9BED2D2}" type="datetimeFigureOut">
               <a:rPr lang="en-US" smtClean="0"/>
-              <a:t>10/8/2020</a:t>
+              <a:t>10/20/2020</a:t>
             </a:fld>
             <a:endParaRPr lang="en-US"/>
           </a:p>
@@ -2083,7 +2078,7 @@
           <a:p>
             <a:fld id="{DABA3B07-39EE-405B-8EBB-3517E9BED2D2}" type="datetimeFigureOut">
               <a:rPr lang="en-US" smtClean="0"/>
-              <a:t>10/8/2020</a:t>
+              <a:t>10/20/2020</a:t>
             </a:fld>
             <a:endParaRPr lang="en-US"/>
           </a:p>
@@ -2394,7 +2389,7 @@
           <a:p>
             <a:fld id="{DABA3B07-39EE-405B-8EBB-3517E9BED2D2}" type="datetimeFigureOut">
               <a:rPr lang="en-US" smtClean="0"/>
-              <a:t>10/8/2020</a:t>
+              <a:t>10/20/2020</a:t>
             </a:fld>
             <a:endParaRPr lang="en-US"/>
           </a:p>
@@ -2682,7 +2677,7 @@
           <a:p>
             <a:fld id="{DABA3B07-39EE-405B-8EBB-3517E9BED2D2}" type="datetimeFigureOut">
               <a:rPr lang="en-US" smtClean="0"/>
-              <a:t>10/8/2020</a:t>
+              <a:t>10/20/2020</a:t>
             </a:fld>
             <a:endParaRPr lang="en-US"/>
           </a:p>
@@ -2923,7 +2918,7 @@
           <a:p>
             <a:fld id="{DABA3B07-39EE-405B-8EBB-3517E9BED2D2}" type="datetimeFigureOut">
               <a:rPr lang="en-US" smtClean="0"/>
-              <a:t>10/8/2020</a:t>
+              <a:t>10/20/2020</a:t>
             </a:fld>
             <a:endParaRPr lang="en-US"/>
           </a:p>
@@ -3407,1008 +3402,6 @@
 </file>
 
 <file path=ppt/slides/slide10.xml><?xml version="1.0" encoding="utf-8"?>
-<p:sld xmlns:a="http://schemas.openxmlformats.org/drawingml/2006/main" xmlns:r="http://schemas.openxmlformats.org/officeDocument/2006/relationships" xmlns:p="http://schemas.openxmlformats.org/presentationml/2006/main" show="0">
-  <p:cSld>
-    <p:bg>
-      <p:bgPr>
-        <a:solidFill>
-          <a:schemeClr val="bg1"/>
-        </a:solidFill>
-        <a:effectLst/>
-      </p:bgPr>
-    </p:bg>
-    <p:spTree>
-      <p:nvGrpSpPr>
-        <p:cNvPr id="1" name=""/>
-        <p:cNvGrpSpPr/>
-        <p:nvPr/>
-      </p:nvGrpSpPr>
-      <p:grpSpPr>
-        <a:xfrm>
-          <a:off x="0" y="0"/>
-          <a:ext cx="0" cy="0"/>
-          <a:chOff x="0" y="0"/>
-          <a:chExt cx="0" cy="0"/>
-        </a:xfrm>
-      </p:grpSpPr>
-      <p:sp>
-        <p:nvSpPr>
-          <p:cNvPr id="2" name="Title 1">
-            <a:extLst>
-              <a:ext uri="{FF2B5EF4-FFF2-40B4-BE49-F238E27FC236}">
-                <a16:creationId xmlns:a16="http://schemas.microsoft.com/office/drawing/2014/main" id="{4F87C7D5-4E35-46C7-A5AB-3569E12C88CF}"/>
-              </a:ext>
-            </a:extLst>
-          </p:cNvPr>
-          <p:cNvSpPr>
-            <a:spLocks noGrp="1"/>
-          </p:cNvSpPr>
-          <p:nvPr>
-            <p:ph type="title"/>
-          </p:nvPr>
-        </p:nvSpPr>
-        <p:spPr>
-          <a:xfrm>
-            <a:off x="648929" y="629266"/>
-            <a:ext cx="3505495" cy="1622321"/>
-          </a:xfrm>
-        </p:spPr>
-        <p:txBody>
-          <a:bodyPr>
-            <a:normAutofit/>
-          </a:bodyPr>
-          <a:lstStyle/>
-          <a:p>
-            <a:r>
-              <a:rPr lang="en-US" sz="3400" dirty="0"/>
-              <a:t>Phase 1.2 – Include Oroville deliveries</a:t>
-            </a:r>
-          </a:p>
-        </p:txBody>
-      </p:sp>
-      <p:sp>
-        <p:nvSpPr>
-          <p:cNvPr id="3" name="Content Placeholder 2">
-            <a:extLst>
-              <a:ext uri="{FF2B5EF4-FFF2-40B4-BE49-F238E27FC236}">
-                <a16:creationId xmlns:a16="http://schemas.microsoft.com/office/drawing/2014/main" id="{319E246B-3D2E-438E-BEED-6A615B92177C}"/>
-              </a:ext>
-            </a:extLst>
-          </p:cNvPr>
-          <p:cNvSpPr>
-            <a:spLocks noGrp="1"/>
-          </p:cNvSpPr>
-          <p:nvPr>
-            <p:ph idx="1"/>
-          </p:nvPr>
-        </p:nvSpPr>
-        <p:spPr>
-          <a:xfrm>
-            <a:off x="648931" y="2438400"/>
-            <a:ext cx="3505494" cy="3785419"/>
-          </a:xfrm>
-        </p:spPr>
-        <p:txBody>
-          <a:bodyPr>
-            <a:normAutofit/>
-          </a:bodyPr>
-          <a:lstStyle/>
-          <a:p>
-            <a:r>
-              <a:rPr lang="en-US" sz="2000" dirty="0"/>
-              <a:t>Include D_OROVL missing from previous step</a:t>
-            </a:r>
-          </a:p>
-          <a:p>
-            <a:r>
-              <a:rPr lang="en-US" sz="2000" dirty="0"/>
-              <a:t>Output</a:t>
-            </a:r>
-          </a:p>
-          <a:p>
-            <a:pPr lvl="1"/>
-            <a:r>
-              <a:rPr lang="en-US" sz="2000" dirty="0"/>
-              <a:t>Oroville releases, storage, deliveries</a:t>
-            </a:r>
-          </a:p>
-        </p:txBody>
-      </p:sp>
-      <p:sp>
-        <p:nvSpPr>
-          <p:cNvPr id="31" name="Rectangle 30">
-            <a:extLst>
-              <a:ext uri="{FF2B5EF4-FFF2-40B4-BE49-F238E27FC236}">
-                <a16:creationId xmlns:a16="http://schemas.microsoft.com/office/drawing/2014/main" id="{5E39A796-BE83-48B1-B33F-35C4A32AAB57}"/>
-              </a:ext>
-              <a:ext uri="{C183D7F6-B498-43B3-948B-1728B52AA6E4}">
-                <adec:decorative xmlns:adec="http://schemas.microsoft.com/office/drawing/2017/decorative" val="1"/>
-              </a:ext>
-            </a:extLst>
-          </p:cNvPr>
-          <p:cNvSpPr>
-            <a:spLocks noGrp="1" noRot="1" noChangeAspect="1" noMove="1" noResize="1" noEditPoints="1" noAdjustHandles="1" noChangeArrowheads="1" noChangeShapeType="1" noTextEdit="1"/>
-          </p:cNvSpPr>
-          <p:nvPr>
-            <p:extLst>
-              <p:ext uri="{386F3935-93C4-4BCD-93E2-E3B085C9AB24}">
-                <p16:designElem xmlns:p16="http://schemas.microsoft.com/office/powerpoint/2015/main" val="1"/>
-              </p:ext>
-            </p:extLst>
-          </p:nvPr>
-        </p:nvSpPr>
-        <p:spPr>
-          <a:xfrm>
-            <a:off x="4639056" y="0"/>
-            <a:ext cx="7552944" cy="6858000"/>
-          </a:xfrm>
-          <a:prstGeom prst="rect">
-            <a:avLst/>
-          </a:prstGeom>
-          <a:solidFill>
-            <a:srgbClr val="C8CACA"/>
-          </a:solidFill>
-          <a:ln>
-            <a:noFill/>
-          </a:ln>
-        </p:spPr>
-        <p:style>
-          <a:lnRef idx="2">
-            <a:schemeClr val="accent1">
-              <a:shade val="50000"/>
-            </a:schemeClr>
-          </a:lnRef>
-          <a:fillRef idx="1">
-            <a:schemeClr val="accent1"/>
-          </a:fillRef>
-          <a:effectRef idx="0">
-            <a:schemeClr val="accent1"/>
-          </a:effectRef>
-          <a:fontRef idx="minor">
-            <a:schemeClr val="lt1"/>
-          </a:fontRef>
-        </p:style>
-        <p:txBody>
-          <a:bodyPr rtlCol="0" anchor="ctr"/>
-          <a:lstStyle/>
-          <a:p>
-            <a:pPr algn="ctr"/>
-            <a:endParaRPr lang="en-US"/>
-          </a:p>
-        </p:txBody>
-      </p:sp>
-      <p:sp>
-        <p:nvSpPr>
-          <p:cNvPr id="33" name="Rounded Rectangle 9">
-            <a:extLst>
-              <a:ext uri="{FF2B5EF4-FFF2-40B4-BE49-F238E27FC236}">
-                <a16:creationId xmlns:a16="http://schemas.microsoft.com/office/drawing/2014/main" id="{72F84B47-E267-4194-8194-831DB7B5547F}"/>
-              </a:ext>
-              <a:ext uri="{C183D7F6-B498-43B3-948B-1728B52AA6E4}">
-                <adec:decorative xmlns:adec="http://schemas.microsoft.com/office/drawing/2017/decorative" val="1"/>
-              </a:ext>
-            </a:extLst>
-          </p:cNvPr>
-          <p:cNvSpPr>
-            <a:spLocks noGrp="1" noRot="1" noChangeAspect="1" noMove="1" noResize="1" noEditPoints="1" noAdjustHandles="1" noChangeArrowheads="1" noChangeShapeType="1" noTextEdit="1"/>
-          </p:cNvSpPr>
-          <p:nvPr>
-            <p:extLst>
-              <p:ext uri="{386F3935-93C4-4BCD-93E2-E3B085C9AB24}">
-                <p16:designElem xmlns:p16="http://schemas.microsoft.com/office/powerpoint/2015/main" val="1"/>
-              </p:ext>
-            </p:extLst>
-          </p:nvPr>
-        </p:nvSpPr>
-        <p:spPr>
-          <a:xfrm>
-            <a:off x="5123688" y="557784"/>
-            <a:ext cx="6584098" cy="5739187"/>
-          </a:xfrm>
-          <a:prstGeom prst="roundRect">
-            <a:avLst>
-              <a:gd name="adj" fmla="val 0"/>
-            </a:avLst>
-          </a:prstGeom>
-          <a:solidFill>
-            <a:srgbClr val="FFFFFF"/>
-          </a:solidFill>
-          <a:ln w="9525">
-            <a:solidFill>
-              <a:srgbClr val="C8CACA"/>
-            </a:solidFill>
-          </a:ln>
-          <a:effectLst>
-            <a:outerShdw blurRad="57150" dist="19050" dir="5400000" algn="t" rotWithShape="0">
-              <a:prstClr val="black">
-                <a:alpha val="63000"/>
-              </a:prstClr>
-            </a:outerShdw>
-          </a:effectLst>
-        </p:spPr>
-        <p:style>
-          <a:lnRef idx="2">
-            <a:schemeClr val="accent1">
-              <a:shade val="50000"/>
-            </a:schemeClr>
-          </a:lnRef>
-          <a:fillRef idx="1">
-            <a:schemeClr val="accent1"/>
-          </a:fillRef>
-          <a:effectRef idx="0">
-            <a:schemeClr val="accent1"/>
-          </a:effectRef>
-          <a:fontRef idx="minor">
-            <a:schemeClr val="lt1"/>
-          </a:fontRef>
-        </p:style>
-        <p:txBody>
-          <a:bodyPr rtlCol="0" anchor="ctr"/>
-          <a:lstStyle/>
-          <a:p>
-            <a:pPr algn="ctr"/>
-            <a:endParaRPr lang="en-US"/>
-          </a:p>
-        </p:txBody>
-      </p:sp>
-      <p:pic>
-        <p:nvPicPr>
-          <p:cNvPr id="8" name="Picture 7">
-            <a:extLst>
-              <a:ext uri="{FF2B5EF4-FFF2-40B4-BE49-F238E27FC236}">
-                <a16:creationId xmlns:a16="http://schemas.microsoft.com/office/drawing/2014/main" id="{D2870AF7-B942-4FB7-895B-E7FA99F0BE2E}"/>
-              </a:ext>
-            </a:extLst>
-          </p:cNvPr>
-          <p:cNvPicPr>
-            <a:picLocks noChangeAspect="1"/>
-          </p:cNvPicPr>
-          <p:nvPr/>
-        </p:nvPicPr>
-        <p:blipFill>
-          <a:blip r:embed="rId2"/>
-          <a:stretch>
-            <a:fillRect/>
-          </a:stretch>
-        </p:blipFill>
-        <p:spPr>
-          <a:xfrm>
-            <a:off x="5567936" y="807593"/>
-            <a:ext cx="5695183" cy="5239568"/>
-          </a:xfrm>
-          <a:prstGeom prst="rect">
-            <a:avLst/>
-          </a:prstGeom>
-          <a:effectLst/>
-        </p:spPr>
-      </p:pic>
-    </p:spTree>
-    <p:extLst>
-      <p:ext uri="{BB962C8B-B14F-4D97-AF65-F5344CB8AC3E}">
-        <p14:creationId xmlns:p14="http://schemas.microsoft.com/office/powerpoint/2010/main" val="1067204752"/>
-      </p:ext>
-    </p:extLst>
-  </p:cSld>
-  <p:clrMapOvr>
-    <a:masterClrMapping/>
-  </p:clrMapOvr>
-</p:sld>
-</file>
-
-<file path=ppt/slides/slide11.xml><?xml version="1.0" encoding="utf-8"?>
-<p:sld xmlns:a="http://schemas.openxmlformats.org/drawingml/2006/main" xmlns:r="http://schemas.openxmlformats.org/officeDocument/2006/relationships" xmlns:p="http://schemas.openxmlformats.org/presentationml/2006/main" show="0">
-  <p:cSld>
-    <p:bg>
-      <p:bgPr>
-        <a:solidFill>
-          <a:schemeClr val="bg1"/>
-        </a:solidFill>
-        <a:effectLst/>
-      </p:bgPr>
-    </p:bg>
-    <p:spTree>
-      <p:nvGrpSpPr>
-        <p:cNvPr id="1" name=""/>
-        <p:cNvGrpSpPr/>
-        <p:nvPr/>
-      </p:nvGrpSpPr>
-      <p:grpSpPr>
-        <a:xfrm>
-          <a:off x="0" y="0"/>
-          <a:ext cx="0" cy="0"/>
-          <a:chOff x="0" y="0"/>
-          <a:chExt cx="0" cy="0"/>
-        </a:xfrm>
-      </p:grpSpPr>
-      <p:sp>
-        <p:nvSpPr>
-          <p:cNvPr id="2" name="Title 1">
-            <a:extLst>
-              <a:ext uri="{FF2B5EF4-FFF2-40B4-BE49-F238E27FC236}">
-                <a16:creationId xmlns:a16="http://schemas.microsoft.com/office/drawing/2014/main" id="{4F87C7D5-4E35-46C7-A5AB-3569E12C88CF}"/>
-              </a:ext>
-            </a:extLst>
-          </p:cNvPr>
-          <p:cNvSpPr>
-            <a:spLocks noGrp="1"/>
-          </p:cNvSpPr>
-          <p:nvPr>
-            <p:ph type="title"/>
-          </p:nvPr>
-        </p:nvSpPr>
-        <p:spPr>
-          <a:xfrm>
-            <a:off x="648929" y="629266"/>
-            <a:ext cx="3505495" cy="1622321"/>
-          </a:xfrm>
-        </p:spPr>
-        <p:txBody>
-          <a:bodyPr>
-            <a:normAutofit/>
-          </a:bodyPr>
-          <a:lstStyle/>
-          <a:p>
-            <a:r>
-              <a:rPr lang="en-US" sz="3700"/>
-              <a:t>Phase 1.3 – Include Thermalito node</a:t>
-            </a:r>
-          </a:p>
-        </p:txBody>
-      </p:sp>
-      <p:sp>
-        <p:nvSpPr>
-          <p:cNvPr id="3" name="Content Placeholder 2">
-            <a:extLst>
-              <a:ext uri="{FF2B5EF4-FFF2-40B4-BE49-F238E27FC236}">
-                <a16:creationId xmlns:a16="http://schemas.microsoft.com/office/drawing/2014/main" id="{319E246B-3D2E-438E-BEED-6A615B92177C}"/>
-              </a:ext>
-            </a:extLst>
-          </p:cNvPr>
-          <p:cNvSpPr>
-            <a:spLocks noGrp="1"/>
-          </p:cNvSpPr>
-          <p:nvPr>
-            <p:ph idx="1"/>
-          </p:nvPr>
-        </p:nvSpPr>
-        <p:spPr>
-          <a:xfrm>
-            <a:off x="648931" y="2438400"/>
-            <a:ext cx="3505494" cy="3785419"/>
-          </a:xfrm>
-        </p:spPr>
-        <p:txBody>
-          <a:bodyPr>
-            <a:normAutofit/>
-          </a:bodyPr>
-          <a:lstStyle/>
-          <a:p>
-            <a:r>
-              <a:rPr lang="en-US" sz="2000" dirty="0"/>
-              <a:t>No deliveries yet</a:t>
-            </a:r>
-          </a:p>
-          <a:p>
-            <a:r>
-              <a:rPr lang="en-US" sz="2000" dirty="0"/>
-              <a:t>Just the passing of water from C_OROVL to C_THERM</a:t>
-            </a:r>
-          </a:p>
-          <a:p>
-            <a:r>
-              <a:rPr lang="en-US" sz="2000" dirty="0"/>
-              <a:t>Need to review the purpose of Accretion-Depletion (AD) terms and how to calculate</a:t>
-            </a:r>
-          </a:p>
-          <a:p>
-            <a:r>
-              <a:rPr lang="en-US" sz="2000" dirty="0"/>
-              <a:t>Output</a:t>
-            </a:r>
-          </a:p>
-          <a:p>
-            <a:pPr lvl="1"/>
-            <a:r>
-              <a:rPr lang="en-US" sz="2000" dirty="0"/>
-              <a:t>Flow from Thermalito (C_THERM)</a:t>
-            </a:r>
-          </a:p>
-        </p:txBody>
-      </p:sp>
-      <p:sp>
-        <p:nvSpPr>
-          <p:cNvPr id="38" name="Rectangle 37">
-            <a:extLst>
-              <a:ext uri="{FF2B5EF4-FFF2-40B4-BE49-F238E27FC236}">
-                <a16:creationId xmlns:a16="http://schemas.microsoft.com/office/drawing/2014/main" id="{5E39A796-BE83-48B1-B33F-35C4A32AAB57}"/>
-              </a:ext>
-              <a:ext uri="{C183D7F6-B498-43B3-948B-1728B52AA6E4}">
-                <adec:decorative xmlns:adec="http://schemas.microsoft.com/office/drawing/2017/decorative" val="1"/>
-              </a:ext>
-            </a:extLst>
-          </p:cNvPr>
-          <p:cNvSpPr>
-            <a:spLocks noGrp="1" noRot="1" noChangeAspect="1" noMove="1" noResize="1" noEditPoints="1" noAdjustHandles="1" noChangeArrowheads="1" noChangeShapeType="1" noTextEdit="1"/>
-          </p:cNvSpPr>
-          <p:nvPr>
-            <p:extLst>
-              <p:ext uri="{386F3935-93C4-4BCD-93E2-E3B085C9AB24}">
-                <p16:designElem xmlns:p16="http://schemas.microsoft.com/office/powerpoint/2015/main" val="1"/>
-              </p:ext>
-            </p:extLst>
-          </p:nvPr>
-        </p:nvSpPr>
-        <p:spPr>
-          <a:xfrm>
-            <a:off x="4639056" y="0"/>
-            <a:ext cx="7552944" cy="6858000"/>
-          </a:xfrm>
-          <a:prstGeom prst="rect">
-            <a:avLst/>
-          </a:prstGeom>
-          <a:solidFill>
-            <a:srgbClr val="C8CACA"/>
-          </a:solidFill>
-          <a:ln>
-            <a:noFill/>
-          </a:ln>
-        </p:spPr>
-        <p:style>
-          <a:lnRef idx="2">
-            <a:schemeClr val="accent1">
-              <a:shade val="50000"/>
-            </a:schemeClr>
-          </a:lnRef>
-          <a:fillRef idx="1">
-            <a:schemeClr val="accent1"/>
-          </a:fillRef>
-          <a:effectRef idx="0">
-            <a:schemeClr val="accent1"/>
-          </a:effectRef>
-          <a:fontRef idx="minor">
-            <a:schemeClr val="lt1"/>
-          </a:fontRef>
-        </p:style>
-        <p:txBody>
-          <a:bodyPr rtlCol="0" anchor="ctr"/>
-          <a:lstStyle/>
-          <a:p>
-            <a:pPr algn="ctr"/>
-            <a:endParaRPr lang="en-US"/>
-          </a:p>
-        </p:txBody>
-      </p:sp>
-      <p:sp>
-        <p:nvSpPr>
-          <p:cNvPr id="40" name="Rounded Rectangle 9">
-            <a:extLst>
-              <a:ext uri="{FF2B5EF4-FFF2-40B4-BE49-F238E27FC236}">
-                <a16:creationId xmlns:a16="http://schemas.microsoft.com/office/drawing/2014/main" id="{72F84B47-E267-4194-8194-831DB7B5547F}"/>
-              </a:ext>
-              <a:ext uri="{C183D7F6-B498-43B3-948B-1728B52AA6E4}">
-                <adec:decorative xmlns:adec="http://schemas.microsoft.com/office/drawing/2017/decorative" val="1"/>
-              </a:ext>
-            </a:extLst>
-          </p:cNvPr>
-          <p:cNvSpPr>
-            <a:spLocks noGrp="1" noRot="1" noChangeAspect="1" noMove="1" noResize="1" noEditPoints="1" noAdjustHandles="1" noChangeArrowheads="1" noChangeShapeType="1" noTextEdit="1"/>
-          </p:cNvSpPr>
-          <p:nvPr>
-            <p:extLst>
-              <p:ext uri="{386F3935-93C4-4BCD-93E2-E3B085C9AB24}">
-                <p16:designElem xmlns:p16="http://schemas.microsoft.com/office/powerpoint/2015/main" val="1"/>
-              </p:ext>
-            </p:extLst>
-          </p:nvPr>
-        </p:nvSpPr>
-        <p:spPr>
-          <a:xfrm>
-            <a:off x="5123688" y="557784"/>
-            <a:ext cx="6584098" cy="5739187"/>
-          </a:xfrm>
-          <a:prstGeom prst="roundRect">
-            <a:avLst>
-              <a:gd name="adj" fmla="val 0"/>
-            </a:avLst>
-          </a:prstGeom>
-          <a:solidFill>
-            <a:srgbClr val="FFFFFF"/>
-          </a:solidFill>
-          <a:ln w="9525">
-            <a:solidFill>
-              <a:srgbClr val="C8CACA"/>
-            </a:solidFill>
-          </a:ln>
-          <a:effectLst>
-            <a:outerShdw blurRad="57150" dist="19050" dir="5400000" algn="t" rotWithShape="0">
-              <a:prstClr val="black">
-                <a:alpha val="63000"/>
-              </a:prstClr>
-            </a:outerShdw>
-          </a:effectLst>
-        </p:spPr>
-        <p:style>
-          <a:lnRef idx="2">
-            <a:schemeClr val="accent1">
-              <a:shade val="50000"/>
-            </a:schemeClr>
-          </a:lnRef>
-          <a:fillRef idx="1">
-            <a:schemeClr val="accent1"/>
-          </a:fillRef>
-          <a:effectRef idx="0">
-            <a:schemeClr val="accent1"/>
-          </a:effectRef>
-          <a:fontRef idx="minor">
-            <a:schemeClr val="lt1"/>
-          </a:fontRef>
-        </p:style>
-        <p:txBody>
-          <a:bodyPr rtlCol="0" anchor="ctr"/>
-          <a:lstStyle/>
-          <a:p>
-            <a:pPr algn="ctr"/>
-            <a:endParaRPr lang="en-US"/>
-          </a:p>
-        </p:txBody>
-      </p:sp>
-      <p:pic>
-        <p:nvPicPr>
-          <p:cNvPr id="5" name="Picture 4">
-            <a:extLst>
-              <a:ext uri="{FF2B5EF4-FFF2-40B4-BE49-F238E27FC236}">
-                <a16:creationId xmlns:a16="http://schemas.microsoft.com/office/drawing/2014/main" id="{9E188F83-D5C3-4028-B774-C3E26D8C896D}"/>
-              </a:ext>
-            </a:extLst>
-          </p:cNvPr>
-          <p:cNvPicPr>
-            <a:picLocks noChangeAspect="1"/>
-          </p:cNvPicPr>
-          <p:nvPr/>
-        </p:nvPicPr>
-        <p:blipFill>
-          <a:blip r:embed="rId2"/>
-          <a:stretch>
-            <a:fillRect/>
-          </a:stretch>
-        </p:blipFill>
-        <p:spPr>
-          <a:xfrm>
-            <a:off x="5567936" y="807593"/>
-            <a:ext cx="5695183" cy="5239568"/>
-          </a:xfrm>
-          <a:prstGeom prst="rect">
-            <a:avLst/>
-          </a:prstGeom>
-          <a:effectLst/>
-        </p:spPr>
-      </p:pic>
-      <p:pic>
-        <p:nvPicPr>
-          <p:cNvPr id="7" name="Graphic 6" descr="Close">
-            <a:extLst>
-              <a:ext uri="{FF2B5EF4-FFF2-40B4-BE49-F238E27FC236}">
-                <a16:creationId xmlns:a16="http://schemas.microsoft.com/office/drawing/2014/main" id="{7F3418E1-10F5-451D-A07D-EA67C0BDDC9C}"/>
-              </a:ext>
-            </a:extLst>
-          </p:cNvPr>
-          <p:cNvPicPr>
-            <a:picLocks noChangeAspect="1"/>
-          </p:cNvPicPr>
-          <p:nvPr/>
-        </p:nvPicPr>
-        <p:blipFill>
-          <a:blip r:embed="rId3">
-            <a:extLst>
-              <a:ext uri="{28A0092B-C50C-407E-A947-70E740481C1C}">
-                <a14:useLocalDpi xmlns:a14="http://schemas.microsoft.com/office/drawing/2010/main" val="0"/>
-              </a:ext>
-              <a:ext uri="{96DAC541-7B7A-43D3-8B79-37D633B846F1}">
-                <asvg:svgBlip xmlns:asvg="http://schemas.microsoft.com/office/drawing/2016/SVG/main" r:embed="rId4"/>
-              </a:ext>
-            </a:extLst>
-          </a:blip>
-          <a:stretch>
-            <a:fillRect/>
-          </a:stretch>
-        </p:blipFill>
-        <p:spPr>
-          <a:xfrm>
-            <a:off x="5862649" y="4240763"/>
-            <a:ext cx="914400" cy="914400"/>
-          </a:xfrm>
-          <a:prstGeom prst="rect">
-            <a:avLst/>
-          </a:prstGeom>
-        </p:spPr>
-      </p:pic>
-      <p:pic>
-        <p:nvPicPr>
-          <p:cNvPr id="9" name="Graphic 8" descr="Close">
-            <a:extLst>
-              <a:ext uri="{FF2B5EF4-FFF2-40B4-BE49-F238E27FC236}">
-                <a16:creationId xmlns:a16="http://schemas.microsoft.com/office/drawing/2014/main" id="{B0745657-67C7-4DC6-B129-D920567331AF}"/>
-              </a:ext>
-            </a:extLst>
-          </p:cNvPr>
-          <p:cNvPicPr>
-            <a:picLocks noChangeAspect="1"/>
-          </p:cNvPicPr>
-          <p:nvPr/>
-        </p:nvPicPr>
-        <p:blipFill>
-          <a:blip r:embed="rId3">
-            <a:extLst>
-              <a:ext uri="{28A0092B-C50C-407E-A947-70E740481C1C}">
-                <a14:useLocalDpi xmlns:a14="http://schemas.microsoft.com/office/drawing/2010/main" val="0"/>
-              </a:ext>
-              <a:ext uri="{96DAC541-7B7A-43D3-8B79-37D633B846F1}">
-                <asvg:svgBlip xmlns:asvg="http://schemas.microsoft.com/office/drawing/2016/SVG/main" r:embed="rId4"/>
-              </a:ext>
-            </a:extLst>
-          </a:blip>
-          <a:stretch>
-            <a:fillRect/>
-          </a:stretch>
-        </p:blipFill>
-        <p:spPr>
-          <a:xfrm>
-            <a:off x="6777049" y="5246926"/>
-            <a:ext cx="914400" cy="914400"/>
-          </a:xfrm>
-          <a:prstGeom prst="rect">
-            <a:avLst/>
-          </a:prstGeom>
-        </p:spPr>
-      </p:pic>
-    </p:spTree>
-    <p:extLst>
-      <p:ext uri="{BB962C8B-B14F-4D97-AF65-F5344CB8AC3E}">
-        <p14:creationId xmlns:p14="http://schemas.microsoft.com/office/powerpoint/2010/main" val="1408431886"/>
-      </p:ext>
-    </p:extLst>
-  </p:cSld>
-  <p:clrMapOvr>
-    <a:masterClrMapping/>
-  </p:clrMapOvr>
-</p:sld>
-</file>
-
-<file path=ppt/slides/slide12.xml><?xml version="1.0" encoding="utf-8"?>
-<p:sld xmlns:a="http://schemas.openxmlformats.org/drawingml/2006/main" xmlns:r="http://schemas.openxmlformats.org/officeDocument/2006/relationships" xmlns:p="http://schemas.openxmlformats.org/presentationml/2006/main" show="0">
-  <p:cSld>
-    <p:bg>
-      <p:bgPr>
-        <a:solidFill>
-          <a:schemeClr val="bg1"/>
-        </a:solidFill>
-        <a:effectLst/>
-      </p:bgPr>
-    </p:bg>
-    <p:spTree>
-      <p:nvGrpSpPr>
-        <p:cNvPr id="1" name=""/>
-        <p:cNvGrpSpPr/>
-        <p:nvPr/>
-      </p:nvGrpSpPr>
-      <p:grpSpPr>
-        <a:xfrm>
-          <a:off x="0" y="0"/>
-          <a:ext cx="0" cy="0"/>
-          <a:chOff x="0" y="0"/>
-          <a:chExt cx="0" cy="0"/>
-        </a:xfrm>
-      </p:grpSpPr>
-      <p:sp>
-        <p:nvSpPr>
-          <p:cNvPr id="2" name="Title 1">
-            <a:extLst>
-              <a:ext uri="{FF2B5EF4-FFF2-40B4-BE49-F238E27FC236}">
-                <a16:creationId xmlns:a16="http://schemas.microsoft.com/office/drawing/2014/main" id="{4F87C7D5-4E35-46C7-A5AB-3569E12C88CF}"/>
-              </a:ext>
-            </a:extLst>
-          </p:cNvPr>
-          <p:cNvSpPr>
-            <a:spLocks noGrp="1"/>
-          </p:cNvSpPr>
-          <p:nvPr>
-            <p:ph type="title"/>
-          </p:nvPr>
-        </p:nvSpPr>
-        <p:spPr>
-          <a:xfrm>
-            <a:off x="648929" y="629266"/>
-            <a:ext cx="3505495" cy="1622321"/>
-          </a:xfrm>
-        </p:spPr>
-        <p:txBody>
-          <a:bodyPr>
-            <a:normAutofit fontScale="90000"/>
-          </a:bodyPr>
-          <a:lstStyle/>
-          <a:p>
-            <a:r>
-              <a:rPr lang="en-US" sz="3700" dirty="0"/>
-              <a:t>Phase 1.4 – Include Thermalito deliveries</a:t>
-            </a:r>
-          </a:p>
-        </p:txBody>
-      </p:sp>
-      <p:sp>
-        <p:nvSpPr>
-          <p:cNvPr id="3" name="Content Placeholder 2">
-            <a:extLst>
-              <a:ext uri="{FF2B5EF4-FFF2-40B4-BE49-F238E27FC236}">
-                <a16:creationId xmlns:a16="http://schemas.microsoft.com/office/drawing/2014/main" id="{319E246B-3D2E-438E-BEED-6A615B92177C}"/>
-              </a:ext>
-            </a:extLst>
-          </p:cNvPr>
-          <p:cNvSpPr>
-            <a:spLocks noGrp="1"/>
-          </p:cNvSpPr>
-          <p:nvPr>
-            <p:ph idx="1"/>
-          </p:nvPr>
-        </p:nvSpPr>
-        <p:spPr>
-          <a:xfrm>
-            <a:off x="648931" y="2438400"/>
-            <a:ext cx="3505494" cy="3785419"/>
-          </a:xfrm>
-        </p:spPr>
-        <p:txBody>
-          <a:bodyPr>
-            <a:normAutofit/>
-          </a:bodyPr>
-          <a:lstStyle/>
-          <a:p>
-            <a:r>
-              <a:rPr lang="en-US" sz="2000" dirty="0"/>
-              <a:t>Add demands for D_THERM</a:t>
-            </a:r>
-          </a:p>
-          <a:p>
-            <a:r>
-              <a:rPr lang="en-US" sz="2000" dirty="0"/>
-              <a:t>Need to review the purpose of Accretion-Depletion (AD) terms and how to calculate</a:t>
-            </a:r>
-          </a:p>
-          <a:p>
-            <a:r>
-              <a:rPr lang="en-US" sz="2000" dirty="0"/>
-              <a:t>Output</a:t>
-            </a:r>
-          </a:p>
-          <a:p>
-            <a:pPr lvl="1"/>
-            <a:r>
-              <a:rPr lang="en-US" sz="2000" dirty="0"/>
-              <a:t>D_THERM</a:t>
-            </a:r>
-          </a:p>
-        </p:txBody>
-      </p:sp>
-      <p:sp>
-        <p:nvSpPr>
-          <p:cNvPr id="38" name="Rectangle 37">
-            <a:extLst>
-              <a:ext uri="{FF2B5EF4-FFF2-40B4-BE49-F238E27FC236}">
-                <a16:creationId xmlns:a16="http://schemas.microsoft.com/office/drawing/2014/main" id="{5E39A796-BE83-48B1-B33F-35C4A32AAB57}"/>
-              </a:ext>
-              <a:ext uri="{C183D7F6-B498-43B3-948B-1728B52AA6E4}">
-                <adec:decorative xmlns:adec="http://schemas.microsoft.com/office/drawing/2017/decorative" val="1"/>
-              </a:ext>
-            </a:extLst>
-          </p:cNvPr>
-          <p:cNvSpPr>
-            <a:spLocks noGrp="1" noRot="1" noChangeAspect="1" noMove="1" noResize="1" noEditPoints="1" noAdjustHandles="1" noChangeArrowheads="1" noChangeShapeType="1" noTextEdit="1"/>
-          </p:cNvSpPr>
-          <p:nvPr>
-            <p:extLst>
-              <p:ext uri="{386F3935-93C4-4BCD-93E2-E3B085C9AB24}">
-                <p16:designElem xmlns:p16="http://schemas.microsoft.com/office/powerpoint/2015/main" val="1"/>
-              </p:ext>
-            </p:extLst>
-          </p:nvPr>
-        </p:nvSpPr>
-        <p:spPr>
-          <a:xfrm>
-            <a:off x="4639056" y="0"/>
-            <a:ext cx="7552944" cy="6858000"/>
-          </a:xfrm>
-          <a:prstGeom prst="rect">
-            <a:avLst/>
-          </a:prstGeom>
-          <a:solidFill>
-            <a:srgbClr val="C8CACA"/>
-          </a:solidFill>
-          <a:ln>
-            <a:noFill/>
-          </a:ln>
-        </p:spPr>
-        <p:style>
-          <a:lnRef idx="2">
-            <a:schemeClr val="accent1">
-              <a:shade val="50000"/>
-            </a:schemeClr>
-          </a:lnRef>
-          <a:fillRef idx="1">
-            <a:schemeClr val="accent1"/>
-          </a:fillRef>
-          <a:effectRef idx="0">
-            <a:schemeClr val="accent1"/>
-          </a:effectRef>
-          <a:fontRef idx="minor">
-            <a:schemeClr val="lt1"/>
-          </a:fontRef>
-        </p:style>
-        <p:txBody>
-          <a:bodyPr rtlCol="0" anchor="ctr"/>
-          <a:lstStyle/>
-          <a:p>
-            <a:pPr algn="ctr"/>
-            <a:endParaRPr lang="en-US"/>
-          </a:p>
-        </p:txBody>
-      </p:sp>
-      <p:sp>
-        <p:nvSpPr>
-          <p:cNvPr id="40" name="Rounded Rectangle 9">
-            <a:extLst>
-              <a:ext uri="{FF2B5EF4-FFF2-40B4-BE49-F238E27FC236}">
-                <a16:creationId xmlns:a16="http://schemas.microsoft.com/office/drawing/2014/main" id="{72F84B47-E267-4194-8194-831DB7B5547F}"/>
-              </a:ext>
-              <a:ext uri="{C183D7F6-B498-43B3-948B-1728B52AA6E4}">
-                <adec:decorative xmlns:adec="http://schemas.microsoft.com/office/drawing/2017/decorative" val="1"/>
-              </a:ext>
-            </a:extLst>
-          </p:cNvPr>
-          <p:cNvSpPr>
-            <a:spLocks noGrp="1" noRot="1" noChangeAspect="1" noMove="1" noResize="1" noEditPoints="1" noAdjustHandles="1" noChangeArrowheads="1" noChangeShapeType="1" noTextEdit="1"/>
-          </p:cNvSpPr>
-          <p:nvPr>
-            <p:extLst>
-              <p:ext uri="{386F3935-93C4-4BCD-93E2-E3B085C9AB24}">
-                <p16:designElem xmlns:p16="http://schemas.microsoft.com/office/powerpoint/2015/main" val="1"/>
-              </p:ext>
-            </p:extLst>
-          </p:nvPr>
-        </p:nvSpPr>
-        <p:spPr>
-          <a:xfrm>
-            <a:off x="5123688" y="557784"/>
-            <a:ext cx="6584098" cy="5739187"/>
-          </a:xfrm>
-          <a:prstGeom prst="roundRect">
-            <a:avLst>
-              <a:gd name="adj" fmla="val 0"/>
-            </a:avLst>
-          </a:prstGeom>
-          <a:solidFill>
-            <a:srgbClr val="FFFFFF"/>
-          </a:solidFill>
-          <a:ln w="9525">
-            <a:solidFill>
-              <a:srgbClr val="C8CACA"/>
-            </a:solidFill>
-          </a:ln>
-          <a:effectLst>
-            <a:outerShdw blurRad="57150" dist="19050" dir="5400000" algn="t" rotWithShape="0">
-              <a:prstClr val="black">
-                <a:alpha val="63000"/>
-              </a:prstClr>
-            </a:outerShdw>
-          </a:effectLst>
-        </p:spPr>
-        <p:style>
-          <a:lnRef idx="2">
-            <a:schemeClr val="accent1">
-              <a:shade val="50000"/>
-            </a:schemeClr>
-          </a:lnRef>
-          <a:fillRef idx="1">
-            <a:schemeClr val="accent1"/>
-          </a:fillRef>
-          <a:effectRef idx="0">
-            <a:schemeClr val="accent1"/>
-          </a:effectRef>
-          <a:fontRef idx="minor">
-            <a:schemeClr val="lt1"/>
-          </a:fontRef>
-        </p:style>
-        <p:txBody>
-          <a:bodyPr rtlCol="0" anchor="ctr"/>
-          <a:lstStyle/>
-          <a:p>
-            <a:pPr algn="ctr"/>
-            <a:endParaRPr lang="en-US"/>
-          </a:p>
-        </p:txBody>
-      </p:sp>
-      <p:pic>
-        <p:nvPicPr>
-          <p:cNvPr id="5" name="Picture 4">
-            <a:extLst>
-              <a:ext uri="{FF2B5EF4-FFF2-40B4-BE49-F238E27FC236}">
-                <a16:creationId xmlns:a16="http://schemas.microsoft.com/office/drawing/2014/main" id="{9E188F83-D5C3-4028-B774-C3E26D8C896D}"/>
-              </a:ext>
-            </a:extLst>
-          </p:cNvPr>
-          <p:cNvPicPr>
-            <a:picLocks noChangeAspect="1"/>
-          </p:cNvPicPr>
-          <p:nvPr/>
-        </p:nvPicPr>
-        <p:blipFill>
-          <a:blip r:embed="rId2"/>
-          <a:stretch>
-            <a:fillRect/>
-          </a:stretch>
-        </p:blipFill>
-        <p:spPr>
-          <a:xfrm>
-            <a:off x="5567936" y="807593"/>
-            <a:ext cx="5695183" cy="5239568"/>
-          </a:xfrm>
-          <a:prstGeom prst="rect">
-            <a:avLst/>
-          </a:prstGeom>
-          <a:effectLst/>
-        </p:spPr>
-      </p:pic>
-      <p:pic>
-        <p:nvPicPr>
-          <p:cNvPr id="9" name="Graphic 8" descr="Close">
-            <a:extLst>
-              <a:ext uri="{FF2B5EF4-FFF2-40B4-BE49-F238E27FC236}">
-                <a16:creationId xmlns:a16="http://schemas.microsoft.com/office/drawing/2014/main" id="{B0745657-67C7-4DC6-B129-D920567331AF}"/>
-              </a:ext>
-            </a:extLst>
-          </p:cNvPr>
-          <p:cNvPicPr>
-            <a:picLocks noChangeAspect="1"/>
-          </p:cNvPicPr>
-          <p:nvPr/>
-        </p:nvPicPr>
-        <p:blipFill>
-          <a:blip r:embed="rId3">
-            <a:extLst>
-              <a:ext uri="{28A0092B-C50C-407E-A947-70E740481C1C}">
-                <a14:useLocalDpi xmlns:a14="http://schemas.microsoft.com/office/drawing/2010/main" val="0"/>
-              </a:ext>
-              <a:ext uri="{96DAC541-7B7A-43D3-8B79-37D633B846F1}">
-                <asvg:svgBlip xmlns:asvg="http://schemas.microsoft.com/office/drawing/2016/SVG/main" r:embed="rId4"/>
-              </a:ext>
-            </a:extLst>
-          </a:blip>
-          <a:stretch>
-            <a:fillRect/>
-          </a:stretch>
-        </p:blipFill>
-        <p:spPr>
-          <a:xfrm>
-            <a:off x="6777049" y="5246926"/>
-            <a:ext cx="914400" cy="914400"/>
-          </a:xfrm>
-          <a:prstGeom prst="rect">
-            <a:avLst/>
-          </a:prstGeom>
-        </p:spPr>
-      </p:pic>
-    </p:spTree>
-    <p:extLst>
-      <p:ext uri="{BB962C8B-B14F-4D97-AF65-F5344CB8AC3E}">
-        <p14:creationId xmlns:p14="http://schemas.microsoft.com/office/powerpoint/2010/main" val="3305777850"/>
-      </p:ext>
-    </p:extLst>
-  </p:cSld>
-  <p:clrMapOvr>
-    <a:masterClrMapping/>
-  </p:clrMapOvr>
-</p:sld>
-</file>
-
-<file path=ppt/slides/slide13.xml><?xml version="1.0" encoding="utf-8"?>
 <p:sld xmlns:a="http://schemas.openxmlformats.org/drawingml/2006/main" xmlns:r="http://schemas.openxmlformats.org/officeDocument/2006/relationships" xmlns:p="http://schemas.openxmlformats.org/presentationml/2006/main">
   <p:cSld>
     <p:spTree>
@@ -4430,7 +3423,7 @@
           <p:cNvPr id="2" name="Title 1">
             <a:extLst>
               <a:ext uri="{FF2B5EF4-FFF2-40B4-BE49-F238E27FC236}">
-                <a16:creationId xmlns:a16="http://schemas.microsoft.com/office/drawing/2014/main" id="{7E602E9E-CB09-48DE-834B-DAFF04BB4499}"/>
+                <a16:creationId xmlns:a16="http://schemas.microsoft.com/office/drawing/2014/main" id="{B963A3C7-558F-48C0-9254-A6C424CED78E}"/>
               </a:ext>
             </a:extLst>
           </p:cNvPr>
@@ -4448,770 +3441,678 @@
           <a:p>
             <a:r>
               <a:rPr lang="en-US" dirty="0"/>
-              <a:t>Phase 1 data requirements</a:t>
-            </a:r>
-          </a:p>
-        </p:txBody>
-      </p:sp>
-      <p:sp>
-        <p:nvSpPr>
-          <p:cNvPr id="3" name="Content Placeholder 2">
-            <a:extLst>
-              <a:ext uri="{FF2B5EF4-FFF2-40B4-BE49-F238E27FC236}">
-                <a16:creationId xmlns:a16="http://schemas.microsoft.com/office/drawing/2014/main" id="{8382E53A-D19C-4A6E-BB07-054AA7B676BF}"/>
-              </a:ext>
-            </a:extLst>
-          </p:cNvPr>
-          <p:cNvSpPr>
-            <a:spLocks noGrp="1"/>
-          </p:cNvSpPr>
+              <a:t>Thermalito demands and diversions</a:t>
+            </a:r>
+          </a:p>
+        </p:txBody>
+      </p:sp>
+      <p:graphicFrame>
+        <p:nvGraphicFramePr>
+          <p:cNvPr id="4" name="Table 4">
+            <a:extLst>
+              <a:ext uri="{FF2B5EF4-FFF2-40B4-BE49-F238E27FC236}">
+                <a16:creationId xmlns:a16="http://schemas.microsoft.com/office/drawing/2014/main" id="{AFC2C28B-4F81-4377-8895-13A46BABB8E8}"/>
+              </a:ext>
+            </a:extLst>
+          </p:cNvPr>
+          <p:cNvGraphicFramePr>
+            <a:graphicFrameLocks noGrp="1"/>
+          </p:cNvGraphicFramePr>
           <p:nvPr>
             <p:ph idx="1"/>
-          </p:nvPr>
-        </p:nvSpPr>
-        <p:spPr/>
-        <p:txBody>
-          <a:bodyPr/>
-          <a:lstStyle/>
-          <a:p>
-            <a:r>
-              <a:rPr lang="en-US" dirty="0"/>
-              <a:t>Lake Oroville</a:t>
-            </a:r>
-          </a:p>
-          <a:p>
-            <a:pPr lvl="1"/>
-            <a:r>
-              <a:rPr lang="en-US" dirty="0"/>
-              <a:t>Inflow (TAF/day)</a:t>
-            </a:r>
-          </a:p>
-          <a:p>
-            <a:pPr lvl="1"/>
-            <a:r>
-              <a:rPr lang="en-US" dirty="0"/>
-              <a:t>Initial storage</a:t>
-            </a:r>
-          </a:p>
-          <a:p>
-            <a:pPr lvl="1"/>
-            <a:r>
-              <a:rPr lang="en-US" dirty="0"/>
-              <a:t>Level 5 storage</a:t>
-            </a:r>
-          </a:p>
-          <a:p>
-            <a:pPr lvl="1"/>
-            <a:r>
-              <a:rPr lang="en-US" dirty="0"/>
-              <a:t>Evaporation rate</a:t>
-            </a:r>
-          </a:p>
-          <a:p>
-            <a:r>
-              <a:rPr lang="en-US" dirty="0"/>
-              <a:t>Oroville water rights demands</a:t>
-            </a:r>
-          </a:p>
-          <a:p>
-            <a:r>
-              <a:rPr lang="en-US" dirty="0"/>
-              <a:t>Minimum groundwater pumping</a:t>
-            </a:r>
-          </a:p>
-          <a:p>
-            <a:endParaRPr lang="en-US" dirty="0"/>
-          </a:p>
-          <a:p>
-            <a:endParaRPr lang="en-US" dirty="0"/>
-          </a:p>
-          <a:p>
-            <a:endParaRPr lang="en-US" dirty="0"/>
-          </a:p>
-        </p:txBody>
-      </p:sp>
+            <p:extLst>
+              <p:ext uri="{D42A27DB-BD31-4B8C-83A1-F6EECF244321}">
+                <p14:modId xmlns:p14="http://schemas.microsoft.com/office/powerpoint/2010/main" val="1034737622"/>
+              </p:ext>
+            </p:extLst>
+          </p:nvPr>
+        </p:nvGraphicFramePr>
+        <p:xfrm>
+          <a:off x="838200" y="1825625"/>
+          <a:ext cx="10515600" cy="4348480"/>
+        </p:xfrm>
+        <a:graphic>
+          <a:graphicData uri="http://schemas.openxmlformats.org/drawingml/2006/table">
+            <a:tbl>
+              <a:tblPr firstRow="1" bandRow="1">
+                <a:tableStyleId>{6E25E649-3F16-4E02-A733-19D2CDBF48F0}</a:tableStyleId>
+              </a:tblPr>
+              <a:tblGrid>
+                <a:gridCol w="2628900">
+                  <a:extLst>
+                    <a:ext uri="{9D8B030D-6E8A-4147-A177-3AD203B41FA5}">
+                      <a16:colId xmlns:a16="http://schemas.microsoft.com/office/drawing/2014/main" val="2773560624"/>
+                    </a:ext>
+                  </a:extLst>
+                </a:gridCol>
+                <a:gridCol w="2628900">
+                  <a:extLst>
+                    <a:ext uri="{9D8B030D-6E8A-4147-A177-3AD203B41FA5}">
+                      <a16:colId xmlns:a16="http://schemas.microsoft.com/office/drawing/2014/main" val="1719155668"/>
+                    </a:ext>
+                  </a:extLst>
+                </a:gridCol>
+                <a:gridCol w="2628900">
+                  <a:extLst>
+                    <a:ext uri="{9D8B030D-6E8A-4147-A177-3AD203B41FA5}">
+                      <a16:colId xmlns:a16="http://schemas.microsoft.com/office/drawing/2014/main" val="1560100998"/>
+                    </a:ext>
+                  </a:extLst>
+                </a:gridCol>
+                <a:gridCol w="2628900">
+                  <a:extLst>
+                    <a:ext uri="{9D8B030D-6E8A-4147-A177-3AD203B41FA5}">
+                      <a16:colId xmlns:a16="http://schemas.microsoft.com/office/drawing/2014/main" val="342775121"/>
+                    </a:ext>
+                  </a:extLst>
+                </a:gridCol>
+              </a:tblGrid>
+              <a:tr h="370840">
+                <a:tc>
+                  <a:txBody>
+                    <a:bodyPr/>
+                    <a:lstStyle/>
+                    <a:p>
+                      <a:r>
+                        <a:rPr lang="en-US" dirty="0"/>
+                        <a:t>Region</a:t>
+                      </a:r>
+                    </a:p>
+                  </a:txBody>
+                  <a:tcPr/>
+                </a:tc>
+                <a:tc>
+                  <a:txBody>
+                    <a:bodyPr/>
+                    <a:lstStyle/>
+                    <a:p>
+                      <a:r>
+                        <a:rPr lang="en-US" dirty="0"/>
+                        <a:t>Delivery Node</a:t>
+                      </a:r>
+                    </a:p>
+                  </a:txBody>
+                  <a:tcPr/>
+                </a:tc>
+                <a:tc>
+                  <a:txBody>
+                    <a:bodyPr/>
+                    <a:lstStyle/>
+                    <a:p>
+                      <a:r>
+                        <a:rPr lang="en-US" dirty="0"/>
+                        <a:t>Project Delivery Type</a:t>
+                      </a:r>
+                    </a:p>
+                  </a:txBody>
+                  <a:tcPr/>
+                </a:tc>
+                <a:tc>
+                  <a:txBody>
+                    <a:bodyPr/>
+                    <a:lstStyle/>
+                    <a:p>
+                      <a:endParaRPr lang="en-US"/>
+                    </a:p>
+                  </a:txBody>
+                  <a:tcPr/>
+                </a:tc>
+                <a:extLst>
+                  <a:ext uri="{0D108BD9-81ED-4DB2-BD59-A6C34878D82A}">
+                    <a16:rowId xmlns:a16="http://schemas.microsoft.com/office/drawing/2014/main" val="2202246166"/>
+                  </a:ext>
+                </a:extLst>
+              </a:tr>
+              <a:tr h="370840">
+                <a:tc rowSpan="3">
+                  <a:txBody>
+                    <a:bodyPr/>
+                    <a:lstStyle/>
+                    <a:p>
+                      <a:r>
+                        <a:rPr lang="en-US" dirty="0"/>
+                        <a:t>Western Canal</a:t>
+                      </a:r>
+                    </a:p>
+                  </a:txBody>
+                  <a:tcPr/>
+                </a:tc>
+                <a:tc>
+                  <a:txBody>
+                    <a:bodyPr/>
+                    <a:lstStyle/>
+                    <a:p>
+                      <a:r>
+                        <a:rPr lang="en-US" dirty="0"/>
+                        <a:t>D7A_PWR</a:t>
+                      </a:r>
+                    </a:p>
+                  </a:txBody>
+                  <a:tcPr/>
+                </a:tc>
+                <a:tc>
+                  <a:txBody>
+                    <a:bodyPr/>
+                    <a:lstStyle/>
+                    <a:p>
+                      <a:r>
+                        <a:rPr lang="en-US" dirty="0"/>
+                        <a:t>Water rights</a:t>
+                      </a:r>
+                    </a:p>
+                  </a:txBody>
+                  <a:tcPr/>
+                </a:tc>
+                <a:tc>
+                  <a:txBody>
+                    <a:bodyPr/>
+                    <a:lstStyle/>
+                    <a:p>
+                      <a:endParaRPr lang="en-US"/>
+                    </a:p>
+                  </a:txBody>
+                  <a:tcPr/>
+                </a:tc>
+                <a:extLst>
+                  <a:ext uri="{0D108BD9-81ED-4DB2-BD59-A6C34878D82A}">
+                    <a16:rowId xmlns:a16="http://schemas.microsoft.com/office/drawing/2014/main" val="1707757952"/>
+                  </a:ext>
+                </a:extLst>
+              </a:tr>
+              <a:tr h="370840">
+                <a:tc vMerge="1">
+                  <a:txBody>
+                    <a:bodyPr/>
+                    <a:lstStyle/>
+                    <a:p>
+                      <a:endParaRPr lang="en-US" dirty="0"/>
+                    </a:p>
+                  </a:txBody>
+                  <a:tcPr/>
+                </a:tc>
+                <a:tc>
+                  <a:txBody>
+                    <a:bodyPr/>
+                    <a:lstStyle/>
+                    <a:p>
+                      <a:r>
+                        <a:rPr lang="en-US" dirty="0"/>
+                        <a:t>D7A_PAG</a:t>
+                      </a:r>
+                    </a:p>
+                  </a:txBody>
+                  <a:tcPr/>
+                </a:tc>
+                <a:tc>
+                  <a:txBody>
+                    <a:bodyPr/>
+                    <a:lstStyle/>
+                    <a:p>
+                      <a:r>
+                        <a:rPr lang="en-US" dirty="0"/>
+                        <a:t>Agricultural</a:t>
+                      </a:r>
+                    </a:p>
+                  </a:txBody>
+                  <a:tcPr/>
+                </a:tc>
+                <a:tc>
+                  <a:txBody>
+                    <a:bodyPr/>
+                    <a:lstStyle/>
+                    <a:p>
+                      <a:endParaRPr lang="en-US"/>
+                    </a:p>
+                  </a:txBody>
+                  <a:tcPr/>
+                </a:tc>
+                <a:extLst>
+                  <a:ext uri="{0D108BD9-81ED-4DB2-BD59-A6C34878D82A}">
+                    <a16:rowId xmlns:a16="http://schemas.microsoft.com/office/drawing/2014/main" val="3108674323"/>
+                  </a:ext>
+                </a:extLst>
+              </a:tr>
+              <a:tr h="370840">
+                <a:tc vMerge="1">
+                  <a:txBody>
+                    <a:bodyPr/>
+                    <a:lstStyle/>
+                    <a:p>
+                      <a:endParaRPr lang="en-US" dirty="0"/>
+                    </a:p>
+                  </a:txBody>
+                  <a:tcPr/>
+                </a:tc>
+                <a:tc>
+                  <a:txBody>
+                    <a:bodyPr/>
+                    <a:lstStyle/>
+                    <a:p>
+                      <a:r>
+                        <a:rPr lang="en-US" dirty="0"/>
+                        <a:t>D7A_PRF</a:t>
+                      </a:r>
+                    </a:p>
+                  </a:txBody>
+                  <a:tcPr/>
+                </a:tc>
+                <a:tc>
+                  <a:txBody>
+                    <a:bodyPr/>
+                    <a:lstStyle/>
+                    <a:p>
+                      <a:r>
+                        <a:rPr lang="en-US" dirty="0"/>
+                        <a:t>Refuge</a:t>
+                      </a:r>
+                    </a:p>
+                  </a:txBody>
+                  <a:tcPr/>
+                </a:tc>
+                <a:tc>
+                  <a:txBody>
+                    <a:bodyPr/>
+                    <a:lstStyle/>
+                    <a:p>
+                      <a:endParaRPr lang="en-US"/>
+                    </a:p>
+                  </a:txBody>
+                  <a:tcPr/>
+                </a:tc>
+                <a:extLst>
+                  <a:ext uri="{0D108BD9-81ED-4DB2-BD59-A6C34878D82A}">
+                    <a16:rowId xmlns:a16="http://schemas.microsoft.com/office/drawing/2014/main" val="378717458"/>
+                  </a:ext>
+                </a:extLst>
+              </a:tr>
+              <a:tr h="370840">
+                <a:tc rowSpan="3">
+                  <a:txBody>
+                    <a:bodyPr/>
+                    <a:lstStyle/>
+                    <a:p>
+                      <a:r>
+                        <a:rPr lang="en-US" dirty="0"/>
+                        <a:t>Joint Canal</a:t>
+                      </a:r>
+                    </a:p>
+                  </a:txBody>
+                  <a:tcPr/>
+                </a:tc>
+                <a:tc>
+                  <a:txBody>
+                    <a:bodyPr/>
+                    <a:lstStyle/>
+                    <a:p>
+                      <a:r>
+                        <a:rPr lang="en-US" dirty="0"/>
+                        <a:t>D7B_PWR</a:t>
+                      </a:r>
+                    </a:p>
+                  </a:txBody>
+                  <a:tcPr/>
+                </a:tc>
+                <a:tc>
+                  <a:txBody>
+                    <a:bodyPr/>
+                    <a:lstStyle/>
+                    <a:p>
+                      <a:r>
+                        <a:rPr lang="en-US" dirty="0"/>
+                        <a:t>Water rights</a:t>
+                      </a:r>
+                    </a:p>
+                  </a:txBody>
+                  <a:tcPr/>
+                </a:tc>
+                <a:tc>
+                  <a:txBody>
+                    <a:bodyPr/>
+                    <a:lstStyle/>
+                    <a:p>
+                      <a:endParaRPr lang="en-US"/>
+                    </a:p>
+                  </a:txBody>
+                  <a:tcPr/>
+                </a:tc>
+                <a:extLst>
+                  <a:ext uri="{0D108BD9-81ED-4DB2-BD59-A6C34878D82A}">
+                    <a16:rowId xmlns:a16="http://schemas.microsoft.com/office/drawing/2014/main" val="4230129858"/>
+                  </a:ext>
+                </a:extLst>
+              </a:tr>
+              <a:tr h="370840">
+                <a:tc vMerge="1">
+                  <a:txBody>
+                    <a:bodyPr/>
+                    <a:lstStyle/>
+                    <a:p>
+                      <a:endParaRPr lang="en-US" dirty="0"/>
+                    </a:p>
+                  </a:txBody>
+                  <a:tcPr/>
+                </a:tc>
+                <a:tc>
+                  <a:txBody>
+                    <a:bodyPr/>
+                    <a:lstStyle/>
+                    <a:p>
+                      <a:r>
+                        <a:rPr lang="en-US" dirty="0"/>
+                        <a:t>D7B_PAG</a:t>
+                      </a:r>
+                    </a:p>
+                  </a:txBody>
+                  <a:tcPr/>
+                </a:tc>
+                <a:tc>
+                  <a:txBody>
+                    <a:bodyPr/>
+                    <a:lstStyle/>
+                    <a:p>
+                      <a:r>
+                        <a:rPr lang="en-US" dirty="0"/>
+                        <a:t>Agricultural</a:t>
+                      </a:r>
+                    </a:p>
+                  </a:txBody>
+                  <a:tcPr/>
+                </a:tc>
+                <a:tc>
+                  <a:txBody>
+                    <a:bodyPr/>
+                    <a:lstStyle/>
+                    <a:p>
+                      <a:endParaRPr lang="en-US"/>
+                    </a:p>
+                  </a:txBody>
+                  <a:tcPr/>
+                </a:tc>
+                <a:extLst>
+                  <a:ext uri="{0D108BD9-81ED-4DB2-BD59-A6C34878D82A}">
+                    <a16:rowId xmlns:a16="http://schemas.microsoft.com/office/drawing/2014/main" val="2587024677"/>
+                  </a:ext>
+                </a:extLst>
+              </a:tr>
+              <a:tr h="370840">
+                <a:tc vMerge="1">
+                  <a:txBody>
+                    <a:bodyPr/>
+                    <a:lstStyle/>
+                    <a:p>
+                      <a:endParaRPr lang="en-US" dirty="0"/>
+                    </a:p>
+                  </a:txBody>
+                  <a:tcPr/>
+                </a:tc>
+                <a:tc>
+                  <a:txBody>
+                    <a:bodyPr/>
+                    <a:lstStyle/>
+                    <a:p>
+                      <a:r>
+                        <a:rPr lang="en-US" dirty="0"/>
+                        <a:t>D7B_PRF</a:t>
+                      </a:r>
+                    </a:p>
+                  </a:txBody>
+                  <a:tcPr/>
+                </a:tc>
+                <a:tc>
+                  <a:txBody>
+                    <a:bodyPr/>
+                    <a:lstStyle/>
+                    <a:p>
+                      <a:r>
+                        <a:rPr lang="en-US" dirty="0"/>
+                        <a:t>Refuge</a:t>
+                      </a:r>
+                    </a:p>
+                  </a:txBody>
+                  <a:tcPr/>
+                </a:tc>
+                <a:tc>
+                  <a:txBody>
+                    <a:bodyPr/>
+                    <a:lstStyle/>
+                    <a:p>
+                      <a:endParaRPr lang="en-US"/>
+                    </a:p>
+                  </a:txBody>
+                  <a:tcPr/>
+                </a:tc>
+                <a:extLst>
+                  <a:ext uri="{0D108BD9-81ED-4DB2-BD59-A6C34878D82A}">
+                    <a16:rowId xmlns:a16="http://schemas.microsoft.com/office/drawing/2014/main" val="1668467391"/>
+                  </a:ext>
+                </a:extLst>
+              </a:tr>
+              <a:tr h="370840">
+                <a:tc>
+                  <a:txBody>
+                    <a:bodyPr/>
+                    <a:lstStyle/>
+                    <a:p>
+                      <a:r>
+                        <a:rPr lang="en-US" dirty="0"/>
+                        <a:t>Rice decomp</a:t>
+                      </a:r>
+                    </a:p>
+                  </a:txBody>
+                  <a:tcPr/>
+                </a:tc>
+                <a:tc>
+                  <a:txBody>
+                    <a:bodyPr/>
+                    <a:lstStyle/>
+                    <a:p>
+                      <a:r>
+                        <a:rPr lang="en-US" dirty="0"/>
+                        <a:t>D7C</a:t>
+                      </a:r>
+                    </a:p>
+                  </a:txBody>
+                  <a:tcPr/>
+                </a:tc>
+                <a:tc>
+                  <a:txBody>
+                    <a:bodyPr/>
+                    <a:lstStyle/>
+                    <a:p>
+                      <a:endParaRPr lang="en-US" dirty="0"/>
+                    </a:p>
+                  </a:txBody>
+                  <a:tcPr/>
+                </a:tc>
+                <a:tc>
+                  <a:txBody>
+                    <a:bodyPr/>
+                    <a:lstStyle/>
+                    <a:p>
+                      <a:endParaRPr lang="en-US" dirty="0"/>
+                    </a:p>
+                  </a:txBody>
+                  <a:tcPr/>
+                </a:tc>
+                <a:extLst>
+                  <a:ext uri="{0D108BD9-81ED-4DB2-BD59-A6C34878D82A}">
+                    <a16:rowId xmlns:a16="http://schemas.microsoft.com/office/drawing/2014/main" val="3569213633"/>
+                  </a:ext>
+                </a:extLst>
+              </a:tr>
+              <a:tr h="370840">
+                <a:tc rowSpan="2">
+                  <a:txBody>
+                    <a:bodyPr/>
+                    <a:lstStyle/>
+                    <a:p>
+                      <a:r>
+                        <a:rPr lang="en-US" dirty="0"/>
+                        <a:t>Butte County</a:t>
+                      </a:r>
+                    </a:p>
+                  </a:txBody>
+                  <a:tcPr/>
+                </a:tc>
+                <a:tc>
+                  <a:txBody>
+                    <a:bodyPr/>
+                    <a:lstStyle/>
+                    <a:p>
+                      <a:r>
+                        <a:rPr lang="en-US" dirty="0"/>
+                        <a:t>D201_PIMI</a:t>
+                      </a:r>
+                    </a:p>
+                  </a:txBody>
+                  <a:tcPr/>
+                </a:tc>
+                <a:tc>
+                  <a:txBody>
+                    <a:bodyPr/>
+                    <a:lstStyle/>
+                    <a:p>
+                      <a:r>
+                        <a:rPr lang="en-US" dirty="0"/>
+                        <a:t>Indoor M&amp;I</a:t>
+                      </a:r>
+                    </a:p>
+                  </a:txBody>
+                  <a:tcPr/>
+                </a:tc>
+                <a:tc>
+                  <a:txBody>
+                    <a:bodyPr/>
+                    <a:lstStyle/>
+                    <a:p>
+                      <a:endParaRPr lang="en-US" dirty="0"/>
+                    </a:p>
+                  </a:txBody>
+                  <a:tcPr/>
+                </a:tc>
+                <a:extLst>
+                  <a:ext uri="{0D108BD9-81ED-4DB2-BD59-A6C34878D82A}">
+                    <a16:rowId xmlns:a16="http://schemas.microsoft.com/office/drawing/2014/main" val="893872213"/>
+                  </a:ext>
+                </a:extLst>
+              </a:tr>
+              <a:tr h="370840">
+                <a:tc vMerge="1">
+                  <a:txBody>
+                    <a:bodyPr/>
+                    <a:lstStyle/>
+                    <a:p>
+                      <a:endParaRPr lang="en-US" dirty="0"/>
+                    </a:p>
+                  </a:txBody>
+                  <a:tcPr/>
+                </a:tc>
+                <a:tc>
+                  <a:txBody>
+                    <a:bodyPr/>
+                    <a:lstStyle/>
+                    <a:p>
+                      <a:r>
+                        <a:rPr lang="en-US" dirty="0"/>
+                        <a:t>D201_POMI</a:t>
+                      </a:r>
+                    </a:p>
+                  </a:txBody>
+                  <a:tcPr/>
+                </a:tc>
+                <a:tc>
+                  <a:txBody>
+                    <a:bodyPr/>
+                    <a:lstStyle/>
+                    <a:p>
+                      <a:r>
+                        <a:rPr lang="en-US" dirty="0"/>
+                        <a:t>Outdoor M&amp;I</a:t>
+                      </a:r>
+                    </a:p>
+                  </a:txBody>
+                  <a:tcPr/>
+                </a:tc>
+                <a:tc>
+                  <a:txBody>
+                    <a:bodyPr/>
+                    <a:lstStyle/>
+                    <a:p>
+                      <a:endParaRPr lang="en-US" dirty="0"/>
+                    </a:p>
+                  </a:txBody>
+                  <a:tcPr/>
+                </a:tc>
+                <a:extLst>
+                  <a:ext uri="{0D108BD9-81ED-4DB2-BD59-A6C34878D82A}">
+                    <a16:rowId xmlns:a16="http://schemas.microsoft.com/office/drawing/2014/main" val="3013178131"/>
+                  </a:ext>
+                </a:extLst>
+              </a:tr>
+              <a:tr h="370840">
+                <a:tc>
+                  <a:txBody>
+                    <a:bodyPr/>
+                    <a:lstStyle/>
+                    <a:p>
+                      <a:r>
+                        <a:rPr lang="en-US" dirty="0"/>
+                        <a:t>Thermalito Irrigation District</a:t>
+                      </a:r>
+                    </a:p>
+                  </a:txBody>
+                  <a:tcPr/>
+                </a:tc>
+                <a:tc>
+                  <a:txBody>
+                    <a:bodyPr/>
+                    <a:lstStyle/>
+                    <a:p>
+                      <a:r>
+                        <a:rPr lang="en-US" dirty="0"/>
+                        <a:t>D202_PWR</a:t>
+                      </a:r>
+                    </a:p>
+                  </a:txBody>
+                  <a:tcPr/>
+                </a:tc>
+                <a:tc>
+                  <a:txBody>
+                    <a:bodyPr/>
+                    <a:lstStyle/>
+                    <a:p>
+                      <a:r>
+                        <a:rPr lang="en-US" dirty="0"/>
+                        <a:t>Water rights</a:t>
+                      </a:r>
+                    </a:p>
+                  </a:txBody>
+                  <a:tcPr/>
+                </a:tc>
+                <a:tc>
+                  <a:txBody>
+                    <a:bodyPr/>
+                    <a:lstStyle/>
+                    <a:p>
+                      <a:endParaRPr lang="en-US" dirty="0"/>
+                    </a:p>
+                  </a:txBody>
+                  <a:tcPr/>
+                </a:tc>
+                <a:extLst>
+                  <a:ext uri="{0D108BD9-81ED-4DB2-BD59-A6C34878D82A}">
+                    <a16:rowId xmlns:a16="http://schemas.microsoft.com/office/drawing/2014/main" val="1224224660"/>
+                  </a:ext>
+                </a:extLst>
+              </a:tr>
+            </a:tbl>
+          </a:graphicData>
+        </a:graphic>
+      </p:graphicFrame>
     </p:spTree>
     <p:extLst>
       <p:ext uri="{BB962C8B-B14F-4D97-AF65-F5344CB8AC3E}">
-        <p14:creationId xmlns:p14="http://schemas.microsoft.com/office/powerpoint/2010/main" val="1200171353"/>
-      </p:ext>
-    </p:extLst>
-  </p:cSld>
-  <p:clrMapOvr>
-    <a:masterClrMapping/>
-  </p:clrMapOvr>
-</p:sld>
-</file>
-
-<file path=ppt/slides/slide14.xml><?xml version="1.0" encoding="utf-8"?>
-<p:sld xmlns:a="http://schemas.openxmlformats.org/drawingml/2006/main" xmlns:r="http://schemas.openxmlformats.org/officeDocument/2006/relationships" xmlns:p="http://schemas.openxmlformats.org/presentationml/2006/main" show="0">
-  <p:cSld>
-    <p:bg>
-      <p:bgPr>
-        <a:solidFill>
-          <a:schemeClr val="bg1"/>
-        </a:solidFill>
-        <a:effectLst/>
-      </p:bgPr>
-    </p:bg>
-    <p:spTree>
-      <p:nvGrpSpPr>
-        <p:cNvPr id="1" name=""/>
-        <p:cNvGrpSpPr/>
-        <p:nvPr/>
-      </p:nvGrpSpPr>
-      <p:grpSpPr>
-        <a:xfrm>
-          <a:off x="0" y="0"/>
-          <a:ext cx="0" cy="0"/>
-          <a:chOff x="0" y="0"/>
-          <a:chExt cx="0" cy="0"/>
-        </a:xfrm>
-      </p:grpSpPr>
-      <p:sp>
-        <p:nvSpPr>
-          <p:cNvPr id="2" name="Title 1">
-            <a:extLst>
-              <a:ext uri="{FF2B5EF4-FFF2-40B4-BE49-F238E27FC236}">
-                <a16:creationId xmlns:a16="http://schemas.microsoft.com/office/drawing/2014/main" id="{4F87C7D5-4E35-46C7-A5AB-3569E12C88CF}"/>
-              </a:ext>
-            </a:extLst>
-          </p:cNvPr>
-          <p:cNvSpPr>
-            <a:spLocks noGrp="1"/>
-          </p:cNvSpPr>
-          <p:nvPr>
-            <p:ph type="title"/>
-          </p:nvPr>
-        </p:nvSpPr>
-        <p:spPr>
-          <a:xfrm>
-            <a:off x="648929" y="629266"/>
-            <a:ext cx="3505495" cy="1622321"/>
-          </a:xfrm>
-        </p:spPr>
-        <p:txBody>
-          <a:bodyPr>
-            <a:normAutofit/>
-          </a:bodyPr>
-          <a:lstStyle/>
-          <a:p>
-            <a:r>
-              <a:rPr lang="en-US" sz="3700"/>
-              <a:t>Phase 2.1 – Shasta dam and outflow only</a:t>
-            </a:r>
-          </a:p>
-        </p:txBody>
-      </p:sp>
-      <p:sp>
-        <p:nvSpPr>
-          <p:cNvPr id="3" name="Content Placeholder 2">
-            <a:extLst>
-              <a:ext uri="{FF2B5EF4-FFF2-40B4-BE49-F238E27FC236}">
-                <a16:creationId xmlns:a16="http://schemas.microsoft.com/office/drawing/2014/main" id="{319E246B-3D2E-438E-BEED-6A615B92177C}"/>
-              </a:ext>
-            </a:extLst>
-          </p:cNvPr>
-          <p:cNvSpPr>
-            <a:spLocks noGrp="1"/>
-          </p:cNvSpPr>
-          <p:nvPr>
-            <p:ph idx="1"/>
-          </p:nvPr>
-        </p:nvSpPr>
-        <p:spPr>
-          <a:xfrm>
-            <a:off x="648931" y="2438400"/>
-            <a:ext cx="3505494" cy="3785419"/>
-          </a:xfrm>
-        </p:spPr>
-        <p:txBody>
-          <a:bodyPr>
-            <a:normAutofit/>
-          </a:bodyPr>
-          <a:lstStyle/>
-          <a:p>
-            <a:r>
-              <a:rPr lang="en-US" sz="2000" dirty="0"/>
-              <a:t>Develop very simple model</a:t>
-            </a:r>
-          </a:p>
-          <a:p>
-            <a:pPr lvl="1"/>
-            <a:r>
-              <a:rPr lang="en-US" sz="2000" dirty="0"/>
-              <a:t>Inflow to Shasta reservoir</a:t>
-            </a:r>
-          </a:p>
-          <a:p>
-            <a:pPr lvl="1"/>
-            <a:r>
-              <a:rPr lang="en-US" sz="2000" dirty="0"/>
-              <a:t>Shasta reservoir storage</a:t>
-            </a:r>
-          </a:p>
-          <a:p>
-            <a:pPr lvl="1"/>
-            <a:r>
-              <a:rPr lang="en-US" sz="2000" dirty="0"/>
-              <a:t>Release from Shasta storage </a:t>
-            </a:r>
-          </a:p>
-          <a:p>
-            <a:r>
-              <a:rPr lang="en-US" sz="2000" dirty="0"/>
-              <a:t>Output</a:t>
-            </a:r>
-          </a:p>
-          <a:p>
-            <a:pPr lvl="1"/>
-            <a:r>
-              <a:rPr lang="en-US" sz="2000" dirty="0"/>
-              <a:t>Daily Shasta releases</a:t>
-            </a:r>
-          </a:p>
-        </p:txBody>
-      </p:sp>
-      <p:sp>
-        <p:nvSpPr>
-          <p:cNvPr id="24" name="Rectangle 23">
-            <a:extLst>
-              <a:ext uri="{FF2B5EF4-FFF2-40B4-BE49-F238E27FC236}">
-                <a16:creationId xmlns:a16="http://schemas.microsoft.com/office/drawing/2014/main" id="{5E39A796-BE83-48B1-B33F-35C4A32AAB57}"/>
-              </a:ext>
-              <a:ext uri="{C183D7F6-B498-43B3-948B-1728B52AA6E4}">
-                <adec:decorative xmlns:adec="http://schemas.microsoft.com/office/drawing/2017/decorative" val="1"/>
-              </a:ext>
-            </a:extLst>
-          </p:cNvPr>
-          <p:cNvSpPr>
-            <a:spLocks noGrp="1" noRot="1" noChangeAspect="1" noMove="1" noResize="1" noEditPoints="1" noAdjustHandles="1" noChangeArrowheads="1" noChangeShapeType="1" noTextEdit="1"/>
-          </p:cNvSpPr>
-          <p:nvPr>
-            <p:extLst>
-              <p:ext uri="{386F3935-93C4-4BCD-93E2-E3B085C9AB24}">
-                <p16:designElem xmlns:p16="http://schemas.microsoft.com/office/powerpoint/2015/main" val="1"/>
-              </p:ext>
-            </p:extLst>
-          </p:nvPr>
-        </p:nvSpPr>
-        <p:spPr>
-          <a:xfrm>
-            <a:off x="4639056" y="0"/>
-            <a:ext cx="7552944" cy="6858000"/>
-          </a:xfrm>
-          <a:prstGeom prst="rect">
-            <a:avLst/>
-          </a:prstGeom>
-          <a:solidFill>
-            <a:srgbClr val="C8CACA"/>
-          </a:solidFill>
-          <a:ln>
-            <a:noFill/>
-          </a:ln>
-        </p:spPr>
-        <p:style>
-          <a:lnRef idx="2">
-            <a:schemeClr val="accent1">
-              <a:shade val="50000"/>
-            </a:schemeClr>
-          </a:lnRef>
-          <a:fillRef idx="1">
-            <a:schemeClr val="accent1"/>
-          </a:fillRef>
-          <a:effectRef idx="0">
-            <a:schemeClr val="accent1"/>
-          </a:effectRef>
-          <a:fontRef idx="minor">
-            <a:schemeClr val="lt1"/>
-          </a:fontRef>
-        </p:style>
-        <p:txBody>
-          <a:bodyPr rtlCol="0" anchor="ctr"/>
-          <a:lstStyle/>
-          <a:p>
-            <a:pPr algn="ctr"/>
-            <a:endParaRPr lang="en-US"/>
-          </a:p>
-        </p:txBody>
-      </p:sp>
-      <p:sp>
-        <p:nvSpPr>
-          <p:cNvPr id="26" name="Rounded Rectangle 9">
-            <a:extLst>
-              <a:ext uri="{FF2B5EF4-FFF2-40B4-BE49-F238E27FC236}">
-                <a16:creationId xmlns:a16="http://schemas.microsoft.com/office/drawing/2014/main" id="{72F84B47-E267-4194-8194-831DB7B5547F}"/>
-              </a:ext>
-              <a:ext uri="{C183D7F6-B498-43B3-948B-1728B52AA6E4}">
-                <adec:decorative xmlns:adec="http://schemas.microsoft.com/office/drawing/2017/decorative" val="1"/>
-              </a:ext>
-            </a:extLst>
-          </p:cNvPr>
-          <p:cNvSpPr>
-            <a:spLocks noGrp="1" noRot="1" noChangeAspect="1" noMove="1" noResize="1" noEditPoints="1" noAdjustHandles="1" noChangeArrowheads="1" noChangeShapeType="1" noTextEdit="1"/>
-          </p:cNvSpPr>
-          <p:nvPr>
-            <p:extLst>
-              <p:ext uri="{386F3935-93C4-4BCD-93E2-E3B085C9AB24}">
-                <p16:designElem xmlns:p16="http://schemas.microsoft.com/office/powerpoint/2015/main" val="1"/>
-              </p:ext>
-            </p:extLst>
-          </p:nvPr>
-        </p:nvSpPr>
-        <p:spPr>
-          <a:xfrm>
-            <a:off x="5123688" y="557784"/>
-            <a:ext cx="6584098" cy="5739187"/>
-          </a:xfrm>
-          <a:prstGeom prst="roundRect">
-            <a:avLst>
-              <a:gd name="adj" fmla="val 0"/>
-            </a:avLst>
-          </a:prstGeom>
-          <a:solidFill>
-            <a:srgbClr val="FFFFFF"/>
-          </a:solidFill>
-          <a:ln w="9525">
-            <a:solidFill>
-              <a:srgbClr val="C8CACA"/>
-            </a:solidFill>
-          </a:ln>
-          <a:effectLst>
-            <a:outerShdw blurRad="57150" dist="19050" dir="5400000" algn="t" rotWithShape="0">
-              <a:prstClr val="black">
-                <a:alpha val="63000"/>
-              </a:prstClr>
-            </a:outerShdw>
-          </a:effectLst>
-        </p:spPr>
-        <p:style>
-          <a:lnRef idx="2">
-            <a:schemeClr val="accent1">
-              <a:shade val="50000"/>
-            </a:schemeClr>
-          </a:lnRef>
-          <a:fillRef idx="1">
-            <a:schemeClr val="accent1"/>
-          </a:fillRef>
-          <a:effectRef idx="0">
-            <a:schemeClr val="accent1"/>
-          </a:effectRef>
-          <a:fontRef idx="minor">
-            <a:schemeClr val="lt1"/>
-          </a:fontRef>
-        </p:style>
-        <p:txBody>
-          <a:bodyPr rtlCol="0" anchor="ctr"/>
-          <a:lstStyle/>
-          <a:p>
-            <a:pPr algn="ctr"/>
-            <a:endParaRPr lang="en-US"/>
-          </a:p>
-        </p:txBody>
-      </p:sp>
-      <p:pic>
-        <p:nvPicPr>
-          <p:cNvPr id="5" name="Picture 4">
-            <a:extLst>
-              <a:ext uri="{FF2B5EF4-FFF2-40B4-BE49-F238E27FC236}">
-                <a16:creationId xmlns:a16="http://schemas.microsoft.com/office/drawing/2014/main" id="{D1F0508B-2B14-460F-9E52-EDD3BAA9511B}"/>
-              </a:ext>
-            </a:extLst>
-          </p:cNvPr>
-          <p:cNvPicPr>
-            <a:picLocks noChangeAspect="1"/>
-          </p:cNvPicPr>
-          <p:nvPr/>
-        </p:nvPicPr>
-        <p:blipFill>
-          <a:blip r:embed="rId2"/>
-          <a:stretch>
-            <a:fillRect/>
-          </a:stretch>
-        </p:blipFill>
-        <p:spPr>
-          <a:xfrm>
-            <a:off x="5920183" y="807593"/>
-            <a:ext cx="4990688" cy="5239568"/>
-          </a:xfrm>
-          <a:prstGeom prst="rect">
-            <a:avLst/>
-          </a:prstGeom>
-          <a:effectLst/>
-        </p:spPr>
-      </p:pic>
-    </p:spTree>
-    <p:extLst>
-      <p:ext uri="{BB962C8B-B14F-4D97-AF65-F5344CB8AC3E}">
-        <p14:creationId xmlns:p14="http://schemas.microsoft.com/office/powerpoint/2010/main" val="3935373024"/>
-      </p:ext>
-    </p:extLst>
-  </p:cSld>
-  <p:clrMapOvr>
-    <a:masterClrMapping/>
-  </p:clrMapOvr>
-</p:sld>
-</file>
-
-<file path=ppt/slides/slide15.xml><?xml version="1.0" encoding="utf-8"?>
-<p:sld xmlns:a="http://schemas.openxmlformats.org/drawingml/2006/main" xmlns:r="http://schemas.openxmlformats.org/officeDocument/2006/relationships" xmlns:p="http://schemas.openxmlformats.org/presentationml/2006/main" show="0">
-  <p:cSld>
-    <p:bg>
-      <p:bgPr>
-        <a:solidFill>
-          <a:schemeClr val="bg1"/>
-        </a:solidFill>
-        <a:effectLst/>
-      </p:bgPr>
-    </p:bg>
-    <p:spTree>
-      <p:nvGrpSpPr>
-        <p:cNvPr id="1" name=""/>
-        <p:cNvGrpSpPr/>
-        <p:nvPr/>
-      </p:nvGrpSpPr>
-      <p:grpSpPr>
-        <a:xfrm>
-          <a:off x="0" y="0"/>
-          <a:ext cx="0" cy="0"/>
-          <a:chOff x="0" y="0"/>
-          <a:chExt cx="0" cy="0"/>
-        </a:xfrm>
-      </p:grpSpPr>
-      <p:sp>
-        <p:nvSpPr>
-          <p:cNvPr id="2" name="Title 1">
-            <a:extLst>
-              <a:ext uri="{FF2B5EF4-FFF2-40B4-BE49-F238E27FC236}">
-                <a16:creationId xmlns:a16="http://schemas.microsoft.com/office/drawing/2014/main" id="{4F87C7D5-4E35-46C7-A5AB-3569E12C88CF}"/>
-              </a:ext>
-            </a:extLst>
-          </p:cNvPr>
-          <p:cNvSpPr>
-            <a:spLocks noGrp="1"/>
-          </p:cNvSpPr>
-          <p:nvPr>
-            <p:ph type="title"/>
-          </p:nvPr>
-        </p:nvSpPr>
-        <p:spPr>
-          <a:xfrm>
-            <a:off x="6622293" y="638144"/>
-            <a:ext cx="4953934" cy="1676603"/>
-          </a:xfrm>
-        </p:spPr>
-        <p:txBody>
-          <a:bodyPr>
-            <a:normAutofit/>
-          </a:bodyPr>
-          <a:lstStyle/>
-          <a:p>
-            <a:r>
-              <a:rPr lang="en-US" sz="4000" dirty="0"/>
-              <a:t>Phase 2.1 – Shasta dam and outflow only</a:t>
-            </a:r>
-          </a:p>
-        </p:txBody>
-      </p:sp>
-      <p:sp>
-        <p:nvSpPr>
-          <p:cNvPr id="31" name="Rectangle 30">
-            <a:extLst>
-              <a:ext uri="{FF2B5EF4-FFF2-40B4-BE49-F238E27FC236}">
-                <a16:creationId xmlns:a16="http://schemas.microsoft.com/office/drawing/2014/main" id="{787900AF-3ED0-4C02-A309-3984EBBD202C}"/>
-              </a:ext>
-              <a:ext uri="{C183D7F6-B498-43B3-948B-1728B52AA6E4}">
-                <adec:decorative xmlns:adec="http://schemas.microsoft.com/office/drawing/2017/decorative" val="1"/>
-              </a:ext>
-            </a:extLst>
-          </p:cNvPr>
-          <p:cNvSpPr>
-            <a:spLocks noGrp="1" noRot="1" noChangeAspect="1" noMove="1" noResize="1" noEditPoints="1" noAdjustHandles="1" noChangeArrowheads="1" noChangeShapeType="1" noTextEdit="1"/>
-          </p:cNvSpPr>
-          <p:nvPr>
-            <p:extLst>
-              <p:ext uri="{386F3935-93C4-4BCD-93E2-E3B085C9AB24}">
-                <p16:designElem xmlns:p16="http://schemas.microsoft.com/office/powerpoint/2015/main" val="1"/>
-              </p:ext>
-            </p:extLst>
-          </p:nvPr>
-        </p:nvSpPr>
-        <p:spPr>
-          <a:xfrm>
-            <a:off x="0" y="0"/>
-            <a:ext cx="6096000" cy="6858000"/>
-          </a:xfrm>
-          <a:prstGeom prst="rect">
-            <a:avLst/>
-          </a:prstGeom>
-          <a:solidFill>
-            <a:srgbClr val="C8CACA"/>
-          </a:solidFill>
-          <a:ln>
-            <a:noFill/>
-          </a:ln>
-        </p:spPr>
-        <p:style>
-          <a:lnRef idx="2">
-            <a:schemeClr val="accent1">
-              <a:shade val="50000"/>
-            </a:schemeClr>
-          </a:lnRef>
-          <a:fillRef idx="1">
-            <a:schemeClr val="accent1"/>
-          </a:fillRef>
-          <a:effectRef idx="0">
-            <a:schemeClr val="accent1"/>
-          </a:effectRef>
-          <a:fontRef idx="minor">
-            <a:schemeClr val="lt1"/>
-          </a:fontRef>
-        </p:style>
-        <p:txBody>
-          <a:bodyPr rtlCol="0" anchor="ctr"/>
-          <a:lstStyle/>
-          <a:p>
-            <a:pPr marL="0" marR="0" lvl="0" indent="0" algn="ctr" defTabSz="914400" rtl="0" eaLnBrk="1" fontAlgn="auto" latinLnBrk="0" hangingPunct="1">
-              <a:lnSpc>
-                <a:spcPct val="100000"/>
-              </a:lnSpc>
-              <a:spcBef>
-                <a:spcPts val="0"/>
-              </a:spcBef>
-              <a:spcAft>
-                <a:spcPts val="0"/>
-              </a:spcAft>
-              <a:buClrTx/>
-              <a:buSzTx/>
-              <a:buFontTx/>
-              <a:buNone/>
-              <a:tabLst/>
-              <a:defRPr/>
-            </a:pPr>
-            <a:endParaRPr kumimoji="0" lang="en-US" sz="1800" b="0" i="0" u="none" strike="noStrike" kern="1200" cap="none" spc="0" normalizeH="0" baseline="0" noProof="0">
-              <a:ln>
-                <a:noFill/>
-              </a:ln>
-              <a:solidFill>
-                <a:prstClr val="white"/>
-              </a:solidFill>
-              <a:effectLst/>
-              <a:uLnTx/>
-              <a:uFillTx/>
-              <a:latin typeface="Calibri" panose="020F0502020204030204"/>
-              <a:ea typeface="+mn-ea"/>
-              <a:cs typeface="+mn-cs"/>
-            </a:endParaRPr>
-          </a:p>
-        </p:txBody>
-      </p:sp>
-      <p:sp>
-        <p:nvSpPr>
-          <p:cNvPr id="33" name="Rounded Rectangle 20">
-            <a:extLst>
-              <a:ext uri="{FF2B5EF4-FFF2-40B4-BE49-F238E27FC236}">
-                <a16:creationId xmlns:a16="http://schemas.microsoft.com/office/drawing/2014/main" id="{8DEDEE5C-3126-4336-A7D4-9277AF5A04B4}"/>
-              </a:ext>
-              <a:ext uri="{C183D7F6-B498-43B3-948B-1728B52AA6E4}">
-                <adec:decorative xmlns:adec="http://schemas.microsoft.com/office/drawing/2017/decorative" val="1"/>
-              </a:ext>
-            </a:extLst>
-          </p:cNvPr>
-          <p:cNvSpPr>
-            <a:spLocks noGrp="1" noRot="1" noChangeAspect="1" noMove="1" noResize="1" noEditPoints="1" noAdjustHandles="1" noChangeArrowheads="1" noChangeShapeType="1" noTextEdit="1"/>
-          </p:cNvSpPr>
-          <p:nvPr>
-            <p:extLst>
-              <p:ext uri="{386F3935-93C4-4BCD-93E2-E3B085C9AB24}">
-                <p16:designElem xmlns:p16="http://schemas.microsoft.com/office/powerpoint/2015/main" val="1"/>
-              </p:ext>
-            </p:extLst>
-          </p:nvPr>
-        </p:nvSpPr>
-        <p:spPr>
-          <a:xfrm>
-            <a:off x="493138" y="559407"/>
-            <a:ext cx="5109725" cy="5739187"/>
-          </a:xfrm>
-          <a:prstGeom prst="roundRect">
-            <a:avLst>
-              <a:gd name="adj" fmla="val 0"/>
-            </a:avLst>
-          </a:prstGeom>
-          <a:solidFill>
-            <a:srgbClr val="FFFFFF"/>
-          </a:solidFill>
-          <a:ln w="9525">
-            <a:solidFill>
-              <a:srgbClr val="C8CACA"/>
-            </a:solidFill>
-          </a:ln>
-          <a:effectLst>
-            <a:outerShdw blurRad="57150" dist="19050" dir="5400000" algn="t" rotWithShape="0">
-              <a:prstClr val="black">
-                <a:alpha val="63000"/>
-              </a:prstClr>
-            </a:outerShdw>
-          </a:effectLst>
-        </p:spPr>
-        <p:style>
-          <a:lnRef idx="2">
-            <a:schemeClr val="accent1">
-              <a:shade val="50000"/>
-            </a:schemeClr>
-          </a:lnRef>
-          <a:fillRef idx="1">
-            <a:schemeClr val="accent1"/>
-          </a:fillRef>
-          <a:effectRef idx="0">
-            <a:schemeClr val="accent1"/>
-          </a:effectRef>
-          <a:fontRef idx="minor">
-            <a:schemeClr val="lt1"/>
-          </a:fontRef>
-        </p:style>
-        <p:txBody>
-          <a:bodyPr rtlCol="0" anchor="ctr"/>
-          <a:lstStyle/>
-          <a:p>
-            <a:pPr marL="0" marR="0" lvl="0" indent="0" algn="ctr" defTabSz="914400" rtl="0" eaLnBrk="1" fontAlgn="auto" latinLnBrk="0" hangingPunct="1">
-              <a:lnSpc>
-                <a:spcPct val="100000"/>
-              </a:lnSpc>
-              <a:spcBef>
-                <a:spcPts val="0"/>
-              </a:spcBef>
-              <a:spcAft>
-                <a:spcPts val="0"/>
-              </a:spcAft>
-              <a:buClrTx/>
-              <a:buSzTx/>
-              <a:buFontTx/>
-              <a:buNone/>
-              <a:tabLst/>
-              <a:defRPr/>
-            </a:pPr>
-            <a:endParaRPr kumimoji="0" lang="en-US" sz="1800" b="0" i="0" u="none" strike="noStrike" kern="1200" cap="none" spc="0" normalizeH="0" baseline="0" noProof="0">
-              <a:ln>
-                <a:noFill/>
-              </a:ln>
-              <a:solidFill>
-                <a:prstClr val="white"/>
-              </a:solidFill>
-              <a:effectLst/>
-              <a:uLnTx/>
-              <a:uFillTx/>
-              <a:latin typeface="Calibri" panose="020F0502020204030204"/>
-              <a:ea typeface="+mn-ea"/>
-              <a:cs typeface="+mn-cs"/>
-            </a:endParaRPr>
-          </a:p>
-        </p:txBody>
-      </p:sp>
-      <p:pic>
-        <p:nvPicPr>
-          <p:cNvPr id="6" name="Picture 5">
-            <a:extLst>
-              <a:ext uri="{FF2B5EF4-FFF2-40B4-BE49-F238E27FC236}">
-                <a16:creationId xmlns:a16="http://schemas.microsoft.com/office/drawing/2014/main" id="{189728B2-F285-4A55-8F08-E0166BCCFB48}"/>
-              </a:ext>
-            </a:extLst>
-          </p:cNvPr>
-          <p:cNvPicPr>
-            <a:picLocks noChangeAspect="1"/>
-          </p:cNvPicPr>
-          <p:nvPr/>
-        </p:nvPicPr>
-        <p:blipFill>
-          <a:blip r:embed="rId2"/>
-          <a:stretch>
-            <a:fillRect/>
-          </a:stretch>
-        </p:blipFill>
-        <p:spPr>
-          <a:xfrm>
-            <a:off x="1902837" y="818521"/>
-            <a:ext cx="2290325" cy="5220957"/>
-          </a:xfrm>
-          <a:prstGeom prst="rect">
-            <a:avLst/>
-          </a:prstGeom>
-          <a:effectLst/>
-        </p:spPr>
-      </p:pic>
-      <p:sp>
-        <p:nvSpPr>
-          <p:cNvPr id="3" name="Content Placeholder 2">
-            <a:extLst>
-              <a:ext uri="{FF2B5EF4-FFF2-40B4-BE49-F238E27FC236}">
-                <a16:creationId xmlns:a16="http://schemas.microsoft.com/office/drawing/2014/main" id="{319E246B-3D2E-438E-BEED-6A615B92177C}"/>
-              </a:ext>
-            </a:extLst>
-          </p:cNvPr>
-          <p:cNvSpPr>
-            <a:spLocks noGrp="1"/>
-          </p:cNvSpPr>
-          <p:nvPr>
-            <p:ph idx="1"/>
-          </p:nvPr>
-        </p:nvSpPr>
-        <p:spPr>
-          <a:xfrm>
-            <a:off x="6622295" y="2438401"/>
-            <a:ext cx="4953932" cy="3779520"/>
-          </a:xfrm>
-        </p:spPr>
-        <p:txBody>
-          <a:bodyPr>
-            <a:normAutofit/>
-          </a:bodyPr>
-          <a:lstStyle/>
-          <a:p>
-            <a:r>
-              <a:rPr lang="en-US" sz="2000" dirty="0"/>
-              <a:t>Develop very simple model</a:t>
-            </a:r>
-          </a:p>
-          <a:p>
-            <a:pPr lvl="1"/>
-            <a:r>
-              <a:rPr lang="en-US" sz="2000" dirty="0"/>
-              <a:t>Inflow to Shasta reservoir</a:t>
-            </a:r>
-          </a:p>
-          <a:p>
-            <a:pPr lvl="1"/>
-            <a:r>
-              <a:rPr lang="en-US" sz="2000" dirty="0"/>
-              <a:t>Shasta reservoir storage</a:t>
-            </a:r>
-          </a:p>
-          <a:p>
-            <a:pPr lvl="1"/>
-            <a:r>
-              <a:rPr lang="en-US" sz="2000" dirty="0"/>
-              <a:t>Release from Shasta storage </a:t>
-            </a:r>
-          </a:p>
-          <a:p>
-            <a:r>
-              <a:rPr lang="en-US" sz="2000" dirty="0"/>
-              <a:t>Output</a:t>
-            </a:r>
-          </a:p>
-          <a:p>
-            <a:pPr lvl="1"/>
-            <a:r>
-              <a:rPr lang="en-US" sz="2000" dirty="0"/>
-              <a:t>Daily Shasta releases</a:t>
-            </a:r>
-          </a:p>
-        </p:txBody>
-      </p:sp>
-    </p:spTree>
-    <p:extLst>
-      <p:ext uri="{BB962C8B-B14F-4D97-AF65-F5344CB8AC3E}">
-        <p14:creationId xmlns:p14="http://schemas.microsoft.com/office/powerpoint/2010/main" val="3706107824"/>
+        <p14:creationId xmlns:p14="http://schemas.microsoft.com/office/powerpoint/2010/main" val="2600548215"/>
       </p:ext>
     </p:extLst>
   </p:cSld>
@@ -6867,8 +5768,8 @@
           </a:p>
         </p:txBody>
       </p:sp>
-      <mc:AlternateContent xmlns:mc="http://schemas.openxmlformats.org/markup-compatibility/2006">
-        <mc:Choice xmlns:a14="http://schemas.microsoft.com/office/drawing/2010/main" Requires="a14">
+      <mc:AlternateContent xmlns:mc="http://schemas.openxmlformats.org/markup-compatibility/2006" xmlns:a14="http://schemas.microsoft.com/office/drawing/2010/main">
+        <mc:Choice Requires="a14">
           <p:sp>
             <p:nvSpPr>
               <p:cNvPr id="3" name="Content Placeholder 2">
@@ -7054,7 +5955,7 @@
             </p:txBody>
           </p:sp>
         </mc:Choice>
-        <mc:Fallback>
+        <mc:Fallback xmlns="">
           <p:sp>
             <p:nvSpPr>
               <p:cNvPr id="3" name="Content Placeholder 2">
@@ -7172,16 +6073,8 @@
 </file>
 
 <file path=ppt/slides/slide9.xml><?xml version="1.0" encoding="utf-8"?>
-<p:sld xmlns:a="http://schemas.openxmlformats.org/drawingml/2006/main" xmlns:r="http://schemas.openxmlformats.org/officeDocument/2006/relationships" xmlns:p="http://schemas.openxmlformats.org/presentationml/2006/main" show="0">
+<p:sld xmlns:a="http://schemas.openxmlformats.org/drawingml/2006/main" xmlns:r="http://schemas.openxmlformats.org/officeDocument/2006/relationships" xmlns:p="http://schemas.openxmlformats.org/presentationml/2006/main">
   <p:cSld>
-    <p:bg>
-      <p:bgPr>
-        <a:solidFill>
-          <a:schemeClr val="bg1"/>
-        </a:solidFill>
-        <a:effectLst/>
-      </p:bgPr>
-    </p:bg>
     <p:spTree>
       <p:nvGrpSpPr>
         <p:cNvPr id="1" name=""/>
@@ -7201,7 +6094,7 @@
           <p:cNvPr id="2" name="Title 1">
             <a:extLst>
               <a:ext uri="{FF2B5EF4-FFF2-40B4-BE49-F238E27FC236}">
-                <a16:creationId xmlns:a16="http://schemas.microsoft.com/office/drawing/2014/main" id="{4F87C7D5-4E35-46C7-A5AB-3569E12C88CF}"/>
+                <a16:creationId xmlns:a16="http://schemas.microsoft.com/office/drawing/2014/main" id="{7E602E9E-CB09-48DE-834B-DAFF04BB4499}"/>
               </a:ext>
             </a:extLst>
           </p:cNvPr>
@@ -7212,21 +6105,14 @@
             <p:ph type="title"/>
           </p:nvPr>
         </p:nvSpPr>
-        <p:spPr>
-          <a:xfrm>
-            <a:off x="648929" y="629266"/>
-            <a:ext cx="3663012" cy="989809"/>
-          </a:xfrm>
-        </p:spPr>
-        <p:txBody>
-          <a:bodyPr>
-            <a:normAutofit fontScale="90000"/>
-          </a:bodyPr>
+        <p:spPr/>
+        <p:txBody>
+          <a:bodyPr/>
           <a:lstStyle/>
           <a:p>
             <a:r>
               <a:rPr lang="en-US" dirty="0"/>
-              <a:t>Phase 1.1 – Oroville dam and outflow only</a:t>
+              <a:t>Phase 1 data requirements</a:t>
             </a:r>
           </a:p>
         </p:txBody>
@@ -7236,7 +6122,7 @@
           <p:cNvPr id="3" name="Content Placeholder 2">
             <a:extLst>
               <a:ext uri="{FF2B5EF4-FFF2-40B4-BE49-F238E27FC236}">
-                <a16:creationId xmlns:a16="http://schemas.microsoft.com/office/drawing/2014/main" id="{319E246B-3D2E-438E-BEED-6A615B92177C}"/>
+                <a16:creationId xmlns:a16="http://schemas.microsoft.com/office/drawing/2014/main" id="{8382E53A-D19C-4A6E-BB07-054AA7B676BF}"/>
               </a:ext>
             </a:extLst>
           </p:cNvPr>
@@ -7247,237 +6133,71 @@
             <p:ph idx="1"/>
           </p:nvPr>
         </p:nvSpPr>
-        <p:spPr>
-          <a:xfrm>
-            <a:off x="648931" y="1847462"/>
-            <a:ext cx="3505494" cy="4376358"/>
-          </a:xfrm>
-        </p:spPr>
-        <p:txBody>
-          <a:bodyPr>
-            <a:normAutofit/>
-          </a:bodyPr>
-          <a:lstStyle/>
-          <a:p>
-            <a:r>
-              <a:rPr lang="en-US" sz="2000" dirty="0"/>
-              <a:t>Develop very simple model</a:t>
+        <p:spPr/>
+        <p:txBody>
+          <a:bodyPr/>
+          <a:lstStyle/>
+          <a:p>
+            <a:r>
+              <a:rPr lang="en-US" dirty="0"/>
+              <a:t>Lake Oroville</a:t>
             </a:r>
           </a:p>
           <a:p>
             <a:pPr lvl="1"/>
             <a:r>
-              <a:rPr lang="en-US" sz="2000" dirty="0"/>
-              <a:t>Inflow to Oroville reservoir</a:t>
+              <a:rPr lang="en-US" dirty="0"/>
+              <a:t>Inflow (TAF/day)</a:t>
             </a:r>
           </a:p>
           <a:p>
             <a:pPr lvl="1"/>
             <a:r>
-              <a:rPr lang="en-US" sz="2000" dirty="0"/>
-              <a:t>Oroville reservoir storage</a:t>
+              <a:rPr lang="en-US" dirty="0"/>
+              <a:t>Initial storage</a:t>
             </a:r>
           </a:p>
           <a:p>
             <a:pPr lvl="1"/>
             <a:r>
-              <a:rPr lang="en-US" sz="2000" dirty="0"/>
-              <a:t>Release from Oroville storage </a:t>
+              <a:rPr lang="en-US" dirty="0"/>
+              <a:t>Level 5 storage</a:t>
             </a:r>
           </a:p>
           <a:p>
             <a:pPr lvl="1"/>
             <a:r>
-              <a:rPr lang="en-US" sz="2000" dirty="0"/>
-              <a:t>No deliveries/demands yet</a:t>
-            </a:r>
-          </a:p>
-          <a:p>
-            <a:r>
-              <a:rPr lang="en-US" sz="2400" dirty="0"/>
-              <a:t>Output</a:t>
-            </a:r>
-          </a:p>
-          <a:p>
-            <a:pPr lvl="1"/>
-            <a:r>
-              <a:rPr lang="en-US" sz="2000" dirty="0"/>
-              <a:t>Daily Oroville releases</a:t>
-            </a:r>
-          </a:p>
-        </p:txBody>
-      </p:sp>
-      <p:sp>
-        <p:nvSpPr>
-          <p:cNvPr id="18" name="Rectangle 11">
-            <a:extLst>
-              <a:ext uri="{FF2B5EF4-FFF2-40B4-BE49-F238E27FC236}">
-                <a16:creationId xmlns:a16="http://schemas.microsoft.com/office/drawing/2014/main" id="{5E39A796-BE83-48B1-B33F-35C4A32AAB57}"/>
-              </a:ext>
-              <a:ext uri="{C183D7F6-B498-43B3-948B-1728B52AA6E4}">
-                <adec:decorative xmlns:adec="http://schemas.microsoft.com/office/drawing/2017/decorative" val="1"/>
-              </a:ext>
-            </a:extLst>
-          </p:cNvPr>
-          <p:cNvSpPr>
-            <a:spLocks noGrp="1" noRot="1" noChangeAspect="1" noMove="1" noResize="1" noEditPoints="1" noAdjustHandles="1" noChangeArrowheads="1" noChangeShapeType="1" noTextEdit="1"/>
-          </p:cNvSpPr>
-          <p:nvPr>
-            <p:extLst>
-              <p:ext uri="{386F3935-93C4-4BCD-93E2-E3B085C9AB24}">
-                <p16:designElem xmlns:p16="http://schemas.microsoft.com/office/powerpoint/2015/main" val="1"/>
-              </p:ext>
-            </p:extLst>
-          </p:nvPr>
-        </p:nvSpPr>
-        <p:spPr>
-          <a:xfrm>
-            <a:off x="4639056" y="0"/>
-            <a:ext cx="7552944" cy="6858000"/>
-          </a:xfrm>
-          <a:prstGeom prst="rect">
-            <a:avLst/>
-          </a:prstGeom>
-          <a:solidFill>
-            <a:srgbClr val="C8CACA"/>
-          </a:solidFill>
-          <a:ln>
-            <a:noFill/>
-          </a:ln>
-        </p:spPr>
-        <p:style>
-          <a:lnRef idx="2">
-            <a:schemeClr val="accent1">
-              <a:shade val="50000"/>
-            </a:schemeClr>
-          </a:lnRef>
-          <a:fillRef idx="1">
-            <a:schemeClr val="accent1"/>
-          </a:fillRef>
-          <a:effectRef idx="0">
-            <a:schemeClr val="accent1"/>
-          </a:effectRef>
-          <a:fontRef idx="minor">
-            <a:schemeClr val="lt1"/>
-          </a:fontRef>
-        </p:style>
-        <p:txBody>
-          <a:bodyPr rtlCol="0" anchor="ctr"/>
-          <a:lstStyle/>
-          <a:p>
-            <a:pPr algn="ctr"/>
-            <a:endParaRPr lang="en-US"/>
-          </a:p>
-        </p:txBody>
-      </p:sp>
-      <p:sp>
-        <p:nvSpPr>
-          <p:cNvPr id="19" name="Rounded Rectangle 9">
-            <a:extLst>
-              <a:ext uri="{FF2B5EF4-FFF2-40B4-BE49-F238E27FC236}">
-                <a16:creationId xmlns:a16="http://schemas.microsoft.com/office/drawing/2014/main" id="{72F84B47-E267-4194-8194-831DB7B5547F}"/>
-              </a:ext>
-              <a:ext uri="{C183D7F6-B498-43B3-948B-1728B52AA6E4}">
-                <adec:decorative xmlns:adec="http://schemas.microsoft.com/office/drawing/2017/decorative" val="1"/>
-              </a:ext>
-            </a:extLst>
-          </p:cNvPr>
-          <p:cNvSpPr>
-            <a:spLocks noGrp="1" noRot="1" noChangeAspect="1" noMove="1" noResize="1" noEditPoints="1" noAdjustHandles="1" noChangeArrowheads="1" noChangeShapeType="1" noTextEdit="1"/>
-          </p:cNvSpPr>
-          <p:nvPr>
-            <p:extLst>
-              <p:ext uri="{386F3935-93C4-4BCD-93E2-E3B085C9AB24}">
-                <p16:designElem xmlns:p16="http://schemas.microsoft.com/office/powerpoint/2015/main" val="1"/>
-              </p:ext>
-            </p:extLst>
-          </p:nvPr>
-        </p:nvSpPr>
-        <p:spPr>
-          <a:xfrm>
-            <a:off x="5123688" y="557784"/>
-            <a:ext cx="6584098" cy="5739187"/>
-          </a:xfrm>
-          <a:prstGeom prst="roundRect">
-            <a:avLst>
-              <a:gd name="adj" fmla="val 0"/>
-            </a:avLst>
-          </a:prstGeom>
-          <a:solidFill>
-            <a:srgbClr val="FFFFFF"/>
-          </a:solidFill>
-          <a:ln w="9525">
-            <a:solidFill>
-              <a:srgbClr val="C8CACA"/>
-            </a:solidFill>
-          </a:ln>
-          <a:effectLst>
-            <a:outerShdw blurRad="57150" dist="19050" dir="5400000" algn="t" rotWithShape="0">
-              <a:prstClr val="black">
-                <a:alpha val="63000"/>
-              </a:prstClr>
-            </a:outerShdw>
-          </a:effectLst>
-        </p:spPr>
-        <p:style>
-          <a:lnRef idx="2">
-            <a:schemeClr val="accent1">
-              <a:shade val="50000"/>
-            </a:schemeClr>
-          </a:lnRef>
-          <a:fillRef idx="1">
-            <a:schemeClr val="accent1"/>
-          </a:fillRef>
-          <a:effectRef idx="0">
-            <a:schemeClr val="accent1"/>
-          </a:effectRef>
-          <a:fontRef idx="minor">
-            <a:schemeClr val="lt1"/>
-          </a:fontRef>
-        </p:style>
-        <p:txBody>
-          <a:bodyPr rtlCol="0" anchor="ctr"/>
-          <a:lstStyle/>
-          <a:p>
-            <a:pPr algn="ctr"/>
-            <a:endParaRPr lang="en-US"/>
-          </a:p>
-        </p:txBody>
-      </p:sp>
-      <p:pic>
-        <p:nvPicPr>
-          <p:cNvPr id="7" name="Picture 6">
-            <a:extLst>
-              <a:ext uri="{FF2B5EF4-FFF2-40B4-BE49-F238E27FC236}">
-                <a16:creationId xmlns:a16="http://schemas.microsoft.com/office/drawing/2014/main" id="{191BED70-9C29-4432-8DE4-262377C5023B}"/>
-              </a:ext>
-            </a:extLst>
-          </p:cNvPr>
-          <p:cNvPicPr>
-            <a:picLocks noChangeAspect="1"/>
-          </p:cNvPicPr>
-          <p:nvPr/>
-        </p:nvPicPr>
-        <p:blipFill rotWithShape="1">
-          <a:blip r:embed="rId2"/>
-          <a:srcRect r="24743"/>
-          <a:stretch/>
-        </p:blipFill>
-        <p:spPr>
-          <a:xfrm>
-            <a:off x="6162303" y="807593"/>
-            <a:ext cx="4506448" cy="5239568"/>
-          </a:xfrm>
-          <a:prstGeom prst="rect">
-            <a:avLst/>
-          </a:prstGeom>
-          <a:effectLst/>
-        </p:spPr>
-      </p:pic>
+              <a:rPr lang="en-US" dirty="0"/>
+              <a:t>Evaporation rate</a:t>
+            </a:r>
+          </a:p>
+          <a:p>
+            <a:r>
+              <a:rPr lang="en-US" dirty="0"/>
+              <a:t>Oroville water rights demands</a:t>
+            </a:r>
+          </a:p>
+          <a:p>
+            <a:r>
+              <a:rPr lang="en-US" dirty="0"/>
+              <a:t>Minimum groundwater pumping</a:t>
+            </a:r>
+          </a:p>
+          <a:p>
+            <a:endParaRPr lang="en-US" dirty="0"/>
+          </a:p>
+          <a:p>
+            <a:endParaRPr lang="en-US" dirty="0"/>
+          </a:p>
+          <a:p>
+            <a:endParaRPr lang="en-US" dirty="0"/>
+          </a:p>
+        </p:txBody>
+      </p:sp>
     </p:spTree>
     <p:extLst>
       <p:ext uri="{BB962C8B-B14F-4D97-AF65-F5344CB8AC3E}">
-        <p14:creationId xmlns:p14="http://schemas.microsoft.com/office/powerpoint/2010/main" val="1792466740"/>
+        <p14:creationId xmlns:p14="http://schemas.microsoft.com/office/powerpoint/2010/main" val="1200171353"/>
       </p:ext>
     </p:extLst>
   </p:cSld>

</xml_diff>

<commit_message>
Begin adding D_YUBFEA demand and delivery logic
</commit_message>
<xml_diff>
--- a/Building daily CalLite model from scratch – daily.pptx
+++ b/Building daily CalLite model from scratch – daily.pptx
@@ -15,6 +15,11 @@
     <p:sldId id="269" r:id="rId9"/>
     <p:sldId id="258" r:id="rId10"/>
     <p:sldId id="271" r:id="rId11"/>
+    <p:sldId id="273" r:id="rId12"/>
+    <p:sldId id="274" r:id="rId13"/>
+    <p:sldId id="275" r:id="rId14"/>
+    <p:sldId id="257" r:id="rId15"/>
+    <p:sldId id="272" r:id="rId16"/>
   </p:sldIdLst>
   <p:sldSz cx="12192000" cy="6858000"/>
   <p:notesSz cx="6858000" cy="9144000"/>
@@ -114,6 +119,37 @@
     </a:lvl9pPr>
   </p:defaultTextStyle>
   <p:extLst>
+    <p:ext uri="{521415D9-36F7-43E2-AB2F-B90AF26B5E84}">
+      <p14:sectionLst xmlns:p14="http://schemas.microsoft.com/office/powerpoint/2010/main">
+        <p14:section name="Default Section" id="{7E143341-03BE-4CFD-BA71-3EF7BA8B53AB}">
+          <p14:sldIdLst>
+            <p14:sldId id="256"/>
+            <p14:sldId id="265"/>
+            <p14:sldId id="260"/>
+            <p14:sldId id="263"/>
+            <p14:sldId id="267"/>
+            <p14:sldId id="268"/>
+            <p14:sldId id="270"/>
+            <p14:sldId id="269"/>
+            <p14:sldId id="258"/>
+            <p14:sldId id="271"/>
+            <p14:sldId id="273"/>
+          </p14:sldIdLst>
+        </p14:section>
+        <p14:section name="Dustin Jones thesis (1997)" id="{188038F8-CF66-47A3-B1FC-5412F0680D2D}">
+          <p14:sldIdLst>
+            <p14:sldId id="274"/>
+            <p14:sldId id="275"/>
+          </p14:sldIdLst>
+        </p14:section>
+        <p14:section name="Daily Operational Model (DOM)" id="{E507F66C-8721-4B8E-8142-9404BDAB96F6}">
+          <p14:sldIdLst>
+            <p14:sldId id="257"/>
+            <p14:sldId id="272"/>
+          </p14:sldIdLst>
+        </p14:section>
+      </p14:sectionLst>
+    </p:ext>
     <p:ext uri="{EFAFB233-063F-42B5-8137-9DF3F51BA10A}">
       <p15:sldGuideLst xmlns:p15="http://schemas.microsoft.com/office/powerpoint/2012/main"/>
     </p:ext>
@@ -268,7 +304,7 @@
           <a:p>
             <a:fld id="{DABA3B07-39EE-405B-8EBB-3517E9BED2D2}" type="datetimeFigureOut">
               <a:rPr lang="en-US" smtClean="0"/>
-              <a:t>10/20/2020</a:t>
+              <a:t>10/31/2020</a:t>
             </a:fld>
             <a:endParaRPr lang="en-US"/>
           </a:p>
@@ -466,7 +502,7 @@
           <a:p>
             <a:fld id="{DABA3B07-39EE-405B-8EBB-3517E9BED2D2}" type="datetimeFigureOut">
               <a:rPr lang="en-US" smtClean="0"/>
-              <a:t>10/20/2020</a:t>
+              <a:t>10/31/2020</a:t>
             </a:fld>
             <a:endParaRPr lang="en-US"/>
           </a:p>
@@ -674,7 +710,7 @@
           <a:p>
             <a:fld id="{DABA3B07-39EE-405B-8EBB-3517E9BED2D2}" type="datetimeFigureOut">
               <a:rPr lang="en-US" smtClean="0"/>
-              <a:t>10/20/2020</a:t>
+              <a:t>10/31/2020</a:t>
             </a:fld>
             <a:endParaRPr lang="en-US"/>
           </a:p>
@@ -872,7 +908,7 @@
           <a:p>
             <a:fld id="{DABA3B07-39EE-405B-8EBB-3517E9BED2D2}" type="datetimeFigureOut">
               <a:rPr lang="en-US" smtClean="0"/>
-              <a:t>10/20/2020</a:t>
+              <a:t>10/31/2020</a:t>
             </a:fld>
             <a:endParaRPr lang="en-US"/>
           </a:p>
@@ -1147,7 +1183,7 @@
           <a:p>
             <a:fld id="{DABA3B07-39EE-405B-8EBB-3517E9BED2D2}" type="datetimeFigureOut">
               <a:rPr lang="en-US" smtClean="0"/>
-              <a:t>10/20/2020</a:t>
+              <a:t>10/31/2020</a:t>
             </a:fld>
             <a:endParaRPr lang="en-US"/>
           </a:p>
@@ -1412,7 +1448,7 @@
           <a:p>
             <a:fld id="{DABA3B07-39EE-405B-8EBB-3517E9BED2D2}" type="datetimeFigureOut">
               <a:rPr lang="en-US" smtClean="0"/>
-              <a:t>10/20/2020</a:t>
+              <a:t>10/31/2020</a:t>
             </a:fld>
             <a:endParaRPr lang="en-US"/>
           </a:p>
@@ -1824,7 +1860,7 @@
           <a:p>
             <a:fld id="{DABA3B07-39EE-405B-8EBB-3517E9BED2D2}" type="datetimeFigureOut">
               <a:rPr lang="en-US" smtClean="0"/>
-              <a:t>10/20/2020</a:t>
+              <a:t>10/31/2020</a:t>
             </a:fld>
             <a:endParaRPr lang="en-US"/>
           </a:p>
@@ -1965,7 +2001,7 @@
           <a:p>
             <a:fld id="{DABA3B07-39EE-405B-8EBB-3517E9BED2D2}" type="datetimeFigureOut">
               <a:rPr lang="en-US" smtClean="0"/>
-              <a:t>10/20/2020</a:t>
+              <a:t>10/31/2020</a:t>
             </a:fld>
             <a:endParaRPr lang="en-US"/>
           </a:p>
@@ -2078,7 +2114,7 @@
           <a:p>
             <a:fld id="{DABA3B07-39EE-405B-8EBB-3517E9BED2D2}" type="datetimeFigureOut">
               <a:rPr lang="en-US" smtClean="0"/>
-              <a:t>10/20/2020</a:t>
+              <a:t>10/31/2020</a:t>
             </a:fld>
             <a:endParaRPr lang="en-US"/>
           </a:p>
@@ -2389,7 +2425,7 @@
           <a:p>
             <a:fld id="{DABA3B07-39EE-405B-8EBB-3517E9BED2D2}" type="datetimeFigureOut">
               <a:rPr lang="en-US" smtClean="0"/>
-              <a:t>10/20/2020</a:t>
+              <a:t>10/31/2020</a:t>
             </a:fld>
             <a:endParaRPr lang="en-US"/>
           </a:p>
@@ -2677,7 +2713,7 @@
           <a:p>
             <a:fld id="{DABA3B07-39EE-405B-8EBB-3517E9BED2D2}" type="datetimeFigureOut">
               <a:rPr lang="en-US" smtClean="0"/>
-              <a:t>10/20/2020</a:t>
+              <a:t>10/31/2020</a:t>
             </a:fld>
             <a:endParaRPr lang="en-US"/>
           </a:p>
@@ -2918,7 +2954,7 @@
           <a:p>
             <a:fld id="{DABA3B07-39EE-405B-8EBB-3517E9BED2D2}" type="datetimeFigureOut">
               <a:rPr lang="en-US" smtClean="0"/>
-              <a:t>10/20/2020</a:t>
+              <a:t>10/31/2020</a:t>
             </a:fld>
             <a:endParaRPr lang="en-US"/>
           </a:p>
@@ -4122,6 +4158,754 @@
 </p:sld>
 </file>
 
+<file path=ppt/slides/slide11.xml><?xml version="1.0" encoding="utf-8"?>
+<p:sld xmlns:a="http://schemas.openxmlformats.org/drawingml/2006/main" xmlns:r="http://schemas.openxmlformats.org/officeDocument/2006/relationships" xmlns:p="http://schemas.openxmlformats.org/presentationml/2006/main">
+  <p:cSld>
+    <p:spTree>
+      <p:nvGrpSpPr>
+        <p:cNvPr id="1" name=""/>
+        <p:cNvGrpSpPr/>
+        <p:nvPr/>
+      </p:nvGrpSpPr>
+      <p:grpSpPr>
+        <a:xfrm>
+          <a:off x="0" y="0"/>
+          <a:ext cx="0" cy="0"/>
+          <a:chOff x="0" y="0"/>
+          <a:chExt cx="0" cy="0"/>
+        </a:xfrm>
+      </p:grpSpPr>
+      <p:sp>
+        <p:nvSpPr>
+          <p:cNvPr id="2" name="Title 1">
+            <a:extLst>
+              <a:ext uri="{FF2B5EF4-FFF2-40B4-BE49-F238E27FC236}">
+                <a16:creationId xmlns:a16="http://schemas.microsoft.com/office/drawing/2014/main" id="{21C3B30E-3B2D-4B9B-B9A8-3AB47AEEE167}"/>
+              </a:ext>
+            </a:extLst>
+          </p:cNvPr>
+          <p:cNvSpPr>
+            <a:spLocks noGrp="1"/>
+          </p:cNvSpPr>
+          <p:nvPr>
+            <p:ph type="title"/>
+          </p:nvPr>
+        </p:nvSpPr>
+        <p:spPr/>
+        <p:txBody>
+          <a:bodyPr/>
+          <a:lstStyle/>
+          <a:p>
+            <a:r>
+              <a:rPr lang="en-US" dirty="0"/>
+              <a:t>Extra slides</a:t>
+            </a:r>
+          </a:p>
+        </p:txBody>
+      </p:sp>
+      <p:sp>
+        <p:nvSpPr>
+          <p:cNvPr id="3" name="Content Placeholder 2">
+            <a:extLst>
+              <a:ext uri="{FF2B5EF4-FFF2-40B4-BE49-F238E27FC236}">
+                <a16:creationId xmlns:a16="http://schemas.microsoft.com/office/drawing/2014/main" id="{B91571D2-2DB4-46DB-A793-9D41E85A08C9}"/>
+              </a:ext>
+            </a:extLst>
+          </p:cNvPr>
+          <p:cNvSpPr>
+            <a:spLocks noGrp="1"/>
+          </p:cNvSpPr>
+          <p:nvPr>
+            <p:ph idx="1"/>
+          </p:nvPr>
+        </p:nvSpPr>
+        <p:spPr/>
+        <p:txBody>
+          <a:bodyPr/>
+          <a:lstStyle/>
+          <a:p>
+            <a:endParaRPr lang="en-US"/>
+          </a:p>
+        </p:txBody>
+      </p:sp>
+    </p:spTree>
+    <p:extLst>
+      <p:ext uri="{BB962C8B-B14F-4D97-AF65-F5344CB8AC3E}">
+        <p14:creationId xmlns:p14="http://schemas.microsoft.com/office/powerpoint/2010/main" val="401327677"/>
+      </p:ext>
+    </p:extLst>
+  </p:cSld>
+  <p:clrMapOvr>
+    <a:masterClrMapping/>
+  </p:clrMapOvr>
+</p:sld>
+</file>
+
+<file path=ppt/slides/slide12.xml><?xml version="1.0" encoding="utf-8"?>
+<p:sld xmlns:a="http://schemas.openxmlformats.org/drawingml/2006/main" xmlns:r="http://schemas.openxmlformats.org/officeDocument/2006/relationships" xmlns:p="http://schemas.openxmlformats.org/presentationml/2006/main">
+  <p:cSld>
+    <p:bg>
+      <p:bgPr>
+        <a:solidFill>
+          <a:schemeClr val="bg1"/>
+        </a:solidFill>
+        <a:effectLst/>
+      </p:bgPr>
+    </p:bg>
+    <p:spTree>
+      <p:nvGrpSpPr>
+        <p:cNvPr id="1" name=""/>
+        <p:cNvGrpSpPr/>
+        <p:nvPr/>
+      </p:nvGrpSpPr>
+      <p:grpSpPr>
+        <a:xfrm>
+          <a:off x="0" y="0"/>
+          <a:ext cx="0" cy="0"/>
+          <a:chOff x="0" y="0"/>
+          <a:chExt cx="0" cy="0"/>
+        </a:xfrm>
+      </p:grpSpPr>
+      <p:sp useBgFill="1">
+        <p:nvSpPr>
+          <p:cNvPr id="12" name="Rectangle 11">
+            <a:extLst>
+              <a:ext uri="{FF2B5EF4-FFF2-40B4-BE49-F238E27FC236}">
+                <a16:creationId xmlns:a16="http://schemas.microsoft.com/office/drawing/2014/main" id="{7D9D36D6-2AC5-46A1-A849-4C82D5264A3A}"/>
+              </a:ext>
+              <a:ext uri="{C183D7F6-B498-43B3-948B-1728B52AA6E4}">
+                <adec:decorative xmlns:adec="http://schemas.microsoft.com/office/drawing/2017/decorative" val="1"/>
+              </a:ext>
+            </a:extLst>
+          </p:cNvPr>
+          <p:cNvSpPr>
+            <a:spLocks noGrp="1" noRot="1" noChangeAspect="1" noMove="1" noResize="1" noEditPoints="1" noAdjustHandles="1" noChangeArrowheads="1" noChangeShapeType="1" noTextEdit="1"/>
+          </p:cNvSpPr>
+          <p:nvPr>
+            <p:extLst>
+              <p:ext uri="{386F3935-93C4-4BCD-93E2-E3B085C9AB24}">
+                <p16:designElem xmlns:p16="http://schemas.microsoft.com/office/powerpoint/2015/main" val="1"/>
+              </p:ext>
+            </p:extLst>
+          </p:nvPr>
+        </p:nvSpPr>
+        <p:spPr>
+          <a:xfrm>
+            <a:off x="-1" y="0"/>
+            <a:ext cx="12188952" cy="6858000"/>
+          </a:xfrm>
+          <a:prstGeom prst="rect">
+            <a:avLst/>
+          </a:prstGeom>
+          <a:ln>
+            <a:noFill/>
+          </a:ln>
+        </p:spPr>
+        <p:style>
+          <a:lnRef idx="2">
+            <a:schemeClr val="accent1">
+              <a:shade val="50000"/>
+            </a:schemeClr>
+          </a:lnRef>
+          <a:fillRef idx="1">
+            <a:schemeClr val="accent1"/>
+          </a:fillRef>
+          <a:effectRef idx="0">
+            <a:schemeClr val="accent1"/>
+          </a:effectRef>
+          <a:fontRef idx="minor">
+            <a:schemeClr val="lt1"/>
+          </a:fontRef>
+        </p:style>
+        <p:txBody>
+          <a:bodyPr rtlCol="0" anchor="ctr"/>
+          <a:lstStyle/>
+          <a:p>
+            <a:pPr algn="ctr"/>
+            <a:endParaRPr lang="en-US" dirty="0"/>
+          </a:p>
+        </p:txBody>
+      </p:sp>
+      <p:sp>
+        <p:nvSpPr>
+          <p:cNvPr id="2" name="Title 1">
+            <a:extLst>
+              <a:ext uri="{FF2B5EF4-FFF2-40B4-BE49-F238E27FC236}">
+                <a16:creationId xmlns:a16="http://schemas.microsoft.com/office/drawing/2014/main" id="{724E032D-2364-4E0E-8EA9-0FECBCB35368}"/>
+              </a:ext>
+            </a:extLst>
+          </p:cNvPr>
+          <p:cNvSpPr>
+            <a:spLocks noGrp="1"/>
+          </p:cNvSpPr>
+          <p:nvPr>
+            <p:ph type="title"/>
+          </p:nvPr>
+        </p:nvSpPr>
+        <p:spPr>
+          <a:xfrm>
+            <a:off x="5354955" y="552182"/>
+            <a:ext cx="5998840" cy="3343135"/>
+          </a:xfrm>
+          <a:noFill/>
+        </p:spPr>
+        <p:txBody>
+          <a:bodyPr vert="horz" lIns="91440" tIns="45720" rIns="91440" bIns="45720" rtlCol="0" anchor="b">
+            <a:normAutofit/>
+          </a:bodyPr>
+          <a:lstStyle/>
+          <a:p>
+            <a:r>
+              <a:rPr lang="en-US" sz="5200" dirty="0"/>
+              <a:t>Dustin Jones’ thesis</a:t>
+            </a:r>
+          </a:p>
+        </p:txBody>
+      </p:sp>
+      <p:pic>
+        <p:nvPicPr>
+          <p:cNvPr id="7" name="Content Placeholder 6">
+            <a:extLst>
+              <a:ext uri="{FF2B5EF4-FFF2-40B4-BE49-F238E27FC236}">
+                <a16:creationId xmlns:a16="http://schemas.microsoft.com/office/drawing/2014/main" id="{109A0D45-E214-4A1C-9B13-C1515B9FDD22}"/>
+              </a:ext>
+            </a:extLst>
+          </p:cNvPr>
+          <p:cNvPicPr>
+            <a:picLocks noGrp="1" noChangeAspect="1"/>
+          </p:cNvPicPr>
+          <p:nvPr>
+            <p:ph idx="1"/>
+          </p:nvPr>
+        </p:nvPicPr>
+        <p:blipFill rotWithShape="1">
+          <a:blip r:embed="rId2"/>
+          <a:srcRect t="1106" r="1" b="1"/>
+          <a:stretch/>
+        </p:blipFill>
+        <p:spPr>
+          <a:xfrm>
+            <a:off x="20" y="10"/>
+            <a:ext cx="4992985" cy="6857990"/>
+          </a:xfrm>
+          <a:prstGeom prst="rect">
+            <a:avLst/>
+          </a:prstGeom>
+        </p:spPr>
+      </p:pic>
+    </p:spTree>
+    <p:extLst>
+      <p:ext uri="{BB962C8B-B14F-4D97-AF65-F5344CB8AC3E}">
+        <p14:creationId xmlns:p14="http://schemas.microsoft.com/office/powerpoint/2010/main" val="3002909355"/>
+      </p:ext>
+    </p:extLst>
+  </p:cSld>
+  <p:clrMapOvr>
+    <a:masterClrMapping/>
+  </p:clrMapOvr>
+</p:sld>
+</file>
+
+<file path=ppt/slides/slide13.xml><?xml version="1.0" encoding="utf-8"?>
+<p:sld xmlns:a="http://schemas.openxmlformats.org/drawingml/2006/main" xmlns:r="http://schemas.openxmlformats.org/officeDocument/2006/relationships" xmlns:p="http://schemas.openxmlformats.org/presentationml/2006/main">
+  <p:cSld>
+    <p:spTree>
+      <p:nvGrpSpPr>
+        <p:cNvPr id="1" name=""/>
+        <p:cNvGrpSpPr/>
+        <p:nvPr/>
+      </p:nvGrpSpPr>
+      <p:grpSpPr>
+        <a:xfrm>
+          <a:off x="0" y="0"/>
+          <a:ext cx="0" cy="0"/>
+          <a:chOff x="0" y="0"/>
+          <a:chExt cx="0" cy="0"/>
+        </a:xfrm>
+      </p:grpSpPr>
+      <p:sp>
+        <p:nvSpPr>
+          <p:cNvPr id="2" name="Title 1">
+            <a:extLst>
+              <a:ext uri="{FF2B5EF4-FFF2-40B4-BE49-F238E27FC236}">
+                <a16:creationId xmlns:a16="http://schemas.microsoft.com/office/drawing/2014/main" id="{156F6981-5E92-4811-A968-568136DA2D6C}"/>
+              </a:ext>
+            </a:extLst>
+          </p:cNvPr>
+          <p:cNvSpPr>
+            <a:spLocks noGrp="1"/>
+          </p:cNvSpPr>
+          <p:nvPr>
+            <p:ph type="title"/>
+          </p:nvPr>
+        </p:nvSpPr>
+        <p:spPr/>
+        <p:txBody>
+          <a:bodyPr/>
+          <a:lstStyle/>
+          <a:p>
+            <a:r>
+              <a:rPr lang="en-US" dirty="0"/>
+              <a:t>Reservoir Operation (Jones 1997)</a:t>
+            </a:r>
+          </a:p>
+        </p:txBody>
+      </p:sp>
+      <p:sp>
+        <p:nvSpPr>
+          <p:cNvPr id="3" name="Content Placeholder 2">
+            <a:extLst>
+              <a:ext uri="{FF2B5EF4-FFF2-40B4-BE49-F238E27FC236}">
+                <a16:creationId xmlns:a16="http://schemas.microsoft.com/office/drawing/2014/main" id="{D6B20981-2D80-44AA-AD8E-F5E108830888}"/>
+              </a:ext>
+            </a:extLst>
+          </p:cNvPr>
+          <p:cNvSpPr>
+            <a:spLocks noGrp="1"/>
+          </p:cNvSpPr>
+          <p:nvPr>
+            <p:ph idx="1"/>
+          </p:nvPr>
+        </p:nvSpPr>
+        <p:spPr/>
+        <p:txBody>
+          <a:bodyPr>
+            <a:normAutofit fontScale="70000" lnSpcReduction="20000"/>
+          </a:bodyPr>
+          <a:lstStyle/>
+          <a:p>
+            <a:pPr marL="0" indent="0">
+              <a:lnSpc>
+                <a:spcPct val="120000"/>
+              </a:lnSpc>
+              <a:buNone/>
+            </a:pPr>
+            <a:r>
+              <a:rPr lang="en-US" b="1" dirty="0"/>
+              <a:t>Oroville Dam. </a:t>
+            </a:r>
+            <a:r>
+              <a:rPr lang="en-US" dirty="0"/>
+              <a:t>Oroville Dam is operated to prevent flows on the Feather River from exceeding 150,000 </a:t>
+            </a:r>
+            <a:r>
+              <a:rPr lang="en-US" dirty="0" err="1"/>
+              <a:t>cfs</a:t>
+            </a:r>
+            <a:r>
+              <a:rPr lang="en-US" dirty="0"/>
+              <a:t> at Oroville, 180,000 </a:t>
+            </a:r>
+            <a:r>
+              <a:rPr lang="en-US" dirty="0" err="1"/>
+              <a:t>cfs</a:t>
+            </a:r>
+            <a:r>
+              <a:rPr lang="en-US" dirty="0"/>
+              <a:t> above and 300,000 </a:t>
+            </a:r>
+            <a:r>
+              <a:rPr lang="en-US" dirty="0" err="1"/>
+              <a:t>cfs</a:t>
+            </a:r>
+            <a:r>
+              <a:rPr lang="en-US" dirty="0"/>
+              <a:t> below the mouth of the Yuba River, and 320,000 </a:t>
+            </a:r>
+            <a:r>
+              <a:rPr lang="en-US" dirty="0" err="1"/>
+              <a:t>cfs</a:t>
+            </a:r>
+            <a:r>
+              <a:rPr lang="en-US" dirty="0"/>
+              <a:t> below the mouth of the Bear River. Oroville Dam releases should not be increased by more than 10,000 </a:t>
+            </a:r>
+            <a:r>
+              <a:rPr lang="en-US" dirty="0" err="1"/>
+              <a:t>cfs</a:t>
+            </a:r>
+            <a:r>
+              <a:rPr lang="en-US" dirty="0"/>
+              <a:t> or decreased by more than 5,000 </a:t>
+            </a:r>
+            <a:r>
+              <a:rPr lang="en-US" dirty="0" err="1"/>
+              <a:t>cfs</a:t>
+            </a:r>
+            <a:r>
+              <a:rPr lang="en-US" dirty="0"/>
+              <a:t> during any 2-hour period. The National Weather Service in Sacramento provides 24-hour forecasts twice a day. From January through May, the National Weather Service also publishes water supply forecasts indicating the forecasted volume of runoff for the remainder of the water year (USACE, 1970).</a:t>
+            </a:r>
+          </a:p>
+          <a:p>
+            <a:pPr marL="0" indent="0">
+              <a:lnSpc>
+                <a:spcPct val="120000"/>
+              </a:lnSpc>
+              <a:buNone/>
+            </a:pPr>
+            <a:r>
+              <a:rPr lang="en-US" b="1" dirty="0"/>
+              <a:t>New </a:t>
+            </a:r>
+            <a:r>
+              <a:rPr lang="en-US" b="1" dirty="0" err="1"/>
+              <a:t>Bullards</a:t>
+            </a:r>
+            <a:r>
+              <a:rPr lang="en-US" b="1" dirty="0"/>
+              <a:t> Bar. </a:t>
+            </a:r>
+            <a:r>
+              <a:rPr lang="en-US" dirty="0"/>
+              <a:t>New </a:t>
+            </a:r>
+            <a:r>
+              <a:rPr lang="en-US" dirty="0" err="1"/>
+              <a:t>Bullards</a:t>
+            </a:r>
+            <a:r>
+              <a:rPr lang="en-US" dirty="0"/>
+              <a:t> Bar reservoir is operated so as not to cause flow in the Yuba River at Marysville to exceed 120,000 </a:t>
+            </a:r>
+            <a:r>
+              <a:rPr lang="en-US" dirty="0" err="1"/>
+              <a:t>cfs</a:t>
+            </a:r>
+            <a:r>
+              <a:rPr lang="en-US" dirty="0"/>
+              <a:t> (180,000 </a:t>
+            </a:r>
+            <a:r>
+              <a:rPr lang="en-US" dirty="0" err="1"/>
+              <a:t>cfs</a:t>
+            </a:r>
+            <a:r>
+              <a:rPr lang="en-US" dirty="0"/>
+              <a:t> when flow in the Feather River is low). The dam also is operated to keep flow in the Feather River below the Yuba River confluence from exceeding 300,000 </a:t>
+            </a:r>
+            <a:r>
+              <a:rPr lang="en-US" dirty="0" err="1"/>
+              <a:t>cfs</a:t>
+            </a:r>
+            <a:r>
+              <a:rPr lang="en-US" dirty="0"/>
+              <a:t> and below the Bear River confluence from exceeding 320,000 </a:t>
+            </a:r>
+            <a:r>
+              <a:rPr lang="en-US" dirty="0" err="1"/>
+              <a:t>cfs</a:t>
+            </a:r>
+            <a:r>
+              <a:rPr lang="en-US" dirty="0"/>
+              <a:t>. Releases at New </a:t>
+            </a:r>
+            <a:r>
+              <a:rPr lang="en-US" dirty="0" err="1"/>
+              <a:t>Bullards</a:t>
+            </a:r>
+            <a:r>
+              <a:rPr lang="en-US" dirty="0"/>
+              <a:t> Bar Dam should not be increased or decreased by more than 5,000 </a:t>
+            </a:r>
+            <a:r>
+              <a:rPr lang="en-US" dirty="0" err="1"/>
+              <a:t>cfs</a:t>
+            </a:r>
+            <a:r>
+              <a:rPr lang="en-US" dirty="0"/>
+              <a:t> in any 1-hour period (USACE, 1972).</a:t>
+            </a:r>
+          </a:p>
+        </p:txBody>
+      </p:sp>
+    </p:spTree>
+    <p:extLst>
+      <p:ext uri="{BB962C8B-B14F-4D97-AF65-F5344CB8AC3E}">
+        <p14:creationId xmlns:p14="http://schemas.microsoft.com/office/powerpoint/2010/main" val="1240098989"/>
+      </p:ext>
+    </p:extLst>
+  </p:cSld>
+  <p:clrMapOvr>
+    <a:masterClrMapping/>
+  </p:clrMapOvr>
+</p:sld>
+</file>
+
+<file path=ppt/slides/slide14.xml><?xml version="1.0" encoding="utf-8"?>
+<p:sld xmlns:a="http://schemas.openxmlformats.org/drawingml/2006/main" xmlns:r="http://schemas.openxmlformats.org/officeDocument/2006/relationships" xmlns:p="http://schemas.openxmlformats.org/presentationml/2006/main">
+  <p:cSld>
+    <p:spTree>
+      <p:nvGrpSpPr>
+        <p:cNvPr id="1" name=""/>
+        <p:cNvGrpSpPr/>
+        <p:nvPr/>
+      </p:nvGrpSpPr>
+      <p:grpSpPr>
+        <a:xfrm>
+          <a:off x="0" y="0"/>
+          <a:ext cx="0" cy="0"/>
+          <a:chOff x="0" y="0"/>
+          <a:chExt cx="0" cy="0"/>
+        </a:xfrm>
+      </p:grpSpPr>
+      <p:sp>
+        <p:nvSpPr>
+          <p:cNvPr id="2" name="Title 1">
+            <a:extLst>
+              <a:ext uri="{FF2B5EF4-FFF2-40B4-BE49-F238E27FC236}">
+                <a16:creationId xmlns:a16="http://schemas.microsoft.com/office/drawing/2014/main" id="{74CCEC8C-768F-416F-9662-74A451431660}"/>
+              </a:ext>
+            </a:extLst>
+          </p:cNvPr>
+          <p:cNvSpPr>
+            <a:spLocks noGrp="1"/>
+          </p:cNvSpPr>
+          <p:nvPr>
+            <p:ph type="title"/>
+          </p:nvPr>
+        </p:nvSpPr>
+        <p:spPr/>
+        <p:txBody>
+          <a:bodyPr/>
+          <a:lstStyle/>
+          <a:p>
+            <a:endParaRPr lang="en-US"/>
+          </a:p>
+        </p:txBody>
+      </p:sp>
+      <p:sp>
+        <p:nvSpPr>
+          <p:cNvPr id="3" name="Content Placeholder 2">
+            <a:extLst>
+              <a:ext uri="{FF2B5EF4-FFF2-40B4-BE49-F238E27FC236}">
+                <a16:creationId xmlns:a16="http://schemas.microsoft.com/office/drawing/2014/main" id="{E31A593A-8E5E-4657-BDDE-3D278826A510}"/>
+              </a:ext>
+            </a:extLst>
+          </p:cNvPr>
+          <p:cNvSpPr>
+            <a:spLocks noGrp="1"/>
+          </p:cNvSpPr>
+          <p:nvPr>
+            <p:ph idx="1"/>
+          </p:nvPr>
+        </p:nvSpPr>
+        <p:spPr/>
+        <p:txBody>
+          <a:bodyPr/>
+          <a:lstStyle/>
+          <a:p>
+            <a:endParaRPr lang="en-US"/>
+          </a:p>
+        </p:txBody>
+      </p:sp>
+      <p:pic>
+        <p:nvPicPr>
+          <p:cNvPr id="5" name="Picture 4">
+            <a:extLst>
+              <a:ext uri="{FF2B5EF4-FFF2-40B4-BE49-F238E27FC236}">
+                <a16:creationId xmlns:a16="http://schemas.microsoft.com/office/drawing/2014/main" id="{DD62E57A-B7B9-4D5E-81FE-D0E2FE42EC42}"/>
+              </a:ext>
+            </a:extLst>
+          </p:cNvPr>
+          <p:cNvPicPr>
+            <a:picLocks noChangeAspect="1"/>
+          </p:cNvPicPr>
+          <p:nvPr/>
+        </p:nvPicPr>
+        <p:blipFill>
+          <a:blip r:embed="rId2"/>
+          <a:stretch>
+            <a:fillRect/>
+          </a:stretch>
+        </p:blipFill>
+        <p:spPr>
+          <a:xfrm>
+            <a:off x="1505013" y="0"/>
+            <a:ext cx="9181973" cy="6858000"/>
+          </a:xfrm>
+          <a:prstGeom prst="rect">
+            <a:avLst/>
+          </a:prstGeom>
+        </p:spPr>
+      </p:pic>
+      <p:sp>
+        <p:nvSpPr>
+          <p:cNvPr id="6" name="Rectangle 5">
+            <a:extLst>
+              <a:ext uri="{FF2B5EF4-FFF2-40B4-BE49-F238E27FC236}">
+                <a16:creationId xmlns:a16="http://schemas.microsoft.com/office/drawing/2014/main" id="{D34439B0-37F9-4545-9A49-11AE396E9630}"/>
+              </a:ext>
+            </a:extLst>
+          </p:cNvPr>
+          <p:cNvSpPr/>
+          <p:nvPr/>
+        </p:nvSpPr>
+        <p:spPr>
+          <a:xfrm>
+            <a:off x="1577130" y="4040155"/>
+            <a:ext cx="8929139" cy="2659225"/>
+          </a:xfrm>
+          <a:prstGeom prst="rect">
+            <a:avLst/>
+          </a:prstGeom>
+          <a:noFill/>
+          <a:ln w="76200" cap="flat" cmpd="sng" algn="ctr">
+            <a:solidFill>
+              <a:schemeClr val="accent4"/>
+            </a:solidFill>
+            <a:prstDash val="solid"/>
+            <a:round/>
+            <a:headEnd type="none" w="med" len="med"/>
+            <a:tailEnd type="none" w="med" len="med"/>
+          </a:ln>
+        </p:spPr>
+        <p:style>
+          <a:lnRef idx="0">
+            <a:scrgbClr r="0" g="0" b="0"/>
+          </a:lnRef>
+          <a:fillRef idx="0">
+            <a:scrgbClr r="0" g="0" b="0"/>
+          </a:fillRef>
+          <a:effectRef idx="0">
+            <a:scrgbClr r="0" g="0" b="0"/>
+          </a:effectRef>
+          <a:fontRef idx="minor">
+            <a:schemeClr val="accent4"/>
+          </a:fontRef>
+        </p:style>
+        <p:txBody>
+          <a:bodyPr rtlCol="0" anchor="ctr"/>
+          <a:lstStyle/>
+          <a:p>
+            <a:pPr algn="ctr"/>
+            <a:endParaRPr lang="en-US"/>
+          </a:p>
+        </p:txBody>
+      </p:sp>
+    </p:spTree>
+    <p:extLst>
+      <p:ext uri="{BB962C8B-B14F-4D97-AF65-F5344CB8AC3E}">
+        <p14:creationId xmlns:p14="http://schemas.microsoft.com/office/powerpoint/2010/main" val="1919883648"/>
+      </p:ext>
+    </p:extLst>
+  </p:cSld>
+  <p:clrMapOvr>
+    <a:masterClrMapping/>
+  </p:clrMapOvr>
+</p:sld>
+</file>
+
+<file path=ppt/slides/slide15.xml><?xml version="1.0" encoding="utf-8"?>
+<p:sld xmlns:a="http://schemas.openxmlformats.org/drawingml/2006/main" xmlns:r="http://schemas.openxmlformats.org/officeDocument/2006/relationships" xmlns:p="http://schemas.openxmlformats.org/presentationml/2006/main">
+  <p:cSld>
+    <p:spTree>
+      <p:nvGrpSpPr>
+        <p:cNvPr id="1" name=""/>
+        <p:cNvGrpSpPr/>
+        <p:nvPr/>
+      </p:nvGrpSpPr>
+      <p:grpSpPr>
+        <a:xfrm>
+          <a:off x="0" y="0"/>
+          <a:ext cx="0" cy="0"/>
+          <a:chOff x="0" y="0"/>
+          <a:chExt cx="0" cy="0"/>
+        </a:xfrm>
+      </p:grpSpPr>
+      <p:sp>
+        <p:nvSpPr>
+          <p:cNvPr id="2" name="Title 1">
+            <a:extLst>
+              <a:ext uri="{FF2B5EF4-FFF2-40B4-BE49-F238E27FC236}">
+                <a16:creationId xmlns:a16="http://schemas.microsoft.com/office/drawing/2014/main" id="{C3CA7100-54E6-4BA1-945B-027F5D6F5561}"/>
+              </a:ext>
+            </a:extLst>
+          </p:cNvPr>
+          <p:cNvSpPr>
+            <a:spLocks noGrp="1"/>
+          </p:cNvSpPr>
+          <p:nvPr>
+            <p:ph type="title"/>
+          </p:nvPr>
+        </p:nvSpPr>
+        <p:spPr/>
+        <p:txBody>
+          <a:bodyPr/>
+          <a:lstStyle/>
+          <a:p>
+            <a:endParaRPr lang="en-US"/>
+          </a:p>
+        </p:txBody>
+      </p:sp>
+      <p:sp>
+        <p:nvSpPr>
+          <p:cNvPr id="3" name="Content Placeholder 2">
+            <a:extLst>
+              <a:ext uri="{FF2B5EF4-FFF2-40B4-BE49-F238E27FC236}">
+                <a16:creationId xmlns:a16="http://schemas.microsoft.com/office/drawing/2014/main" id="{79FD2B82-A7A0-47F6-ADCD-B1B813BB3881}"/>
+              </a:ext>
+            </a:extLst>
+          </p:cNvPr>
+          <p:cNvSpPr>
+            <a:spLocks noGrp="1"/>
+          </p:cNvSpPr>
+          <p:nvPr>
+            <p:ph idx="1"/>
+          </p:nvPr>
+        </p:nvSpPr>
+        <p:spPr/>
+        <p:txBody>
+          <a:bodyPr/>
+          <a:lstStyle/>
+          <a:p>
+            <a:endParaRPr lang="en-US"/>
+          </a:p>
+        </p:txBody>
+      </p:sp>
+      <p:pic>
+        <p:nvPicPr>
+          <p:cNvPr id="5" name="Picture 4">
+            <a:extLst>
+              <a:ext uri="{FF2B5EF4-FFF2-40B4-BE49-F238E27FC236}">
+                <a16:creationId xmlns:a16="http://schemas.microsoft.com/office/drawing/2014/main" id="{0399A1FF-D37E-4BE9-A1F3-E1FC9F59286F}"/>
+              </a:ext>
+            </a:extLst>
+          </p:cNvPr>
+          <p:cNvPicPr>
+            <a:picLocks noChangeAspect="1"/>
+          </p:cNvPicPr>
+          <p:nvPr/>
+        </p:nvPicPr>
+        <p:blipFill>
+          <a:blip r:embed="rId2"/>
+          <a:stretch>
+            <a:fillRect/>
+          </a:stretch>
+        </p:blipFill>
+        <p:spPr>
+          <a:xfrm>
+            <a:off x="1517740" y="0"/>
+            <a:ext cx="9156519" cy="6858000"/>
+          </a:xfrm>
+          <a:prstGeom prst="rect">
+            <a:avLst/>
+          </a:prstGeom>
+        </p:spPr>
+      </p:pic>
+    </p:spTree>
+    <p:extLst>
+      <p:ext uri="{BB962C8B-B14F-4D97-AF65-F5344CB8AC3E}">
+        <p14:creationId xmlns:p14="http://schemas.microsoft.com/office/powerpoint/2010/main" val="3810965186"/>
+      </p:ext>
+    </p:extLst>
+  </p:cSld>
+  <p:clrMapOvr>
+    <a:masterClrMapping/>
+  </p:clrMapOvr>
+</p:sld>
+</file>
+
 <file path=ppt/slides/slide2.xml><?xml version="1.0" encoding="utf-8"?>
 <p:sld xmlns:a="http://schemas.openxmlformats.org/drawingml/2006/main" xmlns:r="http://schemas.openxmlformats.org/officeDocument/2006/relationships" xmlns:p="http://schemas.openxmlformats.org/presentationml/2006/main">
   <p:cSld>

</xml_diff>